<commit_message>
Improve consistency of tutorial thumbnails
</commit_message>
<xml_diff>
--- a/docs/source/figures/gallery_thumbnails.pptx
+++ b/docs/source/figures/gallery_thumbnails.pptx
@@ -3291,6 +3291,55 @@
           <a:chExt cx="0" cy="0"/>
         </a:xfrm>
       </p:grpSpPr>
+      <p:sp>
+        <p:nvSpPr>
+          <p:cNvPr id="27" name="Rounded Rectangle 26"/>
+          <p:cNvSpPr/>
+          <p:nvPr/>
+        </p:nvSpPr>
+        <p:spPr>
+          <a:xfrm>
+            <a:off x="853570" y="853671"/>
+            <a:ext cx="7234527" cy="4851352"/>
+          </a:xfrm>
+          <a:prstGeom prst="roundRect">
+            <a:avLst>
+              <a:gd name="adj" fmla="val 4437"/>
+            </a:avLst>
+          </a:prstGeom>
+          <a:solidFill>
+            <a:srgbClr val="EDEDED"/>
+          </a:solidFill>
+          <a:ln>
+            <a:solidFill>
+              <a:srgbClr val="000000"/>
+            </a:solidFill>
+          </a:ln>
+          <a:effectLst/>
+        </p:spPr>
+        <p:style>
+          <a:lnRef idx="1">
+            <a:schemeClr val="accent1"/>
+          </a:lnRef>
+          <a:fillRef idx="3">
+            <a:schemeClr val="accent1"/>
+          </a:fillRef>
+          <a:effectRef idx="2">
+            <a:schemeClr val="accent1"/>
+          </a:effectRef>
+          <a:fontRef idx="minor">
+            <a:schemeClr val="lt1"/>
+          </a:fontRef>
+        </p:style>
+        <p:txBody>
+          <a:bodyPr rtlCol="0" anchor="ctr"/>
+          <a:lstStyle/>
+          <a:p>
+            <a:pPr algn="ctr"/>
+            <a:endParaRPr lang="en-US"/>
+          </a:p>
+        </p:txBody>
+      </p:sp>
       <p:graphicFrame>
         <p:nvGraphicFramePr>
           <p:cNvPr id="7" name="Table 6"/>
@@ -3300,14 +3349,14 @@
           <p:nvPr>
             <p:extLst>
               <p:ext uri="{D42A27DB-BD31-4B8C-83A1-F6EECF244321}">
-                <p14:modId xmlns:p14="http://schemas.microsoft.com/office/powerpoint/2010/main" val="1306850748"/>
+                <p14:modId xmlns:p14="http://schemas.microsoft.com/office/powerpoint/2010/main" val="556855805"/>
               </p:ext>
             </p:extLst>
           </p:nvPr>
         </p:nvGraphicFramePr>
         <p:xfrm>
-          <a:off x="1311583" y="1812781"/>
-          <a:ext cx="6141542" cy="2257811"/>
+          <a:off x="1020118" y="2187577"/>
+          <a:ext cx="6880609" cy="3074538"/>
         </p:xfrm>
         <a:graphic>
           <a:graphicData uri="http://schemas.openxmlformats.org/drawingml/2006/table">
@@ -3316,22 +3365,22 @@
                 <a:tableStyleId>{5C22544A-7EE6-4342-B048-85BDC9FD1C3A}</a:tableStyleId>
               </a:tblPr>
               <a:tblGrid>
-                <a:gridCol w="877363"/>
-                <a:gridCol w="877363"/>
-                <a:gridCol w="877363"/>
-                <a:gridCol w="877363"/>
-                <a:gridCol w="877364"/>
-                <a:gridCol w="877363"/>
-                <a:gridCol w="877363"/>
+                <a:gridCol w="982944"/>
+                <a:gridCol w="982944"/>
+                <a:gridCol w="982944"/>
+                <a:gridCol w="982944"/>
+                <a:gridCol w="982945"/>
+                <a:gridCol w="982944"/>
+                <a:gridCol w="982944"/>
               </a:tblGrid>
-              <a:tr h="241595">
+              <a:tr h="269255">
                 <a:tc rowSpan="2">
                   <a:txBody>
                     <a:bodyPr/>
                     <a:lstStyle/>
                     <a:p>
                       <a:r>
-                        <a:rPr lang="en-US" sz="1200" b="1" dirty="0" smtClean="0">
+                        <a:rPr lang="en-US" sz="1400" b="1" dirty="0" smtClean="0">
                           <a:solidFill>
                             <a:schemeClr val="bg1"/>
                           </a:solidFill>
@@ -3340,7 +3389,7 @@
                         </a:rPr>
                         <a:t>customer</a:t>
                       </a:r>
-                      <a:endParaRPr lang="en-US" sz="1200" b="1" dirty="0">
+                      <a:endParaRPr lang="en-US" sz="1400" b="1" dirty="0">
                         <a:solidFill>
                           <a:schemeClr val="bg1"/>
                         </a:solidFill>
@@ -3396,7 +3445,7 @@
                     <a:bodyPr/>
                     <a:lstStyle/>
                     <a:p>
-                      <a:endParaRPr lang="en-US" sz="1200" b="1" dirty="0">
+                      <a:endParaRPr lang="en-US" sz="1400" b="1" dirty="0">
                         <a:solidFill>
                           <a:srgbClr val="FFFFFF"/>
                         </a:solidFill>
@@ -3503,7 +3552,7 @@
                     <a:lstStyle/>
                     <a:p>
                       <a:r>
-                        <a:rPr lang="en-US" sz="1200" b="1" dirty="0" err="1" smtClean="0">
+                        <a:rPr lang="en-US" sz="1400" b="1" dirty="0" err="1" smtClean="0">
                           <a:solidFill>
                             <a:srgbClr val="FFFFFF"/>
                           </a:solidFill>
@@ -3512,7 +3561,7 @@
                         </a:rPr>
                         <a:t>home_address</a:t>
                       </a:r>
-                      <a:endParaRPr lang="en-US" sz="1200" b="1" dirty="0">
+                      <a:endParaRPr lang="en-US" sz="1400" b="1" dirty="0">
                         <a:solidFill>
                           <a:srgbClr val="FFFFFF"/>
                         </a:solidFill>
@@ -3619,7 +3668,7 @@
                     <a:lstStyle/>
                     <a:p>
                       <a:r>
-                        <a:rPr lang="en-US" sz="1200" b="1" dirty="0" err="1" smtClean="0">
+                        <a:rPr lang="en-US" sz="1400" b="1" dirty="0" err="1" smtClean="0">
                           <a:solidFill>
                             <a:srgbClr val="FFFFFF"/>
                           </a:solidFill>
@@ -3628,7 +3677,7 @@
                         </a:rPr>
                         <a:t>work_address</a:t>
                       </a:r>
-                      <a:endParaRPr lang="en-US" sz="1200" b="1" dirty="0">
+                      <a:endParaRPr lang="en-US" sz="1400" b="1" dirty="0">
                         <a:solidFill>
                           <a:srgbClr val="FFFFFF"/>
                         </a:solidFill>
@@ -3730,7 +3779,7 @@
                   </a:tcPr>
                 </a:tc>
               </a:tr>
-              <a:tr h="241595">
+              <a:tr h="269255">
                 <a:tc vMerge="1">
                   <a:txBody>
                     <a:bodyPr/>
@@ -3790,7 +3839,7 @@
                     <a:lstStyle/>
                     <a:p>
                       <a:r>
-                        <a:rPr lang="en-US" sz="1200" b="1" dirty="0" err="1" smtClean="0">
+                        <a:rPr lang="en-US" sz="1400" b="1" dirty="0" err="1" smtClean="0">
                           <a:solidFill>
                             <a:srgbClr val="FFFFFF"/>
                           </a:solidFill>
@@ -3799,7 +3848,7 @@
                         </a:rPr>
                         <a:t>firstname</a:t>
                       </a:r>
-                      <a:endParaRPr lang="en-US" sz="1200" b="1" dirty="0">
+                      <a:endParaRPr lang="en-US" sz="1400" b="1" dirty="0">
                         <a:solidFill>
                           <a:srgbClr val="FFFFFF"/>
                         </a:solidFill>
@@ -3856,7 +3905,7 @@
                     <a:lstStyle/>
                     <a:p>
                       <a:r>
-                        <a:rPr lang="en-US" sz="1200" b="1" dirty="0" err="1" smtClean="0">
+                        <a:rPr lang="en-US" sz="1400" b="1" dirty="0" err="1" smtClean="0">
                           <a:solidFill>
                             <a:srgbClr val="FFFFFF"/>
                           </a:solidFill>
@@ -3865,7 +3914,7 @@
                         </a:rPr>
                         <a:t>lastname</a:t>
                       </a:r>
-                      <a:endParaRPr lang="en-US" sz="1200" b="1" dirty="0">
+                      <a:endParaRPr lang="en-US" sz="1400" b="1" dirty="0">
                         <a:solidFill>
                           <a:srgbClr val="FFFFFF"/>
                         </a:solidFill>
@@ -3922,7 +3971,7 @@
                     <a:lstStyle/>
                     <a:p>
                       <a:r>
-                        <a:rPr lang="en-US" sz="1200" b="1" dirty="0" smtClean="0">
+                        <a:rPr lang="en-US" sz="1400" b="1" dirty="0" smtClean="0">
                           <a:solidFill>
                             <a:srgbClr val="FFFFFF"/>
                           </a:solidFill>
@@ -3931,7 +3980,7 @@
                         </a:rPr>
                         <a:t>city</a:t>
                       </a:r>
-                      <a:endParaRPr lang="en-US" sz="1200" b="1" dirty="0">
+                      <a:endParaRPr lang="en-US" sz="1400" b="1" dirty="0">
                         <a:solidFill>
                           <a:srgbClr val="FFFFFF"/>
                         </a:solidFill>
@@ -3988,7 +4037,7 @@
                     <a:lstStyle/>
                     <a:p>
                       <a:r>
-                        <a:rPr lang="en-US" sz="1200" b="1" dirty="0" smtClean="0">
+                        <a:rPr lang="en-US" sz="1400" b="1" dirty="0" smtClean="0">
                           <a:solidFill>
                             <a:srgbClr val="FFFFFF"/>
                           </a:solidFill>
@@ -3997,7 +4046,7 @@
                         </a:rPr>
                         <a:t>street</a:t>
                       </a:r>
-                      <a:endParaRPr lang="en-US" sz="1200" b="1" dirty="0">
+                      <a:endParaRPr lang="en-US" sz="1400" b="1" dirty="0">
                         <a:solidFill>
                           <a:srgbClr val="FFFFFF"/>
                         </a:solidFill>
@@ -4054,7 +4103,7 @@
                     <a:lstStyle/>
                     <a:p>
                       <a:r>
-                        <a:rPr lang="en-US" sz="1200" b="1" dirty="0" smtClean="0">
+                        <a:rPr lang="en-US" sz="1400" b="1" dirty="0" smtClean="0">
                           <a:solidFill>
                             <a:srgbClr val="FFFFFF"/>
                           </a:solidFill>
@@ -4063,7 +4112,7 @@
                         </a:rPr>
                         <a:t>city</a:t>
                       </a:r>
-                      <a:endParaRPr lang="en-US" sz="1200" b="1" dirty="0">
+                      <a:endParaRPr lang="en-US" sz="1400" b="1" dirty="0">
                         <a:solidFill>
                           <a:srgbClr val="FFFFFF"/>
                         </a:solidFill>
@@ -4120,7 +4169,7 @@
                     <a:lstStyle/>
                     <a:p>
                       <a:r>
-                        <a:rPr lang="en-US" sz="1200" b="1" dirty="0" smtClean="0">
+                        <a:rPr lang="en-US" sz="1400" b="1" dirty="0" smtClean="0">
                           <a:solidFill>
                             <a:srgbClr val="FFFFFF"/>
                           </a:solidFill>
@@ -4129,7 +4178,7 @@
                         </a:rPr>
                         <a:t>street</a:t>
                       </a:r>
-                      <a:endParaRPr lang="en-US" sz="1200" b="1" dirty="0">
+                      <a:endParaRPr lang="en-US" sz="1400" b="1" dirty="0">
                         <a:solidFill>
                           <a:srgbClr val="FFFFFF"/>
                         </a:solidFill>
@@ -4181,23 +4230,23 @@
                   </a:tcPr>
                 </a:tc>
               </a:tr>
-              <a:tr h="337571">
+              <a:tr h="331339">
                 <a:tc>
                   <a:txBody>
                     <a:bodyPr/>
                     <a:lstStyle/>
                     <a:p>
                       <a:r>
-                        <a:rPr lang="en-US" sz="1200" b="1" dirty="0" smtClean="0">
+                        <a:rPr lang="en-US" sz="1400" b="1" dirty="0" smtClean="0">
                           <a:solidFill>
                             <a:schemeClr val="bg1"/>
                           </a:solidFill>
-                          <a:latin typeface="+mn-lt"/>
-                          <a:cs typeface="+mn-cs"/>
+                          <a:latin typeface="Arial"/>
+                          <a:cs typeface="Arial"/>
                         </a:rPr>
                         <a:t>id</a:t>
                       </a:r>
-                      <a:endParaRPr lang="en-US" sz="1200" b="1" dirty="0">
+                      <a:endParaRPr lang="en-US" sz="1400" b="1" dirty="0">
                         <a:solidFill>
                           <a:schemeClr val="bg1"/>
                         </a:solidFill>
@@ -4253,7 +4302,7 @@
                     <a:bodyPr/>
                     <a:lstStyle/>
                     <a:p>
-                      <a:endParaRPr lang="en-US" sz="1200" dirty="0">
+                      <a:endParaRPr lang="en-US" sz="1400" dirty="0">
                         <a:latin typeface="Arial"/>
                         <a:cs typeface="Arial"/>
                       </a:endParaRPr>
@@ -4567,20 +4616,20 @@
                   </a:tcPr>
                 </a:tc>
               </a:tr>
-              <a:tr h="241595">
+              <a:tr h="269255">
                 <a:tc>
                   <a:txBody>
                     <a:bodyPr/>
                     <a:lstStyle/>
                     <a:p>
                       <a:r>
-                        <a:rPr lang="en-US" sz="1200" dirty="0" smtClean="0">
+                        <a:rPr lang="en-US" sz="1400" dirty="0" smtClean="0">
                           <a:latin typeface="Arial"/>
                           <a:cs typeface="Arial"/>
                         </a:rPr>
                         <a:t>0</a:t>
                       </a:r>
-                      <a:endParaRPr lang="en-US" sz="1200" dirty="0">
+                      <a:endParaRPr lang="en-US" sz="1400" dirty="0">
                         <a:latin typeface="Arial"/>
                         <a:cs typeface="Arial"/>
                       </a:endParaRPr>
@@ -4631,13 +4680,13 @@
                     <a:lstStyle/>
                     <a:p>
                       <a:r>
-                        <a:rPr lang="en-US" sz="1200" dirty="0" smtClean="0">
+                        <a:rPr lang="en-US" sz="1400" dirty="0" smtClean="0">
                           <a:latin typeface="Arial"/>
                           <a:cs typeface="Arial"/>
                         </a:rPr>
                         <a:t>Peter</a:t>
                       </a:r>
-                      <a:endParaRPr lang="en-US" sz="1200" dirty="0">
+                      <a:endParaRPr lang="en-US" sz="1400" dirty="0">
                         <a:latin typeface="Arial"/>
                         <a:cs typeface="Arial"/>
                       </a:endParaRPr>
@@ -4688,13 +4737,13 @@
                     <a:lstStyle/>
                     <a:p>
                       <a:r>
-                        <a:rPr lang="en-US" sz="1200" dirty="0" smtClean="0">
+                        <a:rPr lang="en-US" sz="1400" dirty="0" smtClean="0">
                           <a:latin typeface="Arial"/>
                           <a:cs typeface="Arial"/>
                         </a:rPr>
                         <a:t>Williams</a:t>
                       </a:r>
-                      <a:endParaRPr lang="en-US" sz="1200" dirty="0">
+                      <a:endParaRPr lang="en-US" sz="1400" dirty="0">
                         <a:latin typeface="Arial"/>
                         <a:cs typeface="Arial"/>
                       </a:endParaRPr>
@@ -4745,13 +4794,13 @@
                     <a:lstStyle/>
                     <a:p>
                       <a:r>
-                        <a:rPr lang="en-US" sz="1200" dirty="0" err="1" smtClean="0">
+                        <a:rPr lang="en-US" sz="1400" dirty="0" err="1" smtClean="0">
                           <a:latin typeface="Arial"/>
                           <a:cs typeface="Arial"/>
                         </a:rPr>
                         <a:t>Rivercity</a:t>
                       </a:r>
-                      <a:endParaRPr lang="en-US" sz="1200" dirty="0">
+                      <a:endParaRPr lang="en-US" sz="1400" dirty="0">
                         <a:latin typeface="Arial"/>
                         <a:cs typeface="Arial"/>
                       </a:endParaRPr>
@@ -4802,13 +4851,13 @@
                     <a:lstStyle/>
                     <a:p>
                       <a:r>
-                        <a:rPr lang="en-US" sz="1200" dirty="0" err="1" smtClean="0">
+                        <a:rPr lang="en-US" sz="1400" dirty="0" err="1" smtClean="0">
                           <a:latin typeface="Arial"/>
                           <a:cs typeface="Arial"/>
                         </a:rPr>
                         <a:t>Aloastreet</a:t>
                       </a:r>
-                      <a:endParaRPr lang="en-US" sz="1200" dirty="0">
+                      <a:endParaRPr lang="en-US" sz="1400" dirty="0">
                         <a:latin typeface="Arial"/>
                         <a:cs typeface="Arial"/>
                       </a:endParaRPr>
@@ -4859,13 +4908,13 @@
                     <a:lstStyle/>
                     <a:p>
                       <a:r>
-                        <a:rPr lang="en-US" sz="1200" dirty="0" err="1" smtClean="0">
+                        <a:rPr lang="en-US" sz="1400" dirty="0" err="1" smtClean="0">
                           <a:latin typeface="Arial"/>
                           <a:cs typeface="Arial"/>
                         </a:rPr>
                         <a:t>Busytown</a:t>
                       </a:r>
-                      <a:endParaRPr lang="en-US" sz="1200" dirty="0">
+                      <a:endParaRPr lang="en-US" sz="1400" dirty="0">
                         <a:latin typeface="Arial"/>
                         <a:cs typeface="Arial"/>
                       </a:endParaRPr>
@@ -4916,13 +4965,13 @@
                     <a:lstStyle/>
                     <a:p>
                       <a:r>
-                        <a:rPr lang="en-US" sz="1200" dirty="0" smtClean="0">
+                        <a:rPr lang="en-US" sz="1400" dirty="0" smtClean="0">
                           <a:latin typeface="Arial"/>
                           <a:cs typeface="Arial"/>
                         </a:rPr>
                         <a:t>Steal</a:t>
                       </a:r>
-                      <a:endParaRPr lang="en-US" sz="1200" dirty="0">
+                      <a:endParaRPr lang="en-US" sz="1400" dirty="0">
                         <a:latin typeface="Arial"/>
                         <a:cs typeface="Arial"/>
                       </a:endParaRPr>
@@ -4968,20 +5017,20 @@
                   </a:tcPr>
                 </a:tc>
               </a:tr>
-              <a:tr h="241595">
+              <a:tr h="269255">
                 <a:tc>
                   <a:txBody>
                     <a:bodyPr/>
                     <a:lstStyle/>
                     <a:p>
                       <a:r>
-                        <a:rPr lang="en-US" sz="1200" dirty="0" smtClean="0">
+                        <a:rPr lang="en-US" sz="1400" dirty="0" smtClean="0">
                           <a:latin typeface="Arial"/>
                           <a:cs typeface="Arial"/>
                         </a:rPr>
                         <a:t>1</a:t>
                       </a:r>
-                      <a:endParaRPr lang="en-US" sz="1200" dirty="0">
+                      <a:endParaRPr lang="en-US" sz="1400" dirty="0">
                         <a:latin typeface="Arial"/>
                         <a:cs typeface="Arial"/>
                       </a:endParaRPr>
@@ -5032,13 +5081,13 @@
                     <a:lstStyle/>
                     <a:p>
                       <a:r>
-                        <a:rPr lang="en-US" sz="1200" dirty="0" smtClean="0">
+                        <a:rPr lang="en-US" sz="1400" dirty="0" smtClean="0">
                           <a:latin typeface="Arial"/>
                           <a:cs typeface="Arial"/>
                         </a:rPr>
                         <a:t>Emma</a:t>
                       </a:r>
-                      <a:endParaRPr lang="en-US" sz="1200" dirty="0">
+                      <a:endParaRPr lang="en-US" sz="1400" dirty="0">
                         <a:latin typeface="Arial"/>
                         <a:cs typeface="Arial"/>
                       </a:endParaRPr>
@@ -5089,13 +5138,13 @@
                     <a:lstStyle/>
                     <a:p>
                       <a:r>
-                        <a:rPr lang="en-US" sz="1200" dirty="0" smtClean="0">
+                        <a:rPr lang="en-US" sz="1400" dirty="0" smtClean="0">
                           <a:latin typeface="Arial"/>
                           <a:cs typeface="Arial"/>
                         </a:rPr>
                         <a:t>Brown</a:t>
                       </a:r>
-                      <a:endParaRPr lang="en-US" sz="1200" dirty="0">
+                      <a:endParaRPr lang="en-US" sz="1400" dirty="0">
                         <a:latin typeface="Arial"/>
                         <a:cs typeface="Arial"/>
                       </a:endParaRPr>
@@ -5146,13 +5195,13 @@
                     <a:lstStyle/>
                     <a:p>
                       <a:r>
-                        <a:rPr lang="en-US" sz="1200" dirty="0" err="1" smtClean="0">
+                        <a:rPr lang="en-US" sz="1400" dirty="0" err="1" smtClean="0">
                           <a:latin typeface="Arial"/>
                           <a:cs typeface="Arial"/>
                         </a:rPr>
                         <a:t>Bugcity</a:t>
                       </a:r>
-                      <a:endParaRPr lang="en-US" sz="1200" dirty="0">
+                      <a:endParaRPr lang="en-US" sz="1400" dirty="0">
                         <a:latin typeface="Arial"/>
                         <a:cs typeface="Arial"/>
                       </a:endParaRPr>
@@ -5203,13 +5252,13 @@
                     <a:lstStyle/>
                     <a:p>
                       <a:r>
-                        <a:rPr lang="en-US" sz="1200" dirty="0" err="1" smtClean="0">
+                        <a:rPr lang="en-US" sz="1400" dirty="0" err="1" smtClean="0">
                           <a:latin typeface="Arial"/>
                           <a:cs typeface="Arial"/>
                         </a:rPr>
                         <a:t>Beestreet</a:t>
                       </a:r>
-                      <a:endParaRPr lang="en-US" sz="1200" dirty="0">
+                      <a:endParaRPr lang="en-US" sz="1400" dirty="0">
                         <a:latin typeface="Arial"/>
                         <a:cs typeface="Arial"/>
                       </a:endParaRPr>
@@ -5260,13 +5309,13 @@
                     <a:lstStyle/>
                     <a:p>
                       <a:r>
-                        <a:rPr lang="en-US" sz="1200" dirty="0" err="1" smtClean="0">
+                        <a:rPr lang="en-US" sz="1400" dirty="0" err="1" smtClean="0">
                           <a:latin typeface="Arial"/>
                           <a:cs typeface="Arial"/>
                         </a:rPr>
                         <a:t>Workcity</a:t>
                       </a:r>
-                      <a:endParaRPr lang="en-US" sz="1200" dirty="0">
+                      <a:endParaRPr lang="en-US" sz="1400" dirty="0">
                         <a:latin typeface="Arial"/>
                         <a:cs typeface="Arial"/>
                       </a:endParaRPr>
@@ -5317,13 +5366,13 @@
                     <a:lstStyle/>
                     <a:p>
                       <a:r>
-                        <a:rPr lang="en-US" sz="1200" dirty="0" smtClean="0">
+                        <a:rPr lang="en-US" sz="1400" dirty="0" smtClean="0">
                           <a:latin typeface="Arial"/>
                           <a:cs typeface="Arial"/>
                         </a:rPr>
                         <a:t>Wood</a:t>
                       </a:r>
-                      <a:endParaRPr lang="en-US" sz="1200" dirty="0">
+                      <a:endParaRPr lang="en-US" sz="1400" dirty="0">
                         <a:latin typeface="Arial"/>
                         <a:cs typeface="Arial"/>
                       </a:endParaRPr>
@@ -5369,20 +5418,20 @@
                   </a:tcPr>
                 </a:tc>
               </a:tr>
-              <a:tr h="241595">
+              <a:tr h="269255">
                 <a:tc>
                   <a:txBody>
                     <a:bodyPr/>
                     <a:lstStyle/>
                     <a:p>
                       <a:r>
-                        <a:rPr lang="en-US" sz="1200" dirty="0" smtClean="0">
+                        <a:rPr lang="en-US" sz="1400" dirty="0" smtClean="0">
                           <a:latin typeface="Arial"/>
                           <a:cs typeface="Arial"/>
                         </a:rPr>
                         <a:t>2</a:t>
                       </a:r>
-                      <a:endParaRPr lang="en-US" sz="1200" dirty="0">
+                      <a:endParaRPr lang="en-US" sz="1400" dirty="0">
                         <a:latin typeface="Arial"/>
                         <a:cs typeface="Arial"/>
                       </a:endParaRPr>
@@ -5433,13 +5482,13 @@
                     <a:lstStyle/>
                     <a:p>
                       <a:r>
-                        <a:rPr lang="en-US" sz="1200" dirty="0" smtClean="0">
+                        <a:rPr lang="en-US" sz="1400" dirty="0" smtClean="0">
                           <a:latin typeface="Arial"/>
                           <a:cs typeface="Arial"/>
                         </a:rPr>
                         <a:t>Paul</a:t>
                       </a:r>
-                      <a:endParaRPr lang="en-US" sz="1200" dirty="0">
+                      <a:endParaRPr lang="en-US" sz="1400" dirty="0">
                         <a:latin typeface="Arial"/>
                         <a:cs typeface="Arial"/>
                       </a:endParaRPr>
@@ -5490,13 +5539,13 @@
                     <a:lstStyle/>
                     <a:p>
                       <a:r>
-                        <a:rPr lang="en-US" sz="1200" dirty="0" smtClean="0">
+                        <a:rPr lang="en-US" sz="1400" dirty="0" smtClean="0">
                           <a:latin typeface="Arial"/>
                           <a:cs typeface="Arial"/>
                         </a:rPr>
                         <a:t>Smith</a:t>
                       </a:r>
-                      <a:endParaRPr lang="en-US" sz="1200" dirty="0">
+                      <a:endParaRPr lang="en-US" sz="1400" dirty="0">
                         <a:latin typeface="Arial"/>
                         <a:cs typeface="Arial"/>
                       </a:endParaRPr>
@@ -5547,13 +5596,13 @@
                     <a:lstStyle/>
                     <a:p>
                       <a:r>
-                        <a:rPr lang="en-US" sz="1200" dirty="0" err="1" smtClean="0">
+                        <a:rPr lang="en-US" sz="1400" dirty="0" err="1" smtClean="0">
                           <a:latin typeface="Arial"/>
                           <a:cs typeface="Arial"/>
                         </a:rPr>
                         <a:t>Treecity</a:t>
                       </a:r>
-                      <a:endParaRPr lang="en-US" sz="1200" dirty="0">
+                      <a:endParaRPr lang="en-US" sz="1400" dirty="0">
                         <a:latin typeface="Arial"/>
                         <a:cs typeface="Arial"/>
                       </a:endParaRPr>
@@ -5604,13 +5653,13 @@
                     <a:lstStyle/>
                     <a:p>
                       <a:r>
-                        <a:rPr lang="en-US" sz="1200" dirty="0" err="1" smtClean="0">
+                        <a:rPr lang="en-US" sz="1400" dirty="0" err="1" smtClean="0">
                           <a:latin typeface="Arial"/>
                           <a:cs typeface="Arial"/>
                         </a:rPr>
                         <a:t>Oakstreet</a:t>
                       </a:r>
-                      <a:endParaRPr lang="en-US" sz="1200" dirty="0">
+                      <a:endParaRPr lang="en-US" sz="1400" dirty="0">
                         <a:latin typeface="Arial"/>
                         <a:cs typeface="Arial"/>
                       </a:endParaRPr>
@@ -5661,13 +5710,13 @@
                     <a:lstStyle/>
                     <a:p>
                       <a:r>
-                        <a:rPr lang="en-US" sz="1200" dirty="0" err="1" smtClean="0">
+                        <a:rPr lang="en-US" sz="1400" dirty="0" err="1" smtClean="0">
                           <a:latin typeface="Arial"/>
                           <a:cs typeface="Arial"/>
                         </a:rPr>
                         <a:t>Laborpark</a:t>
                       </a:r>
-                      <a:endParaRPr lang="en-US" sz="1200" dirty="0">
+                      <a:endParaRPr lang="en-US" sz="1400" dirty="0">
                         <a:latin typeface="Arial"/>
                         <a:cs typeface="Arial"/>
                       </a:endParaRPr>
@@ -5718,13 +5767,13 @@
                     <a:lstStyle/>
                     <a:p>
                       <a:r>
-                        <a:rPr lang="en-US" sz="1200" dirty="0" smtClean="0">
+                        <a:rPr lang="en-US" sz="1400" dirty="0" smtClean="0">
                           <a:latin typeface="Arial"/>
                           <a:cs typeface="Arial"/>
                         </a:rPr>
                         <a:t>Brick</a:t>
                       </a:r>
-                      <a:endParaRPr lang="en-US" sz="1200" dirty="0">
+                      <a:endParaRPr lang="en-US" sz="1400" dirty="0">
                         <a:latin typeface="Arial"/>
                         <a:cs typeface="Arial"/>
                       </a:endParaRPr>
@@ -5770,20 +5819,20 @@
                   </a:tcPr>
                 </a:tc>
               </a:tr>
-              <a:tr h="241595">
+              <a:tr h="269255">
                 <a:tc>
                   <a:txBody>
                     <a:bodyPr/>
                     <a:lstStyle/>
                     <a:p>
                       <a:r>
-                        <a:rPr lang="en-US" sz="1200" dirty="0" smtClean="0">
+                        <a:rPr lang="en-US" sz="1400" dirty="0" smtClean="0">
                           <a:latin typeface="Arial"/>
                           <a:cs typeface="Arial"/>
                         </a:rPr>
                         <a:t>3</a:t>
                       </a:r>
-                      <a:endParaRPr lang="en-US" sz="1200" dirty="0">
+                      <a:endParaRPr lang="en-US" sz="1400" dirty="0">
                         <a:latin typeface="Arial"/>
                         <a:cs typeface="Arial"/>
                       </a:endParaRPr>
@@ -5833,8 +5882,34 @@
                     <a:bodyPr/>
                     <a:lstStyle/>
                     <a:p>
-                      <a:endParaRPr lang="en-US" sz="1200" dirty="0">
-                        <a:latin typeface="Arial"/>
+                      <a:pPr marL="0" marR="0" indent="0" algn="l" defTabSz="914400" rtl="0" eaLnBrk="1" fontAlgn="auto" latinLnBrk="0" hangingPunct="1">
+                        <a:lnSpc>
+                          <a:spcPct val="100000"/>
+                        </a:lnSpc>
+                        <a:spcBef>
+                          <a:spcPts val="0"/>
+                        </a:spcBef>
+                        <a:spcAft>
+                          <a:spcPts val="0"/>
+                        </a:spcAft>
+                        <a:buClr>
+                          <a:srgbClr val="000000"/>
+                        </a:buClr>
+                        <a:buSzTx/>
+                        <a:buFont typeface="Arial"/>
+                        <a:buNone/>
+                        <a:tabLst/>
+                        <a:defRPr/>
+                      </a:pPr>
+                      <a:r>
+                        <a:rPr lang="mr-IN" sz="1400" dirty="0" smtClean="0">
+                          <a:latin typeface="Arial"/>
+                          <a:cs typeface="Arial"/>
+                        </a:rPr>
+                        <a:t>…</a:t>
+                      </a:r>
+                      <a:endParaRPr lang="en-US" sz="1400" dirty="0" smtClean="0">
+                        <a:latin typeface="+mn-lt"/>
                         <a:cs typeface="Arial"/>
                       </a:endParaRPr>
                     </a:p>
@@ -5883,7 +5958,14 @@
                     <a:bodyPr/>
                     <a:lstStyle/>
                     <a:p>
-                      <a:endParaRPr lang="en-US" sz="1200" dirty="0">
+                      <a:r>
+                        <a:rPr lang="mr-IN" sz="1400" dirty="0" smtClean="0">
+                          <a:latin typeface="Arial"/>
+                          <a:cs typeface="Arial"/>
+                        </a:rPr>
+                        <a:t>…</a:t>
+                      </a:r>
+                      <a:endParaRPr lang="en-US" sz="1400" dirty="0">
                         <a:latin typeface="Arial"/>
                         <a:cs typeface="Arial"/>
                       </a:endParaRPr>
@@ -5933,7 +6015,14 @@
                     <a:bodyPr/>
                     <a:lstStyle/>
                     <a:p>
-                      <a:endParaRPr lang="en-US" sz="1200" dirty="0">
+                      <a:r>
+                        <a:rPr lang="mr-IN" sz="1400" dirty="0" smtClean="0">
+                          <a:latin typeface="Arial"/>
+                          <a:cs typeface="Arial"/>
+                        </a:rPr>
+                        <a:t>…</a:t>
+                      </a:r>
+                      <a:endParaRPr lang="en-US" sz="1400" dirty="0">
                         <a:latin typeface="Arial"/>
                         <a:cs typeface="Arial"/>
                       </a:endParaRPr>
@@ -5983,7 +6072,14 @@
                     <a:bodyPr/>
                     <a:lstStyle/>
                     <a:p>
-                      <a:endParaRPr lang="en-US" sz="1200" dirty="0">
+                      <a:r>
+                        <a:rPr lang="mr-IN" sz="1400" dirty="0" smtClean="0">
+                          <a:latin typeface="Arial"/>
+                          <a:cs typeface="Arial"/>
+                        </a:rPr>
+                        <a:t>…</a:t>
+                      </a:r>
+                      <a:endParaRPr lang="en-US" sz="1400" dirty="0">
                         <a:latin typeface="Arial"/>
                         <a:cs typeface="Arial"/>
                       </a:endParaRPr>
@@ -6033,7 +6129,14 @@
                     <a:bodyPr/>
                     <a:lstStyle/>
                     <a:p>
-                      <a:endParaRPr lang="en-US" sz="1200" dirty="0">
+                      <a:r>
+                        <a:rPr lang="mr-IN" sz="1400" dirty="0" smtClean="0">
+                          <a:latin typeface="Arial"/>
+                          <a:cs typeface="Arial"/>
+                        </a:rPr>
+                        <a:t>…</a:t>
+                      </a:r>
+                      <a:endParaRPr lang="en-US" sz="1400" dirty="0">
                         <a:latin typeface="Arial"/>
                         <a:cs typeface="Arial"/>
                       </a:endParaRPr>
@@ -6083,7 +6186,14 @@
                     <a:bodyPr/>
                     <a:lstStyle/>
                     <a:p>
-                      <a:endParaRPr lang="en-US" sz="1200" dirty="0">
+                      <a:r>
+                        <a:rPr lang="mr-IN" sz="1400" dirty="0" smtClean="0">
+                          <a:latin typeface="Arial"/>
+                          <a:cs typeface="Arial"/>
+                        </a:rPr>
+                        <a:t>…</a:t>
+                      </a:r>
+                      <a:endParaRPr lang="en-US" sz="1400" dirty="0">
                         <a:latin typeface="Arial"/>
                         <a:cs typeface="Arial"/>
                       </a:endParaRPr>
@@ -6129,20 +6239,20 @@
                   </a:tcPr>
                 </a:tc>
               </a:tr>
-              <a:tr h="241595">
+              <a:tr h="269255">
                 <a:tc>
                   <a:txBody>
                     <a:bodyPr/>
                     <a:lstStyle/>
                     <a:p>
                       <a:r>
-                        <a:rPr lang="en-US" sz="1200" dirty="0" smtClean="0">
+                        <a:rPr lang="en-US" sz="1400" dirty="0" smtClean="0">
                           <a:latin typeface="Arial"/>
                           <a:cs typeface="Arial"/>
                         </a:rPr>
                         <a:t>4</a:t>
                       </a:r>
-                      <a:endParaRPr lang="en-US" sz="1200" dirty="0">
+                      <a:endParaRPr lang="en-US" sz="1400" dirty="0">
                         <a:latin typeface="Arial"/>
                         <a:cs typeface="Arial"/>
                       </a:endParaRPr>
@@ -6192,7 +6302,14 @@
                     <a:bodyPr/>
                     <a:lstStyle/>
                     <a:p>
-                      <a:endParaRPr lang="en-US" sz="1200" dirty="0">
+                      <a:r>
+                        <a:rPr lang="mr-IN" sz="1400" dirty="0" smtClean="0">
+                          <a:latin typeface="Arial"/>
+                          <a:cs typeface="Arial"/>
+                        </a:rPr>
+                        <a:t>…</a:t>
+                      </a:r>
+                      <a:endParaRPr lang="en-US" sz="1400" dirty="0">
                         <a:latin typeface="Arial"/>
                         <a:cs typeface="Arial"/>
                       </a:endParaRPr>
@@ -6242,7 +6359,14 @@
                     <a:bodyPr/>
                     <a:lstStyle/>
                     <a:p>
-                      <a:endParaRPr lang="en-US" sz="1200" dirty="0">
+                      <a:r>
+                        <a:rPr lang="mr-IN" sz="1400" dirty="0" smtClean="0">
+                          <a:latin typeface="Arial"/>
+                          <a:cs typeface="Arial"/>
+                        </a:rPr>
+                        <a:t>…</a:t>
+                      </a:r>
+                      <a:endParaRPr lang="en-US" sz="1400" dirty="0">
                         <a:latin typeface="Arial"/>
                         <a:cs typeface="Arial"/>
                       </a:endParaRPr>
@@ -6292,7 +6416,14 @@
                     <a:bodyPr/>
                     <a:lstStyle/>
                     <a:p>
-                      <a:endParaRPr lang="en-US" sz="1200" dirty="0">
+                      <a:r>
+                        <a:rPr lang="mr-IN" sz="1400" dirty="0" smtClean="0">
+                          <a:latin typeface="Arial"/>
+                          <a:cs typeface="Arial"/>
+                        </a:rPr>
+                        <a:t>…</a:t>
+                      </a:r>
+                      <a:endParaRPr lang="en-US" sz="1400" dirty="0">
                         <a:latin typeface="Arial"/>
                         <a:cs typeface="Arial"/>
                       </a:endParaRPr>
@@ -6342,7 +6473,14 @@
                     <a:bodyPr/>
                     <a:lstStyle/>
                     <a:p>
-                      <a:endParaRPr lang="en-US" sz="1200" dirty="0">
+                      <a:r>
+                        <a:rPr lang="mr-IN" sz="1400" dirty="0" smtClean="0">
+                          <a:latin typeface="Arial"/>
+                          <a:cs typeface="Arial"/>
+                        </a:rPr>
+                        <a:t>…</a:t>
+                      </a:r>
+                      <a:endParaRPr lang="en-US" sz="1400" dirty="0">
                         <a:latin typeface="Arial"/>
                         <a:cs typeface="Arial"/>
                       </a:endParaRPr>
@@ -6392,7 +6530,14 @@
                     <a:bodyPr/>
                     <a:lstStyle/>
                     <a:p>
-                      <a:endParaRPr lang="en-US" sz="1200" dirty="0">
+                      <a:r>
+                        <a:rPr lang="mr-IN" sz="1400" dirty="0" smtClean="0">
+                          <a:latin typeface="Arial"/>
+                          <a:cs typeface="Arial"/>
+                        </a:rPr>
+                        <a:t>…</a:t>
+                      </a:r>
+                      <a:endParaRPr lang="en-US" sz="1400" dirty="0">
                         <a:latin typeface="Arial"/>
                         <a:cs typeface="Arial"/>
                       </a:endParaRPr>
@@ -6442,7 +6587,816 @@
                     <a:bodyPr/>
                     <a:lstStyle/>
                     <a:p>
-                      <a:endParaRPr lang="en-US" sz="1200" dirty="0">
+                      <a:r>
+                        <a:rPr lang="mr-IN" sz="1400" dirty="0" smtClean="0">
+                          <a:latin typeface="Arial"/>
+                          <a:cs typeface="Arial"/>
+                        </a:rPr>
+                        <a:t>…</a:t>
+                      </a:r>
+                      <a:endParaRPr lang="en-US" sz="1400" dirty="0">
+                        <a:latin typeface="Arial"/>
+                        <a:cs typeface="Arial"/>
+                      </a:endParaRPr>
+                    </a:p>
+                  </a:txBody>
+                  <a:tcPr>
+                    <a:lnL w="12700" cap="flat" cmpd="sng" algn="ctr">
+                      <a:solidFill>
+                        <a:scrgbClr r="0" g="0" b="0"/>
+                      </a:solidFill>
+                      <a:prstDash val="solid"/>
+                      <a:round/>
+                      <a:headEnd type="none" w="med" len="med"/>
+                      <a:tailEnd type="none" w="med" len="med"/>
+                    </a:lnL>
+                    <a:lnR w="12700" cap="flat" cmpd="sng" algn="ctr">
+                      <a:solidFill>
+                        <a:scrgbClr r="0" g="0" b="0"/>
+                      </a:solidFill>
+                      <a:prstDash val="solid"/>
+                      <a:round/>
+                      <a:headEnd type="none" w="med" len="med"/>
+                      <a:tailEnd type="none" w="med" len="med"/>
+                    </a:lnR>
+                    <a:lnT w="12700" cap="flat" cmpd="sng" algn="ctr">
+                      <a:solidFill>
+                        <a:scrgbClr r="0" g="0" b="0"/>
+                      </a:solidFill>
+                      <a:prstDash val="solid"/>
+                      <a:round/>
+                      <a:headEnd type="none" w="med" len="med"/>
+                      <a:tailEnd type="none" w="med" len="med"/>
+                    </a:lnT>
+                    <a:lnB w="12700" cap="flat" cmpd="sng" algn="ctr">
+                      <a:solidFill>
+                        <a:scrgbClr r="0" g="0" b="0"/>
+                      </a:solidFill>
+                      <a:prstDash val="solid"/>
+                      <a:round/>
+                      <a:headEnd type="none" w="med" len="med"/>
+                      <a:tailEnd type="none" w="med" len="med"/>
+                    </a:lnB>
+                  </a:tcPr>
+                </a:tc>
+              </a:tr>
+              <a:tr h="269255">
+                <a:tc>
+                  <a:txBody>
+                    <a:bodyPr/>
+                    <a:lstStyle/>
+                    <a:p>
+                      <a:r>
+                        <a:rPr lang="mr-IN" sz="1400" dirty="0" smtClean="0">
+                          <a:latin typeface="Arial"/>
+                          <a:cs typeface="Arial"/>
+                        </a:rPr>
+                        <a:t>…</a:t>
+                      </a:r>
+                      <a:endParaRPr lang="en-US" sz="1400" dirty="0">
+                        <a:latin typeface="Arial"/>
+                        <a:cs typeface="Arial"/>
+                      </a:endParaRPr>
+                    </a:p>
+                  </a:txBody>
+                  <a:tcPr>
+                    <a:lnL w="12700" cap="flat" cmpd="sng" algn="ctr">
+                      <a:solidFill>
+                        <a:scrgbClr r="0" g="0" b="0"/>
+                      </a:solidFill>
+                      <a:prstDash val="solid"/>
+                      <a:round/>
+                      <a:headEnd type="none" w="med" len="med"/>
+                      <a:tailEnd type="none" w="med" len="med"/>
+                    </a:lnL>
+                    <a:lnR w="12700" cap="flat" cmpd="sng" algn="ctr">
+                      <a:solidFill>
+                        <a:scrgbClr r="0" g="0" b="0"/>
+                      </a:solidFill>
+                      <a:prstDash val="solid"/>
+                      <a:round/>
+                      <a:headEnd type="none" w="med" len="med"/>
+                      <a:tailEnd type="none" w="med" len="med"/>
+                    </a:lnR>
+                    <a:lnT w="12700" cap="flat" cmpd="sng" algn="ctr">
+                      <a:solidFill>
+                        <a:scrgbClr r="0" g="0" b="0"/>
+                      </a:solidFill>
+                      <a:prstDash val="solid"/>
+                      <a:round/>
+                      <a:headEnd type="none" w="med" len="med"/>
+                      <a:tailEnd type="none" w="med" len="med"/>
+                    </a:lnT>
+                    <a:lnB w="12700" cap="flat" cmpd="sng" algn="ctr">
+                      <a:solidFill>
+                        <a:scrgbClr r="0" g="0" b="0"/>
+                      </a:solidFill>
+                      <a:prstDash val="solid"/>
+                      <a:round/>
+                      <a:headEnd type="none" w="med" len="med"/>
+                      <a:tailEnd type="none" w="med" len="med"/>
+                    </a:lnB>
+                  </a:tcPr>
+                </a:tc>
+                <a:tc>
+                  <a:txBody>
+                    <a:bodyPr/>
+                    <a:lstStyle/>
+                    <a:p>
+                      <a:r>
+                        <a:rPr lang="mr-IN" sz="1400" dirty="0" smtClean="0">
+                          <a:latin typeface="Arial"/>
+                          <a:cs typeface="Arial"/>
+                        </a:rPr>
+                        <a:t>…</a:t>
+                      </a:r>
+                      <a:endParaRPr lang="en-US" sz="1400" dirty="0">
+                        <a:latin typeface="Arial"/>
+                        <a:cs typeface="Arial"/>
+                      </a:endParaRPr>
+                    </a:p>
+                  </a:txBody>
+                  <a:tcPr>
+                    <a:lnL w="12700" cap="flat" cmpd="sng" algn="ctr">
+                      <a:solidFill>
+                        <a:scrgbClr r="0" g="0" b="0"/>
+                      </a:solidFill>
+                      <a:prstDash val="solid"/>
+                      <a:round/>
+                      <a:headEnd type="none" w="med" len="med"/>
+                      <a:tailEnd type="none" w="med" len="med"/>
+                    </a:lnL>
+                    <a:lnR w="12700" cap="flat" cmpd="sng" algn="ctr">
+                      <a:solidFill>
+                        <a:scrgbClr r="0" g="0" b="0"/>
+                      </a:solidFill>
+                      <a:prstDash val="solid"/>
+                      <a:round/>
+                      <a:headEnd type="none" w="med" len="med"/>
+                      <a:tailEnd type="none" w="med" len="med"/>
+                    </a:lnR>
+                    <a:lnT w="12700" cap="flat" cmpd="sng" algn="ctr">
+                      <a:solidFill>
+                        <a:scrgbClr r="0" g="0" b="0"/>
+                      </a:solidFill>
+                      <a:prstDash val="solid"/>
+                      <a:round/>
+                      <a:headEnd type="none" w="med" len="med"/>
+                      <a:tailEnd type="none" w="med" len="med"/>
+                    </a:lnT>
+                    <a:lnB w="12700" cap="flat" cmpd="sng" algn="ctr">
+                      <a:solidFill>
+                        <a:scrgbClr r="0" g="0" b="0"/>
+                      </a:solidFill>
+                      <a:prstDash val="solid"/>
+                      <a:round/>
+                      <a:headEnd type="none" w="med" len="med"/>
+                      <a:tailEnd type="none" w="med" len="med"/>
+                    </a:lnB>
+                  </a:tcPr>
+                </a:tc>
+                <a:tc>
+                  <a:txBody>
+                    <a:bodyPr/>
+                    <a:lstStyle/>
+                    <a:p>
+                      <a:r>
+                        <a:rPr lang="mr-IN" sz="1400" dirty="0" smtClean="0">
+                          <a:latin typeface="Arial"/>
+                          <a:cs typeface="Arial"/>
+                        </a:rPr>
+                        <a:t>…</a:t>
+                      </a:r>
+                      <a:endParaRPr lang="en-US" sz="1400" dirty="0">
+                        <a:latin typeface="Arial"/>
+                        <a:cs typeface="Arial"/>
+                      </a:endParaRPr>
+                    </a:p>
+                  </a:txBody>
+                  <a:tcPr>
+                    <a:lnL w="12700" cap="flat" cmpd="sng" algn="ctr">
+                      <a:solidFill>
+                        <a:scrgbClr r="0" g="0" b="0"/>
+                      </a:solidFill>
+                      <a:prstDash val="solid"/>
+                      <a:round/>
+                      <a:headEnd type="none" w="med" len="med"/>
+                      <a:tailEnd type="none" w="med" len="med"/>
+                    </a:lnL>
+                    <a:lnR w="12700" cap="flat" cmpd="sng" algn="ctr">
+                      <a:solidFill>
+                        <a:scrgbClr r="0" g="0" b="0"/>
+                      </a:solidFill>
+                      <a:prstDash val="solid"/>
+                      <a:round/>
+                      <a:headEnd type="none" w="med" len="med"/>
+                      <a:tailEnd type="none" w="med" len="med"/>
+                    </a:lnR>
+                    <a:lnT w="12700" cap="flat" cmpd="sng" algn="ctr">
+                      <a:solidFill>
+                        <a:scrgbClr r="0" g="0" b="0"/>
+                      </a:solidFill>
+                      <a:prstDash val="solid"/>
+                      <a:round/>
+                      <a:headEnd type="none" w="med" len="med"/>
+                      <a:tailEnd type="none" w="med" len="med"/>
+                    </a:lnT>
+                    <a:lnB w="12700" cap="flat" cmpd="sng" algn="ctr">
+                      <a:solidFill>
+                        <a:scrgbClr r="0" g="0" b="0"/>
+                      </a:solidFill>
+                      <a:prstDash val="solid"/>
+                      <a:round/>
+                      <a:headEnd type="none" w="med" len="med"/>
+                      <a:tailEnd type="none" w="med" len="med"/>
+                    </a:lnB>
+                  </a:tcPr>
+                </a:tc>
+                <a:tc>
+                  <a:txBody>
+                    <a:bodyPr/>
+                    <a:lstStyle/>
+                    <a:p>
+                      <a:r>
+                        <a:rPr lang="mr-IN" sz="1400" dirty="0" smtClean="0">
+                          <a:latin typeface="Arial"/>
+                          <a:cs typeface="Arial"/>
+                        </a:rPr>
+                        <a:t>…</a:t>
+                      </a:r>
+                      <a:endParaRPr lang="en-US" sz="1400" dirty="0">
+                        <a:latin typeface="Arial"/>
+                        <a:cs typeface="Arial"/>
+                      </a:endParaRPr>
+                    </a:p>
+                  </a:txBody>
+                  <a:tcPr>
+                    <a:lnL w="12700" cap="flat" cmpd="sng" algn="ctr">
+                      <a:solidFill>
+                        <a:scrgbClr r="0" g="0" b="0"/>
+                      </a:solidFill>
+                      <a:prstDash val="solid"/>
+                      <a:round/>
+                      <a:headEnd type="none" w="med" len="med"/>
+                      <a:tailEnd type="none" w="med" len="med"/>
+                    </a:lnL>
+                    <a:lnR w="12700" cap="flat" cmpd="sng" algn="ctr">
+                      <a:solidFill>
+                        <a:scrgbClr r="0" g="0" b="0"/>
+                      </a:solidFill>
+                      <a:prstDash val="solid"/>
+                      <a:round/>
+                      <a:headEnd type="none" w="med" len="med"/>
+                      <a:tailEnd type="none" w="med" len="med"/>
+                    </a:lnR>
+                    <a:lnT w="12700" cap="flat" cmpd="sng" algn="ctr">
+                      <a:solidFill>
+                        <a:scrgbClr r="0" g="0" b="0"/>
+                      </a:solidFill>
+                      <a:prstDash val="solid"/>
+                      <a:round/>
+                      <a:headEnd type="none" w="med" len="med"/>
+                      <a:tailEnd type="none" w="med" len="med"/>
+                    </a:lnT>
+                    <a:lnB w="12700" cap="flat" cmpd="sng" algn="ctr">
+                      <a:solidFill>
+                        <a:scrgbClr r="0" g="0" b="0"/>
+                      </a:solidFill>
+                      <a:prstDash val="solid"/>
+                      <a:round/>
+                      <a:headEnd type="none" w="med" len="med"/>
+                      <a:tailEnd type="none" w="med" len="med"/>
+                    </a:lnB>
+                  </a:tcPr>
+                </a:tc>
+                <a:tc>
+                  <a:txBody>
+                    <a:bodyPr/>
+                    <a:lstStyle/>
+                    <a:p>
+                      <a:r>
+                        <a:rPr lang="mr-IN" sz="1400" dirty="0" smtClean="0">
+                          <a:latin typeface="Arial"/>
+                          <a:cs typeface="Arial"/>
+                        </a:rPr>
+                        <a:t>…</a:t>
+                      </a:r>
+                      <a:endParaRPr lang="en-US" sz="1400" dirty="0">
+                        <a:latin typeface="Arial"/>
+                        <a:cs typeface="Arial"/>
+                      </a:endParaRPr>
+                    </a:p>
+                  </a:txBody>
+                  <a:tcPr>
+                    <a:lnL w="12700" cap="flat" cmpd="sng" algn="ctr">
+                      <a:solidFill>
+                        <a:scrgbClr r="0" g="0" b="0"/>
+                      </a:solidFill>
+                      <a:prstDash val="solid"/>
+                      <a:round/>
+                      <a:headEnd type="none" w="med" len="med"/>
+                      <a:tailEnd type="none" w="med" len="med"/>
+                    </a:lnL>
+                    <a:lnR w="12700" cap="flat" cmpd="sng" algn="ctr">
+                      <a:solidFill>
+                        <a:scrgbClr r="0" g="0" b="0"/>
+                      </a:solidFill>
+                      <a:prstDash val="solid"/>
+                      <a:round/>
+                      <a:headEnd type="none" w="med" len="med"/>
+                      <a:tailEnd type="none" w="med" len="med"/>
+                    </a:lnR>
+                    <a:lnT w="12700" cap="flat" cmpd="sng" algn="ctr">
+                      <a:solidFill>
+                        <a:scrgbClr r="0" g="0" b="0"/>
+                      </a:solidFill>
+                      <a:prstDash val="solid"/>
+                      <a:round/>
+                      <a:headEnd type="none" w="med" len="med"/>
+                      <a:tailEnd type="none" w="med" len="med"/>
+                    </a:lnT>
+                    <a:lnB w="12700" cap="flat" cmpd="sng" algn="ctr">
+                      <a:solidFill>
+                        <a:scrgbClr r="0" g="0" b="0"/>
+                      </a:solidFill>
+                      <a:prstDash val="solid"/>
+                      <a:round/>
+                      <a:headEnd type="none" w="med" len="med"/>
+                      <a:tailEnd type="none" w="med" len="med"/>
+                    </a:lnB>
+                  </a:tcPr>
+                </a:tc>
+                <a:tc>
+                  <a:txBody>
+                    <a:bodyPr/>
+                    <a:lstStyle/>
+                    <a:p>
+                      <a:r>
+                        <a:rPr lang="mr-IN" sz="1400" dirty="0" smtClean="0">
+                          <a:latin typeface="Arial"/>
+                          <a:cs typeface="Arial"/>
+                        </a:rPr>
+                        <a:t>…</a:t>
+                      </a:r>
+                      <a:endParaRPr lang="en-US" sz="1400" dirty="0">
+                        <a:latin typeface="Arial"/>
+                        <a:cs typeface="Arial"/>
+                      </a:endParaRPr>
+                    </a:p>
+                  </a:txBody>
+                  <a:tcPr>
+                    <a:lnL w="12700" cap="flat" cmpd="sng" algn="ctr">
+                      <a:solidFill>
+                        <a:scrgbClr r="0" g="0" b="0"/>
+                      </a:solidFill>
+                      <a:prstDash val="solid"/>
+                      <a:round/>
+                      <a:headEnd type="none" w="med" len="med"/>
+                      <a:tailEnd type="none" w="med" len="med"/>
+                    </a:lnL>
+                    <a:lnR w="12700" cap="flat" cmpd="sng" algn="ctr">
+                      <a:solidFill>
+                        <a:scrgbClr r="0" g="0" b="0"/>
+                      </a:solidFill>
+                      <a:prstDash val="solid"/>
+                      <a:round/>
+                      <a:headEnd type="none" w="med" len="med"/>
+                      <a:tailEnd type="none" w="med" len="med"/>
+                    </a:lnR>
+                    <a:lnT w="12700" cap="flat" cmpd="sng" algn="ctr">
+                      <a:solidFill>
+                        <a:scrgbClr r="0" g="0" b="0"/>
+                      </a:solidFill>
+                      <a:prstDash val="solid"/>
+                      <a:round/>
+                      <a:headEnd type="none" w="med" len="med"/>
+                      <a:tailEnd type="none" w="med" len="med"/>
+                    </a:lnT>
+                    <a:lnB w="12700" cap="flat" cmpd="sng" algn="ctr">
+                      <a:solidFill>
+                        <a:scrgbClr r="0" g="0" b="0"/>
+                      </a:solidFill>
+                      <a:prstDash val="solid"/>
+                      <a:round/>
+                      <a:headEnd type="none" w="med" len="med"/>
+                      <a:tailEnd type="none" w="med" len="med"/>
+                    </a:lnB>
+                  </a:tcPr>
+                </a:tc>
+                <a:tc>
+                  <a:txBody>
+                    <a:bodyPr/>
+                    <a:lstStyle/>
+                    <a:p>
+                      <a:r>
+                        <a:rPr lang="mr-IN" sz="1400" dirty="0" smtClean="0">
+                          <a:latin typeface="Arial"/>
+                          <a:cs typeface="Arial"/>
+                        </a:rPr>
+                        <a:t>…</a:t>
+                      </a:r>
+                      <a:endParaRPr lang="en-US" sz="1400" dirty="0">
+                        <a:latin typeface="Arial"/>
+                        <a:cs typeface="Arial"/>
+                      </a:endParaRPr>
+                    </a:p>
+                  </a:txBody>
+                  <a:tcPr>
+                    <a:lnL w="12700" cap="flat" cmpd="sng" algn="ctr">
+                      <a:solidFill>
+                        <a:scrgbClr r="0" g="0" b="0"/>
+                      </a:solidFill>
+                      <a:prstDash val="solid"/>
+                      <a:round/>
+                      <a:headEnd type="none" w="med" len="med"/>
+                      <a:tailEnd type="none" w="med" len="med"/>
+                    </a:lnL>
+                    <a:lnR w="12700" cap="flat" cmpd="sng" algn="ctr">
+                      <a:solidFill>
+                        <a:scrgbClr r="0" g="0" b="0"/>
+                      </a:solidFill>
+                      <a:prstDash val="solid"/>
+                      <a:round/>
+                      <a:headEnd type="none" w="med" len="med"/>
+                      <a:tailEnd type="none" w="med" len="med"/>
+                    </a:lnR>
+                    <a:lnT w="12700" cap="flat" cmpd="sng" algn="ctr">
+                      <a:solidFill>
+                        <a:scrgbClr r="0" g="0" b="0"/>
+                      </a:solidFill>
+                      <a:prstDash val="solid"/>
+                      <a:round/>
+                      <a:headEnd type="none" w="med" len="med"/>
+                      <a:tailEnd type="none" w="med" len="med"/>
+                    </a:lnT>
+                    <a:lnB w="12700" cap="flat" cmpd="sng" algn="ctr">
+                      <a:solidFill>
+                        <a:scrgbClr r="0" g="0" b="0"/>
+                      </a:solidFill>
+                      <a:prstDash val="solid"/>
+                      <a:round/>
+                      <a:headEnd type="none" w="med" len="med"/>
+                      <a:tailEnd type="none" w="med" len="med"/>
+                    </a:lnB>
+                  </a:tcPr>
+                </a:tc>
+              </a:tr>
+              <a:tr h="269255">
+                <a:tc>
+                  <a:txBody>
+                    <a:bodyPr/>
+                    <a:lstStyle/>
+                    <a:p>
+                      <a:r>
+                        <a:rPr lang="mr-IN" sz="1400" dirty="0" smtClean="0">
+                          <a:latin typeface="Arial"/>
+                          <a:cs typeface="Arial"/>
+                        </a:rPr>
+                        <a:t>…</a:t>
+                      </a:r>
+                      <a:endParaRPr lang="en-US" sz="1400" dirty="0">
+                        <a:latin typeface="Arial"/>
+                        <a:cs typeface="Arial"/>
+                      </a:endParaRPr>
+                    </a:p>
+                  </a:txBody>
+                  <a:tcPr>
+                    <a:lnL w="12700" cap="flat" cmpd="sng" algn="ctr">
+                      <a:solidFill>
+                        <a:scrgbClr r="0" g="0" b="0"/>
+                      </a:solidFill>
+                      <a:prstDash val="solid"/>
+                      <a:round/>
+                      <a:headEnd type="none" w="med" len="med"/>
+                      <a:tailEnd type="none" w="med" len="med"/>
+                    </a:lnL>
+                    <a:lnR w="12700" cap="flat" cmpd="sng" algn="ctr">
+                      <a:solidFill>
+                        <a:scrgbClr r="0" g="0" b="0"/>
+                      </a:solidFill>
+                      <a:prstDash val="solid"/>
+                      <a:round/>
+                      <a:headEnd type="none" w="med" len="med"/>
+                      <a:tailEnd type="none" w="med" len="med"/>
+                    </a:lnR>
+                    <a:lnT w="12700" cap="flat" cmpd="sng" algn="ctr">
+                      <a:solidFill>
+                        <a:scrgbClr r="0" g="0" b="0"/>
+                      </a:solidFill>
+                      <a:prstDash val="solid"/>
+                      <a:round/>
+                      <a:headEnd type="none" w="med" len="med"/>
+                      <a:tailEnd type="none" w="med" len="med"/>
+                    </a:lnT>
+                    <a:lnB w="12700" cap="flat" cmpd="sng" algn="ctr">
+                      <a:solidFill>
+                        <a:scrgbClr r="0" g="0" b="0"/>
+                      </a:solidFill>
+                      <a:prstDash val="solid"/>
+                      <a:round/>
+                      <a:headEnd type="none" w="med" len="med"/>
+                      <a:tailEnd type="none" w="med" len="med"/>
+                    </a:lnB>
+                  </a:tcPr>
+                </a:tc>
+                <a:tc>
+                  <a:txBody>
+                    <a:bodyPr/>
+                    <a:lstStyle/>
+                    <a:p>
+                      <a:r>
+                        <a:rPr lang="mr-IN" sz="1400" dirty="0" smtClean="0">
+                          <a:latin typeface="Arial"/>
+                          <a:cs typeface="Arial"/>
+                        </a:rPr>
+                        <a:t>…</a:t>
+                      </a:r>
+                      <a:endParaRPr lang="en-US" sz="1400" dirty="0">
+                        <a:latin typeface="Arial"/>
+                        <a:cs typeface="Arial"/>
+                      </a:endParaRPr>
+                    </a:p>
+                  </a:txBody>
+                  <a:tcPr>
+                    <a:lnL w="12700" cap="flat" cmpd="sng" algn="ctr">
+                      <a:solidFill>
+                        <a:scrgbClr r="0" g="0" b="0"/>
+                      </a:solidFill>
+                      <a:prstDash val="solid"/>
+                      <a:round/>
+                      <a:headEnd type="none" w="med" len="med"/>
+                      <a:tailEnd type="none" w="med" len="med"/>
+                    </a:lnL>
+                    <a:lnR w="12700" cap="flat" cmpd="sng" algn="ctr">
+                      <a:solidFill>
+                        <a:scrgbClr r="0" g="0" b="0"/>
+                      </a:solidFill>
+                      <a:prstDash val="solid"/>
+                      <a:round/>
+                      <a:headEnd type="none" w="med" len="med"/>
+                      <a:tailEnd type="none" w="med" len="med"/>
+                    </a:lnR>
+                    <a:lnT w="12700" cap="flat" cmpd="sng" algn="ctr">
+                      <a:solidFill>
+                        <a:scrgbClr r="0" g="0" b="0"/>
+                      </a:solidFill>
+                      <a:prstDash val="solid"/>
+                      <a:round/>
+                      <a:headEnd type="none" w="med" len="med"/>
+                      <a:tailEnd type="none" w="med" len="med"/>
+                    </a:lnT>
+                    <a:lnB w="12700" cap="flat" cmpd="sng" algn="ctr">
+                      <a:solidFill>
+                        <a:scrgbClr r="0" g="0" b="0"/>
+                      </a:solidFill>
+                      <a:prstDash val="solid"/>
+                      <a:round/>
+                      <a:headEnd type="none" w="med" len="med"/>
+                      <a:tailEnd type="none" w="med" len="med"/>
+                    </a:lnB>
+                  </a:tcPr>
+                </a:tc>
+                <a:tc>
+                  <a:txBody>
+                    <a:bodyPr/>
+                    <a:lstStyle/>
+                    <a:p>
+                      <a:r>
+                        <a:rPr lang="mr-IN" sz="1400" dirty="0" smtClean="0">
+                          <a:latin typeface="Arial"/>
+                          <a:cs typeface="Arial"/>
+                        </a:rPr>
+                        <a:t>…</a:t>
+                      </a:r>
+                      <a:endParaRPr lang="en-US" sz="1400" dirty="0">
+                        <a:latin typeface="Arial"/>
+                        <a:cs typeface="Arial"/>
+                      </a:endParaRPr>
+                    </a:p>
+                  </a:txBody>
+                  <a:tcPr>
+                    <a:lnL w="12700" cap="flat" cmpd="sng" algn="ctr">
+                      <a:solidFill>
+                        <a:scrgbClr r="0" g="0" b="0"/>
+                      </a:solidFill>
+                      <a:prstDash val="solid"/>
+                      <a:round/>
+                      <a:headEnd type="none" w="med" len="med"/>
+                      <a:tailEnd type="none" w="med" len="med"/>
+                    </a:lnL>
+                    <a:lnR w="12700" cap="flat" cmpd="sng" algn="ctr">
+                      <a:solidFill>
+                        <a:scrgbClr r="0" g="0" b="0"/>
+                      </a:solidFill>
+                      <a:prstDash val="solid"/>
+                      <a:round/>
+                      <a:headEnd type="none" w="med" len="med"/>
+                      <a:tailEnd type="none" w="med" len="med"/>
+                    </a:lnR>
+                    <a:lnT w="12700" cap="flat" cmpd="sng" algn="ctr">
+                      <a:solidFill>
+                        <a:scrgbClr r="0" g="0" b="0"/>
+                      </a:solidFill>
+                      <a:prstDash val="solid"/>
+                      <a:round/>
+                      <a:headEnd type="none" w="med" len="med"/>
+                      <a:tailEnd type="none" w="med" len="med"/>
+                    </a:lnT>
+                    <a:lnB w="12700" cap="flat" cmpd="sng" algn="ctr">
+                      <a:solidFill>
+                        <a:scrgbClr r="0" g="0" b="0"/>
+                      </a:solidFill>
+                      <a:prstDash val="solid"/>
+                      <a:round/>
+                      <a:headEnd type="none" w="med" len="med"/>
+                      <a:tailEnd type="none" w="med" len="med"/>
+                    </a:lnB>
+                  </a:tcPr>
+                </a:tc>
+                <a:tc>
+                  <a:txBody>
+                    <a:bodyPr/>
+                    <a:lstStyle/>
+                    <a:p>
+                      <a:r>
+                        <a:rPr lang="mr-IN" sz="1400" dirty="0" smtClean="0">
+                          <a:latin typeface="Arial"/>
+                          <a:cs typeface="Arial"/>
+                        </a:rPr>
+                        <a:t>…</a:t>
+                      </a:r>
+                      <a:endParaRPr lang="en-US" sz="1400" dirty="0">
+                        <a:latin typeface="Arial"/>
+                        <a:cs typeface="Arial"/>
+                      </a:endParaRPr>
+                    </a:p>
+                  </a:txBody>
+                  <a:tcPr>
+                    <a:lnL w="12700" cap="flat" cmpd="sng" algn="ctr">
+                      <a:solidFill>
+                        <a:scrgbClr r="0" g="0" b="0"/>
+                      </a:solidFill>
+                      <a:prstDash val="solid"/>
+                      <a:round/>
+                      <a:headEnd type="none" w="med" len="med"/>
+                      <a:tailEnd type="none" w="med" len="med"/>
+                    </a:lnL>
+                    <a:lnR w="12700" cap="flat" cmpd="sng" algn="ctr">
+                      <a:solidFill>
+                        <a:scrgbClr r="0" g="0" b="0"/>
+                      </a:solidFill>
+                      <a:prstDash val="solid"/>
+                      <a:round/>
+                      <a:headEnd type="none" w="med" len="med"/>
+                      <a:tailEnd type="none" w="med" len="med"/>
+                    </a:lnR>
+                    <a:lnT w="12700" cap="flat" cmpd="sng" algn="ctr">
+                      <a:solidFill>
+                        <a:scrgbClr r="0" g="0" b="0"/>
+                      </a:solidFill>
+                      <a:prstDash val="solid"/>
+                      <a:round/>
+                      <a:headEnd type="none" w="med" len="med"/>
+                      <a:tailEnd type="none" w="med" len="med"/>
+                    </a:lnT>
+                    <a:lnB w="12700" cap="flat" cmpd="sng" algn="ctr">
+                      <a:solidFill>
+                        <a:scrgbClr r="0" g="0" b="0"/>
+                      </a:solidFill>
+                      <a:prstDash val="solid"/>
+                      <a:round/>
+                      <a:headEnd type="none" w="med" len="med"/>
+                      <a:tailEnd type="none" w="med" len="med"/>
+                    </a:lnB>
+                  </a:tcPr>
+                </a:tc>
+                <a:tc>
+                  <a:txBody>
+                    <a:bodyPr/>
+                    <a:lstStyle/>
+                    <a:p>
+                      <a:r>
+                        <a:rPr lang="mr-IN" sz="1400" dirty="0" smtClean="0">
+                          <a:latin typeface="Arial"/>
+                          <a:cs typeface="Arial"/>
+                        </a:rPr>
+                        <a:t>…</a:t>
+                      </a:r>
+                      <a:endParaRPr lang="en-US" sz="1400" dirty="0">
+                        <a:latin typeface="Arial"/>
+                        <a:cs typeface="Arial"/>
+                      </a:endParaRPr>
+                    </a:p>
+                  </a:txBody>
+                  <a:tcPr>
+                    <a:lnL w="12700" cap="flat" cmpd="sng" algn="ctr">
+                      <a:solidFill>
+                        <a:scrgbClr r="0" g="0" b="0"/>
+                      </a:solidFill>
+                      <a:prstDash val="solid"/>
+                      <a:round/>
+                      <a:headEnd type="none" w="med" len="med"/>
+                      <a:tailEnd type="none" w="med" len="med"/>
+                    </a:lnL>
+                    <a:lnR w="12700" cap="flat" cmpd="sng" algn="ctr">
+                      <a:solidFill>
+                        <a:scrgbClr r="0" g="0" b="0"/>
+                      </a:solidFill>
+                      <a:prstDash val="solid"/>
+                      <a:round/>
+                      <a:headEnd type="none" w="med" len="med"/>
+                      <a:tailEnd type="none" w="med" len="med"/>
+                    </a:lnR>
+                    <a:lnT w="12700" cap="flat" cmpd="sng" algn="ctr">
+                      <a:solidFill>
+                        <a:scrgbClr r="0" g="0" b="0"/>
+                      </a:solidFill>
+                      <a:prstDash val="solid"/>
+                      <a:round/>
+                      <a:headEnd type="none" w="med" len="med"/>
+                      <a:tailEnd type="none" w="med" len="med"/>
+                    </a:lnT>
+                    <a:lnB w="12700" cap="flat" cmpd="sng" algn="ctr">
+                      <a:solidFill>
+                        <a:scrgbClr r="0" g="0" b="0"/>
+                      </a:solidFill>
+                      <a:prstDash val="solid"/>
+                      <a:round/>
+                      <a:headEnd type="none" w="med" len="med"/>
+                      <a:tailEnd type="none" w="med" len="med"/>
+                    </a:lnB>
+                  </a:tcPr>
+                </a:tc>
+                <a:tc>
+                  <a:txBody>
+                    <a:bodyPr/>
+                    <a:lstStyle/>
+                    <a:p>
+                      <a:r>
+                        <a:rPr lang="mr-IN" sz="1400" dirty="0" smtClean="0">
+                          <a:latin typeface="Arial"/>
+                          <a:cs typeface="Arial"/>
+                        </a:rPr>
+                        <a:t>…</a:t>
+                      </a:r>
+                      <a:endParaRPr lang="en-US" sz="1400" dirty="0">
+                        <a:latin typeface="Arial"/>
+                        <a:cs typeface="Arial"/>
+                      </a:endParaRPr>
+                    </a:p>
+                  </a:txBody>
+                  <a:tcPr>
+                    <a:lnL w="12700" cap="flat" cmpd="sng" algn="ctr">
+                      <a:solidFill>
+                        <a:scrgbClr r="0" g="0" b="0"/>
+                      </a:solidFill>
+                      <a:prstDash val="solid"/>
+                      <a:round/>
+                      <a:headEnd type="none" w="med" len="med"/>
+                      <a:tailEnd type="none" w="med" len="med"/>
+                    </a:lnL>
+                    <a:lnR w="12700" cap="flat" cmpd="sng" algn="ctr">
+                      <a:solidFill>
+                        <a:scrgbClr r="0" g="0" b="0"/>
+                      </a:solidFill>
+                      <a:prstDash val="solid"/>
+                      <a:round/>
+                      <a:headEnd type="none" w="med" len="med"/>
+                      <a:tailEnd type="none" w="med" len="med"/>
+                    </a:lnR>
+                    <a:lnT w="12700" cap="flat" cmpd="sng" algn="ctr">
+                      <a:solidFill>
+                        <a:scrgbClr r="0" g="0" b="0"/>
+                      </a:solidFill>
+                      <a:prstDash val="solid"/>
+                      <a:round/>
+                      <a:headEnd type="none" w="med" len="med"/>
+                      <a:tailEnd type="none" w="med" len="med"/>
+                    </a:lnT>
+                    <a:lnB w="12700" cap="flat" cmpd="sng" algn="ctr">
+                      <a:solidFill>
+                        <a:scrgbClr r="0" g="0" b="0"/>
+                      </a:solidFill>
+                      <a:prstDash val="solid"/>
+                      <a:round/>
+                      <a:headEnd type="none" w="med" len="med"/>
+                      <a:tailEnd type="none" w="med" len="med"/>
+                    </a:lnB>
+                  </a:tcPr>
+                </a:tc>
+                <a:tc>
+                  <a:txBody>
+                    <a:bodyPr/>
+                    <a:lstStyle/>
+                    <a:p>
+                      <a:r>
+                        <a:rPr lang="mr-IN" sz="1400" dirty="0" smtClean="0">
+                          <a:latin typeface="Arial"/>
+                          <a:cs typeface="Arial"/>
+                        </a:rPr>
+                        <a:t>…</a:t>
+                      </a:r>
+                      <a:endParaRPr lang="en-US" sz="1400" dirty="0">
                         <a:latin typeface="Arial"/>
                         <a:cs typeface="Arial"/>
                       </a:endParaRPr>
@@ -6500,15 +7454,15 @@
         </p:nvSpPr>
         <p:spPr>
           <a:xfrm>
-            <a:off x="1210096" y="761316"/>
-            <a:ext cx="6440811" cy="923330"/>
+            <a:off x="863980" y="855015"/>
+            <a:ext cx="7213708" cy="923330"/>
           </a:xfrm>
           <a:prstGeom prst="rect">
             <a:avLst/>
           </a:prstGeom>
         </p:spPr>
         <p:txBody>
-          <a:bodyPr wrap="none">
+          <a:bodyPr wrap="square">
             <a:spAutoFit/>
           </a:bodyPr>
           <a:lstStyle/>
@@ -6566,27 +7520,26 @@
       </p:grpSpPr>
       <p:sp>
         <p:nvSpPr>
-          <p:cNvPr id="26" name="Rectangle 25"/>
+          <p:cNvPr id="28" name="Rounded Rectangle 27"/>
           <p:cNvSpPr/>
           <p:nvPr/>
         </p:nvSpPr>
         <p:spPr>
           <a:xfrm>
-            <a:off x="1374039" y="2352802"/>
-            <a:ext cx="7265755" cy="3550023"/>
+            <a:off x="853570" y="853671"/>
+            <a:ext cx="7234527" cy="4851352"/>
           </a:xfrm>
-          <a:prstGeom prst="rect">
-            <a:avLst/>
+          <a:prstGeom prst="roundRect">
+            <a:avLst>
+              <a:gd name="adj" fmla="val 4437"/>
+            </a:avLst>
           </a:prstGeom>
           <a:solidFill>
-            <a:schemeClr val="bg2">
-              <a:lumMod val="20000"/>
-              <a:lumOff val="80000"/>
-            </a:schemeClr>
+            <a:srgbClr val="EDEDED"/>
           </a:solidFill>
           <a:ln>
             <a:solidFill>
-              <a:srgbClr val="08436D"/>
+              <a:srgbClr val="000000"/>
             </a:solidFill>
           </a:ln>
           <a:effectLst/>
@@ -6606,17 +7559,11 @@
           </a:fontRef>
         </p:style>
         <p:txBody>
-          <a:bodyPr rtlCol="0" anchor="t"/>
+          <a:bodyPr rtlCol="0" anchor="ctr"/>
           <a:lstStyle/>
           <a:p>
             <a:pPr algn="ctr"/>
-            <a:endParaRPr lang="en-US" b="1" dirty="0">
-              <a:solidFill>
-                <a:srgbClr val="052B48"/>
-              </a:solidFill>
-              <a:latin typeface="Calibri"/>
-              <a:cs typeface="Calibri"/>
-            </a:endParaRPr>
+            <a:endParaRPr lang="en-US"/>
           </a:p>
         </p:txBody>
       </p:sp>
@@ -6629,13 +7576,13 @@
           <p:nvPr>
             <p:extLst>
               <p:ext uri="{D42A27DB-BD31-4B8C-83A1-F6EECF244321}">
-                <p14:modId xmlns:p14="http://schemas.microsoft.com/office/powerpoint/2010/main" val="237449173"/>
+                <p14:modId xmlns:p14="http://schemas.microsoft.com/office/powerpoint/2010/main" val="1202897008"/>
               </p:ext>
             </p:extLst>
           </p:nvPr>
         </p:nvGraphicFramePr>
         <p:xfrm>
-          <a:off x="4538701" y="2928265"/>
+          <a:off x="3997418" y="2407735"/>
           <a:ext cx="1740663" cy="1066799"/>
         </p:xfrm>
         <a:graphic>
@@ -7343,7 +8290,7 @@
         </p:nvSpPr>
         <p:spPr>
           <a:xfrm>
-            <a:off x="7175311" y="2596604"/>
+            <a:off x="6634028" y="2076074"/>
             <a:ext cx="1175206" cy="307777"/>
           </a:xfrm>
           <a:prstGeom prst="rect">
@@ -7387,13 +8334,13 @@
           <p:nvPr>
             <p:extLst>
               <p:ext uri="{D42A27DB-BD31-4B8C-83A1-F6EECF244321}">
-                <p14:modId xmlns:p14="http://schemas.microsoft.com/office/powerpoint/2010/main" val="2157054814"/>
+                <p14:modId xmlns:p14="http://schemas.microsoft.com/office/powerpoint/2010/main" val="616582142"/>
               </p:ext>
             </p:extLst>
           </p:nvPr>
         </p:nvGraphicFramePr>
         <p:xfrm>
-          <a:off x="7167641" y="2925090"/>
+          <a:off x="6626358" y="2404560"/>
           <a:ext cx="1227530" cy="2773679"/>
         </p:xfrm>
         <a:graphic>
@@ -9213,7 +10160,7 @@
         </p:nvSpPr>
         <p:spPr>
           <a:xfrm>
-            <a:off x="7043849" y="3149101"/>
+            <a:off x="6502566" y="2628571"/>
             <a:ext cx="123791" cy="1273237"/>
           </a:xfrm>
           <a:prstGeom prst="leftBrace">
@@ -9257,7 +10204,7 @@
         </p:nvSpPr>
         <p:spPr>
           <a:xfrm>
-            <a:off x="7043848" y="4428707"/>
+            <a:off x="6502565" y="3908177"/>
             <a:ext cx="117216" cy="625531"/>
           </a:xfrm>
           <a:prstGeom prst="leftBrace">
@@ -9301,7 +10248,7 @@
         </p:nvSpPr>
         <p:spPr>
           <a:xfrm>
-            <a:off x="7043848" y="5051263"/>
+            <a:off x="6502565" y="4530733"/>
             <a:ext cx="117216" cy="436630"/>
           </a:xfrm>
           <a:prstGeom prst="leftBrace">
@@ -9345,7 +10292,7 @@
         </p:nvCxnSpPr>
         <p:spPr>
           <a:xfrm>
-            <a:off x="6259521" y="3254403"/>
+            <a:off x="5718238" y="2733873"/>
             <a:ext cx="764483" cy="531317"/>
           </a:xfrm>
           <a:prstGeom prst="straightConnector1">
@@ -9382,7 +10329,7 @@
         </p:nvCxnSpPr>
         <p:spPr>
           <a:xfrm>
-            <a:off x="6279366" y="3476027"/>
+            <a:off x="5738083" y="2955497"/>
             <a:ext cx="764482" cy="1266250"/>
           </a:xfrm>
           <a:prstGeom prst="straightConnector1">
@@ -9421,7 +10368,7 @@
         </p:nvCxnSpPr>
         <p:spPr>
           <a:xfrm>
-            <a:off x="6279366" y="3658590"/>
+            <a:off x="5738083" y="3138060"/>
             <a:ext cx="764482" cy="1610988"/>
           </a:xfrm>
           <a:prstGeom prst="straightConnector1">
@@ -9458,7 +10405,7 @@
         </p:nvCxnSpPr>
         <p:spPr>
           <a:xfrm>
-            <a:off x="6066148" y="2766881"/>
+            <a:off x="5524865" y="2246351"/>
             <a:ext cx="1181055" cy="0"/>
           </a:xfrm>
           <a:prstGeom prst="straightConnector1">
@@ -9495,7 +10442,7 @@
         </p:nvSpPr>
         <p:spPr>
           <a:xfrm>
-            <a:off x="6363365" y="2661691"/>
+            <a:off x="5822082" y="2141161"/>
             <a:ext cx="593185" cy="210312"/>
           </a:xfrm>
           <a:prstGeom prst="rect">
@@ -9545,7 +10492,7 @@
         </p:nvSpPr>
         <p:spPr>
           <a:xfrm>
-            <a:off x="4538701" y="2596604"/>
+            <a:off x="3997418" y="2076074"/>
             <a:ext cx="1720819" cy="307777"/>
           </a:xfrm>
           <a:prstGeom prst="rect">
@@ -9609,13 +10556,13 @@
           <p:nvPr>
             <p:extLst>
               <p:ext uri="{D42A27DB-BD31-4B8C-83A1-F6EECF244321}">
-                <p14:modId xmlns:p14="http://schemas.microsoft.com/office/powerpoint/2010/main" val="321078828"/>
+                <p14:modId xmlns:p14="http://schemas.microsoft.com/office/powerpoint/2010/main" val="164238510"/>
               </p:ext>
             </p:extLst>
           </p:nvPr>
         </p:nvGraphicFramePr>
         <p:xfrm>
-          <a:off x="1836930" y="2927999"/>
+          <a:off x="1295647" y="2407469"/>
           <a:ext cx="729060" cy="1067345"/>
         </p:xfrm>
         <a:graphic>
@@ -10312,13 +11259,13 @@
           <p:nvPr>
             <p:extLst>
               <p:ext uri="{D42A27DB-BD31-4B8C-83A1-F6EECF244321}">
-                <p14:modId xmlns:p14="http://schemas.microsoft.com/office/powerpoint/2010/main" val="2684798793"/>
+                <p14:modId xmlns:p14="http://schemas.microsoft.com/office/powerpoint/2010/main" val="1442088381"/>
               </p:ext>
             </p:extLst>
           </p:nvPr>
         </p:nvGraphicFramePr>
         <p:xfrm>
-          <a:off x="2831356" y="2928000"/>
+          <a:off x="2290073" y="2407470"/>
           <a:ext cx="1478133" cy="1067345"/>
         </p:xfrm>
         <a:graphic>
@@ -11034,7 +11981,7 @@
         </p:nvSpPr>
         <p:spPr>
           <a:xfrm>
-            <a:off x="3028640" y="2593924"/>
+            <a:off x="2487357" y="2073394"/>
             <a:ext cx="1175206" cy="307777"/>
           </a:xfrm>
           <a:prstGeom prst="rect">
@@ -11077,7 +12024,7 @@
         </p:nvSpPr>
         <p:spPr>
           <a:xfrm>
-            <a:off x="1401033" y="2620316"/>
+            <a:off x="859750" y="2099786"/>
             <a:ext cx="1659329" cy="307777"/>
           </a:xfrm>
           <a:prstGeom prst="rect">
@@ -11140,15 +12087,15 @@
         </p:nvSpPr>
         <p:spPr>
           <a:xfrm>
-            <a:off x="2862174" y="1281851"/>
-            <a:ext cx="4260864" cy="923330"/>
+            <a:off x="853570" y="855015"/>
+            <a:ext cx="7244937" cy="923330"/>
           </a:xfrm>
           <a:prstGeom prst="rect">
             <a:avLst/>
           </a:prstGeom>
         </p:spPr>
         <p:txBody>
-          <a:bodyPr wrap="none">
+          <a:bodyPr wrap="square">
             <a:spAutoFit/>
           </a:bodyPr>
           <a:lstStyle/>
@@ -11206,13 +12153,62 @@
       </p:grpSpPr>
       <p:sp>
         <p:nvSpPr>
+          <p:cNvPr id="17" name="Rounded Rectangle 16"/>
+          <p:cNvSpPr/>
+          <p:nvPr/>
+        </p:nvSpPr>
+        <p:spPr>
+          <a:xfrm>
+            <a:off x="853570" y="853671"/>
+            <a:ext cx="7234527" cy="4851352"/>
+          </a:xfrm>
+          <a:prstGeom prst="roundRect">
+            <a:avLst>
+              <a:gd name="adj" fmla="val 4437"/>
+            </a:avLst>
+          </a:prstGeom>
+          <a:solidFill>
+            <a:srgbClr val="EDEDED"/>
+          </a:solidFill>
+          <a:ln>
+            <a:solidFill>
+              <a:srgbClr val="000000"/>
+            </a:solidFill>
+          </a:ln>
+          <a:effectLst/>
+        </p:spPr>
+        <p:style>
+          <a:lnRef idx="1">
+            <a:schemeClr val="accent1"/>
+          </a:lnRef>
+          <a:fillRef idx="3">
+            <a:schemeClr val="accent1"/>
+          </a:fillRef>
+          <a:effectRef idx="2">
+            <a:schemeClr val="accent1"/>
+          </a:effectRef>
+          <a:fontRef idx="minor">
+            <a:schemeClr val="lt1"/>
+          </a:fontRef>
+        </p:style>
+        <p:txBody>
+          <a:bodyPr rtlCol="0" anchor="ctr"/>
+          <a:lstStyle/>
+          <a:p>
+            <a:pPr algn="ctr"/>
+            <a:endParaRPr lang="en-US"/>
+          </a:p>
+        </p:txBody>
+      </p:sp>
+      <p:sp>
+        <p:nvSpPr>
           <p:cNvPr id="26" name="Rectangle 25"/>
           <p:cNvSpPr/>
           <p:nvPr/>
         </p:nvSpPr>
         <p:spPr>
           <a:xfrm>
-            <a:off x="849990" y="761316"/>
+            <a:off x="849990" y="865426"/>
             <a:ext cx="7161035" cy="923330"/>
           </a:xfrm>
           <a:prstGeom prst="rect">
@@ -11267,10 +12263,7 @@
           </a:solidFill>
           <a:ln w="28575" cmpd="sng">
             <a:solidFill>
-              <a:schemeClr val="accent1">
-                <a:lumMod val="60000"/>
-                <a:lumOff val="40000"/>
-              </a:schemeClr>
+              <a:schemeClr val="accent1"/>
             </a:solidFill>
           </a:ln>
           <a:effectLst/>
@@ -11362,10 +12355,7 @@
           </a:solidFill>
           <a:ln w="28575" cmpd="sng">
             <a:solidFill>
-              <a:schemeClr val="accent1">
-                <a:lumMod val="60000"/>
-                <a:lumOff val="40000"/>
-              </a:schemeClr>
+              <a:schemeClr val="accent1"/>
             </a:solidFill>
           </a:ln>
           <a:effectLst/>
@@ -11457,10 +12447,7 @@
           </a:solidFill>
           <a:ln w="28575" cmpd="sng">
             <a:solidFill>
-              <a:schemeClr val="accent1">
-                <a:lumMod val="60000"/>
-                <a:lumOff val="40000"/>
-              </a:schemeClr>
+              <a:schemeClr val="accent1"/>
             </a:solidFill>
           </a:ln>
           <a:effectLst/>
@@ -11550,10 +12537,7 @@
           </a:solidFill>
           <a:ln w="28575" cmpd="sng">
             <a:solidFill>
-              <a:schemeClr val="accent1">
-                <a:lumMod val="60000"/>
-                <a:lumOff val="40000"/>
-              </a:schemeClr>
+              <a:schemeClr val="accent1"/>
             </a:solidFill>
           </a:ln>
           <a:effectLst/>
@@ -11599,11 +12583,12 @@
           </a:prstGeom>
           <a:ln>
             <a:solidFill>
-              <a:srgbClr val="08436D"/>
+              <a:schemeClr val="accent1"/>
             </a:solidFill>
             <a:headEnd type="none"/>
             <a:tailEnd type="triangle" w="lg" len="lg"/>
           </a:ln>
+          <a:effectLst/>
         </p:spPr>
         <p:style>
           <a:lnRef idx="2">
@@ -11639,11 +12624,12 @@
           </a:prstGeom>
           <a:ln>
             <a:solidFill>
-              <a:srgbClr val="08436D"/>
+              <a:schemeClr val="accent1"/>
             </a:solidFill>
             <a:headEnd type="none"/>
             <a:tailEnd type="triangle" w="lg" len="lg"/>
           </a:ln>
+          <a:effectLst/>
         </p:spPr>
         <p:style>
           <a:lnRef idx="2">
@@ -11678,11 +12664,12 @@
           </a:prstGeom>
           <a:ln>
             <a:solidFill>
-              <a:srgbClr val="08436D"/>
+              <a:schemeClr val="accent1"/>
             </a:solidFill>
             <a:headEnd type="none"/>
             <a:tailEnd type="triangle" w="lg" len="lg"/>
           </a:ln>
+          <a:effectLst/>
         </p:spPr>
         <p:style>
           <a:lnRef idx="2">
@@ -11729,6 +12716,134 @@
           <a:chExt cx="0" cy="0"/>
         </a:xfrm>
       </p:grpSpPr>
+      <p:sp>
+        <p:nvSpPr>
+          <p:cNvPr id="7" name="Rounded Rectangle 6"/>
+          <p:cNvSpPr/>
+          <p:nvPr/>
+        </p:nvSpPr>
+        <p:spPr>
+          <a:xfrm>
+            <a:off x="853570" y="822438"/>
+            <a:ext cx="7234527" cy="4851352"/>
+          </a:xfrm>
+          <a:prstGeom prst="roundRect">
+            <a:avLst>
+              <a:gd name="adj" fmla="val 4437"/>
+            </a:avLst>
+          </a:prstGeom>
+          <a:solidFill>
+            <a:srgbClr val="EDEDED"/>
+          </a:solidFill>
+          <a:ln>
+            <a:solidFill>
+              <a:srgbClr val="000000"/>
+            </a:solidFill>
+          </a:ln>
+          <a:effectLst/>
+        </p:spPr>
+        <p:style>
+          <a:lnRef idx="1">
+            <a:schemeClr val="accent1"/>
+          </a:lnRef>
+          <a:fillRef idx="3">
+            <a:schemeClr val="accent1"/>
+          </a:fillRef>
+          <a:effectRef idx="2">
+            <a:schemeClr val="accent1"/>
+          </a:effectRef>
+          <a:fontRef idx="minor">
+            <a:schemeClr val="lt1"/>
+          </a:fontRef>
+        </p:style>
+        <p:txBody>
+          <a:bodyPr rtlCol="0" anchor="ctr"/>
+          <a:lstStyle/>
+          <a:p>
+            <a:pPr algn="ctr"/>
+            <a:endParaRPr lang="en-US"/>
+          </a:p>
+        </p:txBody>
+      </p:sp>
+      <p:sp>
+        <p:nvSpPr>
+          <p:cNvPr id="5" name="Rectangle 4"/>
+          <p:cNvSpPr/>
+          <p:nvPr/>
+        </p:nvSpPr>
+        <p:spPr>
+          <a:xfrm>
+            <a:off x="843162" y="823781"/>
+            <a:ext cx="7234526" cy="956437"/>
+          </a:xfrm>
+          <a:prstGeom prst="rect">
+            <a:avLst/>
+          </a:prstGeom>
+        </p:spPr>
+        <p:txBody>
+          <a:bodyPr wrap="square">
+            <a:spAutoFit/>
+          </a:bodyPr>
+          <a:lstStyle/>
+          <a:p>
+            <a:pPr algn="ctr"/>
+            <a:r>
+              <a:rPr lang="en-US" sz="5400" b="1" dirty="0" err="1" smtClean="0">
+                <a:solidFill>
+                  <a:srgbClr val="052B48"/>
+                </a:solidFill>
+                <a:latin typeface="Calibri"/>
+                <a:cs typeface="Calibri"/>
+              </a:rPr>
+              <a:t>ExternalResources</a:t>
+            </a:r>
+            <a:endParaRPr lang="en-US" sz="5400" b="1" dirty="0">
+              <a:solidFill>
+                <a:srgbClr val="052B48"/>
+              </a:solidFill>
+              <a:latin typeface="Calibri"/>
+              <a:cs typeface="Calibri"/>
+            </a:endParaRPr>
+          </a:p>
+        </p:txBody>
+      </p:sp>
+      <p:pic>
+        <p:nvPicPr>
+          <p:cNvPr id="6" name="Picture 5" descr="www-1632431_1280.png"/>
+          <p:cNvPicPr>
+            <a:picLocks noChangeAspect="1"/>
+          </p:cNvPicPr>
+          <p:nvPr/>
+        </p:nvPicPr>
+        <p:blipFill>
+          <a:blip r:embed="rId2">
+            <a:duotone>
+              <a:schemeClr val="accent5">
+                <a:shade val="45000"/>
+                <a:satMod val="135000"/>
+              </a:schemeClr>
+              <a:prstClr val="white"/>
+            </a:duotone>
+            <a:extLst>
+              <a:ext uri="{28A0092B-C50C-407E-A947-70E740481C1C}">
+                <a14:useLocalDpi xmlns:a14="http://schemas.microsoft.com/office/drawing/2010/main" val="0"/>
+              </a:ext>
+            </a:extLst>
+          </a:blip>
+          <a:stretch>
+            <a:fillRect/>
+          </a:stretch>
+        </p:blipFill>
+        <p:spPr>
+          <a:xfrm>
+            <a:off x="2586231" y="1884323"/>
+            <a:ext cx="3749166" cy="3643720"/>
+          </a:xfrm>
+          <a:prstGeom prst="rect">
+            <a:avLst/>
+          </a:prstGeom>
+        </p:spPr>
+      </p:pic>
     </p:spTree>
     <p:extLst>
       <p:ext uri="{BB962C8B-B14F-4D97-AF65-F5344CB8AC3E}">

</xml_diff>

<commit_message>
Add missing thumbnail for generic data chunk iterator tutorial
</commit_message>
<xml_diff>
--- a/docs/source/figures/gallery_thumbnails.pptx
+++ b/docs/source/figures/gallery_thumbnails.pptx
@@ -5,13 +5,14 @@
     <p:sldMasterId id="2147483660" r:id="rId1"/>
   </p:sldMasterIdLst>
   <p:notesMasterIdLst>
-    <p:notesMasterId r:id="rId6"/>
+    <p:notesMasterId r:id="rId7"/>
   </p:notesMasterIdLst>
   <p:sldIdLst>
     <p:sldId id="342" r:id="rId2"/>
     <p:sldId id="343" r:id="rId3"/>
     <p:sldId id="344" r:id="rId4"/>
     <p:sldId id="345" r:id="rId5"/>
+    <p:sldId id="346" r:id="rId6"/>
   </p:sldIdLst>
   <p:sldSz cx="12192000" cy="6858000"/>
   <p:notesSz cx="6858000" cy="9144000"/>
@@ -112,7 +113,18 @@
   </p:defaultTextStyle>
   <p:extLst>
     <p:ext uri="{EFAFB233-063F-42B5-8137-9DF3F51BA10A}">
-      <p15:sldGuideLst xmlns="" xmlns:p15="http://schemas.microsoft.com/office/powerpoint/2012/main"/>
+      <p15:sldGuideLst xmlns:p15="http://schemas.microsoft.com/office/powerpoint/2012/main">
+        <p15:guide id="1" orient="horz" pos="762">
+          <p15:clr>
+            <a:srgbClr val="A4A3A4"/>
+          </p15:clr>
+        </p15:guide>
+        <p15:guide id="2" pos="7410">
+          <p15:clr>
+            <a:srgbClr val="A4A3A4"/>
+          </p15:clr>
+        </p15:guide>
+      </p15:sldGuideLst>
     </p:ext>
   </p:extLst>
 </p:presentation>
@@ -200,7 +212,7 @@
           <a:p>
             <a:fld id="{4D6A40B9-902A-4E0E-AF39-1C357549AEE0}" type="datetimeFigureOut">
               <a:rPr lang="en-US" smtClean="0"/>
-              <a:t>4/14/21</a:t>
+              <a:t>4/21/22</a:t>
             </a:fld>
             <a:endParaRPr lang="en-US"/>
           </a:p>
@@ -467,6 +479,90 @@
 </p:notesMaster>
 </file>
 
+<file path=ppt/notesSlides/notesSlide1.xml><?xml version="1.0" encoding="utf-8"?>
+<p:notes xmlns:a="http://schemas.openxmlformats.org/drawingml/2006/main" xmlns:r="http://schemas.openxmlformats.org/officeDocument/2006/relationships" xmlns:p="http://schemas.openxmlformats.org/presentationml/2006/main">
+  <p:cSld>
+    <p:spTree>
+      <p:nvGrpSpPr>
+        <p:cNvPr id="1" name=""/>
+        <p:cNvGrpSpPr/>
+        <p:nvPr/>
+      </p:nvGrpSpPr>
+      <p:grpSpPr>
+        <a:xfrm>
+          <a:off x="0" y="0"/>
+          <a:ext cx="0" cy="0"/>
+          <a:chOff x="0" y="0"/>
+          <a:chExt cx="0" cy="0"/>
+        </a:xfrm>
+      </p:grpSpPr>
+      <p:sp>
+        <p:nvSpPr>
+          <p:cNvPr id="2" name="Slide Image Placeholder 1"/>
+          <p:cNvSpPr>
+            <a:spLocks noGrp="1" noRot="1" noChangeAspect="1"/>
+          </p:cNvSpPr>
+          <p:nvPr>
+            <p:ph type="sldImg"/>
+          </p:nvPr>
+        </p:nvSpPr>
+        <p:spPr/>
+      </p:sp>
+      <p:sp>
+        <p:nvSpPr>
+          <p:cNvPr id="3" name="Notes Placeholder 2"/>
+          <p:cNvSpPr>
+            <a:spLocks noGrp="1"/>
+          </p:cNvSpPr>
+          <p:nvPr>
+            <p:ph type="body" idx="1"/>
+          </p:nvPr>
+        </p:nvSpPr>
+        <p:spPr/>
+        <p:txBody>
+          <a:bodyPr/>
+          <a:lstStyle/>
+          <a:p>
+            <a:endParaRPr lang="en-US" dirty="0"/>
+          </a:p>
+        </p:txBody>
+      </p:sp>
+      <p:sp>
+        <p:nvSpPr>
+          <p:cNvPr id="4" name="Slide Number Placeholder 3"/>
+          <p:cNvSpPr>
+            <a:spLocks noGrp="1"/>
+          </p:cNvSpPr>
+          <p:nvPr>
+            <p:ph type="sldNum" sz="quarter" idx="5"/>
+          </p:nvPr>
+        </p:nvSpPr>
+        <p:spPr/>
+        <p:txBody>
+          <a:bodyPr/>
+          <a:lstStyle/>
+          <a:p>
+            <a:fld id="{88156F16-9966-4EDC-933D-6170A05B6017}" type="slidenum">
+              <a:rPr lang="en-US" smtClean="0"/>
+              <a:t>5</a:t>
+            </a:fld>
+            <a:endParaRPr lang="en-US"/>
+          </a:p>
+        </p:txBody>
+      </p:sp>
+    </p:spTree>
+    <p:extLst>
+      <p:ext uri="{BB962C8B-B14F-4D97-AF65-F5344CB8AC3E}">
+        <p14:creationId xmlns:p14="http://schemas.microsoft.com/office/powerpoint/2010/main" val="1595721762"/>
+      </p:ext>
+    </p:extLst>
+  </p:cSld>
+  <p:clrMapOvr>
+    <a:masterClrMapping/>
+  </p:clrMapOvr>
+</p:notes>
+</file>
+
 <file path=ppt/slideLayouts/slideLayout1.xml><?xml version="1.0" encoding="utf-8"?>
 <p:sldLayout xmlns:a="http://schemas.openxmlformats.org/drawingml/2006/main" xmlns:r="http://schemas.openxmlformats.org/officeDocument/2006/relationships" xmlns:p="http://schemas.openxmlformats.org/presentationml/2006/main" matchingName="Title slide" type="title" preserve="1">
   <p:cSld name="Title slide">
@@ -1280,7 +1376,7 @@
           <p:cNvPr id="4" name="Text Placeholder 3">
             <a:extLst>
               <a:ext uri="{FF2B5EF4-FFF2-40B4-BE49-F238E27FC236}">
-                <a16:creationId xmlns="" xmlns:a16="http://schemas.microsoft.com/office/drawing/2014/main" id="{8850B379-F419-41FB-9123-96081B074583}"/>
+                <a16:creationId xmlns:a16="http://schemas.microsoft.com/office/drawing/2014/main" id="{8850B379-F419-41FB-9123-96081B074583}"/>
               </a:ext>
             </a:extLst>
           </p:cNvPr>
@@ -1571,7 +1667,7 @@
           <p:cNvPr id="5" name="Picture 4">
             <a:extLst>
               <a:ext uri="{FF2B5EF4-FFF2-40B4-BE49-F238E27FC236}">
-                <a16:creationId xmlns="" xmlns:a16="http://schemas.microsoft.com/office/drawing/2014/main" id="{A5059957-9534-4FB9-8820-2343C3BF0E8F}"/>
+                <a16:creationId xmlns:a16="http://schemas.microsoft.com/office/drawing/2014/main" id="{A5059957-9534-4FB9-8820-2343C3BF0E8F}"/>
               </a:ext>
             </a:extLst>
           </p:cNvPr>
@@ -1601,7 +1697,7 @@
           <p:cNvPr id="4" name="Text Placeholder 3">
             <a:extLst>
               <a:ext uri="{FF2B5EF4-FFF2-40B4-BE49-F238E27FC236}">
-                <a16:creationId xmlns="" xmlns:a16="http://schemas.microsoft.com/office/drawing/2014/main" id="{8850B379-F419-41FB-9123-96081B074583}"/>
+                <a16:creationId xmlns:a16="http://schemas.microsoft.com/office/drawing/2014/main" id="{8850B379-F419-41FB-9123-96081B074583}"/>
               </a:ext>
             </a:extLst>
           </p:cNvPr>
@@ -1958,7 +2054,7 @@
           <p:cNvPr id="7" name="Google Shape;20;p4">
             <a:extLst>
               <a:ext uri="{FF2B5EF4-FFF2-40B4-BE49-F238E27FC236}">
-                <a16:creationId xmlns="" xmlns:a16="http://schemas.microsoft.com/office/drawing/2014/main" id="{537643E4-B983-42CC-9421-9C4C107A5DA4}"/>
+                <a16:creationId xmlns:a16="http://schemas.microsoft.com/office/drawing/2014/main" id="{537643E4-B983-42CC-9421-9C4C107A5DA4}"/>
               </a:ext>
             </a:extLst>
           </p:cNvPr>
@@ -3356,7 +3452,7 @@
         </p:nvGraphicFramePr>
         <p:xfrm>
           <a:off x="1020118" y="2187577"/>
-          <a:ext cx="6880609" cy="3074538"/>
+          <a:ext cx="6880609" cy="3074539"/>
         </p:xfrm>
         <a:graphic>
           <a:graphicData uri="http://schemas.openxmlformats.org/drawingml/2006/table">
@@ -3365,13 +3461,55 @@
                 <a:tableStyleId>{5C22544A-7EE6-4342-B048-85BDC9FD1C3A}</a:tableStyleId>
               </a:tblPr>
               <a:tblGrid>
-                <a:gridCol w="982944"/>
-                <a:gridCol w="982944"/>
-                <a:gridCol w="982944"/>
-                <a:gridCol w="982944"/>
-                <a:gridCol w="982945"/>
-                <a:gridCol w="982944"/>
-                <a:gridCol w="982944"/>
+                <a:gridCol w="982944">
+                  <a:extLst>
+                    <a:ext uri="{9D8B030D-6E8A-4147-A177-3AD203B41FA5}">
+                      <a16:colId xmlns:a16="http://schemas.microsoft.com/office/drawing/2014/main" val="20000"/>
+                    </a:ext>
+                  </a:extLst>
+                </a:gridCol>
+                <a:gridCol w="982944">
+                  <a:extLst>
+                    <a:ext uri="{9D8B030D-6E8A-4147-A177-3AD203B41FA5}">
+                      <a16:colId xmlns:a16="http://schemas.microsoft.com/office/drawing/2014/main" val="20001"/>
+                    </a:ext>
+                  </a:extLst>
+                </a:gridCol>
+                <a:gridCol w="982944">
+                  <a:extLst>
+                    <a:ext uri="{9D8B030D-6E8A-4147-A177-3AD203B41FA5}">
+                      <a16:colId xmlns:a16="http://schemas.microsoft.com/office/drawing/2014/main" val="20002"/>
+                    </a:ext>
+                  </a:extLst>
+                </a:gridCol>
+                <a:gridCol w="982944">
+                  <a:extLst>
+                    <a:ext uri="{9D8B030D-6E8A-4147-A177-3AD203B41FA5}">
+                      <a16:colId xmlns:a16="http://schemas.microsoft.com/office/drawing/2014/main" val="20003"/>
+                    </a:ext>
+                  </a:extLst>
+                </a:gridCol>
+                <a:gridCol w="982945">
+                  <a:extLst>
+                    <a:ext uri="{9D8B030D-6E8A-4147-A177-3AD203B41FA5}">
+                      <a16:colId xmlns:a16="http://schemas.microsoft.com/office/drawing/2014/main" val="20004"/>
+                    </a:ext>
+                  </a:extLst>
+                </a:gridCol>
+                <a:gridCol w="982944">
+                  <a:extLst>
+                    <a:ext uri="{9D8B030D-6E8A-4147-A177-3AD203B41FA5}">
+                      <a16:colId xmlns:a16="http://schemas.microsoft.com/office/drawing/2014/main" val="20005"/>
+                    </a:ext>
+                  </a:extLst>
+                </a:gridCol>
+                <a:gridCol w="982944">
+                  <a:extLst>
+                    <a:ext uri="{9D8B030D-6E8A-4147-A177-3AD203B41FA5}">
+                      <a16:colId xmlns:a16="http://schemas.microsoft.com/office/drawing/2014/main" val="20006"/>
+                    </a:ext>
+                  </a:extLst>
+                </a:gridCol>
               </a:tblGrid>
               <a:tr h="269255">
                 <a:tc rowSpan="2">
@@ -3380,7 +3518,7 @@
                     <a:lstStyle/>
                     <a:p>
                       <a:r>
-                        <a:rPr lang="en-US" sz="1400" b="1" dirty="0" smtClean="0">
+                        <a:rPr lang="en-US" sz="1400" b="1" dirty="0">
                           <a:solidFill>
                             <a:schemeClr val="bg1"/>
                           </a:solidFill>
@@ -3389,13 +3527,6 @@
                         </a:rPr>
                         <a:t>customer</a:t>
                       </a:r>
-                      <a:endParaRPr lang="en-US" sz="1400" b="1" dirty="0">
-                        <a:solidFill>
-                          <a:schemeClr val="bg1"/>
-                        </a:solidFill>
-                        <a:latin typeface="Arial"/>
-                        <a:cs typeface="Arial"/>
-                      </a:endParaRPr>
                     </a:p>
                   </a:txBody>
                   <a:tcPr>
@@ -3552,7 +3683,7 @@
                     <a:lstStyle/>
                     <a:p>
                       <a:r>
-                        <a:rPr lang="en-US" sz="1400" b="1" dirty="0" err="1" smtClean="0">
+                        <a:rPr lang="en-US" sz="1400" b="1" dirty="0" err="1">
                           <a:solidFill>
                             <a:srgbClr val="FFFFFF"/>
                           </a:solidFill>
@@ -3668,7 +3799,7 @@
                     <a:lstStyle/>
                     <a:p>
                       <a:r>
-                        <a:rPr lang="en-US" sz="1400" b="1" dirty="0" err="1" smtClean="0">
+                        <a:rPr lang="en-US" sz="1400" b="1" dirty="0" err="1">
                           <a:solidFill>
                             <a:srgbClr val="FFFFFF"/>
                           </a:solidFill>
@@ -3778,6 +3909,11 @@
                     </a:lnB>
                   </a:tcPr>
                 </a:tc>
+                <a:extLst>
+                  <a:ext uri="{0D108BD9-81ED-4DB2-BD59-A6C34878D82A}">
+                    <a16:rowId xmlns:a16="http://schemas.microsoft.com/office/drawing/2014/main" val="10000"/>
+                  </a:ext>
+                </a:extLst>
               </a:tr>
               <a:tr h="269255">
                 <a:tc vMerge="1">
@@ -3839,7 +3975,7 @@
                     <a:lstStyle/>
                     <a:p>
                       <a:r>
-                        <a:rPr lang="en-US" sz="1400" b="1" dirty="0" err="1" smtClean="0">
+                        <a:rPr lang="en-US" sz="1400" b="1" dirty="0" err="1">
                           <a:solidFill>
                             <a:srgbClr val="FFFFFF"/>
                           </a:solidFill>
@@ -3905,7 +4041,7 @@
                     <a:lstStyle/>
                     <a:p>
                       <a:r>
-                        <a:rPr lang="en-US" sz="1400" b="1" dirty="0" err="1" smtClean="0">
+                        <a:rPr lang="en-US" sz="1400" b="1" dirty="0" err="1">
                           <a:solidFill>
                             <a:srgbClr val="FFFFFF"/>
                           </a:solidFill>
@@ -3971,7 +4107,7 @@
                     <a:lstStyle/>
                     <a:p>
                       <a:r>
-                        <a:rPr lang="en-US" sz="1400" b="1" dirty="0" smtClean="0">
+                        <a:rPr lang="en-US" sz="1400" b="1" dirty="0">
                           <a:solidFill>
                             <a:srgbClr val="FFFFFF"/>
                           </a:solidFill>
@@ -3980,13 +4116,6 @@
                         </a:rPr>
                         <a:t>city</a:t>
                       </a:r>
-                      <a:endParaRPr lang="en-US" sz="1400" b="1" dirty="0">
-                        <a:solidFill>
-                          <a:srgbClr val="FFFFFF"/>
-                        </a:solidFill>
-                        <a:latin typeface="Arial"/>
-                        <a:cs typeface="Arial"/>
-                      </a:endParaRPr>
                     </a:p>
                   </a:txBody>
                   <a:tcPr>
@@ -4037,7 +4166,7 @@
                     <a:lstStyle/>
                     <a:p>
                       <a:r>
-                        <a:rPr lang="en-US" sz="1400" b="1" dirty="0" smtClean="0">
+                        <a:rPr lang="en-US" sz="1400" b="1" dirty="0">
                           <a:solidFill>
                             <a:srgbClr val="FFFFFF"/>
                           </a:solidFill>
@@ -4046,13 +4175,6 @@
                         </a:rPr>
                         <a:t>street</a:t>
                       </a:r>
-                      <a:endParaRPr lang="en-US" sz="1400" b="1" dirty="0">
-                        <a:solidFill>
-                          <a:srgbClr val="FFFFFF"/>
-                        </a:solidFill>
-                        <a:latin typeface="Arial"/>
-                        <a:cs typeface="Arial"/>
-                      </a:endParaRPr>
                     </a:p>
                   </a:txBody>
                   <a:tcPr>
@@ -4103,7 +4225,7 @@
                     <a:lstStyle/>
                     <a:p>
                       <a:r>
-                        <a:rPr lang="en-US" sz="1400" b="1" dirty="0" smtClean="0">
+                        <a:rPr lang="en-US" sz="1400" b="1" dirty="0">
                           <a:solidFill>
                             <a:srgbClr val="FFFFFF"/>
                           </a:solidFill>
@@ -4112,13 +4234,6 @@
                         </a:rPr>
                         <a:t>city</a:t>
                       </a:r>
-                      <a:endParaRPr lang="en-US" sz="1400" b="1" dirty="0">
-                        <a:solidFill>
-                          <a:srgbClr val="FFFFFF"/>
-                        </a:solidFill>
-                        <a:latin typeface="Arial"/>
-                        <a:cs typeface="Arial"/>
-                      </a:endParaRPr>
                     </a:p>
                   </a:txBody>
                   <a:tcPr>
@@ -4169,7 +4284,7 @@
                     <a:lstStyle/>
                     <a:p>
                       <a:r>
-                        <a:rPr lang="en-US" sz="1400" b="1" dirty="0" smtClean="0">
+                        <a:rPr lang="en-US" sz="1400" b="1" dirty="0">
                           <a:solidFill>
                             <a:srgbClr val="FFFFFF"/>
                           </a:solidFill>
@@ -4178,13 +4293,6 @@
                         </a:rPr>
                         <a:t>street</a:t>
                       </a:r>
-                      <a:endParaRPr lang="en-US" sz="1400" b="1" dirty="0">
-                        <a:solidFill>
-                          <a:srgbClr val="FFFFFF"/>
-                        </a:solidFill>
-                        <a:latin typeface="Arial"/>
-                        <a:cs typeface="Arial"/>
-                      </a:endParaRPr>
                     </a:p>
                   </a:txBody>
                   <a:tcPr>
@@ -4229,6 +4337,11 @@
                     </a:solidFill>
                   </a:tcPr>
                 </a:tc>
+                <a:extLst>
+                  <a:ext uri="{0D108BD9-81ED-4DB2-BD59-A6C34878D82A}">
+                    <a16:rowId xmlns:a16="http://schemas.microsoft.com/office/drawing/2014/main" val="10001"/>
+                  </a:ext>
+                </a:extLst>
               </a:tr>
               <a:tr h="331339">
                 <a:tc>
@@ -4237,7 +4350,7 @@
                     <a:lstStyle/>
                     <a:p>
                       <a:r>
-                        <a:rPr lang="en-US" sz="1400" b="1" dirty="0" smtClean="0">
+                        <a:rPr lang="en-US" sz="1400" b="1" dirty="0">
                           <a:solidFill>
                             <a:schemeClr val="bg1"/>
                           </a:solidFill>
@@ -4246,13 +4359,6 @@
                         </a:rPr>
                         <a:t>id</a:t>
                       </a:r>
-                      <a:endParaRPr lang="en-US" sz="1400" b="1" dirty="0">
-                        <a:solidFill>
-                          <a:schemeClr val="bg1"/>
-                        </a:solidFill>
-                        <a:latin typeface="Arial"/>
-                        <a:cs typeface="Arial"/>
-                      </a:endParaRPr>
                     </a:p>
                   </a:txBody>
                   <a:tcPr>
@@ -4615,6 +4721,11 @@
                     </a:solidFill>
                   </a:tcPr>
                 </a:tc>
+                <a:extLst>
+                  <a:ext uri="{0D108BD9-81ED-4DB2-BD59-A6C34878D82A}">
+                    <a16:rowId xmlns:a16="http://schemas.microsoft.com/office/drawing/2014/main" val="10002"/>
+                  </a:ext>
+                </a:extLst>
               </a:tr>
               <a:tr h="269255">
                 <a:tc>
@@ -4623,16 +4734,12 @@
                     <a:lstStyle/>
                     <a:p>
                       <a:r>
-                        <a:rPr lang="en-US" sz="1400" dirty="0" smtClean="0">
+                        <a:rPr lang="en-US" sz="1400" dirty="0">
                           <a:latin typeface="Arial"/>
                           <a:cs typeface="Arial"/>
                         </a:rPr>
                         <a:t>0</a:t>
                       </a:r>
-                      <a:endParaRPr lang="en-US" sz="1400" dirty="0">
-                        <a:latin typeface="Arial"/>
-                        <a:cs typeface="Arial"/>
-                      </a:endParaRPr>
                     </a:p>
                   </a:txBody>
                   <a:tcPr>
@@ -4680,16 +4787,12 @@
                     <a:lstStyle/>
                     <a:p>
                       <a:r>
-                        <a:rPr lang="en-US" sz="1400" dirty="0" smtClean="0">
+                        <a:rPr lang="en-US" sz="1400" dirty="0">
                           <a:latin typeface="Arial"/>
                           <a:cs typeface="Arial"/>
                         </a:rPr>
                         <a:t>Peter</a:t>
                       </a:r>
-                      <a:endParaRPr lang="en-US" sz="1400" dirty="0">
-                        <a:latin typeface="Arial"/>
-                        <a:cs typeface="Arial"/>
-                      </a:endParaRPr>
                     </a:p>
                   </a:txBody>
                   <a:tcPr>
@@ -4737,16 +4840,12 @@
                     <a:lstStyle/>
                     <a:p>
                       <a:r>
-                        <a:rPr lang="en-US" sz="1400" dirty="0" smtClean="0">
+                        <a:rPr lang="en-US" sz="1400" dirty="0">
                           <a:latin typeface="Arial"/>
                           <a:cs typeface="Arial"/>
                         </a:rPr>
                         <a:t>Williams</a:t>
                       </a:r>
-                      <a:endParaRPr lang="en-US" sz="1400" dirty="0">
-                        <a:latin typeface="Arial"/>
-                        <a:cs typeface="Arial"/>
-                      </a:endParaRPr>
                     </a:p>
                   </a:txBody>
                   <a:tcPr>
@@ -4794,7 +4893,7 @@
                     <a:lstStyle/>
                     <a:p>
                       <a:r>
-                        <a:rPr lang="en-US" sz="1400" dirty="0" err="1" smtClean="0">
+                        <a:rPr lang="en-US" sz="1400" dirty="0" err="1">
                           <a:latin typeface="Arial"/>
                           <a:cs typeface="Arial"/>
                         </a:rPr>
@@ -4851,7 +4950,7 @@
                     <a:lstStyle/>
                     <a:p>
                       <a:r>
-                        <a:rPr lang="en-US" sz="1400" dirty="0" err="1" smtClean="0">
+                        <a:rPr lang="en-US" sz="1400" dirty="0" err="1">
                           <a:latin typeface="Arial"/>
                           <a:cs typeface="Arial"/>
                         </a:rPr>
@@ -4908,7 +5007,7 @@
                     <a:lstStyle/>
                     <a:p>
                       <a:r>
-                        <a:rPr lang="en-US" sz="1400" dirty="0" err="1" smtClean="0">
+                        <a:rPr lang="en-US" sz="1400" dirty="0" err="1">
                           <a:latin typeface="Arial"/>
                           <a:cs typeface="Arial"/>
                         </a:rPr>
@@ -4965,16 +5064,12 @@
                     <a:lstStyle/>
                     <a:p>
                       <a:r>
-                        <a:rPr lang="en-US" sz="1400" dirty="0" smtClean="0">
+                        <a:rPr lang="en-US" sz="1400" dirty="0">
                           <a:latin typeface="Arial"/>
                           <a:cs typeface="Arial"/>
                         </a:rPr>
                         <a:t>Steal</a:t>
                       </a:r>
-                      <a:endParaRPr lang="en-US" sz="1400" dirty="0">
-                        <a:latin typeface="Arial"/>
-                        <a:cs typeface="Arial"/>
-                      </a:endParaRPr>
                     </a:p>
                   </a:txBody>
                   <a:tcPr>
@@ -5016,6 +5111,11 @@
                     </a:lnB>
                   </a:tcPr>
                 </a:tc>
+                <a:extLst>
+                  <a:ext uri="{0D108BD9-81ED-4DB2-BD59-A6C34878D82A}">
+                    <a16:rowId xmlns:a16="http://schemas.microsoft.com/office/drawing/2014/main" val="10003"/>
+                  </a:ext>
+                </a:extLst>
               </a:tr>
               <a:tr h="269255">
                 <a:tc>
@@ -5024,16 +5124,12 @@
                     <a:lstStyle/>
                     <a:p>
                       <a:r>
-                        <a:rPr lang="en-US" sz="1400" dirty="0" smtClean="0">
+                        <a:rPr lang="en-US" sz="1400" dirty="0">
                           <a:latin typeface="Arial"/>
                           <a:cs typeface="Arial"/>
                         </a:rPr>
                         <a:t>1</a:t>
                       </a:r>
-                      <a:endParaRPr lang="en-US" sz="1400" dirty="0">
-                        <a:latin typeface="Arial"/>
-                        <a:cs typeface="Arial"/>
-                      </a:endParaRPr>
                     </a:p>
                   </a:txBody>
                   <a:tcPr>
@@ -5081,16 +5177,12 @@
                     <a:lstStyle/>
                     <a:p>
                       <a:r>
-                        <a:rPr lang="en-US" sz="1400" dirty="0" smtClean="0">
+                        <a:rPr lang="en-US" sz="1400" dirty="0">
                           <a:latin typeface="Arial"/>
                           <a:cs typeface="Arial"/>
                         </a:rPr>
                         <a:t>Emma</a:t>
                       </a:r>
-                      <a:endParaRPr lang="en-US" sz="1400" dirty="0">
-                        <a:latin typeface="Arial"/>
-                        <a:cs typeface="Arial"/>
-                      </a:endParaRPr>
                     </a:p>
                   </a:txBody>
                   <a:tcPr>
@@ -5138,16 +5230,12 @@
                     <a:lstStyle/>
                     <a:p>
                       <a:r>
-                        <a:rPr lang="en-US" sz="1400" dirty="0" smtClean="0">
+                        <a:rPr lang="en-US" sz="1400" dirty="0">
                           <a:latin typeface="Arial"/>
                           <a:cs typeface="Arial"/>
                         </a:rPr>
                         <a:t>Brown</a:t>
                       </a:r>
-                      <a:endParaRPr lang="en-US" sz="1400" dirty="0">
-                        <a:latin typeface="Arial"/>
-                        <a:cs typeface="Arial"/>
-                      </a:endParaRPr>
                     </a:p>
                   </a:txBody>
                   <a:tcPr>
@@ -5195,7 +5283,7 @@
                     <a:lstStyle/>
                     <a:p>
                       <a:r>
-                        <a:rPr lang="en-US" sz="1400" dirty="0" err="1" smtClean="0">
+                        <a:rPr lang="en-US" sz="1400" dirty="0" err="1">
                           <a:latin typeface="Arial"/>
                           <a:cs typeface="Arial"/>
                         </a:rPr>
@@ -5252,7 +5340,7 @@
                     <a:lstStyle/>
                     <a:p>
                       <a:r>
-                        <a:rPr lang="en-US" sz="1400" dirty="0" err="1" smtClean="0">
+                        <a:rPr lang="en-US" sz="1400" dirty="0" err="1">
                           <a:latin typeface="Arial"/>
                           <a:cs typeface="Arial"/>
                         </a:rPr>
@@ -5309,7 +5397,7 @@
                     <a:lstStyle/>
                     <a:p>
                       <a:r>
-                        <a:rPr lang="en-US" sz="1400" dirty="0" err="1" smtClean="0">
+                        <a:rPr lang="en-US" sz="1400" dirty="0" err="1">
                           <a:latin typeface="Arial"/>
                           <a:cs typeface="Arial"/>
                         </a:rPr>
@@ -5366,16 +5454,12 @@
                     <a:lstStyle/>
                     <a:p>
                       <a:r>
-                        <a:rPr lang="en-US" sz="1400" dirty="0" smtClean="0">
+                        <a:rPr lang="en-US" sz="1400" dirty="0">
                           <a:latin typeface="Arial"/>
                           <a:cs typeface="Arial"/>
                         </a:rPr>
                         <a:t>Wood</a:t>
                       </a:r>
-                      <a:endParaRPr lang="en-US" sz="1400" dirty="0">
-                        <a:latin typeface="Arial"/>
-                        <a:cs typeface="Arial"/>
-                      </a:endParaRPr>
                     </a:p>
                   </a:txBody>
                   <a:tcPr>
@@ -5417,6 +5501,11 @@
                     </a:lnB>
                   </a:tcPr>
                 </a:tc>
+                <a:extLst>
+                  <a:ext uri="{0D108BD9-81ED-4DB2-BD59-A6C34878D82A}">
+                    <a16:rowId xmlns:a16="http://schemas.microsoft.com/office/drawing/2014/main" val="10004"/>
+                  </a:ext>
+                </a:extLst>
               </a:tr>
               <a:tr h="269255">
                 <a:tc>
@@ -5425,16 +5514,12 @@
                     <a:lstStyle/>
                     <a:p>
                       <a:r>
-                        <a:rPr lang="en-US" sz="1400" dirty="0" smtClean="0">
+                        <a:rPr lang="en-US" sz="1400" dirty="0">
                           <a:latin typeface="Arial"/>
                           <a:cs typeface="Arial"/>
                         </a:rPr>
                         <a:t>2</a:t>
                       </a:r>
-                      <a:endParaRPr lang="en-US" sz="1400" dirty="0">
-                        <a:latin typeface="Arial"/>
-                        <a:cs typeface="Arial"/>
-                      </a:endParaRPr>
                     </a:p>
                   </a:txBody>
                   <a:tcPr>
@@ -5482,16 +5567,12 @@
                     <a:lstStyle/>
                     <a:p>
                       <a:r>
-                        <a:rPr lang="en-US" sz="1400" dirty="0" smtClean="0">
+                        <a:rPr lang="en-US" sz="1400" dirty="0">
                           <a:latin typeface="Arial"/>
                           <a:cs typeface="Arial"/>
                         </a:rPr>
                         <a:t>Paul</a:t>
                       </a:r>
-                      <a:endParaRPr lang="en-US" sz="1400" dirty="0">
-                        <a:latin typeface="Arial"/>
-                        <a:cs typeface="Arial"/>
-                      </a:endParaRPr>
                     </a:p>
                   </a:txBody>
                   <a:tcPr>
@@ -5539,16 +5620,12 @@
                     <a:lstStyle/>
                     <a:p>
                       <a:r>
-                        <a:rPr lang="en-US" sz="1400" dirty="0" smtClean="0">
+                        <a:rPr lang="en-US" sz="1400" dirty="0">
                           <a:latin typeface="Arial"/>
                           <a:cs typeface="Arial"/>
                         </a:rPr>
                         <a:t>Smith</a:t>
                       </a:r>
-                      <a:endParaRPr lang="en-US" sz="1400" dirty="0">
-                        <a:latin typeface="Arial"/>
-                        <a:cs typeface="Arial"/>
-                      </a:endParaRPr>
                     </a:p>
                   </a:txBody>
                   <a:tcPr>
@@ -5596,7 +5673,7 @@
                     <a:lstStyle/>
                     <a:p>
                       <a:r>
-                        <a:rPr lang="en-US" sz="1400" dirty="0" err="1" smtClean="0">
+                        <a:rPr lang="en-US" sz="1400" dirty="0" err="1">
                           <a:latin typeface="Arial"/>
                           <a:cs typeface="Arial"/>
                         </a:rPr>
@@ -5653,7 +5730,7 @@
                     <a:lstStyle/>
                     <a:p>
                       <a:r>
-                        <a:rPr lang="en-US" sz="1400" dirty="0" err="1" smtClean="0">
+                        <a:rPr lang="en-US" sz="1400" dirty="0" err="1">
                           <a:latin typeface="Arial"/>
                           <a:cs typeface="Arial"/>
                         </a:rPr>
@@ -5710,7 +5787,7 @@
                     <a:lstStyle/>
                     <a:p>
                       <a:r>
-                        <a:rPr lang="en-US" sz="1400" dirty="0" err="1" smtClean="0">
+                        <a:rPr lang="en-US" sz="1400" dirty="0" err="1">
                           <a:latin typeface="Arial"/>
                           <a:cs typeface="Arial"/>
                         </a:rPr>
@@ -5767,16 +5844,12 @@
                     <a:lstStyle/>
                     <a:p>
                       <a:r>
-                        <a:rPr lang="en-US" sz="1400" dirty="0" smtClean="0">
+                        <a:rPr lang="en-US" sz="1400" dirty="0">
                           <a:latin typeface="Arial"/>
                           <a:cs typeface="Arial"/>
                         </a:rPr>
                         <a:t>Brick</a:t>
                       </a:r>
-                      <a:endParaRPr lang="en-US" sz="1400" dirty="0">
-                        <a:latin typeface="Arial"/>
-                        <a:cs typeface="Arial"/>
-                      </a:endParaRPr>
                     </a:p>
                   </a:txBody>
                   <a:tcPr>
@@ -5818,6 +5891,11 @@
                     </a:lnB>
                   </a:tcPr>
                 </a:tc>
+                <a:extLst>
+                  <a:ext uri="{0D108BD9-81ED-4DB2-BD59-A6C34878D82A}">
+                    <a16:rowId xmlns:a16="http://schemas.microsoft.com/office/drawing/2014/main" val="10005"/>
+                  </a:ext>
+                </a:extLst>
               </a:tr>
               <a:tr h="269255">
                 <a:tc>
@@ -5826,16 +5904,12 @@
                     <a:lstStyle/>
                     <a:p>
                       <a:r>
-                        <a:rPr lang="en-US" sz="1400" dirty="0" smtClean="0">
+                        <a:rPr lang="en-US" sz="1400" dirty="0">
                           <a:latin typeface="Arial"/>
                           <a:cs typeface="Arial"/>
                         </a:rPr>
                         <a:t>3</a:t>
                       </a:r>
-                      <a:endParaRPr lang="en-US" sz="1400" dirty="0">
-                        <a:latin typeface="Arial"/>
-                        <a:cs typeface="Arial"/>
-                      </a:endParaRPr>
                     </a:p>
                   </a:txBody>
                   <a:tcPr>
@@ -5902,13 +5976,13 @@
                         <a:defRPr/>
                       </a:pPr>
                       <a:r>
-                        <a:rPr lang="mr-IN" sz="1400" dirty="0" smtClean="0">
+                        <a:rPr lang="mr-IN" sz="1400" dirty="0">
                           <a:latin typeface="Arial"/>
                           <a:cs typeface="Arial"/>
                         </a:rPr>
                         <a:t>…</a:t>
                       </a:r>
-                      <a:endParaRPr lang="en-US" sz="1400" dirty="0" smtClean="0">
+                      <a:endParaRPr lang="en-US" sz="1400" dirty="0">
                         <a:latin typeface="+mn-lt"/>
                         <a:cs typeface="Arial"/>
                       </a:endParaRPr>
@@ -5959,7 +6033,7 @@
                     <a:lstStyle/>
                     <a:p>
                       <a:r>
-                        <a:rPr lang="mr-IN" sz="1400" dirty="0" smtClean="0">
+                        <a:rPr lang="mr-IN" sz="1400" dirty="0">
                           <a:latin typeface="Arial"/>
                           <a:cs typeface="Arial"/>
                         </a:rPr>
@@ -6016,7 +6090,7 @@
                     <a:lstStyle/>
                     <a:p>
                       <a:r>
-                        <a:rPr lang="mr-IN" sz="1400" dirty="0" smtClean="0">
+                        <a:rPr lang="mr-IN" sz="1400" dirty="0">
                           <a:latin typeface="Arial"/>
                           <a:cs typeface="Arial"/>
                         </a:rPr>
@@ -6073,7 +6147,7 @@
                     <a:lstStyle/>
                     <a:p>
                       <a:r>
-                        <a:rPr lang="mr-IN" sz="1400" dirty="0" smtClean="0">
+                        <a:rPr lang="mr-IN" sz="1400" dirty="0">
                           <a:latin typeface="Arial"/>
                           <a:cs typeface="Arial"/>
                         </a:rPr>
@@ -6130,7 +6204,7 @@
                     <a:lstStyle/>
                     <a:p>
                       <a:r>
-                        <a:rPr lang="mr-IN" sz="1400" dirty="0" smtClean="0">
+                        <a:rPr lang="mr-IN" sz="1400" dirty="0">
                           <a:latin typeface="Arial"/>
                           <a:cs typeface="Arial"/>
                         </a:rPr>
@@ -6187,7 +6261,7 @@
                     <a:lstStyle/>
                     <a:p>
                       <a:r>
-                        <a:rPr lang="mr-IN" sz="1400" dirty="0" smtClean="0">
+                        <a:rPr lang="mr-IN" sz="1400" dirty="0">
                           <a:latin typeface="Arial"/>
                           <a:cs typeface="Arial"/>
                         </a:rPr>
@@ -6238,6 +6312,11 @@
                     </a:lnB>
                   </a:tcPr>
                 </a:tc>
+                <a:extLst>
+                  <a:ext uri="{0D108BD9-81ED-4DB2-BD59-A6C34878D82A}">
+                    <a16:rowId xmlns:a16="http://schemas.microsoft.com/office/drawing/2014/main" val="10006"/>
+                  </a:ext>
+                </a:extLst>
               </a:tr>
               <a:tr h="269255">
                 <a:tc>
@@ -6246,16 +6325,12 @@
                     <a:lstStyle/>
                     <a:p>
                       <a:r>
-                        <a:rPr lang="en-US" sz="1400" dirty="0" smtClean="0">
+                        <a:rPr lang="en-US" sz="1400" dirty="0">
                           <a:latin typeface="Arial"/>
                           <a:cs typeface="Arial"/>
                         </a:rPr>
                         <a:t>4</a:t>
                       </a:r>
-                      <a:endParaRPr lang="en-US" sz="1400" dirty="0">
-                        <a:latin typeface="Arial"/>
-                        <a:cs typeface="Arial"/>
-                      </a:endParaRPr>
                     </a:p>
                   </a:txBody>
                   <a:tcPr>
@@ -6303,7 +6378,7 @@
                     <a:lstStyle/>
                     <a:p>
                       <a:r>
-                        <a:rPr lang="mr-IN" sz="1400" dirty="0" smtClean="0">
+                        <a:rPr lang="mr-IN" sz="1400" dirty="0">
                           <a:latin typeface="Arial"/>
                           <a:cs typeface="Arial"/>
                         </a:rPr>
@@ -6360,7 +6435,7 @@
                     <a:lstStyle/>
                     <a:p>
                       <a:r>
-                        <a:rPr lang="mr-IN" sz="1400" dirty="0" smtClean="0">
+                        <a:rPr lang="mr-IN" sz="1400" dirty="0">
                           <a:latin typeface="Arial"/>
                           <a:cs typeface="Arial"/>
                         </a:rPr>
@@ -6417,7 +6492,7 @@
                     <a:lstStyle/>
                     <a:p>
                       <a:r>
-                        <a:rPr lang="mr-IN" sz="1400" dirty="0" smtClean="0">
+                        <a:rPr lang="mr-IN" sz="1400" dirty="0">
                           <a:latin typeface="Arial"/>
                           <a:cs typeface="Arial"/>
                         </a:rPr>
@@ -6474,7 +6549,7 @@
                     <a:lstStyle/>
                     <a:p>
                       <a:r>
-                        <a:rPr lang="mr-IN" sz="1400" dirty="0" smtClean="0">
+                        <a:rPr lang="mr-IN" sz="1400" dirty="0">
                           <a:latin typeface="Arial"/>
                           <a:cs typeface="Arial"/>
                         </a:rPr>
@@ -6531,7 +6606,7 @@
                     <a:lstStyle/>
                     <a:p>
                       <a:r>
-                        <a:rPr lang="mr-IN" sz="1400" dirty="0" smtClean="0">
+                        <a:rPr lang="mr-IN" sz="1400" dirty="0">
                           <a:latin typeface="Arial"/>
                           <a:cs typeface="Arial"/>
                         </a:rPr>
@@ -6588,7 +6663,7 @@
                     <a:lstStyle/>
                     <a:p>
                       <a:r>
-                        <a:rPr lang="mr-IN" sz="1400" dirty="0" smtClean="0">
+                        <a:rPr lang="mr-IN" sz="1400" dirty="0">
                           <a:latin typeface="Arial"/>
                           <a:cs typeface="Arial"/>
                         </a:rPr>
@@ -6639,6 +6714,11 @@
                     </a:lnB>
                   </a:tcPr>
                 </a:tc>
+                <a:extLst>
+                  <a:ext uri="{0D108BD9-81ED-4DB2-BD59-A6C34878D82A}">
+                    <a16:rowId xmlns:a16="http://schemas.microsoft.com/office/drawing/2014/main" val="10007"/>
+                  </a:ext>
+                </a:extLst>
               </a:tr>
               <a:tr h="269255">
                 <a:tc>
@@ -6647,7 +6727,7 @@
                     <a:lstStyle/>
                     <a:p>
                       <a:r>
-                        <a:rPr lang="mr-IN" sz="1400" dirty="0" smtClean="0">
+                        <a:rPr lang="mr-IN" sz="1400" dirty="0">
                           <a:latin typeface="Arial"/>
                           <a:cs typeface="Arial"/>
                         </a:rPr>
@@ -6704,7 +6784,7 @@
                     <a:lstStyle/>
                     <a:p>
                       <a:r>
-                        <a:rPr lang="mr-IN" sz="1400" dirty="0" smtClean="0">
+                        <a:rPr lang="mr-IN" sz="1400" dirty="0">
                           <a:latin typeface="Arial"/>
                           <a:cs typeface="Arial"/>
                         </a:rPr>
@@ -6761,7 +6841,7 @@
                     <a:lstStyle/>
                     <a:p>
                       <a:r>
-                        <a:rPr lang="mr-IN" sz="1400" dirty="0" smtClean="0">
+                        <a:rPr lang="mr-IN" sz="1400" dirty="0">
                           <a:latin typeface="Arial"/>
                           <a:cs typeface="Arial"/>
                         </a:rPr>
@@ -6818,7 +6898,7 @@
                     <a:lstStyle/>
                     <a:p>
                       <a:r>
-                        <a:rPr lang="mr-IN" sz="1400" dirty="0" smtClean="0">
+                        <a:rPr lang="mr-IN" sz="1400" dirty="0">
                           <a:latin typeface="Arial"/>
                           <a:cs typeface="Arial"/>
                         </a:rPr>
@@ -6875,7 +6955,7 @@
                     <a:lstStyle/>
                     <a:p>
                       <a:r>
-                        <a:rPr lang="mr-IN" sz="1400" dirty="0" smtClean="0">
+                        <a:rPr lang="mr-IN" sz="1400" dirty="0">
                           <a:latin typeface="Arial"/>
                           <a:cs typeface="Arial"/>
                         </a:rPr>
@@ -6932,7 +7012,7 @@
                     <a:lstStyle/>
                     <a:p>
                       <a:r>
-                        <a:rPr lang="mr-IN" sz="1400" dirty="0" smtClean="0">
+                        <a:rPr lang="mr-IN" sz="1400" dirty="0">
                           <a:latin typeface="Arial"/>
                           <a:cs typeface="Arial"/>
                         </a:rPr>
@@ -6989,7 +7069,7 @@
                     <a:lstStyle/>
                     <a:p>
                       <a:r>
-                        <a:rPr lang="mr-IN" sz="1400" dirty="0" smtClean="0">
+                        <a:rPr lang="mr-IN" sz="1400" dirty="0">
                           <a:latin typeface="Arial"/>
                           <a:cs typeface="Arial"/>
                         </a:rPr>
@@ -7040,6 +7120,11 @@
                     </a:lnB>
                   </a:tcPr>
                 </a:tc>
+                <a:extLst>
+                  <a:ext uri="{0D108BD9-81ED-4DB2-BD59-A6C34878D82A}">
+                    <a16:rowId xmlns:a16="http://schemas.microsoft.com/office/drawing/2014/main" val="10008"/>
+                  </a:ext>
+                </a:extLst>
               </a:tr>
               <a:tr h="269255">
                 <a:tc>
@@ -7048,7 +7133,7 @@
                     <a:lstStyle/>
                     <a:p>
                       <a:r>
-                        <a:rPr lang="mr-IN" sz="1400" dirty="0" smtClean="0">
+                        <a:rPr lang="mr-IN" sz="1400" dirty="0">
                           <a:latin typeface="Arial"/>
                           <a:cs typeface="Arial"/>
                         </a:rPr>
@@ -7105,7 +7190,7 @@
                     <a:lstStyle/>
                     <a:p>
                       <a:r>
-                        <a:rPr lang="mr-IN" sz="1400" dirty="0" smtClean="0">
+                        <a:rPr lang="mr-IN" sz="1400" dirty="0">
                           <a:latin typeface="Arial"/>
                           <a:cs typeface="Arial"/>
                         </a:rPr>
@@ -7162,7 +7247,7 @@
                     <a:lstStyle/>
                     <a:p>
                       <a:r>
-                        <a:rPr lang="mr-IN" sz="1400" dirty="0" smtClean="0">
+                        <a:rPr lang="mr-IN" sz="1400" dirty="0">
                           <a:latin typeface="Arial"/>
                           <a:cs typeface="Arial"/>
                         </a:rPr>
@@ -7219,7 +7304,7 @@
                     <a:lstStyle/>
                     <a:p>
                       <a:r>
-                        <a:rPr lang="mr-IN" sz="1400" dirty="0" smtClean="0">
+                        <a:rPr lang="mr-IN" sz="1400" dirty="0">
                           <a:latin typeface="Arial"/>
                           <a:cs typeface="Arial"/>
                         </a:rPr>
@@ -7276,7 +7361,7 @@
                     <a:lstStyle/>
                     <a:p>
                       <a:r>
-                        <a:rPr lang="mr-IN" sz="1400" dirty="0" smtClean="0">
+                        <a:rPr lang="mr-IN" sz="1400" dirty="0">
                           <a:latin typeface="Arial"/>
                           <a:cs typeface="Arial"/>
                         </a:rPr>
@@ -7333,7 +7418,7 @@
                     <a:lstStyle/>
                     <a:p>
                       <a:r>
-                        <a:rPr lang="mr-IN" sz="1400" dirty="0" smtClean="0">
+                        <a:rPr lang="mr-IN" sz="1400" dirty="0">
                           <a:latin typeface="Arial"/>
                           <a:cs typeface="Arial"/>
                         </a:rPr>
@@ -7390,7 +7475,7 @@
                     <a:lstStyle/>
                     <a:p>
                       <a:r>
-                        <a:rPr lang="mr-IN" sz="1400" dirty="0" smtClean="0">
+                        <a:rPr lang="mr-IN" sz="1400" dirty="0">
                           <a:latin typeface="Arial"/>
                           <a:cs typeface="Arial"/>
                         </a:rPr>
@@ -7441,6 +7526,11 @@
                     </a:lnB>
                   </a:tcPr>
                 </a:tc>
+                <a:extLst>
+                  <a:ext uri="{0D108BD9-81ED-4DB2-BD59-A6C34878D82A}">
+                    <a16:rowId xmlns:a16="http://schemas.microsoft.com/office/drawing/2014/main" val="10009"/>
+                  </a:ext>
+                </a:extLst>
               </a:tr>
             </a:tbl>
           </a:graphicData>
@@ -7469,7 +7559,7 @@
           <a:p>
             <a:pPr algn="ctr"/>
             <a:r>
-              <a:rPr lang="en-US" sz="5400" b="1" dirty="0" err="1" smtClean="0">
+              <a:rPr lang="en-US" sz="5400" b="1" dirty="0" err="1">
                 <a:solidFill>
                   <a:srgbClr val="052B48"/>
                 </a:solidFill>
@@ -7592,8 +7682,20 @@
                 <a:tableStyleId>{5C22544A-7EE6-4342-B048-85BDC9FD1C3A}</a:tableStyleId>
               </a:tblPr>
               <a:tblGrid>
-                <a:gridCol w="264643"/>
-                <a:gridCol w="1476020"/>
+                <a:gridCol w="264643">
+                  <a:extLst>
+                    <a:ext uri="{9D8B030D-6E8A-4147-A177-3AD203B41FA5}">
+                      <a16:colId xmlns:a16="http://schemas.microsoft.com/office/drawing/2014/main" val="20000"/>
+                    </a:ext>
+                  </a:extLst>
+                </a:gridCol>
+                <a:gridCol w="1476020">
+                  <a:extLst>
+                    <a:ext uri="{9D8B030D-6E8A-4147-A177-3AD203B41FA5}">
+                      <a16:colId xmlns:a16="http://schemas.microsoft.com/office/drawing/2014/main" val="20001"/>
+                    </a:ext>
+                  </a:extLst>
+                </a:gridCol>
               </a:tblGrid>
               <a:tr h="171206">
                 <a:tc>
@@ -7662,7 +7764,7 @@
                     <a:p>
                       <a:pPr algn="ctr"/>
                       <a:r>
-                        <a:rPr lang="en-US" sz="1400" b="0" dirty="0" err="1" smtClean="0"/>
+                        <a:rPr lang="en-US" sz="1400" b="0" dirty="0" err="1"/>
                         <a:t>times_index</a:t>
                       </a:r>
                       <a:endParaRPr lang="en-US" sz="1400" b="0" dirty="0"/>
@@ -7714,6 +7816,11 @@
                     </a:solidFill>
                   </a:tcPr>
                 </a:tc>
+                <a:extLst>
+                  <a:ext uri="{0D108BD9-81ED-4DB2-BD59-A6C34878D82A}">
+                    <a16:rowId xmlns:a16="http://schemas.microsoft.com/office/drawing/2014/main" val="10000"/>
+                  </a:ext>
+                </a:extLst>
               </a:tr>
               <a:tr h="171206">
                 <a:tc>
@@ -7723,18 +7830,13 @@
                     <a:p>
                       <a:pPr algn="l"/>
                       <a:r>
-                        <a:rPr lang="en-US" sz="1400" dirty="0" smtClean="0">
+                        <a:rPr lang="en-US" sz="1400" dirty="0">
                           <a:solidFill>
                             <a:schemeClr val="bg1"/>
                           </a:solidFill>
                         </a:rPr>
                         <a:t>0</a:t>
                       </a:r>
-                      <a:endParaRPr lang="en-US" sz="1400" dirty="0">
-                        <a:solidFill>
-                          <a:schemeClr val="bg1"/>
-                        </a:solidFill>
-                      </a:endParaRPr>
                     </a:p>
                   </a:txBody>
                   <a:tcPr marR="0" marT="0" marB="0">
@@ -7792,10 +7894,9 @@
                     <a:p>
                       <a:pPr algn="ctr"/>
                       <a:r>
-                        <a:rPr lang="en-US" sz="1400" dirty="0" smtClean="0"/>
+                        <a:rPr lang="en-US" sz="1400" dirty="0"/>
                         <a:t>6</a:t>
                       </a:r>
-                      <a:endParaRPr lang="en-US" sz="1400" dirty="0"/>
                     </a:p>
                   </a:txBody>
                   <a:tcPr marL="0" marR="0" marT="0" marB="0">
@@ -7849,6 +7950,11 @@
                     </a:solidFill>
                   </a:tcPr>
                 </a:tc>
+                <a:extLst>
+                  <a:ext uri="{0D108BD9-81ED-4DB2-BD59-A6C34878D82A}">
+                    <a16:rowId xmlns:a16="http://schemas.microsoft.com/office/drawing/2014/main" val="10001"/>
+                  </a:ext>
+                </a:extLst>
               </a:tr>
               <a:tr h="171206">
                 <a:tc>
@@ -7858,18 +7964,13 @@
                     <a:p>
                       <a:pPr algn="l"/>
                       <a:r>
-                        <a:rPr lang="en-US" sz="1400" dirty="0" smtClean="0">
+                        <a:rPr lang="en-US" sz="1400" dirty="0">
                           <a:solidFill>
                             <a:schemeClr val="bg1"/>
                           </a:solidFill>
                         </a:rPr>
                         <a:t>1</a:t>
                       </a:r>
-                      <a:endParaRPr lang="en-US" sz="1400" dirty="0">
-                        <a:solidFill>
-                          <a:schemeClr val="bg1"/>
-                        </a:solidFill>
-                      </a:endParaRPr>
                     </a:p>
                   </a:txBody>
                   <a:tcPr marR="0" marT="0" marB="0">
@@ -7943,7 +8044,7 @@
                         <a:defRPr/>
                       </a:pPr>
                       <a:r>
-                        <a:rPr lang="en-US" sz="1400" dirty="0" smtClean="0"/>
+                        <a:rPr lang="en-US" sz="1400" dirty="0"/>
                         <a:t>9</a:t>
                       </a:r>
                     </a:p>
@@ -7999,6 +8100,11 @@
                     </a:solidFill>
                   </a:tcPr>
                 </a:tc>
+                <a:extLst>
+                  <a:ext uri="{0D108BD9-81ED-4DB2-BD59-A6C34878D82A}">
+                    <a16:rowId xmlns:a16="http://schemas.microsoft.com/office/drawing/2014/main" val="10002"/>
+                  </a:ext>
+                </a:extLst>
               </a:tr>
               <a:tr h="171206">
                 <a:tc>
@@ -8008,18 +8114,13 @@
                     <a:p>
                       <a:pPr algn="l"/>
                       <a:r>
-                        <a:rPr lang="en-US" sz="1400" dirty="0" smtClean="0">
+                        <a:rPr lang="en-US" sz="1400" dirty="0">
                           <a:solidFill>
                             <a:schemeClr val="bg1"/>
                           </a:solidFill>
                         </a:rPr>
                         <a:t>2</a:t>
                       </a:r>
-                      <a:endParaRPr lang="en-US" sz="1400" dirty="0">
-                        <a:solidFill>
-                          <a:schemeClr val="bg1"/>
-                        </a:solidFill>
-                      </a:endParaRPr>
                     </a:p>
                   </a:txBody>
                   <a:tcPr marR="0" marT="0" marB="0">
@@ -8093,7 +8194,7 @@
                         <a:defRPr/>
                       </a:pPr>
                       <a:r>
-                        <a:rPr lang="en-US" sz="1400" dirty="0" smtClean="0"/>
+                        <a:rPr lang="en-US" sz="1400" dirty="0"/>
                         <a:t>11</a:t>
                       </a:r>
                     </a:p>
@@ -8149,6 +8250,11 @@
                     </a:solidFill>
                   </a:tcPr>
                 </a:tc>
+                <a:extLst>
+                  <a:ext uri="{0D108BD9-81ED-4DB2-BD59-A6C34878D82A}">
+                    <a16:rowId xmlns:a16="http://schemas.microsoft.com/office/drawing/2014/main" val="10003"/>
+                  </a:ext>
+                </a:extLst>
               </a:tr>
               <a:tr h="171206">
                 <a:tc>
@@ -8158,18 +8264,13 @@
                     <a:p>
                       <a:pPr algn="l"/>
                       <a:r>
-                        <a:rPr lang="en-US" sz="1400" b="0" dirty="0" smtClean="0">
+                        <a:rPr lang="en-US" sz="1400" b="0" dirty="0">
                           <a:solidFill>
                             <a:schemeClr val="bg1"/>
                           </a:solidFill>
                         </a:rPr>
                         <a:t>..</a:t>
                       </a:r>
-                      <a:endParaRPr lang="en-US" sz="1400" b="0" dirty="0">
-                        <a:solidFill>
-                          <a:schemeClr val="bg1"/>
-                        </a:solidFill>
-                      </a:endParaRPr>
                     </a:p>
                   </a:txBody>
                   <a:tcPr marR="0" marT="0" marB="0">
@@ -8225,7 +8326,7 @@
                     <a:p>
                       <a:pPr algn="ctr"/>
                       <a:r>
-                        <a:rPr lang="mr-IN" sz="1400" dirty="0" smtClean="0"/>
+                        <a:rPr lang="mr-IN" sz="1400" dirty="0"/>
                         <a:t>…</a:t>
                       </a:r>
                       <a:endParaRPr lang="en-US" sz="1400" dirty="0"/>
@@ -8277,6 +8378,11 @@
                     </a:solidFill>
                   </a:tcPr>
                 </a:tc>
+                <a:extLst>
+                  <a:ext uri="{0D108BD9-81ED-4DB2-BD59-A6C34878D82A}">
+                    <a16:rowId xmlns:a16="http://schemas.microsoft.com/office/drawing/2014/main" val="10004"/>
+                  </a:ext>
+                </a:extLst>
               </a:tr>
             </a:tbl>
           </a:graphicData>
@@ -8306,7 +8412,7 @@
           <a:p>
             <a:pPr algn="ctr"/>
             <a:r>
-              <a:rPr lang="en-US" sz="1400" b="1" dirty="0" smtClean="0">
+              <a:rPr lang="en-US" sz="1400" b="1" dirty="0">
                 <a:solidFill>
                   <a:srgbClr val="052B48"/>
                 </a:solidFill>
@@ -8315,13 +8421,6 @@
               </a:rPr>
               <a:t>&lt;VectorData&gt;</a:t>
             </a:r>
-            <a:endParaRPr lang="en-US" sz="1400" b="1" dirty="0">
-              <a:solidFill>
-                <a:srgbClr val="052B48"/>
-              </a:solidFill>
-              <a:latin typeface="Calibri"/>
-              <a:cs typeface="Calibri"/>
-            </a:endParaRPr>
           </a:p>
         </p:txBody>
       </p:sp>
@@ -8350,8 +8449,20 @@
                 <a:tableStyleId>{5C22544A-7EE6-4342-B048-85BDC9FD1C3A}</a:tableStyleId>
               </a:tblPr>
               <a:tblGrid>
-                <a:gridCol w="299570"/>
-                <a:gridCol w="927960"/>
+                <a:gridCol w="299570">
+                  <a:extLst>
+                    <a:ext uri="{9D8B030D-6E8A-4147-A177-3AD203B41FA5}">
+                      <a16:colId xmlns:a16="http://schemas.microsoft.com/office/drawing/2014/main" val="20000"/>
+                    </a:ext>
+                  </a:extLst>
+                </a:gridCol>
+                <a:gridCol w="927960">
+                  <a:extLst>
+                    <a:ext uri="{9D8B030D-6E8A-4147-A177-3AD203B41FA5}">
+                      <a16:colId xmlns:a16="http://schemas.microsoft.com/office/drawing/2014/main" val="20001"/>
+                    </a:ext>
+                  </a:extLst>
+                </a:gridCol>
               </a:tblGrid>
               <a:tr h="171206">
                 <a:tc>
@@ -8424,12 +8535,8 @@
                     <a:p>
                       <a:pPr algn="ctr"/>
                       <a:r>
-                        <a:rPr lang="en-US" sz="1400" b="0" baseline="0" dirty="0" smtClean="0"/>
-                        <a:t> </a:t>
-                      </a:r>
-                      <a:r>
-                        <a:rPr lang="en-US" sz="1400" b="0" baseline="0" dirty="0" smtClean="0"/>
-                        <a:t>times</a:t>
+                        <a:rPr lang="en-US" sz="1400" b="0" baseline="0" dirty="0"/>
+                        <a:t> times</a:t>
                       </a:r>
                       <a:endParaRPr lang="en-US" sz="1400" b="0" dirty="0"/>
                     </a:p>
@@ -8484,6 +8591,11 @@
                     </a:solidFill>
                   </a:tcPr>
                 </a:tc>
+                <a:extLst>
+                  <a:ext uri="{0D108BD9-81ED-4DB2-BD59-A6C34878D82A}">
+                    <a16:rowId xmlns:a16="http://schemas.microsoft.com/office/drawing/2014/main" val="10000"/>
+                  </a:ext>
+                </a:extLst>
               </a:tr>
               <a:tr h="171206">
                 <a:tc>
@@ -8493,18 +8605,13 @@
                     <a:p>
                       <a:pPr algn="l"/>
                       <a:r>
-                        <a:rPr lang="en-US" sz="1400" dirty="0" smtClean="0">
+                        <a:rPr lang="en-US" sz="1400" dirty="0">
                           <a:solidFill>
                             <a:schemeClr val="bg1"/>
                           </a:solidFill>
                         </a:rPr>
                         <a:t>0</a:t>
                       </a:r>
-                      <a:endParaRPr lang="en-US" sz="1400" dirty="0">
-                        <a:solidFill>
-                          <a:schemeClr val="bg1"/>
-                        </a:solidFill>
-                      </a:endParaRPr>
                     </a:p>
                   </a:txBody>
                   <a:tcPr marR="0" marT="0" marB="0">
@@ -8564,10 +8671,9 @@
                     <a:p>
                       <a:pPr algn="ctr"/>
                       <a:r>
-                        <a:rPr lang="en-US" sz="1400" dirty="0" smtClean="0"/>
+                        <a:rPr lang="en-US" sz="1400" dirty="0"/>
                         <a:t>0.03</a:t>
                       </a:r>
-                      <a:endParaRPr lang="en-US" sz="1400" dirty="0"/>
                     </a:p>
                   </a:txBody>
                   <a:tcPr marL="0" marR="0" marT="0" marB="0">
@@ -8623,6 +8729,11 @@
                     </a:solidFill>
                   </a:tcPr>
                 </a:tc>
+                <a:extLst>
+                  <a:ext uri="{0D108BD9-81ED-4DB2-BD59-A6C34878D82A}">
+                    <a16:rowId xmlns:a16="http://schemas.microsoft.com/office/drawing/2014/main" val="10001"/>
+                  </a:ext>
+                </a:extLst>
               </a:tr>
               <a:tr h="171206">
                 <a:tc>
@@ -8632,18 +8743,13 @@
                     <a:p>
                       <a:pPr algn="l"/>
                       <a:r>
-                        <a:rPr lang="en-US" sz="1400" dirty="0" smtClean="0">
+                        <a:rPr lang="en-US" sz="1400" dirty="0">
                           <a:solidFill>
                             <a:schemeClr val="bg1"/>
                           </a:solidFill>
                         </a:rPr>
                         <a:t>1</a:t>
                       </a:r>
-                      <a:endParaRPr lang="en-US" sz="1400" dirty="0">
-                        <a:solidFill>
-                          <a:schemeClr val="bg1"/>
-                        </a:solidFill>
-                      </a:endParaRPr>
                     </a:p>
                   </a:txBody>
                   <a:tcPr marR="0" marT="0" marB="0">
@@ -8703,10 +8809,9 @@
                     <a:p>
                       <a:pPr algn="ctr"/>
                       <a:r>
-                        <a:rPr lang="en-US" sz="1400" dirty="0" smtClean="0"/>
+                        <a:rPr lang="en-US" sz="1400" dirty="0"/>
                         <a:t>0.14</a:t>
                       </a:r>
-                      <a:endParaRPr lang="en-US" sz="1400" dirty="0"/>
                     </a:p>
                   </a:txBody>
                   <a:tcPr marL="0" marR="0" marT="0" marB="0">
@@ -8762,6 +8867,11 @@
                     </a:solidFill>
                   </a:tcPr>
                 </a:tc>
+                <a:extLst>
+                  <a:ext uri="{0D108BD9-81ED-4DB2-BD59-A6C34878D82A}">
+                    <a16:rowId xmlns:a16="http://schemas.microsoft.com/office/drawing/2014/main" val="10002"/>
+                  </a:ext>
+                </a:extLst>
               </a:tr>
               <a:tr h="171206">
                 <a:tc>
@@ -8771,18 +8881,13 @@
                     <a:p>
                       <a:pPr algn="l"/>
                       <a:r>
-                        <a:rPr lang="en-US" sz="1400" dirty="0" smtClean="0">
+                        <a:rPr lang="en-US" sz="1400" dirty="0">
                           <a:solidFill>
                             <a:schemeClr val="bg1"/>
                           </a:solidFill>
                         </a:rPr>
                         <a:t>2</a:t>
                       </a:r>
-                      <a:endParaRPr lang="en-US" sz="1400" dirty="0">
-                        <a:solidFill>
-                          <a:schemeClr val="bg1"/>
-                        </a:solidFill>
-                      </a:endParaRPr>
                     </a:p>
                   </a:txBody>
                   <a:tcPr marR="0" marT="0" marB="0">
@@ -8842,7 +8947,7 @@
                     <a:p>
                       <a:pPr algn="ctr"/>
                       <a:r>
-                        <a:rPr lang="en-US" sz="1400" dirty="0" smtClean="0"/>
+                        <a:rPr lang="en-US" sz="1400" dirty="0"/>
                         <a:t>0.6</a:t>
                       </a:r>
                     </a:p>
@@ -8900,6 +9005,11 @@
                     </a:solidFill>
                   </a:tcPr>
                 </a:tc>
+                <a:extLst>
+                  <a:ext uri="{0D108BD9-81ED-4DB2-BD59-A6C34878D82A}">
+                    <a16:rowId xmlns:a16="http://schemas.microsoft.com/office/drawing/2014/main" val="10003"/>
+                  </a:ext>
+                </a:extLst>
               </a:tr>
               <a:tr h="171206">
                 <a:tc>
@@ -8909,18 +9019,13 @@
                     <a:p>
                       <a:pPr algn="l"/>
                       <a:r>
-                        <a:rPr lang="en-US" sz="1400" b="0" dirty="0" smtClean="0">
+                        <a:rPr lang="en-US" sz="1400" b="0" dirty="0">
                           <a:solidFill>
                             <a:schemeClr val="bg1"/>
                           </a:solidFill>
                         </a:rPr>
                         <a:t>3</a:t>
                       </a:r>
-                      <a:endParaRPr lang="en-US" sz="1400" b="0" dirty="0">
-                        <a:solidFill>
-                          <a:schemeClr val="bg1"/>
-                        </a:solidFill>
-                      </a:endParaRPr>
                     </a:p>
                   </a:txBody>
                   <a:tcPr marR="0" marT="0" marB="0">
@@ -8980,10 +9085,9 @@
                     <a:p>
                       <a:pPr algn="ctr"/>
                       <a:r>
-                        <a:rPr lang="en-US" sz="1400" dirty="0" smtClean="0"/>
+                        <a:rPr lang="en-US" sz="1400" dirty="0"/>
                         <a:t>1.25</a:t>
                       </a:r>
-                      <a:endParaRPr lang="en-US" sz="1400" dirty="0"/>
                     </a:p>
                   </a:txBody>
                   <a:tcPr marL="0" marR="0" marT="0" marB="0">
@@ -9039,6 +9143,11 @@
                     </a:solidFill>
                   </a:tcPr>
                 </a:tc>
+                <a:extLst>
+                  <a:ext uri="{0D108BD9-81ED-4DB2-BD59-A6C34878D82A}">
+                    <a16:rowId xmlns:a16="http://schemas.microsoft.com/office/drawing/2014/main" val="10004"/>
+                  </a:ext>
+                </a:extLst>
               </a:tr>
               <a:tr h="171206">
                 <a:tc>
@@ -9048,18 +9157,13 @@
                     <a:p>
                       <a:pPr algn="l"/>
                       <a:r>
-                        <a:rPr lang="en-US" sz="1400" b="0" dirty="0" smtClean="0">
+                        <a:rPr lang="en-US" sz="1400" b="0" dirty="0">
                           <a:solidFill>
                             <a:schemeClr val="bg1"/>
                           </a:solidFill>
                         </a:rPr>
                         <a:t>4</a:t>
                       </a:r>
-                      <a:endParaRPr lang="en-US" sz="1400" b="0" dirty="0">
-                        <a:solidFill>
-                          <a:schemeClr val="bg1"/>
-                        </a:solidFill>
-                      </a:endParaRPr>
                     </a:p>
                   </a:txBody>
                   <a:tcPr marR="0" marT="0" marB="0">
@@ -9119,10 +9223,9 @@
                     <a:p>
                       <a:pPr algn="ctr"/>
                       <a:r>
-                        <a:rPr lang="en-US" sz="1400" dirty="0" smtClean="0"/>
+                        <a:rPr lang="en-US" sz="1400" dirty="0"/>
                         <a:t>2.62</a:t>
                       </a:r>
-                      <a:endParaRPr lang="en-US" sz="1400" dirty="0"/>
                     </a:p>
                   </a:txBody>
                   <a:tcPr marL="0" marR="0" marT="0" marB="0">
@@ -9178,6 +9281,11 @@
                     </a:solidFill>
                   </a:tcPr>
                 </a:tc>
+                <a:extLst>
+                  <a:ext uri="{0D108BD9-81ED-4DB2-BD59-A6C34878D82A}">
+                    <a16:rowId xmlns:a16="http://schemas.microsoft.com/office/drawing/2014/main" val="10005"/>
+                  </a:ext>
+                </a:extLst>
               </a:tr>
               <a:tr h="171206">
                 <a:tc>
@@ -9187,18 +9295,13 @@
                     <a:p>
                       <a:pPr algn="l"/>
                       <a:r>
-                        <a:rPr lang="en-US" sz="1400" b="0" dirty="0" smtClean="0">
+                        <a:rPr lang="en-US" sz="1400" b="0" dirty="0">
                           <a:solidFill>
                             <a:schemeClr val="bg1"/>
                           </a:solidFill>
                         </a:rPr>
                         <a:t>5</a:t>
                       </a:r>
-                      <a:endParaRPr lang="en-US" sz="1400" b="0" dirty="0">
-                        <a:solidFill>
-                          <a:schemeClr val="bg1"/>
-                        </a:solidFill>
-                      </a:endParaRPr>
                     </a:p>
                   </a:txBody>
                   <a:tcPr marR="0" marT="0" marB="0">
@@ -9258,7 +9361,7 @@
                     <a:p>
                       <a:pPr algn="ctr"/>
                       <a:r>
-                        <a:rPr lang="en-US" sz="1400" dirty="0" smtClean="0"/>
+                        <a:rPr lang="en-US" sz="1400" dirty="0"/>
                         <a:t>3.07</a:t>
                       </a:r>
                     </a:p>
@@ -9316,6 +9419,11 @@
                     </a:solidFill>
                   </a:tcPr>
                 </a:tc>
+                <a:extLst>
+                  <a:ext uri="{0D108BD9-81ED-4DB2-BD59-A6C34878D82A}">
+                    <a16:rowId xmlns:a16="http://schemas.microsoft.com/office/drawing/2014/main" val="10006"/>
+                  </a:ext>
+                </a:extLst>
               </a:tr>
               <a:tr h="171206">
                 <a:tc>
@@ -9325,18 +9433,13 @@
                     <a:p>
                       <a:pPr algn="l"/>
                       <a:r>
-                        <a:rPr lang="en-US" sz="1400" b="0" dirty="0" smtClean="0">
+                        <a:rPr lang="en-US" sz="1400" b="0" dirty="0">
                           <a:solidFill>
                             <a:schemeClr val="bg1"/>
                           </a:solidFill>
                         </a:rPr>
                         <a:t>6</a:t>
                       </a:r>
-                      <a:endParaRPr lang="en-US" sz="1400" b="0" dirty="0">
-                        <a:solidFill>
-                          <a:schemeClr val="bg1"/>
-                        </a:solidFill>
-                      </a:endParaRPr>
                     </a:p>
                   </a:txBody>
                   <a:tcPr marR="0" marT="0" marB="0">
@@ -9396,10 +9499,9 @@
                     <a:p>
                       <a:pPr algn="ctr"/>
                       <a:r>
-                        <a:rPr lang="en-US" sz="1400" dirty="0" smtClean="0"/>
+                        <a:rPr lang="en-US" sz="1400" dirty="0"/>
                         <a:t>1.23</a:t>
                       </a:r>
-                      <a:endParaRPr lang="en-US" sz="1400" dirty="0"/>
                     </a:p>
                   </a:txBody>
                   <a:tcPr marL="0" marR="0" marT="0" marB="0">
@@ -9455,6 +9557,11 @@
                     </a:solidFill>
                   </a:tcPr>
                 </a:tc>
+                <a:extLst>
+                  <a:ext uri="{0D108BD9-81ED-4DB2-BD59-A6C34878D82A}">
+                    <a16:rowId xmlns:a16="http://schemas.microsoft.com/office/drawing/2014/main" val="10007"/>
+                  </a:ext>
+                </a:extLst>
               </a:tr>
               <a:tr h="171206">
                 <a:tc>
@@ -9464,18 +9571,13 @@
                     <a:p>
                       <a:pPr algn="l"/>
                       <a:r>
-                        <a:rPr lang="en-US" sz="1400" b="0" dirty="0" smtClean="0">
+                        <a:rPr lang="en-US" sz="1400" b="0" dirty="0">
                           <a:solidFill>
                             <a:schemeClr val="bg1"/>
                           </a:solidFill>
                         </a:rPr>
                         <a:t>7</a:t>
                       </a:r>
-                      <a:endParaRPr lang="en-US" sz="1400" b="0" dirty="0">
-                        <a:solidFill>
-                          <a:schemeClr val="bg1"/>
-                        </a:solidFill>
-                      </a:endParaRPr>
                     </a:p>
                   </a:txBody>
                   <a:tcPr marR="0" marT="0" marB="0">
@@ -9535,10 +9637,9 @@
                     <a:p>
                       <a:pPr algn="ctr"/>
                       <a:r>
-                        <a:rPr lang="en-US" sz="1400" dirty="0" smtClean="0"/>
+                        <a:rPr lang="en-US" sz="1400" dirty="0"/>
                         <a:t>1.37</a:t>
                       </a:r>
-                      <a:endParaRPr lang="en-US" sz="1400" dirty="0"/>
                     </a:p>
                   </a:txBody>
                   <a:tcPr marL="0" marR="0" marT="0" marB="0">
@@ -9594,6 +9695,11 @@
                     </a:solidFill>
                   </a:tcPr>
                 </a:tc>
+                <a:extLst>
+                  <a:ext uri="{0D108BD9-81ED-4DB2-BD59-A6C34878D82A}">
+                    <a16:rowId xmlns:a16="http://schemas.microsoft.com/office/drawing/2014/main" val="10008"/>
+                  </a:ext>
+                </a:extLst>
               </a:tr>
               <a:tr h="171206">
                 <a:tc>
@@ -9603,18 +9709,13 @@
                     <a:p>
                       <a:pPr algn="l"/>
                       <a:r>
-                        <a:rPr lang="en-US" sz="1400" b="0" dirty="0" smtClean="0">
+                        <a:rPr lang="en-US" sz="1400" b="0" dirty="0">
                           <a:solidFill>
                             <a:schemeClr val="bg1"/>
                           </a:solidFill>
                         </a:rPr>
                         <a:t>8</a:t>
                       </a:r>
-                      <a:endParaRPr lang="en-US" sz="1400" b="0" dirty="0">
-                        <a:solidFill>
-                          <a:schemeClr val="bg1"/>
-                        </a:solidFill>
-                      </a:endParaRPr>
                     </a:p>
                   </a:txBody>
                   <a:tcPr marR="0" marT="0" marB="0">
@@ -9674,10 +9775,9 @@
                     <a:p>
                       <a:pPr algn="ctr"/>
                       <a:r>
-                        <a:rPr lang="en-US" sz="1400" dirty="0" smtClean="0"/>
+                        <a:rPr lang="en-US" sz="1400" dirty="0"/>
                         <a:t>2.12</a:t>
                       </a:r>
-                      <a:endParaRPr lang="en-US" sz="1400" dirty="0"/>
                     </a:p>
                   </a:txBody>
                   <a:tcPr marL="0" marR="0" marT="0" marB="0">
@@ -9733,6 +9833,11 @@
                     </a:solidFill>
                   </a:tcPr>
                 </a:tc>
+                <a:extLst>
+                  <a:ext uri="{0D108BD9-81ED-4DB2-BD59-A6C34878D82A}">
+                    <a16:rowId xmlns:a16="http://schemas.microsoft.com/office/drawing/2014/main" val="10009"/>
+                  </a:ext>
+                </a:extLst>
               </a:tr>
               <a:tr h="171206">
                 <a:tc>
@@ -9742,18 +9847,13 @@
                     <a:p>
                       <a:pPr algn="l"/>
                       <a:r>
-                        <a:rPr lang="en-US" sz="1400" b="0" dirty="0" smtClean="0">
+                        <a:rPr lang="en-US" sz="1400" b="0" dirty="0">
                           <a:solidFill>
                             <a:schemeClr val="bg1"/>
                           </a:solidFill>
                         </a:rPr>
                         <a:t>9</a:t>
                       </a:r>
-                      <a:endParaRPr lang="en-US" sz="1400" b="0" dirty="0">
-                        <a:solidFill>
-                          <a:schemeClr val="bg1"/>
-                        </a:solidFill>
-                      </a:endParaRPr>
                     </a:p>
                   </a:txBody>
                   <a:tcPr marR="0" marT="0" marB="0">
@@ -9813,10 +9913,9 @@
                     <a:p>
                       <a:pPr algn="ctr"/>
                       <a:r>
-                        <a:rPr lang="en-US" sz="1400" dirty="0" smtClean="0"/>
+                        <a:rPr lang="en-US" sz="1400" dirty="0"/>
                         <a:t>0.56</a:t>
                       </a:r>
-                      <a:endParaRPr lang="en-US" sz="1400" dirty="0"/>
                     </a:p>
                   </a:txBody>
                   <a:tcPr marL="0" marR="0" marT="0" marB="0">
@@ -9872,6 +9971,11 @@
                     </a:solidFill>
                   </a:tcPr>
                 </a:tc>
+                <a:extLst>
+                  <a:ext uri="{0D108BD9-81ED-4DB2-BD59-A6C34878D82A}">
+                    <a16:rowId xmlns:a16="http://schemas.microsoft.com/office/drawing/2014/main" val="10010"/>
+                  </a:ext>
+                </a:extLst>
               </a:tr>
               <a:tr h="171206">
                 <a:tc>
@@ -9881,18 +9985,13 @@
                     <a:p>
                       <a:pPr algn="l"/>
                       <a:r>
-                        <a:rPr lang="en-US" sz="1400" b="0" dirty="0" smtClean="0">
+                        <a:rPr lang="en-US" sz="1400" b="0" dirty="0">
                           <a:solidFill>
                             <a:schemeClr val="bg1"/>
                           </a:solidFill>
                         </a:rPr>
                         <a:t>10</a:t>
                       </a:r>
-                      <a:endParaRPr lang="en-US" sz="1400" b="0" dirty="0">
-                        <a:solidFill>
-                          <a:schemeClr val="bg1"/>
-                        </a:solidFill>
-                      </a:endParaRPr>
                     </a:p>
                   </a:txBody>
                   <a:tcPr marR="0" marT="0" marB="0">
@@ -9952,10 +10051,9 @@
                     <a:p>
                       <a:pPr algn="ctr"/>
                       <a:r>
-                        <a:rPr lang="en-US" sz="1400" dirty="0" smtClean="0"/>
+                        <a:rPr lang="en-US" sz="1400" dirty="0"/>
                         <a:t>0.91</a:t>
                       </a:r>
-                      <a:endParaRPr lang="en-US" sz="1400" dirty="0"/>
                     </a:p>
                   </a:txBody>
                   <a:tcPr marL="0" marR="0" marT="0" marB="0">
@@ -10011,6 +10109,11 @@
                     </a:solidFill>
                   </a:tcPr>
                 </a:tc>
+                <a:extLst>
+                  <a:ext uri="{0D108BD9-81ED-4DB2-BD59-A6C34878D82A}">
+                    <a16:rowId xmlns:a16="http://schemas.microsoft.com/office/drawing/2014/main" val="10011"/>
+                  </a:ext>
+                </a:extLst>
               </a:tr>
               <a:tr h="171206">
                 <a:tc>
@@ -10020,18 +10123,13 @@
                     <a:p>
                       <a:pPr algn="l"/>
                       <a:r>
-                        <a:rPr lang="en-US" sz="1400" b="0" dirty="0" smtClean="0">
+                        <a:rPr lang="en-US" sz="1400" b="0" dirty="0">
                           <a:solidFill>
                             <a:schemeClr val="bg1"/>
                           </a:solidFill>
                         </a:rPr>
                         <a:t>..</a:t>
                       </a:r>
-                      <a:endParaRPr lang="en-US" sz="1400" b="0" dirty="0">
-                        <a:solidFill>
-                          <a:schemeClr val="bg1"/>
-                        </a:solidFill>
-                      </a:endParaRPr>
                     </a:p>
                   </a:txBody>
                   <a:tcPr marR="0" marT="0" marB="0">
@@ -10091,7 +10189,7 @@
                     <a:p>
                       <a:pPr algn="ctr"/>
                       <a:r>
-                        <a:rPr lang="mr-IN" sz="1400" dirty="0" smtClean="0"/>
+                        <a:rPr lang="mr-IN" sz="1400" dirty="0"/>
                         <a:t>…</a:t>
                       </a:r>
                       <a:endParaRPr lang="en-US" sz="1400" dirty="0"/>
@@ -10147,6 +10245,11 @@
                     </a:solidFill>
                   </a:tcPr>
                 </a:tc>
+                <a:extLst>
+                  <a:ext uri="{0D108BD9-81ED-4DB2-BD59-A6C34878D82A}">
+                    <a16:rowId xmlns:a16="http://schemas.microsoft.com/office/drawing/2014/main" val="10012"/>
+                  </a:ext>
+                </a:extLst>
               </a:tr>
             </a:tbl>
           </a:graphicData>
@@ -10465,7 +10568,7 @@
           <a:p>
             <a:pPr algn="ctr"/>
             <a:r>
-              <a:rPr lang="en-US" sz="1200" b="1" dirty="0" smtClean="0">
+              <a:rPr lang="en-US" sz="1200" b="1" dirty="0">
                 <a:solidFill>
                   <a:srgbClr val="FF0000"/>
                 </a:solidFill>
@@ -10474,13 +10577,6 @@
               </a:rPr>
               <a:t>target</a:t>
             </a:r>
-            <a:endParaRPr lang="en-US" sz="1200" b="1" dirty="0">
-              <a:solidFill>
-                <a:srgbClr val="FF0000"/>
-              </a:solidFill>
-              <a:latin typeface="Calibri"/>
-              <a:cs typeface="Calibri"/>
-            </a:endParaRPr>
           </a:p>
         </p:txBody>
       </p:sp>
@@ -10508,7 +10604,7 @@
           <a:p>
             <a:pPr algn="ctr"/>
             <a:r>
-              <a:rPr lang="en-US" sz="1400" b="1" dirty="0" smtClean="0">
+              <a:rPr lang="en-US" sz="1400" b="1" dirty="0">
                 <a:solidFill>
                   <a:srgbClr val="052B48"/>
                 </a:solidFill>
@@ -10518,7 +10614,7 @@
               <a:t>&lt;</a:t>
             </a:r>
             <a:r>
-              <a:rPr lang="en-US" sz="1400" b="1" dirty="0" err="1" smtClean="0">
+              <a:rPr lang="en-US" sz="1400" b="1" dirty="0" err="1">
                 <a:solidFill>
                   <a:srgbClr val="052B48"/>
                 </a:solidFill>
@@ -10528,7 +10624,7 @@
               <a:t>VectorIndex</a:t>
             </a:r>
             <a:r>
-              <a:rPr lang="en-US" sz="1400" b="1" dirty="0" smtClean="0">
+              <a:rPr lang="en-US" sz="1400" b="1" dirty="0">
                 <a:solidFill>
                   <a:srgbClr val="052B48"/>
                 </a:solidFill>
@@ -10537,13 +10633,6 @@
               </a:rPr>
               <a:t>&gt;</a:t>
             </a:r>
-            <a:endParaRPr lang="en-US" sz="1400" b="1" dirty="0">
-              <a:solidFill>
-                <a:srgbClr val="052B48"/>
-              </a:solidFill>
-              <a:latin typeface="Calibri"/>
-              <a:cs typeface="Calibri"/>
-            </a:endParaRPr>
           </a:p>
         </p:txBody>
       </p:sp>
@@ -10572,8 +10661,20 @@
                 <a:tableStyleId>{5C22544A-7EE6-4342-B048-85BDC9FD1C3A}</a:tableStyleId>
               </a:tblPr>
               <a:tblGrid>
-                <a:gridCol w="311673"/>
-                <a:gridCol w="417387"/>
+                <a:gridCol w="311673">
+                  <a:extLst>
+                    <a:ext uri="{9D8B030D-6E8A-4147-A177-3AD203B41FA5}">
+                      <a16:colId xmlns:a16="http://schemas.microsoft.com/office/drawing/2014/main" val="20000"/>
+                    </a:ext>
+                  </a:extLst>
+                </a:gridCol>
+                <a:gridCol w="417387">
+                  <a:extLst>
+                    <a:ext uri="{9D8B030D-6E8A-4147-A177-3AD203B41FA5}">
+                      <a16:colId xmlns:a16="http://schemas.microsoft.com/office/drawing/2014/main" val="20001"/>
+                    </a:ext>
+                  </a:extLst>
+                </a:gridCol>
               </a:tblGrid>
               <a:tr h="213906">
                 <a:tc>
@@ -10582,7 +10683,7 @@
                     <a:lstStyle/>
                     <a:p>
                       <a:pPr algn="ctr"/>
-                      <a:endParaRPr lang="en-US" sz="1400" b="0" baseline="0" dirty="0" smtClean="0"/>
+                      <a:endParaRPr lang="en-US" sz="1400" b="0" baseline="0" dirty="0"/>
                     </a:p>
                   </a:txBody>
                   <a:tcPr marR="0" marT="0" marB="0">
@@ -10642,7 +10743,7 @@
                     <a:p>
                       <a:pPr algn="ctr"/>
                       <a:r>
-                        <a:rPr lang="en-US" sz="1400" b="0" baseline="0" dirty="0" smtClean="0">
+                        <a:rPr lang="en-US" sz="1400" b="0" baseline="0" dirty="0">
                           <a:solidFill>
                             <a:srgbClr val="FFFFFF"/>
                           </a:solidFill>
@@ -10701,6 +10802,11 @@
                     </a:solidFill>
                   </a:tcPr>
                 </a:tc>
+                <a:extLst>
+                  <a:ext uri="{0D108BD9-81ED-4DB2-BD59-A6C34878D82A}">
+                    <a16:rowId xmlns:a16="http://schemas.microsoft.com/office/drawing/2014/main" val="10000"/>
+                  </a:ext>
+                </a:extLst>
               </a:tr>
               <a:tr h="171206">
                 <a:tc>
@@ -10710,18 +10816,13 @@
                     <a:p>
                       <a:pPr algn="l"/>
                       <a:r>
-                        <a:rPr lang="en-US" sz="1400" dirty="0" smtClean="0">
+                        <a:rPr lang="en-US" sz="1400" dirty="0">
                           <a:solidFill>
                             <a:schemeClr val="bg1"/>
                           </a:solidFill>
                         </a:rPr>
                         <a:t>0</a:t>
                       </a:r>
-                      <a:endParaRPr lang="en-US" sz="1400" dirty="0">
-                        <a:solidFill>
-                          <a:schemeClr val="bg1"/>
-                        </a:solidFill>
-                      </a:endParaRPr>
                     </a:p>
                   </a:txBody>
                   <a:tcPr marR="0" marT="0" marB="0">
@@ -10781,10 +10882,9 @@
                     <a:p>
                       <a:pPr algn="ctr"/>
                       <a:r>
-                        <a:rPr lang="en-US" sz="1400" dirty="0" smtClean="0"/>
+                        <a:rPr lang="en-US" sz="1400" dirty="0"/>
                         <a:t>0</a:t>
                       </a:r>
-                      <a:endParaRPr lang="en-US" sz="1400" dirty="0"/>
                     </a:p>
                   </a:txBody>
                   <a:tcPr marL="0" marR="0" marT="0" marB="0">
@@ -10837,6 +10937,11 @@
                     </a:solidFill>
                   </a:tcPr>
                 </a:tc>
+                <a:extLst>
+                  <a:ext uri="{0D108BD9-81ED-4DB2-BD59-A6C34878D82A}">
+                    <a16:rowId xmlns:a16="http://schemas.microsoft.com/office/drawing/2014/main" val="10001"/>
+                  </a:ext>
+                </a:extLst>
               </a:tr>
               <a:tr h="171206">
                 <a:tc>
@@ -10846,18 +10951,13 @@
                     <a:p>
                       <a:pPr algn="l"/>
                       <a:r>
-                        <a:rPr lang="en-US" sz="1400" dirty="0" smtClean="0">
+                        <a:rPr lang="en-US" sz="1400" dirty="0">
                           <a:solidFill>
                             <a:schemeClr val="bg1"/>
                           </a:solidFill>
                         </a:rPr>
                         <a:t>1</a:t>
                       </a:r>
-                      <a:endParaRPr lang="en-US" sz="1400" dirty="0">
-                        <a:solidFill>
-                          <a:schemeClr val="bg1"/>
-                        </a:solidFill>
-                      </a:endParaRPr>
                     </a:p>
                   </a:txBody>
                   <a:tcPr marR="0" marT="0" marB="0">
@@ -10917,10 +11017,9 @@
                     <a:p>
                       <a:pPr algn="ctr"/>
                       <a:r>
-                        <a:rPr lang="en-US" sz="1400" dirty="0" smtClean="0"/>
+                        <a:rPr lang="en-US" sz="1400" dirty="0"/>
                         <a:t>1</a:t>
                       </a:r>
-                      <a:endParaRPr lang="en-US" sz="1400" dirty="0"/>
                     </a:p>
                   </a:txBody>
                   <a:tcPr marL="0" marR="0" marT="0" marB="0">
@@ -10973,6 +11072,11 @@
                     </a:solidFill>
                   </a:tcPr>
                 </a:tc>
+                <a:extLst>
+                  <a:ext uri="{0D108BD9-81ED-4DB2-BD59-A6C34878D82A}">
+                    <a16:rowId xmlns:a16="http://schemas.microsoft.com/office/drawing/2014/main" val="10002"/>
+                  </a:ext>
+                </a:extLst>
               </a:tr>
               <a:tr h="171206">
                 <a:tc>
@@ -10982,18 +11086,13 @@
                     <a:p>
                       <a:pPr algn="l"/>
                       <a:r>
-                        <a:rPr lang="en-US" sz="1400" dirty="0" smtClean="0">
+                        <a:rPr lang="en-US" sz="1400" dirty="0">
                           <a:solidFill>
                             <a:schemeClr val="bg1"/>
                           </a:solidFill>
                         </a:rPr>
                         <a:t>2</a:t>
                       </a:r>
-                      <a:endParaRPr lang="en-US" sz="1400" dirty="0">
-                        <a:solidFill>
-                          <a:schemeClr val="bg1"/>
-                        </a:solidFill>
-                      </a:endParaRPr>
                     </a:p>
                   </a:txBody>
                   <a:tcPr marR="0" marT="0" marB="0">
@@ -11053,10 +11152,9 @@
                     <a:p>
                       <a:pPr algn="ctr"/>
                       <a:r>
-                        <a:rPr lang="en-US" sz="1400" dirty="0" smtClean="0"/>
+                        <a:rPr lang="en-US" sz="1400" dirty="0"/>
                         <a:t>2</a:t>
                       </a:r>
-                      <a:endParaRPr lang="en-US" sz="1400" dirty="0"/>
                     </a:p>
                   </a:txBody>
                   <a:tcPr marL="0" marR="0" marT="0" marB="0">
@@ -11109,6 +11207,11 @@
                     </a:solidFill>
                   </a:tcPr>
                 </a:tc>
+                <a:extLst>
+                  <a:ext uri="{0D108BD9-81ED-4DB2-BD59-A6C34878D82A}">
+                    <a16:rowId xmlns:a16="http://schemas.microsoft.com/office/drawing/2014/main" val="10003"/>
+                  </a:ext>
+                </a:extLst>
               </a:tr>
               <a:tr h="171206">
                 <a:tc>
@@ -11118,18 +11221,13 @@
                     <a:p>
                       <a:pPr algn="l"/>
                       <a:r>
-                        <a:rPr lang="en-US" sz="1400" b="0" dirty="0" smtClean="0">
+                        <a:rPr lang="en-US" sz="1400" b="0" dirty="0">
                           <a:solidFill>
                             <a:schemeClr val="bg1"/>
                           </a:solidFill>
                         </a:rPr>
                         <a:t>..</a:t>
                       </a:r>
-                      <a:endParaRPr lang="en-US" sz="1400" b="0" dirty="0">
-                        <a:solidFill>
-                          <a:schemeClr val="bg1"/>
-                        </a:solidFill>
-                      </a:endParaRPr>
                     </a:p>
                   </a:txBody>
                   <a:tcPr marR="0" marT="0" marB="0">
@@ -11189,7 +11287,7 @@
                     <a:p>
                       <a:pPr algn="ctr"/>
                       <a:r>
-                        <a:rPr lang="mr-IN" sz="1400" dirty="0" smtClean="0"/>
+                        <a:rPr lang="mr-IN" sz="1400" dirty="0"/>
                         <a:t>…</a:t>
                       </a:r>
                       <a:endParaRPr lang="en-US" sz="1400" dirty="0"/>
@@ -11245,6 +11343,11 @@
                     </a:solidFill>
                   </a:tcPr>
                 </a:tc>
+                <a:extLst>
+                  <a:ext uri="{0D108BD9-81ED-4DB2-BD59-A6C34878D82A}">
+                    <a16:rowId xmlns:a16="http://schemas.microsoft.com/office/drawing/2014/main" val="10004"/>
+                  </a:ext>
+                </a:extLst>
               </a:tr>
             </a:tbl>
           </a:graphicData>
@@ -11275,8 +11378,20 @@
                 <a:tableStyleId>{5C22544A-7EE6-4342-B048-85BDC9FD1C3A}</a:tableStyleId>
               </a:tblPr>
               <a:tblGrid>
-                <a:gridCol w="281053"/>
-                <a:gridCol w="1197080"/>
+                <a:gridCol w="281053">
+                  <a:extLst>
+                    <a:ext uri="{9D8B030D-6E8A-4147-A177-3AD203B41FA5}">
+                      <a16:colId xmlns:a16="http://schemas.microsoft.com/office/drawing/2014/main" val="20000"/>
+                    </a:ext>
+                  </a:extLst>
+                </a:gridCol>
+                <a:gridCol w="1197080">
+                  <a:extLst>
+                    <a:ext uri="{9D8B030D-6E8A-4147-A177-3AD203B41FA5}">
+                      <a16:colId xmlns:a16="http://schemas.microsoft.com/office/drawing/2014/main" val="20001"/>
+                    </a:ext>
+                  </a:extLst>
+                </a:gridCol>
               </a:tblGrid>
               <a:tr h="213906">
                 <a:tc>
@@ -11285,7 +11400,7 @@
                     <a:lstStyle/>
                     <a:p>
                       <a:pPr algn="ctr"/>
-                      <a:endParaRPr lang="en-US" sz="1400" b="0" baseline="0" dirty="0" smtClean="0">
+                      <a:endParaRPr lang="en-US" sz="1400" b="0" baseline="0" dirty="0">
                         <a:solidFill>
                           <a:srgbClr val="FFFFFF"/>
                         </a:solidFill>
@@ -11349,7 +11464,7 @@
                     <a:p>
                       <a:pPr algn="ctr"/>
                       <a:r>
-                        <a:rPr lang="en-US" sz="1400" b="0" baseline="0" dirty="0" smtClean="0">
+                        <a:rPr lang="en-US" sz="1400" b="0" baseline="0" dirty="0">
                           <a:solidFill>
                             <a:srgbClr val="FFFFFF"/>
                           </a:solidFill>
@@ -11357,7 +11472,7 @@
                         <a:t>(</a:t>
                       </a:r>
                       <a:r>
-                        <a:rPr lang="en-US" sz="1400" b="0" baseline="0" dirty="0" err="1" smtClean="0">
+                        <a:rPr lang="en-US" sz="1400" b="0" baseline="0" dirty="0" err="1">
                           <a:solidFill>
                             <a:srgbClr val="FFFFFF"/>
                           </a:solidFill>
@@ -11365,7 +11480,7 @@
                         <a:t>x,y,z</a:t>
                       </a:r>
                       <a:r>
-                        <a:rPr lang="en-US" sz="1400" b="0" baseline="0" dirty="0" smtClean="0">
+                        <a:rPr lang="en-US" sz="1400" b="0" baseline="0" dirty="0">
                           <a:solidFill>
                             <a:srgbClr val="FFFFFF"/>
                           </a:solidFill>
@@ -11424,6 +11539,11 @@
                     </a:solidFill>
                   </a:tcPr>
                 </a:tc>
+                <a:extLst>
+                  <a:ext uri="{0D108BD9-81ED-4DB2-BD59-A6C34878D82A}">
+                    <a16:rowId xmlns:a16="http://schemas.microsoft.com/office/drawing/2014/main" val="10000"/>
+                  </a:ext>
+                </a:extLst>
               </a:tr>
               <a:tr h="171206">
                 <a:tc>
@@ -11433,18 +11553,13 @@
                     <a:p>
                       <a:pPr algn="l"/>
                       <a:r>
-                        <a:rPr lang="en-US" sz="1400" b="0" baseline="0" dirty="0" smtClean="0">
+                        <a:rPr lang="en-US" sz="1400" b="0" baseline="0" dirty="0">
                           <a:solidFill>
                             <a:srgbClr val="FFFFFF"/>
                           </a:solidFill>
                         </a:rPr>
                         <a:t>0</a:t>
                       </a:r>
-                      <a:endParaRPr lang="en-US" sz="1400" b="0" baseline="0" dirty="0" smtClean="0">
-                        <a:solidFill>
-                          <a:srgbClr val="FFFFFF"/>
-                        </a:solidFill>
-                      </a:endParaRPr>
                     </a:p>
                   </a:txBody>
                   <a:tcPr marR="0" marT="0" marB="0">
@@ -11504,10 +11619,9 @@
                     <a:p>
                       <a:pPr algn="ctr"/>
                       <a:r>
-                        <a:rPr lang="en-US" sz="1400" dirty="0" smtClean="0"/>
+                        <a:rPr lang="en-US" sz="1400" dirty="0"/>
                         <a:t>(0.1, 0.3, 0.4)</a:t>
                       </a:r>
-                      <a:endParaRPr lang="en-US" sz="1400" dirty="0"/>
                     </a:p>
                   </a:txBody>
                   <a:tcPr marL="0" marR="0" marT="0" marB="0">
@@ -11560,6 +11674,11 @@
                     </a:solidFill>
                   </a:tcPr>
                 </a:tc>
+                <a:extLst>
+                  <a:ext uri="{0D108BD9-81ED-4DB2-BD59-A6C34878D82A}">
+                    <a16:rowId xmlns:a16="http://schemas.microsoft.com/office/drawing/2014/main" val="10001"/>
+                  </a:ext>
+                </a:extLst>
               </a:tr>
               <a:tr h="171206">
                 <a:tc>
@@ -11569,18 +11688,13 @@
                     <a:p>
                       <a:pPr algn="l"/>
                       <a:r>
-                        <a:rPr lang="en-US" sz="1400" dirty="0" smtClean="0">
+                        <a:rPr lang="en-US" sz="1400" dirty="0">
                           <a:solidFill>
                             <a:srgbClr val="FFFFFF"/>
                           </a:solidFill>
                         </a:rPr>
                         <a:t>1</a:t>
                       </a:r>
-                      <a:endParaRPr lang="en-US" sz="1400" dirty="0">
-                        <a:solidFill>
-                          <a:srgbClr val="FFFFFF"/>
-                        </a:solidFill>
-                      </a:endParaRPr>
                     </a:p>
                   </a:txBody>
                   <a:tcPr marR="0" marT="0" marB="0">
@@ -11640,10 +11754,9 @@
                     <a:p>
                       <a:pPr algn="ctr"/>
                       <a:r>
-                        <a:rPr lang="en-US" sz="1400" dirty="0" smtClean="0"/>
+                        <a:rPr lang="en-US" sz="1400" dirty="0"/>
                         <a:t>(0.5, 0.4, 0.2)</a:t>
                       </a:r>
-                      <a:endParaRPr lang="en-US" sz="1400" dirty="0"/>
                     </a:p>
                   </a:txBody>
                   <a:tcPr marL="0" marR="0" marT="0" marB="0">
@@ -11696,6 +11809,11 @@
                     </a:solidFill>
                   </a:tcPr>
                 </a:tc>
+                <a:extLst>
+                  <a:ext uri="{0D108BD9-81ED-4DB2-BD59-A6C34878D82A}">
+                    <a16:rowId xmlns:a16="http://schemas.microsoft.com/office/drawing/2014/main" val="10002"/>
+                  </a:ext>
+                </a:extLst>
               </a:tr>
               <a:tr h="171206">
                 <a:tc>
@@ -11705,18 +11823,13 @@
                     <a:p>
                       <a:pPr algn="l"/>
                       <a:r>
-                        <a:rPr lang="en-US" sz="1400" dirty="0" smtClean="0">
+                        <a:rPr lang="en-US" sz="1400" dirty="0">
                           <a:solidFill>
                             <a:srgbClr val="FFFFFF"/>
                           </a:solidFill>
                         </a:rPr>
                         <a:t>2</a:t>
                       </a:r>
-                      <a:endParaRPr lang="en-US" sz="1400" dirty="0">
-                        <a:solidFill>
-                          <a:srgbClr val="FFFFFF"/>
-                        </a:solidFill>
-                      </a:endParaRPr>
                     </a:p>
                   </a:txBody>
                   <a:tcPr marR="0" marT="0" marB="0">
@@ -11776,10 +11889,9 @@
                     <a:p>
                       <a:pPr algn="ctr"/>
                       <a:r>
-                        <a:rPr lang="en-US" sz="1400" dirty="0" smtClean="0"/>
+                        <a:rPr lang="en-US" sz="1400" dirty="0"/>
                         <a:t>(1.5, 2.6, 1.8)</a:t>
                       </a:r>
-                      <a:endParaRPr lang="en-US" sz="1400" dirty="0"/>
                     </a:p>
                   </a:txBody>
                   <a:tcPr marL="0" marR="0" marT="0" marB="0">
@@ -11832,6 +11944,11 @@
                     </a:solidFill>
                   </a:tcPr>
                 </a:tc>
+                <a:extLst>
+                  <a:ext uri="{0D108BD9-81ED-4DB2-BD59-A6C34878D82A}">
+                    <a16:rowId xmlns:a16="http://schemas.microsoft.com/office/drawing/2014/main" val="10003"/>
+                  </a:ext>
+                </a:extLst>
               </a:tr>
               <a:tr h="171206">
                 <a:tc>
@@ -11841,18 +11958,13 @@
                     <a:p>
                       <a:pPr algn="l"/>
                       <a:r>
-                        <a:rPr lang="en-US" sz="1400" b="0" dirty="0" smtClean="0">
+                        <a:rPr lang="en-US" sz="1400" b="0" dirty="0">
                           <a:solidFill>
                             <a:srgbClr val="FFFFFF"/>
                           </a:solidFill>
                         </a:rPr>
                         <a:t>..</a:t>
                       </a:r>
-                      <a:endParaRPr lang="en-US" sz="1400" b="0" dirty="0">
-                        <a:solidFill>
-                          <a:srgbClr val="FFFFFF"/>
-                        </a:solidFill>
-                      </a:endParaRPr>
                     </a:p>
                   </a:txBody>
                   <a:tcPr marR="0" marT="0" marB="0">
@@ -11912,7 +12024,7 @@
                     <a:p>
                       <a:pPr algn="ctr"/>
                       <a:r>
-                        <a:rPr lang="mr-IN" sz="1400" dirty="0" smtClean="0"/>
+                        <a:rPr lang="mr-IN" sz="1400" dirty="0"/>
                         <a:t>…</a:t>
                       </a:r>
                       <a:endParaRPr lang="en-US" sz="1400" dirty="0"/>
@@ -11968,6 +12080,11 @@
                     </a:solidFill>
                   </a:tcPr>
                 </a:tc>
+                <a:extLst>
+                  <a:ext uri="{0D108BD9-81ED-4DB2-BD59-A6C34878D82A}">
+                    <a16:rowId xmlns:a16="http://schemas.microsoft.com/office/drawing/2014/main" val="10004"/>
+                  </a:ext>
+                </a:extLst>
               </a:tr>
             </a:tbl>
           </a:graphicData>
@@ -11997,7 +12114,7 @@
           <a:p>
             <a:pPr algn="ctr"/>
             <a:r>
-              <a:rPr lang="en-US" sz="1400" b="1" dirty="0" smtClean="0">
+              <a:rPr lang="en-US" sz="1400" b="1" dirty="0">
                 <a:solidFill>
                   <a:srgbClr val="052B48"/>
                 </a:solidFill>
@@ -12006,13 +12123,6 @@
               </a:rPr>
               <a:t>&lt;VectorData&gt;</a:t>
             </a:r>
-            <a:endParaRPr lang="en-US" sz="1400" b="1" dirty="0">
-              <a:solidFill>
-                <a:srgbClr val="052B48"/>
-              </a:solidFill>
-              <a:latin typeface="Calibri"/>
-              <a:cs typeface="Calibri"/>
-            </a:endParaRPr>
           </a:p>
         </p:txBody>
       </p:sp>
@@ -12069,13 +12179,6 @@
               </a:rPr>
               <a:t>&gt;</a:t>
             </a:r>
-            <a:endParaRPr lang="en-US" sz="1400" b="1" dirty="0">
-              <a:solidFill>
-                <a:srgbClr val="052B48"/>
-              </a:solidFill>
-              <a:latin typeface="Calibri"/>
-              <a:cs typeface="Calibri"/>
-            </a:endParaRPr>
           </a:p>
         </p:txBody>
       </p:sp>
@@ -12102,7 +12205,7 @@
           <a:p>
             <a:pPr algn="ctr"/>
             <a:r>
-              <a:rPr lang="en-US" sz="5400" b="1" dirty="0" err="1" smtClean="0">
+              <a:rPr lang="en-US" sz="5400" b="1" dirty="0" err="1">
                 <a:solidFill>
                   <a:srgbClr val="052B48"/>
                 </a:solidFill>
@@ -12223,7 +12326,7 @@
           <a:p>
             <a:pPr algn="ctr"/>
             <a:r>
-              <a:rPr lang="en-US" sz="5400" b="1" dirty="0" err="1" smtClean="0">
+              <a:rPr lang="en-US" sz="5400" b="1" dirty="0" err="1">
                 <a:solidFill>
                   <a:srgbClr val="052B48"/>
                 </a:solidFill>
@@ -12287,26 +12390,6 @@
           <a:lstStyle/>
           <a:p>
             <a:pPr algn="ctr"/>
-            <a:endParaRPr lang="en-US" sz="1200" dirty="0" smtClean="0"/>
-          </a:p>
-          <a:p>
-            <a:pPr algn="ctr"/>
-            <a:r>
-              <a:rPr lang="en-US" sz="1200" dirty="0" smtClean="0"/>
-              <a:t>-------------</a:t>
-            </a:r>
-            <a:endParaRPr lang="en-US" sz="1200" dirty="0"/>
-          </a:p>
-          <a:p>
-            <a:pPr algn="ctr"/>
-            <a:r>
-              <a:rPr lang="en-US" sz="1200" dirty="0"/>
-              <a:t>------------</a:t>
-            </a:r>
-            <a:r>
-              <a:rPr lang="en-US" sz="1200" dirty="0" smtClean="0"/>
-              <a:t>-</a:t>
-            </a:r>
             <a:endParaRPr lang="en-US" sz="1200" dirty="0"/>
           </a:p>
           <a:p>
@@ -12320,17 +12403,26 @@
             <a:pPr algn="ctr"/>
             <a:r>
               <a:rPr lang="en-US" sz="1200" dirty="0"/>
-              <a:t>-----------</a:t>
+              <a:t>-------------</a:t>
             </a:r>
-            <a:r>
-              <a:rPr lang="en-US" sz="1200" dirty="0" smtClean="0"/>
-              <a:t>--</a:t>
-            </a:r>
-            <a:endParaRPr lang="en-US" sz="1200" dirty="0"/>
           </a:p>
           <a:p>
             <a:pPr algn="ctr"/>
-            <a:endParaRPr lang="en-US" sz="1200" dirty="0" smtClean="0"/>
+            <a:r>
+              <a:rPr lang="en-US" sz="1200" dirty="0"/>
+              <a:t>-------------</a:t>
+            </a:r>
+          </a:p>
+          <a:p>
+            <a:pPr algn="ctr"/>
+            <a:r>
+              <a:rPr lang="en-US" sz="1200" dirty="0"/>
+              <a:t>-------------</a:t>
+            </a:r>
+          </a:p>
+          <a:p>
+            <a:pPr algn="ctr"/>
+            <a:endParaRPr lang="en-US" sz="1200" dirty="0"/>
           </a:p>
         </p:txBody>
       </p:sp>
@@ -12379,26 +12471,6 @@
           <a:lstStyle/>
           <a:p>
             <a:pPr algn="ctr"/>
-            <a:endParaRPr lang="en-US" sz="1200" dirty="0" smtClean="0"/>
-          </a:p>
-          <a:p>
-            <a:pPr algn="ctr"/>
-            <a:r>
-              <a:rPr lang="en-US" sz="1200" dirty="0" smtClean="0"/>
-              <a:t>-------------</a:t>
-            </a:r>
-            <a:endParaRPr lang="en-US" sz="1200" dirty="0"/>
-          </a:p>
-          <a:p>
-            <a:pPr algn="ctr"/>
-            <a:r>
-              <a:rPr lang="en-US" sz="1200" dirty="0"/>
-              <a:t>------------</a:t>
-            </a:r>
-            <a:r>
-              <a:rPr lang="en-US" sz="1200" dirty="0" smtClean="0"/>
-              <a:t>-</a:t>
-            </a:r>
             <a:endParaRPr lang="en-US" sz="1200" dirty="0"/>
           </a:p>
           <a:p>
@@ -12412,17 +12484,26 @@
             <a:pPr algn="ctr"/>
             <a:r>
               <a:rPr lang="en-US" sz="1200" dirty="0"/>
-              <a:t>-----------</a:t>
+              <a:t>-------------</a:t>
             </a:r>
-            <a:r>
-              <a:rPr lang="en-US" sz="1200" dirty="0" smtClean="0"/>
-              <a:t>--</a:t>
-            </a:r>
-            <a:endParaRPr lang="en-US" sz="1200" dirty="0"/>
           </a:p>
           <a:p>
             <a:pPr algn="ctr"/>
-            <a:endParaRPr lang="en-US" sz="1200" dirty="0" smtClean="0"/>
+            <a:r>
+              <a:rPr lang="en-US" sz="1200" dirty="0"/>
+              <a:t>-------------</a:t>
+            </a:r>
+          </a:p>
+          <a:p>
+            <a:pPr algn="ctr"/>
+            <a:r>
+              <a:rPr lang="en-US" sz="1200" dirty="0"/>
+              <a:t>-------------</a:t>
+            </a:r>
+          </a:p>
+          <a:p>
+            <a:pPr algn="ctr"/>
+            <a:endParaRPr lang="en-US" sz="1200" dirty="0"/>
           </a:p>
         </p:txBody>
       </p:sp>
@@ -12471,26 +12552,6 @@
           <a:lstStyle/>
           <a:p>
             <a:pPr algn="ctr"/>
-            <a:endParaRPr lang="en-US" sz="1200" dirty="0" smtClean="0"/>
-          </a:p>
-          <a:p>
-            <a:pPr algn="ctr"/>
-            <a:r>
-              <a:rPr lang="en-US" sz="1200" dirty="0" smtClean="0"/>
-              <a:t>-------------</a:t>
-            </a:r>
-            <a:endParaRPr lang="en-US" sz="1200" dirty="0"/>
-          </a:p>
-          <a:p>
-            <a:pPr algn="ctr"/>
-            <a:r>
-              <a:rPr lang="en-US" sz="1200" dirty="0"/>
-              <a:t>------------</a:t>
-            </a:r>
-            <a:r>
-              <a:rPr lang="en-US" sz="1200" dirty="0" smtClean="0"/>
-              <a:t>-</a:t>
-            </a:r>
             <a:endParaRPr lang="en-US" sz="1200" dirty="0"/>
           </a:p>
           <a:p>
@@ -12504,17 +12565,26 @@
             <a:pPr algn="ctr"/>
             <a:r>
               <a:rPr lang="en-US" sz="1200" dirty="0"/>
-              <a:t>-----------</a:t>
+              <a:t>-------------</a:t>
             </a:r>
-            <a:r>
-              <a:rPr lang="en-US" sz="1200" dirty="0" smtClean="0"/>
-              <a:t>--</a:t>
-            </a:r>
-            <a:endParaRPr lang="en-US" sz="1200" dirty="0"/>
           </a:p>
           <a:p>
             <a:pPr algn="ctr"/>
-            <a:endParaRPr lang="en-US" sz="1200" dirty="0" smtClean="0"/>
+            <a:r>
+              <a:rPr lang="en-US" sz="1200" dirty="0"/>
+              <a:t>-------------</a:t>
+            </a:r>
+          </a:p>
+          <a:p>
+            <a:pPr algn="ctr"/>
+            <a:r>
+              <a:rPr lang="en-US" sz="1200" dirty="0"/>
+              <a:t>-------------</a:t>
+            </a:r>
+          </a:p>
+          <a:p>
+            <a:pPr algn="ctr"/>
+            <a:endParaRPr lang="en-US" sz="1200" dirty="0"/>
           </a:p>
         </p:txBody>
       </p:sp>
@@ -12788,7 +12858,7 @@
           <a:p>
             <a:pPr algn="ctr"/>
             <a:r>
-              <a:rPr lang="en-US" sz="5400" b="1" dirty="0" err="1" smtClean="0">
+              <a:rPr lang="en-US" sz="5400" b="1" dirty="0" err="1">
                 <a:solidFill>
                   <a:srgbClr val="052B48"/>
                 </a:solidFill>
@@ -12848,6 +12918,1115 @@
     <p:extLst>
       <p:ext uri="{BB962C8B-B14F-4D97-AF65-F5344CB8AC3E}">
         <p14:creationId xmlns:p14="http://schemas.microsoft.com/office/powerpoint/2010/main" val="2909957797"/>
+      </p:ext>
+    </p:extLst>
+  </p:cSld>
+  <p:clrMapOvr>
+    <a:masterClrMapping/>
+  </p:clrMapOvr>
+</p:sld>
+</file>
+
+<file path=ppt/slides/slide5.xml><?xml version="1.0" encoding="utf-8"?>
+<p:sld xmlns:a="http://schemas.openxmlformats.org/drawingml/2006/main" xmlns:r="http://schemas.openxmlformats.org/officeDocument/2006/relationships" xmlns:p="http://schemas.openxmlformats.org/presentationml/2006/main">
+  <p:cSld>
+    <p:spTree>
+      <p:nvGrpSpPr>
+        <p:cNvPr id="1" name=""/>
+        <p:cNvGrpSpPr/>
+        <p:nvPr/>
+      </p:nvGrpSpPr>
+      <p:grpSpPr>
+        <a:xfrm>
+          <a:off x="0" y="0"/>
+          <a:ext cx="0" cy="0"/>
+          <a:chOff x="0" y="0"/>
+          <a:chExt cx="0" cy="0"/>
+        </a:xfrm>
+      </p:grpSpPr>
+      <p:sp>
+        <p:nvSpPr>
+          <p:cNvPr id="5" name="Rounded Rectangle 4">
+            <a:extLst>
+              <a:ext uri="{FF2B5EF4-FFF2-40B4-BE49-F238E27FC236}">
+                <a16:creationId xmlns:a16="http://schemas.microsoft.com/office/drawing/2014/main" id="{9CD34A0F-9AB2-5841-9E08-8B0C7A830E9B}"/>
+              </a:ext>
+            </a:extLst>
+          </p:cNvPr>
+          <p:cNvSpPr/>
+          <p:nvPr/>
+        </p:nvSpPr>
+        <p:spPr>
+          <a:xfrm>
+            <a:off x="853570" y="853671"/>
+            <a:ext cx="7234527" cy="4851352"/>
+          </a:xfrm>
+          <a:prstGeom prst="roundRect">
+            <a:avLst>
+              <a:gd name="adj" fmla="val 4437"/>
+            </a:avLst>
+          </a:prstGeom>
+          <a:solidFill>
+            <a:srgbClr val="EDEDED"/>
+          </a:solidFill>
+          <a:ln>
+            <a:solidFill>
+              <a:srgbClr val="000000"/>
+            </a:solidFill>
+          </a:ln>
+          <a:effectLst/>
+        </p:spPr>
+        <p:style>
+          <a:lnRef idx="1">
+            <a:schemeClr val="accent1"/>
+          </a:lnRef>
+          <a:fillRef idx="3">
+            <a:schemeClr val="accent1"/>
+          </a:fillRef>
+          <a:effectRef idx="2">
+            <a:schemeClr val="accent1"/>
+          </a:effectRef>
+          <a:fontRef idx="minor">
+            <a:schemeClr val="lt1"/>
+          </a:fontRef>
+        </p:style>
+        <p:txBody>
+          <a:bodyPr rtlCol="0" anchor="ctr"/>
+          <a:lstStyle/>
+          <a:p>
+            <a:pPr algn="ctr"/>
+            <a:endParaRPr lang="en-US"/>
+          </a:p>
+        </p:txBody>
+      </p:sp>
+      <p:sp>
+        <p:nvSpPr>
+          <p:cNvPr id="6" name="Rectangle 5">
+            <a:extLst>
+              <a:ext uri="{FF2B5EF4-FFF2-40B4-BE49-F238E27FC236}">
+                <a16:creationId xmlns:a16="http://schemas.microsoft.com/office/drawing/2014/main" id="{CC770130-5EE4-FD4A-AE93-EB252A3711BD}"/>
+              </a:ext>
+            </a:extLst>
+          </p:cNvPr>
+          <p:cNvSpPr/>
+          <p:nvPr/>
+        </p:nvSpPr>
+        <p:spPr>
+          <a:xfrm>
+            <a:off x="863980" y="855015"/>
+            <a:ext cx="7213708" cy="677108"/>
+          </a:xfrm>
+          <a:prstGeom prst="rect">
+            <a:avLst/>
+          </a:prstGeom>
+        </p:spPr>
+        <p:txBody>
+          <a:bodyPr wrap="square">
+            <a:spAutoFit/>
+          </a:bodyPr>
+          <a:lstStyle/>
+          <a:p>
+            <a:pPr algn="ctr"/>
+            <a:r>
+              <a:rPr lang="en-US" sz="3800" b="1" dirty="0" err="1">
+                <a:solidFill>
+                  <a:srgbClr val="052B48"/>
+                </a:solidFill>
+                <a:latin typeface="Courier" pitchFamily="2" charset="0"/>
+                <a:cs typeface="Courier New" panose="02070309020205020404" pitchFamily="49" charset="0"/>
+              </a:rPr>
+              <a:t>GenericDataChunkIterator</a:t>
+            </a:r>
+            <a:endParaRPr lang="en-US" sz="3800" b="1" dirty="0">
+              <a:solidFill>
+                <a:srgbClr val="052B48"/>
+              </a:solidFill>
+              <a:latin typeface="Courier" pitchFamily="2" charset="0"/>
+              <a:cs typeface="Courier New" panose="02070309020205020404" pitchFamily="49" charset="0"/>
+            </a:endParaRPr>
+          </a:p>
+        </p:txBody>
+      </p:sp>
+      <p:sp>
+        <p:nvSpPr>
+          <p:cNvPr id="8" name="Curved Right Arrow 7">
+            <a:extLst>
+              <a:ext uri="{FF2B5EF4-FFF2-40B4-BE49-F238E27FC236}">
+                <a16:creationId xmlns:a16="http://schemas.microsoft.com/office/drawing/2014/main" id="{0E05D44F-881E-D147-AC3F-718A69FCF7CE}"/>
+              </a:ext>
+            </a:extLst>
+          </p:cNvPr>
+          <p:cNvSpPr/>
+          <p:nvPr/>
+        </p:nvSpPr>
+        <p:spPr>
+          <a:xfrm flipV="1">
+            <a:off x="1458410" y="1770861"/>
+            <a:ext cx="1702606" cy="3316278"/>
+          </a:xfrm>
+          <a:prstGeom prst="curvedRightArrow">
+            <a:avLst/>
+          </a:prstGeom>
+          <a:gradFill rotWithShape="1">
+            <a:gsLst>
+              <a:gs pos="24000">
+                <a:srgbClr val="052A48"/>
+              </a:gs>
+              <a:gs pos="70000">
+                <a:schemeClr val="bg1">
+                  <a:lumMod val="44037"/>
+                  <a:lumOff val="55963"/>
+                </a:schemeClr>
+              </a:gs>
+            </a:gsLst>
+            <a:lin ang="16200000" scaled="0"/>
+          </a:gradFill>
+          <a:ln w="9525" cap="flat" cmpd="sng" algn="ctr">
+            <a:solidFill>
+              <a:sysClr val="windowText" lastClr="000000"/>
+            </a:solidFill>
+            <a:prstDash val="solid"/>
+          </a:ln>
+          <a:effectLst>
+            <a:outerShdw blurRad="40000" dist="23000" dir="5400000" rotWithShape="0">
+              <a:srgbClr val="000000">
+                <a:alpha val="35000"/>
+              </a:srgbClr>
+            </a:outerShdw>
+          </a:effectLst>
+        </p:spPr>
+        <p:txBody>
+          <a:bodyPr rtlCol="0" anchor="ctr"/>
+          <a:lstStyle/>
+          <a:p>
+            <a:pPr marL="0" marR="0" lvl="0" indent="0" algn="ctr" defTabSz="914400" eaLnBrk="1" fontAlgn="auto" latinLnBrk="0" hangingPunct="1">
+              <a:lnSpc>
+                <a:spcPct val="100000"/>
+              </a:lnSpc>
+              <a:spcBef>
+                <a:spcPts val="0"/>
+              </a:spcBef>
+              <a:spcAft>
+                <a:spcPts val="0"/>
+              </a:spcAft>
+              <a:buClrTx/>
+              <a:buSzTx/>
+              <a:buFontTx/>
+              <a:buNone/>
+              <a:tabLst/>
+              <a:defRPr/>
+            </a:pPr>
+            <a:endParaRPr kumimoji="0" lang="en-US" sz="1800" b="0" i="0" u="none" strike="noStrike" kern="0" cap="none" spc="0" normalizeH="0" baseline="0" noProof="0">
+              <a:ln>
+                <a:noFill/>
+              </a:ln>
+              <a:solidFill>
+                <a:sysClr val="windowText" lastClr="000000"/>
+              </a:solidFill>
+              <a:effectLst/>
+              <a:uLnTx/>
+              <a:uFillTx/>
+              <a:latin typeface="Calibri"/>
+              <a:ea typeface="+mn-ea"/>
+              <a:cs typeface="+mn-cs"/>
+            </a:endParaRPr>
+          </a:p>
+        </p:txBody>
+      </p:sp>
+      <p:sp>
+        <p:nvSpPr>
+          <p:cNvPr id="9" name="Curved Right Arrow 8">
+            <a:extLst>
+              <a:ext uri="{FF2B5EF4-FFF2-40B4-BE49-F238E27FC236}">
+                <a16:creationId xmlns:a16="http://schemas.microsoft.com/office/drawing/2014/main" id="{7E41067D-CFF7-8745-B91C-34FF13C878E4}"/>
+              </a:ext>
+            </a:extLst>
+          </p:cNvPr>
+          <p:cNvSpPr/>
+          <p:nvPr/>
+        </p:nvSpPr>
+        <p:spPr>
+          <a:xfrm flipH="1">
+            <a:off x="5757580" y="1796904"/>
+            <a:ext cx="1702605" cy="3316278"/>
+          </a:xfrm>
+          <a:prstGeom prst="curvedRightArrow">
+            <a:avLst/>
+          </a:prstGeom>
+          <a:gradFill rotWithShape="1">
+            <a:gsLst>
+              <a:gs pos="29000">
+                <a:schemeClr val="accent1">
+                  <a:lumMod val="75000"/>
+                </a:schemeClr>
+              </a:gs>
+              <a:gs pos="87000">
+                <a:srgbClr val="C00000"/>
+              </a:gs>
+            </a:gsLst>
+            <a:lin ang="16200000" scaled="0"/>
+          </a:gradFill>
+          <a:ln w="9525" cap="flat" cmpd="sng" algn="ctr">
+            <a:solidFill>
+              <a:sysClr val="windowText" lastClr="000000"/>
+            </a:solidFill>
+            <a:prstDash val="solid"/>
+          </a:ln>
+          <a:effectLst>
+            <a:outerShdw blurRad="40000" dist="23000" dir="5400000" rotWithShape="0">
+              <a:srgbClr val="000000">
+                <a:alpha val="35000"/>
+              </a:srgbClr>
+            </a:outerShdw>
+          </a:effectLst>
+        </p:spPr>
+        <p:txBody>
+          <a:bodyPr rtlCol="0" anchor="ctr"/>
+          <a:lstStyle/>
+          <a:p>
+            <a:pPr marL="0" marR="0" lvl="0" indent="0" algn="ctr" defTabSz="914400" eaLnBrk="1" fontAlgn="auto" latinLnBrk="0" hangingPunct="1">
+              <a:lnSpc>
+                <a:spcPct val="100000"/>
+              </a:lnSpc>
+              <a:spcBef>
+                <a:spcPts val="0"/>
+              </a:spcBef>
+              <a:spcAft>
+                <a:spcPts val="0"/>
+              </a:spcAft>
+              <a:buClrTx/>
+              <a:buSzTx/>
+              <a:buFontTx/>
+              <a:buNone/>
+              <a:tabLst/>
+              <a:defRPr/>
+            </a:pPr>
+            <a:endParaRPr kumimoji="0" lang="en-US" sz="1800" b="0" i="0" u="none" strike="noStrike" kern="0" cap="none" spc="0" normalizeH="0" baseline="0" noProof="0">
+              <a:ln>
+                <a:noFill/>
+              </a:ln>
+              <a:solidFill>
+                <a:sysClr val="windowText" lastClr="000000"/>
+              </a:solidFill>
+              <a:effectLst/>
+              <a:uLnTx/>
+              <a:uFillTx/>
+              <a:latin typeface="Calibri"/>
+              <a:ea typeface="+mn-ea"/>
+              <a:cs typeface="+mn-cs"/>
+            </a:endParaRPr>
+          </a:p>
+        </p:txBody>
+      </p:sp>
+      <p:grpSp>
+        <p:nvGrpSpPr>
+          <p:cNvPr id="18" name="Group 17">
+            <a:extLst>
+              <a:ext uri="{FF2B5EF4-FFF2-40B4-BE49-F238E27FC236}">
+                <a16:creationId xmlns:a16="http://schemas.microsoft.com/office/drawing/2014/main" id="{1B5F8B31-FB1F-974C-9DAC-2E016F17C816}"/>
+              </a:ext>
+            </a:extLst>
+          </p:cNvPr>
+          <p:cNvGrpSpPr>
+            <a:grpSpLocks noChangeAspect="1"/>
+          </p:cNvGrpSpPr>
+          <p:nvPr/>
+        </p:nvGrpSpPr>
+        <p:grpSpPr>
+          <a:xfrm>
+            <a:off x="3416937" y="3854054"/>
+            <a:ext cx="2037088" cy="1767487"/>
+            <a:chOff x="7635099" y="2460210"/>
+            <a:chExt cx="3917748" cy="3399249"/>
+          </a:xfrm>
+        </p:grpSpPr>
+        <p:sp>
+          <p:nvSpPr>
+            <p:cNvPr id="10" name="Cube 9">
+              <a:extLst>
+                <a:ext uri="{FF2B5EF4-FFF2-40B4-BE49-F238E27FC236}">
+                  <a16:creationId xmlns:a16="http://schemas.microsoft.com/office/drawing/2014/main" id="{5782626C-AF0C-DD40-BB16-1C25BCF0B204}"/>
+                </a:ext>
+              </a:extLst>
+            </p:cNvPr>
+            <p:cNvSpPr/>
+            <p:nvPr/>
+          </p:nvSpPr>
+          <p:spPr>
+            <a:xfrm>
+              <a:off x="8065710" y="3751363"/>
+              <a:ext cx="1901188" cy="1633887"/>
+            </a:xfrm>
+            <a:prstGeom prst="cube">
+              <a:avLst/>
+            </a:prstGeom>
+            <a:solidFill>
+              <a:srgbClr val="052A48"/>
+            </a:solidFill>
+            <a:ln w="28575" cap="flat" cmpd="sng" algn="ctr">
+              <a:solidFill>
+                <a:srgbClr val="FFFFFF"/>
+              </a:solidFill>
+              <a:prstDash val="solid"/>
+            </a:ln>
+            <a:effectLst/>
+          </p:spPr>
+          <p:txBody>
+            <a:bodyPr rtlCol="0" anchor="ctr"/>
+            <a:lstStyle/>
+            <a:p>
+              <a:pPr marL="0" marR="0" lvl="0" indent="0" algn="ctr" defTabSz="914400" eaLnBrk="1" fontAlgn="auto" latinLnBrk="0" hangingPunct="1">
+                <a:lnSpc>
+                  <a:spcPct val="100000"/>
+                </a:lnSpc>
+                <a:spcBef>
+                  <a:spcPts val="0"/>
+                </a:spcBef>
+                <a:spcAft>
+                  <a:spcPts val="0"/>
+                </a:spcAft>
+                <a:buClrTx/>
+                <a:buSzTx/>
+                <a:buFontTx/>
+                <a:buNone/>
+                <a:tabLst/>
+                <a:defRPr/>
+              </a:pPr>
+              <a:endParaRPr kumimoji="0" lang="en-US" sz="1800" b="0" i="0" u="none" strike="noStrike" kern="0" cap="none" spc="0" normalizeH="0" baseline="0" noProof="0">
+                <a:ln>
+                  <a:noFill/>
+                </a:ln>
+                <a:solidFill>
+                  <a:sysClr val="window" lastClr="FFFFFF"/>
+                </a:solidFill>
+                <a:effectLst/>
+                <a:uLnTx/>
+                <a:uFillTx/>
+                <a:latin typeface="Calibri"/>
+                <a:ea typeface="+mn-ea"/>
+                <a:cs typeface="+mn-cs"/>
+              </a:endParaRPr>
+            </a:p>
+          </p:txBody>
+        </p:sp>
+        <p:sp>
+          <p:nvSpPr>
+            <p:cNvPr id="11" name="Cube 10">
+              <a:extLst>
+                <a:ext uri="{FF2B5EF4-FFF2-40B4-BE49-F238E27FC236}">
+                  <a16:creationId xmlns:a16="http://schemas.microsoft.com/office/drawing/2014/main" id="{C0587256-9A2B-8C4D-AE67-0AD974A9D29F}"/>
+                </a:ext>
+              </a:extLst>
+            </p:cNvPr>
+            <p:cNvSpPr/>
+            <p:nvPr/>
+          </p:nvSpPr>
+          <p:spPr>
+            <a:xfrm>
+              <a:off x="9651659" y="3751363"/>
+              <a:ext cx="1901188" cy="1633887"/>
+            </a:xfrm>
+            <a:prstGeom prst="cube">
+              <a:avLst/>
+            </a:prstGeom>
+            <a:solidFill>
+              <a:srgbClr val="052A48"/>
+            </a:solidFill>
+            <a:ln w="28575" cap="flat" cmpd="sng" algn="ctr">
+              <a:solidFill>
+                <a:srgbClr val="FFFFFF"/>
+              </a:solidFill>
+              <a:prstDash val="solid"/>
+            </a:ln>
+            <a:effectLst/>
+          </p:spPr>
+          <p:txBody>
+            <a:bodyPr rtlCol="0" anchor="ctr"/>
+            <a:lstStyle/>
+            <a:p>
+              <a:pPr marL="0" marR="0" lvl="0" indent="0" algn="ctr" defTabSz="914400" eaLnBrk="1" fontAlgn="auto" latinLnBrk="0" hangingPunct="1">
+                <a:lnSpc>
+                  <a:spcPct val="100000"/>
+                </a:lnSpc>
+                <a:spcBef>
+                  <a:spcPts val="0"/>
+                </a:spcBef>
+                <a:spcAft>
+                  <a:spcPts val="0"/>
+                </a:spcAft>
+                <a:buClrTx/>
+                <a:buSzTx/>
+                <a:buFontTx/>
+                <a:buNone/>
+                <a:tabLst/>
+                <a:defRPr/>
+              </a:pPr>
+              <a:endParaRPr kumimoji="0" lang="en-US" sz="1800" b="0" i="0" u="none" strike="noStrike" kern="0" cap="none" spc="0" normalizeH="0" baseline="0" noProof="0">
+                <a:ln>
+                  <a:noFill/>
+                </a:ln>
+                <a:solidFill>
+                  <a:sysClr val="window" lastClr="FFFFFF"/>
+                </a:solidFill>
+                <a:effectLst/>
+                <a:uLnTx/>
+                <a:uFillTx/>
+                <a:latin typeface="Calibri"/>
+                <a:ea typeface="+mn-ea"/>
+                <a:cs typeface="+mn-cs"/>
+              </a:endParaRPr>
+            </a:p>
+          </p:txBody>
+        </p:sp>
+        <p:sp>
+          <p:nvSpPr>
+            <p:cNvPr id="12" name="Cube 11">
+              <a:extLst>
+                <a:ext uri="{FF2B5EF4-FFF2-40B4-BE49-F238E27FC236}">
+                  <a16:creationId xmlns:a16="http://schemas.microsoft.com/office/drawing/2014/main" id="{C00A4BF3-BB4C-5641-A2AA-2E58B938CBEE}"/>
+                </a:ext>
+              </a:extLst>
+            </p:cNvPr>
+            <p:cNvSpPr/>
+            <p:nvPr/>
+          </p:nvSpPr>
+          <p:spPr>
+            <a:xfrm>
+              <a:off x="8065710" y="2460210"/>
+              <a:ext cx="1901188" cy="1633887"/>
+            </a:xfrm>
+            <a:prstGeom prst="cube">
+              <a:avLst/>
+            </a:prstGeom>
+            <a:solidFill>
+              <a:srgbClr val="052A48"/>
+            </a:solidFill>
+            <a:ln w="28575" cap="flat" cmpd="sng" algn="ctr">
+              <a:solidFill>
+                <a:schemeClr val="bg1"/>
+              </a:solidFill>
+              <a:prstDash val="solid"/>
+            </a:ln>
+            <a:effectLst/>
+          </p:spPr>
+          <p:txBody>
+            <a:bodyPr rtlCol="0" anchor="ctr"/>
+            <a:lstStyle/>
+            <a:p>
+              <a:pPr marL="0" marR="0" lvl="0" indent="0" algn="ctr" defTabSz="914400" eaLnBrk="1" fontAlgn="auto" latinLnBrk="0" hangingPunct="1">
+                <a:lnSpc>
+                  <a:spcPct val="100000"/>
+                </a:lnSpc>
+                <a:spcBef>
+                  <a:spcPts val="0"/>
+                </a:spcBef>
+                <a:spcAft>
+                  <a:spcPts val="0"/>
+                </a:spcAft>
+                <a:buClrTx/>
+                <a:buSzTx/>
+                <a:buFontTx/>
+                <a:buNone/>
+                <a:tabLst/>
+                <a:defRPr/>
+              </a:pPr>
+              <a:endParaRPr kumimoji="0" lang="en-US" sz="1800" b="0" i="0" u="none" strike="noStrike" kern="0" cap="none" spc="0" normalizeH="0" baseline="0" noProof="0">
+                <a:ln>
+                  <a:noFill/>
+                </a:ln>
+                <a:solidFill>
+                  <a:sysClr val="window" lastClr="FFFFFF"/>
+                </a:solidFill>
+                <a:effectLst/>
+                <a:uLnTx/>
+                <a:uFillTx/>
+                <a:latin typeface="Calibri"/>
+                <a:ea typeface="+mn-ea"/>
+                <a:cs typeface="+mn-cs"/>
+              </a:endParaRPr>
+            </a:p>
+          </p:txBody>
+        </p:sp>
+        <p:sp>
+          <p:nvSpPr>
+            <p:cNvPr id="14" name="Cube 13">
+              <a:extLst>
+                <a:ext uri="{FF2B5EF4-FFF2-40B4-BE49-F238E27FC236}">
+                  <a16:creationId xmlns:a16="http://schemas.microsoft.com/office/drawing/2014/main" id="{FABCCDBB-C8F8-0D45-ACE1-F2982E06CA83}"/>
+                </a:ext>
+              </a:extLst>
+            </p:cNvPr>
+            <p:cNvSpPr/>
+            <p:nvPr/>
+          </p:nvSpPr>
+          <p:spPr>
+            <a:xfrm>
+              <a:off x="7635099" y="4225572"/>
+              <a:ext cx="1901188" cy="1633887"/>
+            </a:xfrm>
+            <a:prstGeom prst="cube">
+              <a:avLst/>
+            </a:prstGeom>
+            <a:solidFill>
+              <a:srgbClr val="052A48"/>
+            </a:solidFill>
+            <a:ln w="28575" cap="flat" cmpd="sng" algn="ctr">
+              <a:solidFill>
+                <a:srgbClr val="FFFFFF"/>
+              </a:solidFill>
+              <a:prstDash val="solid"/>
+            </a:ln>
+            <a:effectLst/>
+          </p:spPr>
+          <p:txBody>
+            <a:bodyPr rtlCol="0" anchor="ctr"/>
+            <a:lstStyle/>
+            <a:p>
+              <a:pPr marL="0" marR="0" lvl="0" indent="0" algn="ctr" defTabSz="914400" eaLnBrk="1" fontAlgn="auto" latinLnBrk="0" hangingPunct="1">
+                <a:lnSpc>
+                  <a:spcPct val="100000"/>
+                </a:lnSpc>
+                <a:spcBef>
+                  <a:spcPts val="0"/>
+                </a:spcBef>
+                <a:spcAft>
+                  <a:spcPts val="0"/>
+                </a:spcAft>
+                <a:buClrTx/>
+                <a:buSzTx/>
+                <a:buFontTx/>
+                <a:buNone/>
+                <a:tabLst/>
+                <a:defRPr/>
+              </a:pPr>
+              <a:endParaRPr kumimoji="0" lang="en-US" sz="1800" b="0" i="0" u="none" strike="noStrike" kern="0" cap="none" spc="0" normalizeH="0" baseline="0" noProof="0">
+                <a:ln>
+                  <a:noFill/>
+                </a:ln>
+                <a:solidFill>
+                  <a:sysClr val="window" lastClr="FFFFFF"/>
+                </a:solidFill>
+                <a:effectLst/>
+                <a:uLnTx/>
+                <a:uFillTx/>
+                <a:latin typeface="Calibri"/>
+                <a:ea typeface="+mn-ea"/>
+                <a:cs typeface="+mn-cs"/>
+              </a:endParaRPr>
+            </a:p>
+          </p:txBody>
+        </p:sp>
+        <p:sp>
+          <p:nvSpPr>
+            <p:cNvPr id="16" name="Cube 15">
+              <a:extLst>
+                <a:ext uri="{FF2B5EF4-FFF2-40B4-BE49-F238E27FC236}">
+                  <a16:creationId xmlns:a16="http://schemas.microsoft.com/office/drawing/2014/main" id="{476DEF7D-B377-2442-B052-620C8D9FE4DA}"/>
+                </a:ext>
+              </a:extLst>
+            </p:cNvPr>
+            <p:cNvSpPr/>
+            <p:nvPr/>
+          </p:nvSpPr>
+          <p:spPr>
+            <a:xfrm>
+              <a:off x="7635099" y="2934419"/>
+              <a:ext cx="1901188" cy="1633887"/>
+            </a:xfrm>
+            <a:prstGeom prst="cube">
+              <a:avLst/>
+            </a:prstGeom>
+            <a:solidFill>
+              <a:srgbClr val="052A48"/>
+            </a:solidFill>
+            <a:ln w="28575" cap="flat" cmpd="sng" algn="ctr">
+              <a:solidFill>
+                <a:schemeClr val="bg1"/>
+              </a:solidFill>
+              <a:prstDash val="solid"/>
+            </a:ln>
+            <a:effectLst/>
+          </p:spPr>
+          <p:txBody>
+            <a:bodyPr rtlCol="0" anchor="ctr"/>
+            <a:lstStyle/>
+            <a:p>
+              <a:pPr marL="0" marR="0" lvl="0" indent="0" algn="ctr" defTabSz="914400" eaLnBrk="1" fontAlgn="auto" latinLnBrk="0" hangingPunct="1">
+                <a:lnSpc>
+                  <a:spcPct val="100000"/>
+                </a:lnSpc>
+                <a:spcBef>
+                  <a:spcPts val="0"/>
+                </a:spcBef>
+                <a:spcAft>
+                  <a:spcPts val="0"/>
+                </a:spcAft>
+                <a:buClrTx/>
+                <a:buSzTx/>
+                <a:buFontTx/>
+                <a:buNone/>
+                <a:tabLst/>
+                <a:defRPr/>
+              </a:pPr>
+              <a:endParaRPr kumimoji="0" lang="en-US" sz="1800" b="0" i="0" u="none" strike="noStrike" kern="0" cap="none" spc="0" normalizeH="0" baseline="0" noProof="0">
+                <a:ln>
+                  <a:noFill/>
+                </a:ln>
+                <a:solidFill>
+                  <a:sysClr val="window" lastClr="FFFFFF"/>
+                </a:solidFill>
+                <a:effectLst/>
+                <a:uLnTx/>
+                <a:uFillTx/>
+                <a:latin typeface="Calibri"/>
+                <a:ea typeface="+mn-ea"/>
+                <a:cs typeface="+mn-cs"/>
+              </a:endParaRPr>
+            </a:p>
+          </p:txBody>
+        </p:sp>
+      </p:grpSp>
+      <p:grpSp>
+        <p:nvGrpSpPr>
+          <p:cNvPr id="24" name="Group 23">
+            <a:extLst>
+              <a:ext uri="{FF2B5EF4-FFF2-40B4-BE49-F238E27FC236}">
+                <a16:creationId xmlns:a16="http://schemas.microsoft.com/office/drawing/2014/main" id="{E9D50164-93F3-9341-BE77-EF668DFDE85A}"/>
+              </a:ext>
+            </a:extLst>
+          </p:cNvPr>
+          <p:cNvGrpSpPr>
+            <a:grpSpLocks noChangeAspect="1"/>
+          </p:cNvGrpSpPr>
+          <p:nvPr/>
+        </p:nvGrpSpPr>
+        <p:grpSpPr>
+          <a:xfrm>
+            <a:off x="3446932" y="1600486"/>
+            <a:ext cx="2037088" cy="1767487"/>
+            <a:chOff x="7635099" y="2460210"/>
+            <a:chExt cx="3917748" cy="3399249"/>
+          </a:xfrm>
+        </p:grpSpPr>
+        <p:sp>
+          <p:nvSpPr>
+            <p:cNvPr id="25" name="Cube 24">
+              <a:extLst>
+                <a:ext uri="{FF2B5EF4-FFF2-40B4-BE49-F238E27FC236}">
+                  <a16:creationId xmlns:a16="http://schemas.microsoft.com/office/drawing/2014/main" id="{98EE61E4-E6D0-D84B-A72C-C47BB6962BC4}"/>
+                </a:ext>
+              </a:extLst>
+            </p:cNvPr>
+            <p:cNvSpPr/>
+            <p:nvPr/>
+          </p:nvSpPr>
+          <p:spPr>
+            <a:xfrm>
+              <a:off x="8065710" y="3751363"/>
+              <a:ext cx="1901188" cy="1633887"/>
+            </a:xfrm>
+            <a:prstGeom prst="cube">
+              <a:avLst/>
+            </a:prstGeom>
+            <a:solidFill>
+              <a:srgbClr val="052A48"/>
+            </a:solidFill>
+            <a:ln w="28575" cap="flat" cmpd="sng" algn="ctr">
+              <a:solidFill>
+                <a:srgbClr val="FFFFFF"/>
+              </a:solidFill>
+              <a:prstDash val="solid"/>
+            </a:ln>
+            <a:effectLst/>
+          </p:spPr>
+          <p:txBody>
+            <a:bodyPr rtlCol="0" anchor="ctr"/>
+            <a:lstStyle/>
+            <a:p>
+              <a:pPr marL="0" marR="0" lvl="0" indent="0" algn="ctr" defTabSz="914400" eaLnBrk="1" fontAlgn="auto" latinLnBrk="0" hangingPunct="1">
+                <a:lnSpc>
+                  <a:spcPct val="100000"/>
+                </a:lnSpc>
+                <a:spcBef>
+                  <a:spcPts val="0"/>
+                </a:spcBef>
+                <a:spcAft>
+                  <a:spcPts val="0"/>
+                </a:spcAft>
+                <a:buClrTx/>
+                <a:buSzTx/>
+                <a:buFontTx/>
+                <a:buNone/>
+                <a:tabLst/>
+                <a:defRPr/>
+              </a:pPr>
+              <a:endParaRPr kumimoji="0" lang="en-US" sz="1800" b="0" i="0" u="none" strike="noStrike" kern="0" cap="none" spc="0" normalizeH="0" baseline="0" noProof="0">
+                <a:ln>
+                  <a:noFill/>
+                </a:ln>
+                <a:solidFill>
+                  <a:sysClr val="window" lastClr="FFFFFF"/>
+                </a:solidFill>
+                <a:effectLst/>
+                <a:uLnTx/>
+                <a:uFillTx/>
+                <a:latin typeface="Calibri"/>
+                <a:ea typeface="+mn-ea"/>
+                <a:cs typeface="+mn-cs"/>
+              </a:endParaRPr>
+            </a:p>
+          </p:txBody>
+        </p:sp>
+        <p:sp>
+          <p:nvSpPr>
+            <p:cNvPr id="26" name="Cube 25">
+              <a:extLst>
+                <a:ext uri="{FF2B5EF4-FFF2-40B4-BE49-F238E27FC236}">
+                  <a16:creationId xmlns:a16="http://schemas.microsoft.com/office/drawing/2014/main" id="{372AFCA4-87AD-6149-8A23-DE2454EF17DA}"/>
+                </a:ext>
+              </a:extLst>
+            </p:cNvPr>
+            <p:cNvSpPr/>
+            <p:nvPr/>
+          </p:nvSpPr>
+          <p:spPr>
+            <a:xfrm>
+              <a:off x="9651659" y="3751363"/>
+              <a:ext cx="1901188" cy="1633887"/>
+            </a:xfrm>
+            <a:prstGeom prst="cube">
+              <a:avLst/>
+            </a:prstGeom>
+            <a:solidFill>
+              <a:srgbClr val="052A48"/>
+            </a:solidFill>
+            <a:ln w="28575" cap="flat" cmpd="sng" algn="ctr">
+              <a:solidFill>
+                <a:srgbClr val="FFFFFF"/>
+              </a:solidFill>
+              <a:prstDash val="solid"/>
+            </a:ln>
+            <a:effectLst/>
+          </p:spPr>
+          <p:txBody>
+            <a:bodyPr rtlCol="0" anchor="ctr"/>
+            <a:lstStyle/>
+            <a:p>
+              <a:pPr marL="0" marR="0" lvl="0" indent="0" algn="ctr" defTabSz="914400" eaLnBrk="1" fontAlgn="auto" latinLnBrk="0" hangingPunct="1">
+                <a:lnSpc>
+                  <a:spcPct val="100000"/>
+                </a:lnSpc>
+                <a:spcBef>
+                  <a:spcPts val="0"/>
+                </a:spcBef>
+                <a:spcAft>
+                  <a:spcPts val="0"/>
+                </a:spcAft>
+                <a:buClrTx/>
+                <a:buSzTx/>
+                <a:buFontTx/>
+                <a:buNone/>
+                <a:tabLst/>
+                <a:defRPr/>
+              </a:pPr>
+              <a:endParaRPr kumimoji="0" lang="en-US" sz="1800" b="0" i="0" u="none" strike="noStrike" kern="0" cap="none" spc="0" normalizeH="0" baseline="0" noProof="0">
+                <a:ln>
+                  <a:noFill/>
+                </a:ln>
+                <a:solidFill>
+                  <a:sysClr val="window" lastClr="FFFFFF"/>
+                </a:solidFill>
+                <a:effectLst/>
+                <a:uLnTx/>
+                <a:uFillTx/>
+                <a:latin typeface="Calibri"/>
+                <a:ea typeface="+mn-ea"/>
+                <a:cs typeface="+mn-cs"/>
+              </a:endParaRPr>
+            </a:p>
+          </p:txBody>
+        </p:sp>
+        <p:sp>
+          <p:nvSpPr>
+            <p:cNvPr id="27" name="Cube 26">
+              <a:extLst>
+                <a:ext uri="{FF2B5EF4-FFF2-40B4-BE49-F238E27FC236}">
+                  <a16:creationId xmlns:a16="http://schemas.microsoft.com/office/drawing/2014/main" id="{F10E446A-3CF2-7F4F-894F-947AE8391EFE}"/>
+                </a:ext>
+              </a:extLst>
+            </p:cNvPr>
+            <p:cNvSpPr/>
+            <p:nvPr/>
+          </p:nvSpPr>
+          <p:spPr>
+            <a:xfrm>
+              <a:off x="8065710" y="2460210"/>
+              <a:ext cx="1901188" cy="1633887"/>
+            </a:xfrm>
+            <a:prstGeom prst="cube">
+              <a:avLst/>
+            </a:prstGeom>
+            <a:solidFill>
+              <a:srgbClr val="052A48"/>
+            </a:solidFill>
+            <a:ln w="28575" cap="flat" cmpd="sng" algn="ctr">
+              <a:solidFill>
+                <a:schemeClr val="bg1"/>
+              </a:solidFill>
+              <a:prstDash val="solid"/>
+            </a:ln>
+            <a:effectLst/>
+          </p:spPr>
+          <p:txBody>
+            <a:bodyPr rtlCol="0" anchor="ctr"/>
+            <a:lstStyle/>
+            <a:p>
+              <a:pPr marL="0" marR="0" lvl="0" indent="0" algn="ctr" defTabSz="914400" eaLnBrk="1" fontAlgn="auto" latinLnBrk="0" hangingPunct="1">
+                <a:lnSpc>
+                  <a:spcPct val="100000"/>
+                </a:lnSpc>
+                <a:spcBef>
+                  <a:spcPts val="0"/>
+                </a:spcBef>
+                <a:spcAft>
+                  <a:spcPts val="0"/>
+                </a:spcAft>
+                <a:buClrTx/>
+                <a:buSzTx/>
+                <a:buFontTx/>
+                <a:buNone/>
+                <a:tabLst/>
+                <a:defRPr/>
+              </a:pPr>
+              <a:endParaRPr kumimoji="0" lang="en-US" sz="1800" b="0" i="0" u="none" strike="noStrike" kern="0" cap="none" spc="0" normalizeH="0" baseline="0" noProof="0">
+                <a:ln>
+                  <a:noFill/>
+                </a:ln>
+                <a:solidFill>
+                  <a:sysClr val="window" lastClr="FFFFFF"/>
+                </a:solidFill>
+                <a:effectLst/>
+                <a:uLnTx/>
+                <a:uFillTx/>
+                <a:latin typeface="Calibri"/>
+                <a:ea typeface="+mn-ea"/>
+                <a:cs typeface="+mn-cs"/>
+              </a:endParaRPr>
+            </a:p>
+          </p:txBody>
+        </p:sp>
+        <p:sp>
+          <p:nvSpPr>
+            <p:cNvPr id="28" name="Cube 27">
+              <a:extLst>
+                <a:ext uri="{FF2B5EF4-FFF2-40B4-BE49-F238E27FC236}">
+                  <a16:creationId xmlns:a16="http://schemas.microsoft.com/office/drawing/2014/main" id="{D0C568F2-65AC-B143-951C-4760DA0F53E6}"/>
+                </a:ext>
+              </a:extLst>
+            </p:cNvPr>
+            <p:cNvSpPr/>
+            <p:nvPr/>
+          </p:nvSpPr>
+          <p:spPr>
+            <a:xfrm>
+              <a:off x="7635099" y="4225572"/>
+              <a:ext cx="1901188" cy="1633887"/>
+            </a:xfrm>
+            <a:prstGeom prst="cube">
+              <a:avLst/>
+            </a:prstGeom>
+            <a:solidFill>
+              <a:srgbClr val="052A48"/>
+            </a:solidFill>
+            <a:ln w="28575" cap="flat" cmpd="sng" algn="ctr">
+              <a:solidFill>
+                <a:srgbClr val="FFFFFF"/>
+              </a:solidFill>
+              <a:prstDash val="solid"/>
+            </a:ln>
+            <a:effectLst/>
+          </p:spPr>
+          <p:txBody>
+            <a:bodyPr rtlCol="0" anchor="ctr"/>
+            <a:lstStyle/>
+            <a:p>
+              <a:pPr marL="0" marR="0" lvl="0" indent="0" algn="ctr" defTabSz="914400" eaLnBrk="1" fontAlgn="auto" latinLnBrk="0" hangingPunct="1">
+                <a:lnSpc>
+                  <a:spcPct val="100000"/>
+                </a:lnSpc>
+                <a:spcBef>
+                  <a:spcPts val="0"/>
+                </a:spcBef>
+                <a:spcAft>
+                  <a:spcPts val="0"/>
+                </a:spcAft>
+                <a:buClrTx/>
+                <a:buSzTx/>
+                <a:buFontTx/>
+                <a:buNone/>
+                <a:tabLst/>
+                <a:defRPr/>
+              </a:pPr>
+              <a:endParaRPr kumimoji="0" lang="en-US" sz="1800" b="0" i="0" u="none" strike="noStrike" kern="0" cap="none" spc="0" normalizeH="0" baseline="0" noProof="0">
+                <a:ln>
+                  <a:noFill/>
+                </a:ln>
+                <a:solidFill>
+                  <a:sysClr val="window" lastClr="FFFFFF"/>
+                </a:solidFill>
+                <a:effectLst/>
+                <a:uLnTx/>
+                <a:uFillTx/>
+                <a:latin typeface="Calibri"/>
+                <a:ea typeface="+mn-ea"/>
+                <a:cs typeface="+mn-cs"/>
+              </a:endParaRPr>
+            </a:p>
+          </p:txBody>
+        </p:sp>
+        <p:sp>
+          <p:nvSpPr>
+            <p:cNvPr id="29" name="Cube 28">
+              <a:extLst>
+                <a:ext uri="{FF2B5EF4-FFF2-40B4-BE49-F238E27FC236}">
+                  <a16:creationId xmlns:a16="http://schemas.microsoft.com/office/drawing/2014/main" id="{6E2CF3BD-5B09-AC45-95DB-E8BB46715AFC}"/>
+                </a:ext>
+              </a:extLst>
+            </p:cNvPr>
+            <p:cNvSpPr/>
+            <p:nvPr/>
+          </p:nvSpPr>
+          <p:spPr>
+            <a:xfrm>
+              <a:off x="7635099" y="2934419"/>
+              <a:ext cx="1901188" cy="1633887"/>
+            </a:xfrm>
+            <a:prstGeom prst="cube">
+              <a:avLst/>
+            </a:prstGeom>
+            <a:solidFill>
+              <a:srgbClr val="052A48"/>
+            </a:solidFill>
+            <a:ln w="28575" cap="flat" cmpd="sng" algn="ctr">
+              <a:solidFill>
+                <a:schemeClr val="bg1"/>
+              </a:solidFill>
+              <a:prstDash val="solid"/>
+            </a:ln>
+            <a:effectLst/>
+          </p:spPr>
+          <p:txBody>
+            <a:bodyPr rtlCol="0" anchor="ctr"/>
+            <a:lstStyle/>
+            <a:p>
+              <a:pPr marL="0" marR="0" lvl="0" indent="0" algn="ctr" defTabSz="914400" eaLnBrk="1" fontAlgn="auto" latinLnBrk="0" hangingPunct="1">
+                <a:lnSpc>
+                  <a:spcPct val="100000"/>
+                </a:lnSpc>
+                <a:spcBef>
+                  <a:spcPts val="0"/>
+                </a:spcBef>
+                <a:spcAft>
+                  <a:spcPts val="0"/>
+                </a:spcAft>
+                <a:buClrTx/>
+                <a:buSzTx/>
+                <a:buFontTx/>
+                <a:buNone/>
+                <a:tabLst/>
+                <a:defRPr/>
+              </a:pPr>
+              <a:endParaRPr kumimoji="0" lang="en-US" sz="1800" b="0" i="0" u="none" strike="noStrike" kern="0" cap="none" spc="0" normalizeH="0" baseline="0" noProof="0">
+                <a:ln>
+                  <a:noFill/>
+                </a:ln>
+                <a:solidFill>
+                  <a:sysClr val="window" lastClr="FFFFFF"/>
+                </a:solidFill>
+                <a:effectLst/>
+                <a:uLnTx/>
+                <a:uFillTx/>
+                <a:latin typeface="Calibri"/>
+                <a:ea typeface="+mn-ea"/>
+                <a:cs typeface="+mn-cs"/>
+              </a:endParaRPr>
+            </a:p>
+          </p:txBody>
+        </p:sp>
+      </p:grpSp>
+      <p:sp>
+        <p:nvSpPr>
+          <p:cNvPr id="30" name="Cube 29">
+            <a:extLst>
+              <a:ext uri="{FF2B5EF4-FFF2-40B4-BE49-F238E27FC236}">
+                <a16:creationId xmlns:a16="http://schemas.microsoft.com/office/drawing/2014/main" id="{E3A5EB04-0E97-CB42-8448-88F44782776D}"/>
+              </a:ext>
+            </a:extLst>
+          </p:cNvPr>
+          <p:cNvSpPr/>
+          <p:nvPr/>
+        </p:nvSpPr>
+        <p:spPr>
+          <a:xfrm>
+            <a:off x="4495471" y="1593423"/>
+            <a:ext cx="988549" cy="849562"/>
+          </a:xfrm>
+          <a:prstGeom prst="cube">
+            <a:avLst/>
+          </a:prstGeom>
+          <a:solidFill>
+            <a:srgbClr val="C00000"/>
+          </a:solidFill>
+          <a:ln w="28575" cap="flat" cmpd="sng" algn="ctr">
+            <a:solidFill>
+              <a:srgbClr val="FFFFFF"/>
+            </a:solidFill>
+            <a:prstDash val="solid"/>
+          </a:ln>
+          <a:effectLst/>
+        </p:spPr>
+        <p:txBody>
+          <a:bodyPr rtlCol="0" anchor="ctr"/>
+          <a:lstStyle/>
+          <a:p>
+            <a:pPr marL="0" marR="0" lvl="0" indent="0" algn="ctr" defTabSz="914400" eaLnBrk="1" fontAlgn="auto" latinLnBrk="0" hangingPunct="1">
+              <a:lnSpc>
+                <a:spcPct val="100000"/>
+              </a:lnSpc>
+              <a:spcBef>
+                <a:spcPts val="0"/>
+              </a:spcBef>
+              <a:spcAft>
+                <a:spcPts val="0"/>
+              </a:spcAft>
+              <a:buClrTx/>
+              <a:buSzTx/>
+              <a:buFontTx/>
+              <a:buNone/>
+              <a:tabLst/>
+              <a:defRPr/>
+            </a:pPr>
+            <a:endParaRPr kumimoji="0" lang="en-US" sz="1800" b="0" i="0" u="none" strike="noStrike" kern="0" cap="none" spc="0" normalizeH="0" baseline="0" noProof="0">
+              <a:ln>
+                <a:noFill/>
+              </a:ln>
+              <a:solidFill>
+                <a:sysClr val="window" lastClr="FFFFFF"/>
+              </a:solidFill>
+              <a:effectLst/>
+              <a:uLnTx/>
+              <a:uFillTx/>
+              <a:latin typeface="Calibri"/>
+              <a:ea typeface="+mn-ea"/>
+              <a:cs typeface="+mn-cs"/>
+            </a:endParaRPr>
+          </a:p>
+        </p:txBody>
+      </p:sp>
+    </p:spTree>
+    <p:extLst>
+      <p:ext uri="{BB962C8B-B14F-4D97-AF65-F5344CB8AC3E}">
+        <p14:creationId xmlns:p14="http://schemas.microsoft.com/office/powerpoint/2010/main" val="1025323820"/>
       </p:ext>
     </p:extLst>
   </p:cSld>
@@ -13427,7 +14606,7 @@
   <a:extraClrSchemeLst/>
   <a:extLst>
     <a:ext uri="{05A4C25C-085E-4340-85A3-A5531E510DB2}">
-      <thm15:themeFamily xmlns="" xmlns:thm15="http://schemas.microsoft.com/office/thememl/2012/main" name="Office Theme" id="{62F939B6-93AF-4DB8-9C6B-D6C7DFDC589F}" vid="{4A3C46E8-61CC-4603-A589-7422A47A8E4A}"/>
+      <thm15:themeFamily xmlns:thm15="http://schemas.microsoft.com/office/thememl/2012/main" name="Office Theme" id="{62F939B6-93AF-4DB8-9C6B-D6C7DFDC589F}" vid="{4A3C46E8-61CC-4603-A589-7422A47A8E4A}"/>
     </a:ext>
   </a:extLst>
 </a:theme>

</xml_diff>

<commit_message>
Add missing thumbnail for generic data chunk iterator tutorial (#727)
</commit_message>
<xml_diff>
--- a/docs/source/figures/gallery_thumbnails.pptx
+++ b/docs/source/figures/gallery_thumbnails.pptx
@@ -5,13 +5,14 @@
     <p:sldMasterId id="2147483660" r:id="rId1"/>
   </p:sldMasterIdLst>
   <p:notesMasterIdLst>
-    <p:notesMasterId r:id="rId6"/>
+    <p:notesMasterId r:id="rId7"/>
   </p:notesMasterIdLst>
   <p:sldIdLst>
     <p:sldId id="342" r:id="rId2"/>
     <p:sldId id="343" r:id="rId3"/>
     <p:sldId id="344" r:id="rId4"/>
     <p:sldId id="345" r:id="rId5"/>
+    <p:sldId id="346" r:id="rId6"/>
   </p:sldIdLst>
   <p:sldSz cx="12192000" cy="6858000"/>
   <p:notesSz cx="6858000" cy="9144000"/>
@@ -112,7 +113,18 @@
   </p:defaultTextStyle>
   <p:extLst>
     <p:ext uri="{EFAFB233-063F-42B5-8137-9DF3F51BA10A}">
-      <p15:sldGuideLst xmlns="" xmlns:p15="http://schemas.microsoft.com/office/powerpoint/2012/main"/>
+      <p15:sldGuideLst xmlns:p15="http://schemas.microsoft.com/office/powerpoint/2012/main">
+        <p15:guide id="1" orient="horz" pos="762">
+          <p15:clr>
+            <a:srgbClr val="A4A3A4"/>
+          </p15:clr>
+        </p15:guide>
+        <p15:guide id="2" pos="7410">
+          <p15:clr>
+            <a:srgbClr val="A4A3A4"/>
+          </p15:clr>
+        </p15:guide>
+      </p15:sldGuideLst>
     </p:ext>
   </p:extLst>
 </p:presentation>
@@ -200,7 +212,7 @@
           <a:p>
             <a:fld id="{4D6A40B9-902A-4E0E-AF39-1C357549AEE0}" type="datetimeFigureOut">
               <a:rPr lang="en-US" smtClean="0"/>
-              <a:t>4/14/21</a:t>
+              <a:t>4/21/22</a:t>
             </a:fld>
             <a:endParaRPr lang="en-US"/>
           </a:p>
@@ -467,6 +479,90 @@
 </p:notesMaster>
 </file>
 
+<file path=ppt/notesSlides/notesSlide1.xml><?xml version="1.0" encoding="utf-8"?>
+<p:notes xmlns:a="http://schemas.openxmlformats.org/drawingml/2006/main" xmlns:r="http://schemas.openxmlformats.org/officeDocument/2006/relationships" xmlns:p="http://schemas.openxmlformats.org/presentationml/2006/main">
+  <p:cSld>
+    <p:spTree>
+      <p:nvGrpSpPr>
+        <p:cNvPr id="1" name=""/>
+        <p:cNvGrpSpPr/>
+        <p:nvPr/>
+      </p:nvGrpSpPr>
+      <p:grpSpPr>
+        <a:xfrm>
+          <a:off x="0" y="0"/>
+          <a:ext cx="0" cy="0"/>
+          <a:chOff x="0" y="0"/>
+          <a:chExt cx="0" cy="0"/>
+        </a:xfrm>
+      </p:grpSpPr>
+      <p:sp>
+        <p:nvSpPr>
+          <p:cNvPr id="2" name="Slide Image Placeholder 1"/>
+          <p:cNvSpPr>
+            <a:spLocks noGrp="1" noRot="1" noChangeAspect="1"/>
+          </p:cNvSpPr>
+          <p:nvPr>
+            <p:ph type="sldImg"/>
+          </p:nvPr>
+        </p:nvSpPr>
+        <p:spPr/>
+      </p:sp>
+      <p:sp>
+        <p:nvSpPr>
+          <p:cNvPr id="3" name="Notes Placeholder 2"/>
+          <p:cNvSpPr>
+            <a:spLocks noGrp="1"/>
+          </p:cNvSpPr>
+          <p:nvPr>
+            <p:ph type="body" idx="1"/>
+          </p:nvPr>
+        </p:nvSpPr>
+        <p:spPr/>
+        <p:txBody>
+          <a:bodyPr/>
+          <a:lstStyle/>
+          <a:p>
+            <a:endParaRPr lang="en-US" dirty="0"/>
+          </a:p>
+        </p:txBody>
+      </p:sp>
+      <p:sp>
+        <p:nvSpPr>
+          <p:cNvPr id="4" name="Slide Number Placeholder 3"/>
+          <p:cNvSpPr>
+            <a:spLocks noGrp="1"/>
+          </p:cNvSpPr>
+          <p:nvPr>
+            <p:ph type="sldNum" sz="quarter" idx="5"/>
+          </p:nvPr>
+        </p:nvSpPr>
+        <p:spPr/>
+        <p:txBody>
+          <a:bodyPr/>
+          <a:lstStyle/>
+          <a:p>
+            <a:fld id="{88156F16-9966-4EDC-933D-6170A05B6017}" type="slidenum">
+              <a:rPr lang="en-US" smtClean="0"/>
+              <a:t>5</a:t>
+            </a:fld>
+            <a:endParaRPr lang="en-US"/>
+          </a:p>
+        </p:txBody>
+      </p:sp>
+    </p:spTree>
+    <p:extLst>
+      <p:ext uri="{BB962C8B-B14F-4D97-AF65-F5344CB8AC3E}">
+        <p14:creationId xmlns:p14="http://schemas.microsoft.com/office/powerpoint/2010/main" val="1595721762"/>
+      </p:ext>
+    </p:extLst>
+  </p:cSld>
+  <p:clrMapOvr>
+    <a:masterClrMapping/>
+  </p:clrMapOvr>
+</p:notes>
+</file>
+
 <file path=ppt/slideLayouts/slideLayout1.xml><?xml version="1.0" encoding="utf-8"?>
 <p:sldLayout xmlns:a="http://schemas.openxmlformats.org/drawingml/2006/main" xmlns:r="http://schemas.openxmlformats.org/officeDocument/2006/relationships" xmlns:p="http://schemas.openxmlformats.org/presentationml/2006/main" matchingName="Title slide" type="title" preserve="1">
   <p:cSld name="Title slide">
@@ -1280,7 +1376,7 @@
           <p:cNvPr id="4" name="Text Placeholder 3">
             <a:extLst>
               <a:ext uri="{FF2B5EF4-FFF2-40B4-BE49-F238E27FC236}">
-                <a16:creationId xmlns="" xmlns:a16="http://schemas.microsoft.com/office/drawing/2014/main" id="{8850B379-F419-41FB-9123-96081B074583}"/>
+                <a16:creationId xmlns:a16="http://schemas.microsoft.com/office/drawing/2014/main" id="{8850B379-F419-41FB-9123-96081B074583}"/>
               </a:ext>
             </a:extLst>
           </p:cNvPr>
@@ -1571,7 +1667,7 @@
           <p:cNvPr id="5" name="Picture 4">
             <a:extLst>
               <a:ext uri="{FF2B5EF4-FFF2-40B4-BE49-F238E27FC236}">
-                <a16:creationId xmlns="" xmlns:a16="http://schemas.microsoft.com/office/drawing/2014/main" id="{A5059957-9534-4FB9-8820-2343C3BF0E8F}"/>
+                <a16:creationId xmlns:a16="http://schemas.microsoft.com/office/drawing/2014/main" id="{A5059957-9534-4FB9-8820-2343C3BF0E8F}"/>
               </a:ext>
             </a:extLst>
           </p:cNvPr>
@@ -1601,7 +1697,7 @@
           <p:cNvPr id="4" name="Text Placeholder 3">
             <a:extLst>
               <a:ext uri="{FF2B5EF4-FFF2-40B4-BE49-F238E27FC236}">
-                <a16:creationId xmlns="" xmlns:a16="http://schemas.microsoft.com/office/drawing/2014/main" id="{8850B379-F419-41FB-9123-96081B074583}"/>
+                <a16:creationId xmlns:a16="http://schemas.microsoft.com/office/drawing/2014/main" id="{8850B379-F419-41FB-9123-96081B074583}"/>
               </a:ext>
             </a:extLst>
           </p:cNvPr>
@@ -1958,7 +2054,7 @@
           <p:cNvPr id="7" name="Google Shape;20;p4">
             <a:extLst>
               <a:ext uri="{FF2B5EF4-FFF2-40B4-BE49-F238E27FC236}">
-                <a16:creationId xmlns="" xmlns:a16="http://schemas.microsoft.com/office/drawing/2014/main" id="{537643E4-B983-42CC-9421-9C4C107A5DA4}"/>
+                <a16:creationId xmlns:a16="http://schemas.microsoft.com/office/drawing/2014/main" id="{537643E4-B983-42CC-9421-9C4C107A5DA4}"/>
               </a:ext>
             </a:extLst>
           </p:cNvPr>
@@ -3356,7 +3452,7 @@
         </p:nvGraphicFramePr>
         <p:xfrm>
           <a:off x="1020118" y="2187577"/>
-          <a:ext cx="6880609" cy="3074538"/>
+          <a:ext cx="6880609" cy="3074539"/>
         </p:xfrm>
         <a:graphic>
           <a:graphicData uri="http://schemas.openxmlformats.org/drawingml/2006/table">
@@ -3365,13 +3461,55 @@
                 <a:tableStyleId>{5C22544A-7EE6-4342-B048-85BDC9FD1C3A}</a:tableStyleId>
               </a:tblPr>
               <a:tblGrid>
-                <a:gridCol w="982944"/>
-                <a:gridCol w="982944"/>
-                <a:gridCol w="982944"/>
-                <a:gridCol w="982944"/>
-                <a:gridCol w="982945"/>
-                <a:gridCol w="982944"/>
-                <a:gridCol w="982944"/>
+                <a:gridCol w="982944">
+                  <a:extLst>
+                    <a:ext uri="{9D8B030D-6E8A-4147-A177-3AD203B41FA5}">
+                      <a16:colId xmlns:a16="http://schemas.microsoft.com/office/drawing/2014/main" val="20000"/>
+                    </a:ext>
+                  </a:extLst>
+                </a:gridCol>
+                <a:gridCol w="982944">
+                  <a:extLst>
+                    <a:ext uri="{9D8B030D-6E8A-4147-A177-3AD203B41FA5}">
+                      <a16:colId xmlns:a16="http://schemas.microsoft.com/office/drawing/2014/main" val="20001"/>
+                    </a:ext>
+                  </a:extLst>
+                </a:gridCol>
+                <a:gridCol w="982944">
+                  <a:extLst>
+                    <a:ext uri="{9D8B030D-6E8A-4147-A177-3AD203B41FA5}">
+                      <a16:colId xmlns:a16="http://schemas.microsoft.com/office/drawing/2014/main" val="20002"/>
+                    </a:ext>
+                  </a:extLst>
+                </a:gridCol>
+                <a:gridCol w="982944">
+                  <a:extLst>
+                    <a:ext uri="{9D8B030D-6E8A-4147-A177-3AD203B41FA5}">
+                      <a16:colId xmlns:a16="http://schemas.microsoft.com/office/drawing/2014/main" val="20003"/>
+                    </a:ext>
+                  </a:extLst>
+                </a:gridCol>
+                <a:gridCol w="982945">
+                  <a:extLst>
+                    <a:ext uri="{9D8B030D-6E8A-4147-A177-3AD203B41FA5}">
+                      <a16:colId xmlns:a16="http://schemas.microsoft.com/office/drawing/2014/main" val="20004"/>
+                    </a:ext>
+                  </a:extLst>
+                </a:gridCol>
+                <a:gridCol w="982944">
+                  <a:extLst>
+                    <a:ext uri="{9D8B030D-6E8A-4147-A177-3AD203B41FA5}">
+                      <a16:colId xmlns:a16="http://schemas.microsoft.com/office/drawing/2014/main" val="20005"/>
+                    </a:ext>
+                  </a:extLst>
+                </a:gridCol>
+                <a:gridCol w="982944">
+                  <a:extLst>
+                    <a:ext uri="{9D8B030D-6E8A-4147-A177-3AD203B41FA5}">
+                      <a16:colId xmlns:a16="http://schemas.microsoft.com/office/drawing/2014/main" val="20006"/>
+                    </a:ext>
+                  </a:extLst>
+                </a:gridCol>
               </a:tblGrid>
               <a:tr h="269255">
                 <a:tc rowSpan="2">
@@ -3380,7 +3518,7 @@
                     <a:lstStyle/>
                     <a:p>
                       <a:r>
-                        <a:rPr lang="en-US" sz="1400" b="1" dirty="0" smtClean="0">
+                        <a:rPr lang="en-US" sz="1400" b="1" dirty="0">
                           <a:solidFill>
                             <a:schemeClr val="bg1"/>
                           </a:solidFill>
@@ -3389,13 +3527,6 @@
                         </a:rPr>
                         <a:t>customer</a:t>
                       </a:r>
-                      <a:endParaRPr lang="en-US" sz="1400" b="1" dirty="0">
-                        <a:solidFill>
-                          <a:schemeClr val="bg1"/>
-                        </a:solidFill>
-                        <a:latin typeface="Arial"/>
-                        <a:cs typeface="Arial"/>
-                      </a:endParaRPr>
                     </a:p>
                   </a:txBody>
                   <a:tcPr>
@@ -3552,7 +3683,7 @@
                     <a:lstStyle/>
                     <a:p>
                       <a:r>
-                        <a:rPr lang="en-US" sz="1400" b="1" dirty="0" err="1" smtClean="0">
+                        <a:rPr lang="en-US" sz="1400" b="1" dirty="0" err="1">
                           <a:solidFill>
                             <a:srgbClr val="FFFFFF"/>
                           </a:solidFill>
@@ -3668,7 +3799,7 @@
                     <a:lstStyle/>
                     <a:p>
                       <a:r>
-                        <a:rPr lang="en-US" sz="1400" b="1" dirty="0" err="1" smtClean="0">
+                        <a:rPr lang="en-US" sz="1400" b="1" dirty="0" err="1">
                           <a:solidFill>
                             <a:srgbClr val="FFFFFF"/>
                           </a:solidFill>
@@ -3778,6 +3909,11 @@
                     </a:lnB>
                   </a:tcPr>
                 </a:tc>
+                <a:extLst>
+                  <a:ext uri="{0D108BD9-81ED-4DB2-BD59-A6C34878D82A}">
+                    <a16:rowId xmlns:a16="http://schemas.microsoft.com/office/drawing/2014/main" val="10000"/>
+                  </a:ext>
+                </a:extLst>
               </a:tr>
               <a:tr h="269255">
                 <a:tc vMerge="1">
@@ -3839,7 +3975,7 @@
                     <a:lstStyle/>
                     <a:p>
                       <a:r>
-                        <a:rPr lang="en-US" sz="1400" b="1" dirty="0" err="1" smtClean="0">
+                        <a:rPr lang="en-US" sz="1400" b="1" dirty="0" err="1">
                           <a:solidFill>
                             <a:srgbClr val="FFFFFF"/>
                           </a:solidFill>
@@ -3905,7 +4041,7 @@
                     <a:lstStyle/>
                     <a:p>
                       <a:r>
-                        <a:rPr lang="en-US" sz="1400" b="1" dirty="0" err="1" smtClean="0">
+                        <a:rPr lang="en-US" sz="1400" b="1" dirty="0" err="1">
                           <a:solidFill>
                             <a:srgbClr val="FFFFFF"/>
                           </a:solidFill>
@@ -3971,7 +4107,7 @@
                     <a:lstStyle/>
                     <a:p>
                       <a:r>
-                        <a:rPr lang="en-US" sz="1400" b="1" dirty="0" smtClean="0">
+                        <a:rPr lang="en-US" sz="1400" b="1" dirty="0">
                           <a:solidFill>
                             <a:srgbClr val="FFFFFF"/>
                           </a:solidFill>
@@ -3980,13 +4116,6 @@
                         </a:rPr>
                         <a:t>city</a:t>
                       </a:r>
-                      <a:endParaRPr lang="en-US" sz="1400" b="1" dirty="0">
-                        <a:solidFill>
-                          <a:srgbClr val="FFFFFF"/>
-                        </a:solidFill>
-                        <a:latin typeface="Arial"/>
-                        <a:cs typeface="Arial"/>
-                      </a:endParaRPr>
                     </a:p>
                   </a:txBody>
                   <a:tcPr>
@@ -4037,7 +4166,7 @@
                     <a:lstStyle/>
                     <a:p>
                       <a:r>
-                        <a:rPr lang="en-US" sz="1400" b="1" dirty="0" smtClean="0">
+                        <a:rPr lang="en-US" sz="1400" b="1" dirty="0">
                           <a:solidFill>
                             <a:srgbClr val="FFFFFF"/>
                           </a:solidFill>
@@ -4046,13 +4175,6 @@
                         </a:rPr>
                         <a:t>street</a:t>
                       </a:r>
-                      <a:endParaRPr lang="en-US" sz="1400" b="1" dirty="0">
-                        <a:solidFill>
-                          <a:srgbClr val="FFFFFF"/>
-                        </a:solidFill>
-                        <a:latin typeface="Arial"/>
-                        <a:cs typeface="Arial"/>
-                      </a:endParaRPr>
                     </a:p>
                   </a:txBody>
                   <a:tcPr>
@@ -4103,7 +4225,7 @@
                     <a:lstStyle/>
                     <a:p>
                       <a:r>
-                        <a:rPr lang="en-US" sz="1400" b="1" dirty="0" smtClean="0">
+                        <a:rPr lang="en-US" sz="1400" b="1" dirty="0">
                           <a:solidFill>
                             <a:srgbClr val="FFFFFF"/>
                           </a:solidFill>
@@ -4112,13 +4234,6 @@
                         </a:rPr>
                         <a:t>city</a:t>
                       </a:r>
-                      <a:endParaRPr lang="en-US" sz="1400" b="1" dirty="0">
-                        <a:solidFill>
-                          <a:srgbClr val="FFFFFF"/>
-                        </a:solidFill>
-                        <a:latin typeface="Arial"/>
-                        <a:cs typeface="Arial"/>
-                      </a:endParaRPr>
                     </a:p>
                   </a:txBody>
                   <a:tcPr>
@@ -4169,7 +4284,7 @@
                     <a:lstStyle/>
                     <a:p>
                       <a:r>
-                        <a:rPr lang="en-US" sz="1400" b="1" dirty="0" smtClean="0">
+                        <a:rPr lang="en-US" sz="1400" b="1" dirty="0">
                           <a:solidFill>
                             <a:srgbClr val="FFFFFF"/>
                           </a:solidFill>
@@ -4178,13 +4293,6 @@
                         </a:rPr>
                         <a:t>street</a:t>
                       </a:r>
-                      <a:endParaRPr lang="en-US" sz="1400" b="1" dirty="0">
-                        <a:solidFill>
-                          <a:srgbClr val="FFFFFF"/>
-                        </a:solidFill>
-                        <a:latin typeface="Arial"/>
-                        <a:cs typeface="Arial"/>
-                      </a:endParaRPr>
                     </a:p>
                   </a:txBody>
                   <a:tcPr>
@@ -4229,6 +4337,11 @@
                     </a:solidFill>
                   </a:tcPr>
                 </a:tc>
+                <a:extLst>
+                  <a:ext uri="{0D108BD9-81ED-4DB2-BD59-A6C34878D82A}">
+                    <a16:rowId xmlns:a16="http://schemas.microsoft.com/office/drawing/2014/main" val="10001"/>
+                  </a:ext>
+                </a:extLst>
               </a:tr>
               <a:tr h="331339">
                 <a:tc>
@@ -4237,7 +4350,7 @@
                     <a:lstStyle/>
                     <a:p>
                       <a:r>
-                        <a:rPr lang="en-US" sz="1400" b="1" dirty="0" smtClean="0">
+                        <a:rPr lang="en-US" sz="1400" b="1" dirty="0">
                           <a:solidFill>
                             <a:schemeClr val="bg1"/>
                           </a:solidFill>
@@ -4246,13 +4359,6 @@
                         </a:rPr>
                         <a:t>id</a:t>
                       </a:r>
-                      <a:endParaRPr lang="en-US" sz="1400" b="1" dirty="0">
-                        <a:solidFill>
-                          <a:schemeClr val="bg1"/>
-                        </a:solidFill>
-                        <a:latin typeface="Arial"/>
-                        <a:cs typeface="Arial"/>
-                      </a:endParaRPr>
                     </a:p>
                   </a:txBody>
                   <a:tcPr>
@@ -4615,6 +4721,11 @@
                     </a:solidFill>
                   </a:tcPr>
                 </a:tc>
+                <a:extLst>
+                  <a:ext uri="{0D108BD9-81ED-4DB2-BD59-A6C34878D82A}">
+                    <a16:rowId xmlns:a16="http://schemas.microsoft.com/office/drawing/2014/main" val="10002"/>
+                  </a:ext>
+                </a:extLst>
               </a:tr>
               <a:tr h="269255">
                 <a:tc>
@@ -4623,16 +4734,12 @@
                     <a:lstStyle/>
                     <a:p>
                       <a:r>
-                        <a:rPr lang="en-US" sz="1400" dirty="0" smtClean="0">
+                        <a:rPr lang="en-US" sz="1400" dirty="0">
                           <a:latin typeface="Arial"/>
                           <a:cs typeface="Arial"/>
                         </a:rPr>
                         <a:t>0</a:t>
                       </a:r>
-                      <a:endParaRPr lang="en-US" sz="1400" dirty="0">
-                        <a:latin typeface="Arial"/>
-                        <a:cs typeface="Arial"/>
-                      </a:endParaRPr>
                     </a:p>
                   </a:txBody>
                   <a:tcPr>
@@ -4680,16 +4787,12 @@
                     <a:lstStyle/>
                     <a:p>
                       <a:r>
-                        <a:rPr lang="en-US" sz="1400" dirty="0" smtClean="0">
+                        <a:rPr lang="en-US" sz="1400" dirty="0">
                           <a:latin typeface="Arial"/>
                           <a:cs typeface="Arial"/>
                         </a:rPr>
                         <a:t>Peter</a:t>
                       </a:r>
-                      <a:endParaRPr lang="en-US" sz="1400" dirty="0">
-                        <a:latin typeface="Arial"/>
-                        <a:cs typeface="Arial"/>
-                      </a:endParaRPr>
                     </a:p>
                   </a:txBody>
                   <a:tcPr>
@@ -4737,16 +4840,12 @@
                     <a:lstStyle/>
                     <a:p>
                       <a:r>
-                        <a:rPr lang="en-US" sz="1400" dirty="0" smtClean="0">
+                        <a:rPr lang="en-US" sz="1400" dirty="0">
                           <a:latin typeface="Arial"/>
                           <a:cs typeface="Arial"/>
                         </a:rPr>
                         <a:t>Williams</a:t>
                       </a:r>
-                      <a:endParaRPr lang="en-US" sz="1400" dirty="0">
-                        <a:latin typeface="Arial"/>
-                        <a:cs typeface="Arial"/>
-                      </a:endParaRPr>
                     </a:p>
                   </a:txBody>
                   <a:tcPr>
@@ -4794,7 +4893,7 @@
                     <a:lstStyle/>
                     <a:p>
                       <a:r>
-                        <a:rPr lang="en-US" sz="1400" dirty="0" err="1" smtClean="0">
+                        <a:rPr lang="en-US" sz="1400" dirty="0" err="1">
                           <a:latin typeface="Arial"/>
                           <a:cs typeface="Arial"/>
                         </a:rPr>
@@ -4851,7 +4950,7 @@
                     <a:lstStyle/>
                     <a:p>
                       <a:r>
-                        <a:rPr lang="en-US" sz="1400" dirty="0" err="1" smtClean="0">
+                        <a:rPr lang="en-US" sz="1400" dirty="0" err="1">
                           <a:latin typeface="Arial"/>
                           <a:cs typeface="Arial"/>
                         </a:rPr>
@@ -4908,7 +5007,7 @@
                     <a:lstStyle/>
                     <a:p>
                       <a:r>
-                        <a:rPr lang="en-US" sz="1400" dirty="0" err="1" smtClean="0">
+                        <a:rPr lang="en-US" sz="1400" dirty="0" err="1">
                           <a:latin typeface="Arial"/>
                           <a:cs typeface="Arial"/>
                         </a:rPr>
@@ -4965,16 +5064,12 @@
                     <a:lstStyle/>
                     <a:p>
                       <a:r>
-                        <a:rPr lang="en-US" sz="1400" dirty="0" smtClean="0">
+                        <a:rPr lang="en-US" sz="1400" dirty="0">
                           <a:latin typeface="Arial"/>
                           <a:cs typeface="Arial"/>
                         </a:rPr>
                         <a:t>Steal</a:t>
                       </a:r>
-                      <a:endParaRPr lang="en-US" sz="1400" dirty="0">
-                        <a:latin typeface="Arial"/>
-                        <a:cs typeface="Arial"/>
-                      </a:endParaRPr>
                     </a:p>
                   </a:txBody>
                   <a:tcPr>
@@ -5016,6 +5111,11 @@
                     </a:lnB>
                   </a:tcPr>
                 </a:tc>
+                <a:extLst>
+                  <a:ext uri="{0D108BD9-81ED-4DB2-BD59-A6C34878D82A}">
+                    <a16:rowId xmlns:a16="http://schemas.microsoft.com/office/drawing/2014/main" val="10003"/>
+                  </a:ext>
+                </a:extLst>
               </a:tr>
               <a:tr h="269255">
                 <a:tc>
@@ -5024,16 +5124,12 @@
                     <a:lstStyle/>
                     <a:p>
                       <a:r>
-                        <a:rPr lang="en-US" sz="1400" dirty="0" smtClean="0">
+                        <a:rPr lang="en-US" sz="1400" dirty="0">
                           <a:latin typeface="Arial"/>
                           <a:cs typeface="Arial"/>
                         </a:rPr>
                         <a:t>1</a:t>
                       </a:r>
-                      <a:endParaRPr lang="en-US" sz="1400" dirty="0">
-                        <a:latin typeface="Arial"/>
-                        <a:cs typeface="Arial"/>
-                      </a:endParaRPr>
                     </a:p>
                   </a:txBody>
                   <a:tcPr>
@@ -5081,16 +5177,12 @@
                     <a:lstStyle/>
                     <a:p>
                       <a:r>
-                        <a:rPr lang="en-US" sz="1400" dirty="0" smtClean="0">
+                        <a:rPr lang="en-US" sz="1400" dirty="0">
                           <a:latin typeface="Arial"/>
                           <a:cs typeface="Arial"/>
                         </a:rPr>
                         <a:t>Emma</a:t>
                       </a:r>
-                      <a:endParaRPr lang="en-US" sz="1400" dirty="0">
-                        <a:latin typeface="Arial"/>
-                        <a:cs typeface="Arial"/>
-                      </a:endParaRPr>
                     </a:p>
                   </a:txBody>
                   <a:tcPr>
@@ -5138,16 +5230,12 @@
                     <a:lstStyle/>
                     <a:p>
                       <a:r>
-                        <a:rPr lang="en-US" sz="1400" dirty="0" smtClean="0">
+                        <a:rPr lang="en-US" sz="1400" dirty="0">
                           <a:latin typeface="Arial"/>
                           <a:cs typeface="Arial"/>
                         </a:rPr>
                         <a:t>Brown</a:t>
                       </a:r>
-                      <a:endParaRPr lang="en-US" sz="1400" dirty="0">
-                        <a:latin typeface="Arial"/>
-                        <a:cs typeface="Arial"/>
-                      </a:endParaRPr>
                     </a:p>
                   </a:txBody>
                   <a:tcPr>
@@ -5195,7 +5283,7 @@
                     <a:lstStyle/>
                     <a:p>
                       <a:r>
-                        <a:rPr lang="en-US" sz="1400" dirty="0" err="1" smtClean="0">
+                        <a:rPr lang="en-US" sz="1400" dirty="0" err="1">
                           <a:latin typeface="Arial"/>
                           <a:cs typeface="Arial"/>
                         </a:rPr>
@@ -5252,7 +5340,7 @@
                     <a:lstStyle/>
                     <a:p>
                       <a:r>
-                        <a:rPr lang="en-US" sz="1400" dirty="0" err="1" smtClean="0">
+                        <a:rPr lang="en-US" sz="1400" dirty="0" err="1">
                           <a:latin typeface="Arial"/>
                           <a:cs typeface="Arial"/>
                         </a:rPr>
@@ -5309,7 +5397,7 @@
                     <a:lstStyle/>
                     <a:p>
                       <a:r>
-                        <a:rPr lang="en-US" sz="1400" dirty="0" err="1" smtClean="0">
+                        <a:rPr lang="en-US" sz="1400" dirty="0" err="1">
                           <a:latin typeface="Arial"/>
                           <a:cs typeface="Arial"/>
                         </a:rPr>
@@ -5366,16 +5454,12 @@
                     <a:lstStyle/>
                     <a:p>
                       <a:r>
-                        <a:rPr lang="en-US" sz="1400" dirty="0" smtClean="0">
+                        <a:rPr lang="en-US" sz="1400" dirty="0">
                           <a:latin typeface="Arial"/>
                           <a:cs typeface="Arial"/>
                         </a:rPr>
                         <a:t>Wood</a:t>
                       </a:r>
-                      <a:endParaRPr lang="en-US" sz="1400" dirty="0">
-                        <a:latin typeface="Arial"/>
-                        <a:cs typeface="Arial"/>
-                      </a:endParaRPr>
                     </a:p>
                   </a:txBody>
                   <a:tcPr>
@@ -5417,6 +5501,11 @@
                     </a:lnB>
                   </a:tcPr>
                 </a:tc>
+                <a:extLst>
+                  <a:ext uri="{0D108BD9-81ED-4DB2-BD59-A6C34878D82A}">
+                    <a16:rowId xmlns:a16="http://schemas.microsoft.com/office/drawing/2014/main" val="10004"/>
+                  </a:ext>
+                </a:extLst>
               </a:tr>
               <a:tr h="269255">
                 <a:tc>
@@ -5425,16 +5514,12 @@
                     <a:lstStyle/>
                     <a:p>
                       <a:r>
-                        <a:rPr lang="en-US" sz="1400" dirty="0" smtClean="0">
+                        <a:rPr lang="en-US" sz="1400" dirty="0">
                           <a:latin typeface="Arial"/>
                           <a:cs typeface="Arial"/>
                         </a:rPr>
                         <a:t>2</a:t>
                       </a:r>
-                      <a:endParaRPr lang="en-US" sz="1400" dirty="0">
-                        <a:latin typeface="Arial"/>
-                        <a:cs typeface="Arial"/>
-                      </a:endParaRPr>
                     </a:p>
                   </a:txBody>
                   <a:tcPr>
@@ -5482,16 +5567,12 @@
                     <a:lstStyle/>
                     <a:p>
                       <a:r>
-                        <a:rPr lang="en-US" sz="1400" dirty="0" smtClean="0">
+                        <a:rPr lang="en-US" sz="1400" dirty="0">
                           <a:latin typeface="Arial"/>
                           <a:cs typeface="Arial"/>
                         </a:rPr>
                         <a:t>Paul</a:t>
                       </a:r>
-                      <a:endParaRPr lang="en-US" sz="1400" dirty="0">
-                        <a:latin typeface="Arial"/>
-                        <a:cs typeface="Arial"/>
-                      </a:endParaRPr>
                     </a:p>
                   </a:txBody>
                   <a:tcPr>
@@ -5539,16 +5620,12 @@
                     <a:lstStyle/>
                     <a:p>
                       <a:r>
-                        <a:rPr lang="en-US" sz="1400" dirty="0" smtClean="0">
+                        <a:rPr lang="en-US" sz="1400" dirty="0">
                           <a:latin typeface="Arial"/>
                           <a:cs typeface="Arial"/>
                         </a:rPr>
                         <a:t>Smith</a:t>
                       </a:r>
-                      <a:endParaRPr lang="en-US" sz="1400" dirty="0">
-                        <a:latin typeface="Arial"/>
-                        <a:cs typeface="Arial"/>
-                      </a:endParaRPr>
                     </a:p>
                   </a:txBody>
                   <a:tcPr>
@@ -5596,7 +5673,7 @@
                     <a:lstStyle/>
                     <a:p>
                       <a:r>
-                        <a:rPr lang="en-US" sz="1400" dirty="0" err="1" smtClean="0">
+                        <a:rPr lang="en-US" sz="1400" dirty="0" err="1">
                           <a:latin typeface="Arial"/>
                           <a:cs typeface="Arial"/>
                         </a:rPr>
@@ -5653,7 +5730,7 @@
                     <a:lstStyle/>
                     <a:p>
                       <a:r>
-                        <a:rPr lang="en-US" sz="1400" dirty="0" err="1" smtClean="0">
+                        <a:rPr lang="en-US" sz="1400" dirty="0" err="1">
                           <a:latin typeface="Arial"/>
                           <a:cs typeface="Arial"/>
                         </a:rPr>
@@ -5710,7 +5787,7 @@
                     <a:lstStyle/>
                     <a:p>
                       <a:r>
-                        <a:rPr lang="en-US" sz="1400" dirty="0" err="1" smtClean="0">
+                        <a:rPr lang="en-US" sz="1400" dirty="0" err="1">
                           <a:latin typeface="Arial"/>
                           <a:cs typeface="Arial"/>
                         </a:rPr>
@@ -5767,16 +5844,12 @@
                     <a:lstStyle/>
                     <a:p>
                       <a:r>
-                        <a:rPr lang="en-US" sz="1400" dirty="0" smtClean="0">
+                        <a:rPr lang="en-US" sz="1400" dirty="0">
                           <a:latin typeface="Arial"/>
                           <a:cs typeface="Arial"/>
                         </a:rPr>
                         <a:t>Brick</a:t>
                       </a:r>
-                      <a:endParaRPr lang="en-US" sz="1400" dirty="0">
-                        <a:latin typeface="Arial"/>
-                        <a:cs typeface="Arial"/>
-                      </a:endParaRPr>
                     </a:p>
                   </a:txBody>
                   <a:tcPr>
@@ -5818,6 +5891,11 @@
                     </a:lnB>
                   </a:tcPr>
                 </a:tc>
+                <a:extLst>
+                  <a:ext uri="{0D108BD9-81ED-4DB2-BD59-A6C34878D82A}">
+                    <a16:rowId xmlns:a16="http://schemas.microsoft.com/office/drawing/2014/main" val="10005"/>
+                  </a:ext>
+                </a:extLst>
               </a:tr>
               <a:tr h="269255">
                 <a:tc>
@@ -5826,16 +5904,12 @@
                     <a:lstStyle/>
                     <a:p>
                       <a:r>
-                        <a:rPr lang="en-US" sz="1400" dirty="0" smtClean="0">
+                        <a:rPr lang="en-US" sz="1400" dirty="0">
                           <a:latin typeface="Arial"/>
                           <a:cs typeface="Arial"/>
                         </a:rPr>
                         <a:t>3</a:t>
                       </a:r>
-                      <a:endParaRPr lang="en-US" sz="1400" dirty="0">
-                        <a:latin typeface="Arial"/>
-                        <a:cs typeface="Arial"/>
-                      </a:endParaRPr>
                     </a:p>
                   </a:txBody>
                   <a:tcPr>
@@ -5902,13 +5976,13 @@
                         <a:defRPr/>
                       </a:pPr>
                       <a:r>
-                        <a:rPr lang="mr-IN" sz="1400" dirty="0" smtClean="0">
+                        <a:rPr lang="mr-IN" sz="1400" dirty="0">
                           <a:latin typeface="Arial"/>
                           <a:cs typeface="Arial"/>
                         </a:rPr>
                         <a:t>…</a:t>
                       </a:r>
-                      <a:endParaRPr lang="en-US" sz="1400" dirty="0" smtClean="0">
+                      <a:endParaRPr lang="en-US" sz="1400" dirty="0">
                         <a:latin typeface="+mn-lt"/>
                         <a:cs typeface="Arial"/>
                       </a:endParaRPr>
@@ -5959,7 +6033,7 @@
                     <a:lstStyle/>
                     <a:p>
                       <a:r>
-                        <a:rPr lang="mr-IN" sz="1400" dirty="0" smtClean="0">
+                        <a:rPr lang="mr-IN" sz="1400" dirty="0">
                           <a:latin typeface="Arial"/>
                           <a:cs typeface="Arial"/>
                         </a:rPr>
@@ -6016,7 +6090,7 @@
                     <a:lstStyle/>
                     <a:p>
                       <a:r>
-                        <a:rPr lang="mr-IN" sz="1400" dirty="0" smtClean="0">
+                        <a:rPr lang="mr-IN" sz="1400" dirty="0">
                           <a:latin typeface="Arial"/>
                           <a:cs typeface="Arial"/>
                         </a:rPr>
@@ -6073,7 +6147,7 @@
                     <a:lstStyle/>
                     <a:p>
                       <a:r>
-                        <a:rPr lang="mr-IN" sz="1400" dirty="0" smtClean="0">
+                        <a:rPr lang="mr-IN" sz="1400" dirty="0">
                           <a:latin typeface="Arial"/>
                           <a:cs typeface="Arial"/>
                         </a:rPr>
@@ -6130,7 +6204,7 @@
                     <a:lstStyle/>
                     <a:p>
                       <a:r>
-                        <a:rPr lang="mr-IN" sz="1400" dirty="0" smtClean="0">
+                        <a:rPr lang="mr-IN" sz="1400" dirty="0">
                           <a:latin typeface="Arial"/>
                           <a:cs typeface="Arial"/>
                         </a:rPr>
@@ -6187,7 +6261,7 @@
                     <a:lstStyle/>
                     <a:p>
                       <a:r>
-                        <a:rPr lang="mr-IN" sz="1400" dirty="0" smtClean="0">
+                        <a:rPr lang="mr-IN" sz="1400" dirty="0">
                           <a:latin typeface="Arial"/>
                           <a:cs typeface="Arial"/>
                         </a:rPr>
@@ -6238,6 +6312,11 @@
                     </a:lnB>
                   </a:tcPr>
                 </a:tc>
+                <a:extLst>
+                  <a:ext uri="{0D108BD9-81ED-4DB2-BD59-A6C34878D82A}">
+                    <a16:rowId xmlns:a16="http://schemas.microsoft.com/office/drawing/2014/main" val="10006"/>
+                  </a:ext>
+                </a:extLst>
               </a:tr>
               <a:tr h="269255">
                 <a:tc>
@@ -6246,16 +6325,12 @@
                     <a:lstStyle/>
                     <a:p>
                       <a:r>
-                        <a:rPr lang="en-US" sz="1400" dirty="0" smtClean="0">
+                        <a:rPr lang="en-US" sz="1400" dirty="0">
                           <a:latin typeface="Arial"/>
                           <a:cs typeface="Arial"/>
                         </a:rPr>
                         <a:t>4</a:t>
                       </a:r>
-                      <a:endParaRPr lang="en-US" sz="1400" dirty="0">
-                        <a:latin typeface="Arial"/>
-                        <a:cs typeface="Arial"/>
-                      </a:endParaRPr>
                     </a:p>
                   </a:txBody>
                   <a:tcPr>
@@ -6303,7 +6378,7 @@
                     <a:lstStyle/>
                     <a:p>
                       <a:r>
-                        <a:rPr lang="mr-IN" sz="1400" dirty="0" smtClean="0">
+                        <a:rPr lang="mr-IN" sz="1400" dirty="0">
                           <a:latin typeface="Arial"/>
                           <a:cs typeface="Arial"/>
                         </a:rPr>
@@ -6360,7 +6435,7 @@
                     <a:lstStyle/>
                     <a:p>
                       <a:r>
-                        <a:rPr lang="mr-IN" sz="1400" dirty="0" smtClean="0">
+                        <a:rPr lang="mr-IN" sz="1400" dirty="0">
                           <a:latin typeface="Arial"/>
                           <a:cs typeface="Arial"/>
                         </a:rPr>
@@ -6417,7 +6492,7 @@
                     <a:lstStyle/>
                     <a:p>
                       <a:r>
-                        <a:rPr lang="mr-IN" sz="1400" dirty="0" smtClean="0">
+                        <a:rPr lang="mr-IN" sz="1400" dirty="0">
                           <a:latin typeface="Arial"/>
                           <a:cs typeface="Arial"/>
                         </a:rPr>
@@ -6474,7 +6549,7 @@
                     <a:lstStyle/>
                     <a:p>
                       <a:r>
-                        <a:rPr lang="mr-IN" sz="1400" dirty="0" smtClean="0">
+                        <a:rPr lang="mr-IN" sz="1400" dirty="0">
                           <a:latin typeface="Arial"/>
                           <a:cs typeface="Arial"/>
                         </a:rPr>
@@ -6531,7 +6606,7 @@
                     <a:lstStyle/>
                     <a:p>
                       <a:r>
-                        <a:rPr lang="mr-IN" sz="1400" dirty="0" smtClean="0">
+                        <a:rPr lang="mr-IN" sz="1400" dirty="0">
                           <a:latin typeface="Arial"/>
                           <a:cs typeface="Arial"/>
                         </a:rPr>
@@ -6588,7 +6663,7 @@
                     <a:lstStyle/>
                     <a:p>
                       <a:r>
-                        <a:rPr lang="mr-IN" sz="1400" dirty="0" smtClean="0">
+                        <a:rPr lang="mr-IN" sz="1400" dirty="0">
                           <a:latin typeface="Arial"/>
                           <a:cs typeface="Arial"/>
                         </a:rPr>
@@ -6639,6 +6714,11 @@
                     </a:lnB>
                   </a:tcPr>
                 </a:tc>
+                <a:extLst>
+                  <a:ext uri="{0D108BD9-81ED-4DB2-BD59-A6C34878D82A}">
+                    <a16:rowId xmlns:a16="http://schemas.microsoft.com/office/drawing/2014/main" val="10007"/>
+                  </a:ext>
+                </a:extLst>
               </a:tr>
               <a:tr h="269255">
                 <a:tc>
@@ -6647,7 +6727,7 @@
                     <a:lstStyle/>
                     <a:p>
                       <a:r>
-                        <a:rPr lang="mr-IN" sz="1400" dirty="0" smtClean="0">
+                        <a:rPr lang="mr-IN" sz="1400" dirty="0">
                           <a:latin typeface="Arial"/>
                           <a:cs typeface="Arial"/>
                         </a:rPr>
@@ -6704,7 +6784,7 @@
                     <a:lstStyle/>
                     <a:p>
                       <a:r>
-                        <a:rPr lang="mr-IN" sz="1400" dirty="0" smtClean="0">
+                        <a:rPr lang="mr-IN" sz="1400" dirty="0">
                           <a:latin typeface="Arial"/>
                           <a:cs typeface="Arial"/>
                         </a:rPr>
@@ -6761,7 +6841,7 @@
                     <a:lstStyle/>
                     <a:p>
                       <a:r>
-                        <a:rPr lang="mr-IN" sz="1400" dirty="0" smtClean="0">
+                        <a:rPr lang="mr-IN" sz="1400" dirty="0">
                           <a:latin typeface="Arial"/>
                           <a:cs typeface="Arial"/>
                         </a:rPr>
@@ -6818,7 +6898,7 @@
                     <a:lstStyle/>
                     <a:p>
                       <a:r>
-                        <a:rPr lang="mr-IN" sz="1400" dirty="0" smtClean="0">
+                        <a:rPr lang="mr-IN" sz="1400" dirty="0">
                           <a:latin typeface="Arial"/>
                           <a:cs typeface="Arial"/>
                         </a:rPr>
@@ -6875,7 +6955,7 @@
                     <a:lstStyle/>
                     <a:p>
                       <a:r>
-                        <a:rPr lang="mr-IN" sz="1400" dirty="0" smtClean="0">
+                        <a:rPr lang="mr-IN" sz="1400" dirty="0">
                           <a:latin typeface="Arial"/>
                           <a:cs typeface="Arial"/>
                         </a:rPr>
@@ -6932,7 +7012,7 @@
                     <a:lstStyle/>
                     <a:p>
                       <a:r>
-                        <a:rPr lang="mr-IN" sz="1400" dirty="0" smtClean="0">
+                        <a:rPr lang="mr-IN" sz="1400" dirty="0">
                           <a:latin typeface="Arial"/>
                           <a:cs typeface="Arial"/>
                         </a:rPr>
@@ -6989,7 +7069,7 @@
                     <a:lstStyle/>
                     <a:p>
                       <a:r>
-                        <a:rPr lang="mr-IN" sz="1400" dirty="0" smtClean="0">
+                        <a:rPr lang="mr-IN" sz="1400" dirty="0">
                           <a:latin typeface="Arial"/>
                           <a:cs typeface="Arial"/>
                         </a:rPr>
@@ -7040,6 +7120,11 @@
                     </a:lnB>
                   </a:tcPr>
                 </a:tc>
+                <a:extLst>
+                  <a:ext uri="{0D108BD9-81ED-4DB2-BD59-A6C34878D82A}">
+                    <a16:rowId xmlns:a16="http://schemas.microsoft.com/office/drawing/2014/main" val="10008"/>
+                  </a:ext>
+                </a:extLst>
               </a:tr>
               <a:tr h="269255">
                 <a:tc>
@@ -7048,7 +7133,7 @@
                     <a:lstStyle/>
                     <a:p>
                       <a:r>
-                        <a:rPr lang="mr-IN" sz="1400" dirty="0" smtClean="0">
+                        <a:rPr lang="mr-IN" sz="1400" dirty="0">
                           <a:latin typeface="Arial"/>
                           <a:cs typeface="Arial"/>
                         </a:rPr>
@@ -7105,7 +7190,7 @@
                     <a:lstStyle/>
                     <a:p>
                       <a:r>
-                        <a:rPr lang="mr-IN" sz="1400" dirty="0" smtClean="0">
+                        <a:rPr lang="mr-IN" sz="1400" dirty="0">
                           <a:latin typeface="Arial"/>
                           <a:cs typeface="Arial"/>
                         </a:rPr>
@@ -7162,7 +7247,7 @@
                     <a:lstStyle/>
                     <a:p>
                       <a:r>
-                        <a:rPr lang="mr-IN" sz="1400" dirty="0" smtClean="0">
+                        <a:rPr lang="mr-IN" sz="1400" dirty="0">
                           <a:latin typeface="Arial"/>
                           <a:cs typeface="Arial"/>
                         </a:rPr>
@@ -7219,7 +7304,7 @@
                     <a:lstStyle/>
                     <a:p>
                       <a:r>
-                        <a:rPr lang="mr-IN" sz="1400" dirty="0" smtClean="0">
+                        <a:rPr lang="mr-IN" sz="1400" dirty="0">
                           <a:latin typeface="Arial"/>
                           <a:cs typeface="Arial"/>
                         </a:rPr>
@@ -7276,7 +7361,7 @@
                     <a:lstStyle/>
                     <a:p>
                       <a:r>
-                        <a:rPr lang="mr-IN" sz="1400" dirty="0" smtClean="0">
+                        <a:rPr lang="mr-IN" sz="1400" dirty="0">
                           <a:latin typeface="Arial"/>
                           <a:cs typeface="Arial"/>
                         </a:rPr>
@@ -7333,7 +7418,7 @@
                     <a:lstStyle/>
                     <a:p>
                       <a:r>
-                        <a:rPr lang="mr-IN" sz="1400" dirty="0" smtClean="0">
+                        <a:rPr lang="mr-IN" sz="1400" dirty="0">
                           <a:latin typeface="Arial"/>
                           <a:cs typeface="Arial"/>
                         </a:rPr>
@@ -7390,7 +7475,7 @@
                     <a:lstStyle/>
                     <a:p>
                       <a:r>
-                        <a:rPr lang="mr-IN" sz="1400" dirty="0" smtClean="0">
+                        <a:rPr lang="mr-IN" sz="1400" dirty="0">
                           <a:latin typeface="Arial"/>
                           <a:cs typeface="Arial"/>
                         </a:rPr>
@@ -7441,6 +7526,11 @@
                     </a:lnB>
                   </a:tcPr>
                 </a:tc>
+                <a:extLst>
+                  <a:ext uri="{0D108BD9-81ED-4DB2-BD59-A6C34878D82A}">
+                    <a16:rowId xmlns:a16="http://schemas.microsoft.com/office/drawing/2014/main" val="10009"/>
+                  </a:ext>
+                </a:extLst>
               </a:tr>
             </a:tbl>
           </a:graphicData>
@@ -7469,7 +7559,7 @@
           <a:p>
             <a:pPr algn="ctr"/>
             <a:r>
-              <a:rPr lang="en-US" sz="5400" b="1" dirty="0" err="1" smtClean="0">
+              <a:rPr lang="en-US" sz="5400" b="1" dirty="0" err="1">
                 <a:solidFill>
                   <a:srgbClr val="052B48"/>
                 </a:solidFill>
@@ -7592,8 +7682,20 @@
                 <a:tableStyleId>{5C22544A-7EE6-4342-B048-85BDC9FD1C3A}</a:tableStyleId>
               </a:tblPr>
               <a:tblGrid>
-                <a:gridCol w="264643"/>
-                <a:gridCol w="1476020"/>
+                <a:gridCol w="264643">
+                  <a:extLst>
+                    <a:ext uri="{9D8B030D-6E8A-4147-A177-3AD203B41FA5}">
+                      <a16:colId xmlns:a16="http://schemas.microsoft.com/office/drawing/2014/main" val="20000"/>
+                    </a:ext>
+                  </a:extLst>
+                </a:gridCol>
+                <a:gridCol w="1476020">
+                  <a:extLst>
+                    <a:ext uri="{9D8B030D-6E8A-4147-A177-3AD203B41FA5}">
+                      <a16:colId xmlns:a16="http://schemas.microsoft.com/office/drawing/2014/main" val="20001"/>
+                    </a:ext>
+                  </a:extLst>
+                </a:gridCol>
               </a:tblGrid>
               <a:tr h="171206">
                 <a:tc>
@@ -7662,7 +7764,7 @@
                     <a:p>
                       <a:pPr algn="ctr"/>
                       <a:r>
-                        <a:rPr lang="en-US" sz="1400" b="0" dirty="0" err="1" smtClean="0"/>
+                        <a:rPr lang="en-US" sz="1400" b="0" dirty="0" err="1"/>
                         <a:t>times_index</a:t>
                       </a:r>
                       <a:endParaRPr lang="en-US" sz="1400" b="0" dirty="0"/>
@@ -7714,6 +7816,11 @@
                     </a:solidFill>
                   </a:tcPr>
                 </a:tc>
+                <a:extLst>
+                  <a:ext uri="{0D108BD9-81ED-4DB2-BD59-A6C34878D82A}">
+                    <a16:rowId xmlns:a16="http://schemas.microsoft.com/office/drawing/2014/main" val="10000"/>
+                  </a:ext>
+                </a:extLst>
               </a:tr>
               <a:tr h="171206">
                 <a:tc>
@@ -7723,18 +7830,13 @@
                     <a:p>
                       <a:pPr algn="l"/>
                       <a:r>
-                        <a:rPr lang="en-US" sz="1400" dirty="0" smtClean="0">
+                        <a:rPr lang="en-US" sz="1400" dirty="0">
                           <a:solidFill>
                             <a:schemeClr val="bg1"/>
                           </a:solidFill>
                         </a:rPr>
                         <a:t>0</a:t>
                       </a:r>
-                      <a:endParaRPr lang="en-US" sz="1400" dirty="0">
-                        <a:solidFill>
-                          <a:schemeClr val="bg1"/>
-                        </a:solidFill>
-                      </a:endParaRPr>
                     </a:p>
                   </a:txBody>
                   <a:tcPr marR="0" marT="0" marB="0">
@@ -7792,10 +7894,9 @@
                     <a:p>
                       <a:pPr algn="ctr"/>
                       <a:r>
-                        <a:rPr lang="en-US" sz="1400" dirty="0" smtClean="0"/>
+                        <a:rPr lang="en-US" sz="1400" dirty="0"/>
                         <a:t>6</a:t>
                       </a:r>
-                      <a:endParaRPr lang="en-US" sz="1400" dirty="0"/>
                     </a:p>
                   </a:txBody>
                   <a:tcPr marL="0" marR="0" marT="0" marB="0">
@@ -7849,6 +7950,11 @@
                     </a:solidFill>
                   </a:tcPr>
                 </a:tc>
+                <a:extLst>
+                  <a:ext uri="{0D108BD9-81ED-4DB2-BD59-A6C34878D82A}">
+                    <a16:rowId xmlns:a16="http://schemas.microsoft.com/office/drawing/2014/main" val="10001"/>
+                  </a:ext>
+                </a:extLst>
               </a:tr>
               <a:tr h="171206">
                 <a:tc>
@@ -7858,18 +7964,13 @@
                     <a:p>
                       <a:pPr algn="l"/>
                       <a:r>
-                        <a:rPr lang="en-US" sz="1400" dirty="0" smtClean="0">
+                        <a:rPr lang="en-US" sz="1400" dirty="0">
                           <a:solidFill>
                             <a:schemeClr val="bg1"/>
                           </a:solidFill>
                         </a:rPr>
                         <a:t>1</a:t>
                       </a:r>
-                      <a:endParaRPr lang="en-US" sz="1400" dirty="0">
-                        <a:solidFill>
-                          <a:schemeClr val="bg1"/>
-                        </a:solidFill>
-                      </a:endParaRPr>
                     </a:p>
                   </a:txBody>
                   <a:tcPr marR="0" marT="0" marB="0">
@@ -7943,7 +8044,7 @@
                         <a:defRPr/>
                       </a:pPr>
                       <a:r>
-                        <a:rPr lang="en-US" sz="1400" dirty="0" smtClean="0"/>
+                        <a:rPr lang="en-US" sz="1400" dirty="0"/>
                         <a:t>9</a:t>
                       </a:r>
                     </a:p>
@@ -7999,6 +8100,11 @@
                     </a:solidFill>
                   </a:tcPr>
                 </a:tc>
+                <a:extLst>
+                  <a:ext uri="{0D108BD9-81ED-4DB2-BD59-A6C34878D82A}">
+                    <a16:rowId xmlns:a16="http://schemas.microsoft.com/office/drawing/2014/main" val="10002"/>
+                  </a:ext>
+                </a:extLst>
               </a:tr>
               <a:tr h="171206">
                 <a:tc>
@@ -8008,18 +8114,13 @@
                     <a:p>
                       <a:pPr algn="l"/>
                       <a:r>
-                        <a:rPr lang="en-US" sz="1400" dirty="0" smtClean="0">
+                        <a:rPr lang="en-US" sz="1400" dirty="0">
                           <a:solidFill>
                             <a:schemeClr val="bg1"/>
                           </a:solidFill>
                         </a:rPr>
                         <a:t>2</a:t>
                       </a:r>
-                      <a:endParaRPr lang="en-US" sz="1400" dirty="0">
-                        <a:solidFill>
-                          <a:schemeClr val="bg1"/>
-                        </a:solidFill>
-                      </a:endParaRPr>
                     </a:p>
                   </a:txBody>
                   <a:tcPr marR="0" marT="0" marB="0">
@@ -8093,7 +8194,7 @@
                         <a:defRPr/>
                       </a:pPr>
                       <a:r>
-                        <a:rPr lang="en-US" sz="1400" dirty="0" smtClean="0"/>
+                        <a:rPr lang="en-US" sz="1400" dirty="0"/>
                         <a:t>11</a:t>
                       </a:r>
                     </a:p>
@@ -8149,6 +8250,11 @@
                     </a:solidFill>
                   </a:tcPr>
                 </a:tc>
+                <a:extLst>
+                  <a:ext uri="{0D108BD9-81ED-4DB2-BD59-A6C34878D82A}">
+                    <a16:rowId xmlns:a16="http://schemas.microsoft.com/office/drawing/2014/main" val="10003"/>
+                  </a:ext>
+                </a:extLst>
               </a:tr>
               <a:tr h="171206">
                 <a:tc>
@@ -8158,18 +8264,13 @@
                     <a:p>
                       <a:pPr algn="l"/>
                       <a:r>
-                        <a:rPr lang="en-US" sz="1400" b="0" dirty="0" smtClean="0">
+                        <a:rPr lang="en-US" sz="1400" b="0" dirty="0">
                           <a:solidFill>
                             <a:schemeClr val="bg1"/>
                           </a:solidFill>
                         </a:rPr>
                         <a:t>..</a:t>
                       </a:r>
-                      <a:endParaRPr lang="en-US" sz="1400" b="0" dirty="0">
-                        <a:solidFill>
-                          <a:schemeClr val="bg1"/>
-                        </a:solidFill>
-                      </a:endParaRPr>
                     </a:p>
                   </a:txBody>
                   <a:tcPr marR="0" marT="0" marB="0">
@@ -8225,7 +8326,7 @@
                     <a:p>
                       <a:pPr algn="ctr"/>
                       <a:r>
-                        <a:rPr lang="mr-IN" sz="1400" dirty="0" smtClean="0"/>
+                        <a:rPr lang="mr-IN" sz="1400" dirty="0"/>
                         <a:t>…</a:t>
                       </a:r>
                       <a:endParaRPr lang="en-US" sz="1400" dirty="0"/>
@@ -8277,6 +8378,11 @@
                     </a:solidFill>
                   </a:tcPr>
                 </a:tc>
+                <a:extLst>
+                  <a:ext uri="{0D108BD9-81ED-4DB2-BD59-A6C34878D82A}">
+                    <a16:rowId xmlns:a16="http://schemas.microsoft.com/office/drawing/2014/main" val="10004"/>
+                  </a:ext>
+                </a:extLst>
               </a:tr>
             </a:tbl>
           </a:graphicData>
@@ -8306,7 +8412,7 @@
           <a:p>
             <a:pPr algn="ctr"/>
             <a:r>
-              <a:rPr lang="en-US" sz="1400" b="1" dirty="0" smtClean="0">
+              <a:rPr lang="en-US" sz="1400" b="1" dirty="0">
                 <a:solidFill>
                   <a:srgbClr val="052B48"/>
                 </a:solidFill>
@@ -8315,13 +8421,6 @@
               </a:rPr>
               <a:t>&lt;VectorData&gt;</a:t>
             </a:r>
-            <a:endParaRPr lang="en-US" sz="1400" b="1" dirty="0">
-              <a:solidFill>
-                <a:srgbClr val="052B48"/>
-              </a:solidFill>
-              <a:latin typeface="Calibri"/>
-              <a:cs typeface="Calibri"/>
-            </a:endParaRPr>
           </a:p>
         </p:txBody>
       </p:sp>
@@ -8350,8 +8449,20 @@
                 <a:tableStyleId>{5C22544A-7EE6-4342-B048-85BDC9FD1C3A}</a:tableStyleId>
               </a:tblPr>
               <a:tblGrid>
-                <a:gridCol w="299570"/>
-                <a:gridCol w="927960"/>
+                <a:gridCol w="299570">
+                  <a:extLst>
+                    <a:ext uri="{9D8B030D-6E8A-4147-A177-3AD203B41FA5}">
+                      <a16:colId xmlns:a16="http://schemas.microsoft.com/office/drawing/2014/main" val="20000"/>
+                    </a:ext>
+                  </a:extLst>
+                </a:gridCol>
+                <a:gridCol w="927960">
+                  <a:extLst>
+                    <a:ext uri="{9D8B030D-6E8A-4147-A177-3AD203B41FA5}">
+                      <a16:colId xmlns:a16="http://schemas.microsoft.com/office/drawing/2014/main" val="20001"/>
+                    </a:ext>
+                  </a:extLst>
+                </a:gridCol>
               </a:tblGrid>
               <a:tr h="171206">
                 <a:tc>
@@ -8424,12 +8535,8 @@
                     <a:p>
                       <a:pPr algn="ctr"/>
                       <a:r>
-                        <a:rPr lang="en-US" sz="1400" b="0" baseline="0" dirty="0" smtClean="0"/>
-                        <a:t> </a:t>
-                      </a:r>
-                      <a:r>
-                        <a:rPr lang="en-US" sz="1400" b="0" baseline="0" dirty="0" smtClean="0"/>
-                        <a:t>times</a:t>
+                        <a:rPr lang="en-US" sz="1400" b="0" baseline="0" dirty="0"/>
+                        <a:t> times</a:t>
                       </a:r>
                       <a:endParaRPr lang="en-US" sz="1400" b="0" dirty="0"/>
                     </a:p>
@@ -8484,6 +8591,11 @@
                     </a:solidFill>
                   </a:tcPr>
                 </a:tc>
+                <a:extLst>
+                  <a:ext uri="{0D108BD9-81ED-4DB2-BD59-A6C34878D82A}">
+                    <a16:rowId xmlns:a16="http://schemas.microsoft.com/office/drawing/2014/main" val="10000"/>
+                  </a:ext>
+                </a:extLst>
               </a:tr>
               <a:tr h="171206">
                 <a:tc>
@@ -8493,18 +8605,13 @@
                     <a:p>
                       <a:pPr algn="l"/>
                       <a:r>
-                        <a:rPr lang="en-US" sz="1400" dirty="0" smtClean="0">
+                        <a:rPr lang="en-US" sz="1400" dirty="0">
                           <a:solidFill>
                             <a:schemeClr val="bg1"/>
                           </a:solidFill>
                         </a:rPr>
                         <a:t>0</a:t>
                       </a:r>
-                      <a:endParaRPr lang="en-US" sz="1400" dirty="0">
-                        <a:solidFill>
-                          <a:schemeClr val="bg1"/>
-                        </a:solidFill>
-                      </a:endParaRPr>
                     </a:p>
                   </a:txBody>
                   <a:tcPr marR="0" marT="0" marB="0">
@@ -8564,10 +8671,9 @@
                     <a:p>
                       <a:pPr algn="ctr"/>
                       <a:r>
-                        <a:rPr lang="en-US" sz="1400" dirty="0" smtClean="0"/>
+                        <a:rPr lang="en-US" sz="1400" dirty="0"/>
                         <a:t>0.03</a:t>
                       </a:r>
-                      <a:endParaRPr lang="en-US" sz="1400" dirty="0"/>
                     </a:p>
                   </a:txBody>
                   <a:tcPr marL="0" marR="0" marT="0" marB="0">
@@ -8623,6 +8729,11 @@
                     </a:solidFill>
                   </a:tcPr>
                 </a:tc>
+                <a:extLst>
+                  <a:ext uri="{0D108BD9-81ED-4DB2-BD59-A6C34878D82A}">
+                    <a16:rowId xmlns:a16="http://schemas.microsoft.com/office/drawing/2014/main" val="10001"/>
+                  </a:ext>
+                </a:extLst>
               </a:tr>
               <a:tr h="171206">
                 <a:tc>
@@ -8632,18 +8743,13 @@
                     <a:p>
                       <a:pPr algn="l"/>
                       <a:r>
-                        <a:rPr lang="en-US" sz="1400" dirty="0" smtClean="0">
+                        <a:rPr lang="en-US" sz="1400" dirty="0">
                           <a:solidFill>
                             <a:schemeClr val="bg1"/>
                           </a:solidFill>
                         </a:rPr>
                         <a:t>1</a:t>
                       </a:r>
-                      <a:endParaRPr lang="en-US" sz="1400" dirty="0">
-                        <a:solidFill>
-                          <a:schemeClr val="bg1"/>
-                        </a:solidFill>
-                      </a:endParaRPr>
                     </a:p>
                   </a:txBody>
                   <a:tcPr marR="0" marT="0" marB="0">
@@ -8703,10 +8809,9 @@
                     <a:p>
                       <a:pPr algn="ctr"/>
                       <a:r>
-                        <a:rPr lang="en-US" sz="1400" dirty="0" smtClean="0"/>
+                        <a:rPr lang="en-US" sz="1400" dirty="0"/>
                         <a:t>0.14</a:t>
                       </a:r>
-                      <a:endParaRPr lang="en-US" sz="1400" dirty="0"/>
                     </a:p>
                   </a:txBody>
                   <a:tcPr marL="0" marR="0" marT="0" marB="0">
@@ -8762,6 +8867,11 @@
                     </a:solidFill>
                   </a:tcPr>
                 </a:tc>
+                <a:extLst>
+                  <a:ext uri="{0D108BD9-81ED-4DB2-BD59-A6C34878D82A}">
+                    <a16:rowId xmlns:a16="http://schemas.microsoft.com/office/drawing/2014/main" val="10002"/>
+                  </a:ext>
+                </a:extLst>
               </a:tr>
               <a:tr h="171206">
                 <a:tc>
@@ -8771,18 +8881,13 @@
                     <a:p>
                       <a:pPr algn="l"/>
                       <a:r>
-                        <a:rPr lang="en-US" sz="1400" dirty="0" smtClean="0">
+                        <a:rPr lang="en-US" sz="1400" dirty="0">
                           <a:solidFill>
                             <a:schemeClr val="bg1"/>
                           </a:solidFill>
                         </a:rPr>
                         <a:t>2</a:t>
                       </a:r>
-                      <a:endParaRPr lang="en-US" sz="1400" dirty="0">
-                        <a:solidFill>
-                          <a:schemeClr val="bg1"/>
-                        </a:solidFill>
-                      </a:endParaRPr>
                     </a:p>
                   </a:txBody>
                   <a:tcPr marR="0" marT="0" marB="0">
@@ -8842,7 +8947,7 @@
                     <a:p>
                       <a:pPr algn="ctr"/>
                       <a:r>
-                        <a:rPr lang="en-US" sz="1400" dirty="0" smtClean="0"/>
+                        <a:rPr lang="en-US" sz="1400" dirty="0"/>
                         <a:t>0.6</a:t>
                       </a:r>
                     </a:p>
@@ -8900,6 +9005,11 @@
                     </a:solidFill>
                   </a:tcPr>
                 </a:tc>
+                <a:extLst>
+                  <a:ext uri="{0D108BD9-81ED-4DB2-BD59-A6C34878D82A}">
+                    <a16:rowId xmlns:a16="http://schemas.microsoft.com/office/drawing/2014/main" val="10003"/>
+                  </a:ext>
+                </a:extLst>
               </a:tr>
               <a:tr h="171206">
                 <a:tc>
@@ -8909,18 +9019,13 @@
                     <a:p>
                       <a:pPr algn="l"/>
                       <a:r>
-                        <a:rPr lang="en-US" sz="1400" b="0" dirty="0" smtClean="0">
+                        <a:rPr lang="en-US" sz="1400" b="0" dirty="0">
                           <a:solidFill>
                             <a:schemeClr val="bg1"/>
                           </a:solidFill>
                         </a:rPr>
                         <a:t>3</a:t>
                       </a:r>
-                      <a:endParaRPr lang="en-US" sz="1400" b="0" dirty="0">
-                        <a:solidFill>
-                          <a:schemeClr val="bg1"/>
-                        </a:solidFill>
-                      </a:endParaRPr>
                     </a:p>
                   </a:txBody>
                   <a:tcPr marR="0" marT="0" marB="0">
@@ -8980,10 +9085,9 @@
                     <a:p>
                       <a:pPr algn="ctr"/>
                       <a:r>
-                        <a:rPr lang="en-US" sz="1400" dirty="0" smtClean="0"/>
+                        <a:rPr lang="en-US" sz="1400" dirty="0"/>
                         <a:t>1.25</a:t>
                       </a:r>
-                      <a:endParaRPr lang="en-US" sz="1400" dirty="0"/>
                     </a:p>
                   </a:txBody>
                   <a:tcPr marL="0" marR="0" marT="0" marB="0">
@@ -9039,6 +9143,11 @@
                     </a:solidFill>
                   </a:tcPr>
                 </a:tc>
+                <a:extLst>
+                  <a:ext uri="{0D108BD9-81ED-4DB2-BD59-A6C34878D82A}">
+                    <a16:rowId xmlns:a16="http://schemas.microsoft.com/office/drawing/2014/main" val="10004"/>
+                  </a:ext>
+                </a:extLst>
               </a:tr>
               <a:tr h="171206">
                 <a:tc>
@@ -9048,18 +9157,13 @@
                     <a:p>
                       <a:pPr algn="l"/>
                       <a:r>
-                        <a:rPr lang="en-US" sz="1400" b="0" dirty="0" smtClean="0">
+                        <a:rPr lang="en-US" sz="1400" b="0" dirty="0">
                           <a:solidFill>
                             <a:schemeClr val="bg1"/>
                           </a:solidFill>
                         </a:rPr>
                         <a:t>4</a:t>
                       </a:r>
-                      <a:endParaRPr lang="en-US" sz="1400" b="0" dirty="0">
-                        <a:solidFill>
-                          <a:schemeClr val="bg1"/>
-                        </a:solidFill>
-                      </a:endParaRPr>
                     </a:p>
                   </a:txBody>
                   <a:tcPr marR="0" marT="0" marB="0">
@@ -9119,10 +9223,9 @@
                     <a:p>
                       <a:pPr algn="ctr"/>
                       <a:r>
-                        <a:rPr lang="en-US" sz="1400" dirty="0" smtClean="0"/>
+                        <a:rPr lang="en-US" sz="1400" dirty="0"/>
                         <a:t>2.62</a:t>
                       </a:r>
-                      <a:endParaRPr lang="en-US" sz="1400" dirty="0"/>
                     </a:p>
                   </a:txBody>
                   <a:tcPr marL="0" marR="0" marT="0" marB="0">
@@ -9178,6 +9281,11 @@
                     </a:solidFill>
                   </a:tcPr>
                 </a:tc>
+                <a:extLst>
+                  <a:ext uri="{0D108BD9-81ED-4DB2-BD59-A6C34878D82A}">
+                    <a16:rowId xmlns:a16="http://schemas.microsoft.com/office/drawing/2014/main" val="10005"/>
+                  </a:ext>
+                </a:extLst>
               </a:tr>
               <a:tr h="171206">
                 <a:tc>
@@ -9187,18 +9295,13 @@
                     <a:p>
                       <a:pPr algn="l"/>
                       <a:r>
-                        <a:rPr lang="en-US" sz="1400" b="0" dirty="0" smtClean="0">
+                        <a:rPr lang="en-US" sz="1400" b="0" dirty="0">
                           <a:solidFill>
                             <a:schemeClr val="bg1"/>
                           </a:solidFill>
                         </a:rPr>
                         <a:t>5</a:t>
                       </a:r>
-                      <a:endParaRPr lang="en-US" sz="1400" b="0" dirty="0">
-                        <a:solidFill>
-                          <a:schemeClr val="bg1"/>
-                        </a:solidFill>
-                      </a:endParaRPr>
                     </a:p>
                   </a:txBody>
                   <a:tcPr marR="0" marT="0" marB="0">
@@ -9258,7 +9361,7 @@
                     <a:p>
                       <a:pPr algn="ctr"/>
                       <a:r>
-                        <a:rPr lang="en-US" sz="1400" dirty="0" smtClean="0"/>
+                        <a:rPr lang="en-US" sz="1400" dirty="0"/>
                         <a:t>3.07</a:t>
                       </a:r>
                     </a:p>
@@ -9316,6 +9419,11 @@
                     </a:solidFill>
                   </a:tcPr>
                 </a:tc>
+                <a:extLst>
+                  <a:ext uri="{0D108BD9-81ED-4DB2-BD59-A6C34878D82A}">
+                    <a16:rowId xmlns:a16="http://schemas.microsoft.com/office/drawing/2014/main" val="10006"/>
+                  </a:ext>
+                </a:extLst>
               </a:tr>
               <a:tr h="171206">
                 <a:tc>
@@ -9325,18 +9433,13 @@
                     <a:p>
                       <a:pPr algn="l"/>
                       <a:r>
-                        <a:rPr lang="en-US" sz="1400" b="0" dirty="0" smtClean="0">
+                        <a:rPr lang="en-US" sz="1400" b="0" dirty="0">
                           <a:solidFill>
                             <a:schemeClr val="bg1"/>
                           </a:solidFill>
                         </a:rPr>
                         <a:t>6</a:t>
                       </a:r>
-                      <a:endParaRPr lang="en-US" sz="1400" b="0" dirty="0">
-                        <a:solidFill>
-                          <a:schemeClr val="bg1"/>
-                        </a:solidFill>
-                      </a:endParaRPr>
                     </a:p>
                   </a:txBody>
                   <a:tcPr marR="0" marT="0" marB="0">
@@ -9396,10 +9499,9 @@
                     <a:p>
                       <a:pPr algn="ctr"/>
                       <a:r>
-                        <a:rPr lang="en-US" sz="1400" dirty="0" smtClean="0"/>
+                        <a:rPr lang="en-US" sz="1400" dirty="0"/>
                         <a:t>1.23</a:t>
                       </a:r>
-                      <a:endParaRPr lang="en-US" sz="1400" dirty="0"/>
                     </a:p>
                   </a:txBody>
                   <a:tcPr marL="0" marR="0" marT="0" marB="0">
@@ -9455,6 +9557,11 @@
                     </a:solidFill>
                   </a:tcPr>
                 </a:tc>
+                <a:extLst>
+                  <a:ext uri="{0D108BD9-81ED-4DB2-BD59-A6C34878D82A}">
+                    <a16:rowId xmlns:a16="http://schemas.microsoft.com/office/drawing/2014/main" val="10007"/>
+                  </a:ext>
+                </a:extLst>
               </a:tr>
               <a:tr h="171206">
                 <a:tc>
@@ -9464,18 +9571,13 @@
                     <a:p>
                       <a:pPr algn="l"/>
                       <a:r>
-                        <a:rPr lang="en-US" sz="1400" b="0" dirty="0" smtClean="0">
+                        <a:rPr lang="en-US" sz="1400" b="0" dirty="0">
                           <a:solidFill>
                             <a:schemeClr val="bg1"/>
                           </a:solidFill>
                         </a:rPr>
                         <a:t>7</a:t>
                       </a:r>
-                      <a:endParaRPr lang="en-US" sz="1400" b="0" dirty="0">
-                        <a:solidFill>
-                          <a:schemeClr val="bg1"/>
-                        </a:solidFill>
-                      </a:endParaRPr>
                     </a:p>
                   </a:txBody>
                   <a:tcPr marR="0" marT="0" marB="0">
@@ -9535,10 +9637,9 @@
                     <a:p>
                       <a:pPr algn="ctr"/>
                       <a:r>
-                        <a:rPr lang="en-US" sz="1400" dirty="0" smtClean="0"/>
+                        <a:rPr lang="en-US" sz="1400" dirty="0"/>
                         <a:t>1.37</a:t>
                       </a:r>
-                      <a:endParaRPr lang="en-US" sz="1400" dirty="0"/>
                     </a:p>
                   </a:txBody>
                   <a:tcPr marL="0" marR="0" marT="0" marB="0">
@@ -9594,6 +9695,11 @@
                     </a:solidFill>
                   </a:tcPr>
                 </a:tc>
+                <a:extLst>
+                  <a:ext uri="{0D108BD9-81ED-4DB2-BD59-A6C34878D82A}">
+                    <a16:rowId xmlns:a16="http://schemas.microsoft.com/office/drawing/2014/main" val="10008"/>
+                  </a:ext>
+                </a:extLst>
               </a:tr>
               <a:tr h="171206">
                 <a:tc>
@@ -9603,18 +9709,13 @@
                     <a:p>
                       <a:pPr algn="l"/>
                       <a:r>
-                        <a:rPr lang="en-US" sz="1400" b="0" dirty="0" smtClean="0">
+                        <a:rPr lang="en-US" sz="1400" b="0" dirty="0">
                           <a:solidFill>
                             <a:schemeClr val="bg1"/>
                           </a:solidFill>
                         </a:rPr>
                         <a:t>8</a:t>
                       </a:r>
-                      <a:endParaRPr lang="en-US" sz="1400" b="0" dirty="0">
-                        <a:solidFill>
-                          <a:schemeClr val="bg1"/>
-                        </a:solidFill>
-                      </a:endParaRPr>
                     </a:p>
                   </a:txBody>
                   <a:tcPr marR="0" marT="0" marB="0">
@@ -9674,10 +9775,9 @@
                     <a:p>
                       <a:pPr algn="ctr"/>
                       <a:r>
-                        <a:rPr lang="en-US" sz="1400" dirty="0" smtClean="0"/>
+                        <a:rPr lang="en-US" sz="1400" dirty="0"/>
                         <a:t>2.12</a:t>
                       </a:r>
-                      <a:endParaRPr lang="en-US" sz="1400" dirty="0"/>
                     </a:p>
                   </a:txBody>
                   <a:tcPr marL="0" marR="0" marT="0" marB="0">
@@ -9733,6 +9833,11 @@
                     </a:solidFill>
                   </a:tcPr>
                 </a:tc>
+                <a:extLst>
+                  <a:ext uri="{0D108BD9-81ED-4DB2-BD59-A6C34878D82A}">
+                    <a16:rowId xmlns:a16="http://schemas.microsoft.com/office/drawing/2014/main" val="10009"/>
+                  </a:ext>
+                </a:extLst>
               </a:tr>
               <a:tr h="171206">
                 <a:tc>
@@ -9742,18 +9847,13 @@
                     <a:p>
                       <a:pPr algn="l"/>
                       <a:r>
-                        <a:rPr lang="en-US" sz="1400" b="0" dirty="0" smtClean="0">
+                        <a:rPr lang="en-US" sz="1400" b="0" dirty="0">
                           <a:solidFill>
                             <a:schemeClr val="bg1"/>
                           </a:solidFill>
                         </a:rPr>
                         <a:t>9</a:t>
                       </a:r>
-                      <a:endParaRPr lang="en-US" sz="1400" b="0" dirty="0">
-                        <a:solidFill>
-                          <a:schemeClr val="bg1"/>
-                        </a:solidFill>
-                      </a:endParaRPr>
                     </a:p>
                   </a:txBody>
                   <a:tcPr marR="0" marT="0" marB="0">
@@ -9813,10 +9913,9 @@
                     <a:p>
                       <a:pPr algn="ctr"/>
                       <a:r>
-                        <a:rPr lang="en-US" sz="1400" dirty="0" smtClean="0"/>
+                        <a:rPr lang="en-US" sz="1400" dirty="0"/>
                         <a:t>0.56</a:t>
                       </a:r>
-                      <a:endParaRPr lang="en-US" sz="1400" dirty="0"/>
                     </a:p>
                   </a:txBody>
                   <a:tcPr marL="0" marR="0" marT="0" marB="0">
@@ -9872,6 +9971,11 @@
                     </a:solidFill>
                   </a:tcPr>
                 </a:tc>
+                <a:extLst>
+                  <a:ext uri="{0D108BD9-81ED-4DB2-BD59-A6C34878D82A}">
+                    <a16:rowId xmlns:a16="http://schemas.microsoft.com/office/drawing/2014/main" val="10010"/>
+                  </a:ext>
+                </a:extLst>
               </a:tr>
               <a:tr h="171206">
                 <a:tc>
@@ -9881,18 +9985,13 @@
                     <a:p>
                       <a:pPr algn="l"/>
                       <a:r>
-                        <a:rPr lang="en-US" sz="1400" b="0" dirty="0" smtClean="0">
+                        <a:rPr lang="en-US" sz="1400" b="0" dirty="0">
                           <a:solidFill>
                             <a:schemeClr val="bg1"/>
                           </a:solidFill>
                         </a:rPr>
                         <a:t>10</a:t>
                       </a:r>
-                      <a:endParaRPr lang="en-US" sz="1400" b="0" dirty="0">
-                        <a:solidFill>
-                          <a:schemeClr val="bg1"/>
-                        </a:solidFill>
-                      </a:endParaRPr>
                     </a:p>
                   </a:txBody>
                   <a:tcPr marR="0" marT="0" marB="0">
@@ -9952,10 +10051,9 @@
                     <a:p>
                       <a:pPr algn="ctr"/>
                       <a:r>
-                        <a:rPr lang="en-US" sz="1400" dirty="0" smtClean="0"/>
+                        <a:rPr lang="en-US" sz="1400" dirty="0"/>
                         <a:t>0.91</a:t>
                       </a:r>
-                      <a:endParaRPr lang="en-US" sz="1400" dirty="0"/>
                     </a:p>
                   </a:txBody>
                   <a:tcPr marL="0" marR="0" marT="0" marB="0">
@@ -10011,6 +10109,11 @@
                     </a:solidFill>
                   </a:tcPr>
                 </a:tc>
+                <a:extLst>
+                  <a:ext uri="{0D108BD9-81ED-4DB2-BD59-A6C34878D82A}">
+                    <a16:rowId xmlns:a16="http://schemas.microsoft.com/office/drawing/2014/main" val="10011"/>
+                  </a:ext>
+                </a:extLst>
               </a:tr>
               <a:tr h="171206">
                 <a:tc>
@@ -10020,18 +10123,13 @@
                     <a:p>
                       <a:pPr algn="l"/>
                       <a:r>
-                        <a:rPr lang="en-US" sz="1400" b="0" dirty="0" smtClean="0">
+                        <a:rPr lang="en-US" sz="1400" b="0" dirty="0">
                           <a:solidFill>
                             <a:schemeClr val="bg1"/>
                           </a:solidFill>
                         </a:rPr>
                         <a:t>..</a:t>
                       </a:r>
-                      <a:endParaRPr lang="en-US" sz="1400" b="0" dirty="0">
-                        <a:solidFill>
-                          <a:schemeClr val="bg1"/>
-                        </a:solidFill>
-                      </a:endParaRPr>
                     </a:p>
                   </a:txBody>
                   <a:tcPr marR="0" marT="0" marB="0">
@@ -10091,7 +10189,7 @@
                     <a:p>
                       <a:pPr algn="ctr"/>
                       <a:r>
-                        <a:rPr lang="mr-IN" sz="1400" dirty="0" smtClean="0"/>
+                        <a:rPr lang="mr-IN" sz="1400" dirty="0"/>
                         <a:t>…</a:t>
                       </a:r>
                       <a:endParaRPr lang="en-US" sz="1400" dirty="0"/>
@@ -10147,6 +10245,11 @@
                     </a:solidFill>
                   </a:tcPr>
                 </a:tc>
+                <a:extLst>
+                  <a:ext uri="{0D108BD9-81ED-4DB2-BD59-A6C34878D82A}">
+                    <a16:rowId xmlns:a16="http://schemas.microsoft.com/office/drawing/2014/main" val="10012"/>
+                  </a:ext>
+                </a:extLst>
               </a:tr>
             </a:tbl>
           </a:graphicData>
@@ -10465,7 +10568,7 @@
           <a:p>
             <a:pPr algn="ctr"/>
             <a:r>
-              <a:rPr lang="en-US" sz="1200" b="1" dirty="0" smtClean="0">
+              <a:rPr lang="en-US" sz="1200" b="1" dirty="0">
                 <a:solidFill>
                   <a:srgbClr val="FF0000"/>
                 </a:solidFill>
@@ -10474,13 +10577,6 @@
               </a:rPr>
               <a:t>target</a:t>
             </a:r>
-            <a:endParaRPr lang="en-US" sz="1200" b="1" dirty="0">
-              <a:solidFill>
-                <a:srgbClr val="FF0000"/>
-              </a:solidFill>
-              <a:latin typeface="Calibri"/>
-              <a:cs typeface="Calibri"/>
-            </a:endParaRPr>
           </a:p>
         </p:txBody>
       </p:sp>
@@ -10508,7 +10604,7 @@
           <a:p>
             <a:pPr algn="ctr"/>
             <a:r>
-              <a:rPr lang="en-US" sz="1400" b="1" dirty="0" smtClean="0">
+              <a:rPr lang="en-US" sz="1400" b="1" dirty="0">
                 <a:solidFill>
                   <a:srgbClr val="052B48"/>
                 </a:solidFill>
@@ -10518,7 +10614,7 @@
               <a:t>&lt;</a:t>
             </a:r>
             <a:r>
-              <a:rPr lang="en-US" sz="1400" b="1" dirty="0" err="1" smtClean="0">
+              <a:rPr lang="en-US" sz="1400" b="1" dirty="0" err="1">
                 <a:solidFill>
                   <a:srgbClr val="052B48"/>
                 </a:solidFill>
@@ -10528,7 +10624,7 @@
               <a:t>VectorIndex</a:t>
             </a:r>
             <a:r>
-              <a:rPr lang="en-US" sz="1400" b="1" dirty="0" smtClean="0">
+              <a:rPr lang="en-US" sz="1400" b="1" dirty="0">
                 <a:solidFill>
                   <a:srgbClr val="052B48"/>
                 </a:solidFill>
@@ -10537,13 +10633,6 @@
               </a:rPr>
               <a:t>&gt;</a:t>
             </a:r>
-            <a:endParaRPr lang="en-US" sz="1400" b="1" dirty="0">
-              <a:solidFill>
-                <a:srgbClr val="052B48"/>
-              </a:solidFill>
-              <a:latin typeface="Calibri"/>
-              <a:cs typeface="Calibri"/>
-            </a:endParaRPr>
           </a:p>
         </p:txBody>
       </p:sp>
@@ -10572,8 +10661,20 @@
                 <a:tableStyleId>{5C22544A-7EE6-4342-B048-85BDC9FD1C3A}</a:tableStyleId>
               </a:tblPr>
               <a:tblGrid>
-                <a:gridCol w="311673"/>
-                <a:gridCol w="417387"/>
+                <a:gridCol w="311673">
+                  <a:extLst>
+                    <a:ext uri="{9D8B030D-6E8A-4147-A177-3AD203B41FA5}">
+                      <a16:colId xmlns:a16="http://schemas.microsoft.com/office/drawing/2014/main" val="20000"/>
+                    </a:ext>
+                  </a:extLst>
+                </a:gridCol>
+                <a:gridCol w="417387">
+                  <a:extLst>
+                    <a:ext uri="{9D8B030D-6E8A-4147-A177-3AD203B41FA5}">
+                      <a16:colId xmlns:a16="http://schemas.microsoft.com/office/drawing/2014/main" val="20001"/>
+                    </a:ext>
+                  </a:extLst>
+                </a:gridCol>
               </a:tblGrid>
               <a:tr h="213906">
                 <a:tc>
@@ -10582,7 +10683,7 @@
                     <a:lstStyle/>
                     <a:p>
                       <a:pPr algn="ctr"/>
-                      <a:endParaRPr lang="en-US" sz="1400" b="0" baseline="0" dirty="0" smtClean="0"/>
+                      <a:endParaRPr lang="en-US" sz="1400" b="0" baseline="0" dirty="0"/>
                     </a:p>
                   </a:txBody>
                   <a:tcPr marR="0" marT="0" marB="0">
@@ -10642,7 +10743,7 @@
                     <a:p>
                       <a:pPr algn="ctr"/>
                       <a:r>
-                        <a:rPr lang="en-US" sz="1400" b="0" baseline="0" dirty="0" smtClean="0">
+                        <a:rPr lang="en-US" sz="1400" b="0" baseline="0" dirty="0">
                           <a:solidFill>
                             <a:srgbClr val="FFFFFF"/>
                           </a:solidFill>
@@ -10701,6 +10802,11 @@
                     </a:solidFill>
                   </a:tcPr>
                 </a:tc>
+                <a:extLst>
+                  <a:ext uri="{0D108BD9-81ED-4DB2-BD59-A6C34878D82A}">
+                    <a16:rowId xmlns:a16="http://schemas.microsoft.com/office/drawing/2014/main" val="10000"/>
+                  </a:ext>
+                </a:extLst>
               </a:tr>
               <a:tr h="171206">
                 <a:tc>
@@ -10710,18 +10816,13 @@
                     <a:p>
                       <a:pPr algn="l"/>
                       <a:r>
-                        <a:rPr lang="en-US" sz="1400" dirty="0" smtClean="0">
+                        <a:rPr lang="en-US" sz="1400" dirty="0">
                           <a:solidFill>
                             <a:schemeClr val="bg1"/>
                           </a:solidFill>
                         </a:rPr>
                         <a:t>0</a:t>
                       </a:r>
-                      <a:endParaRPr lang="en-US" sz="1400" dirty="0">
-                        <a:solidFill>
-                          <a:schemeClr val="bg1"/>
-                        </a:solidFill>
-                      </a:endParaRPr>
                     </a:p>
                   </a:txBody>
                   <a:tcPr marR="0" marT="0" marB="0">
@@ -10781,10 +10882,9 @@
                     <a:p>
                       <a:pPr algn="ctr"/>
                       <a:r>
-                        <a:rPr lang="en-US" sz="1400" dirty="0" smtClean="0"/>
+                        <a:rPr lang="en-US" sz="1400" dirty="0"/>
                         <a:t>0</a:t>
                       </a:r>
-                      <a:endParaRPr lang="en-US" sz="1400" dirty="0"/>
                     </a:p>
                   </a:txBody>
                   <a:tcPr marL="0" marR="0" marT="0" marB="0">
@@ -10837,6 +10937,11 @@
                     </a:solidFill>
                   </a:tcPr>
                 </a:tc>
+                <a:extLst>
+                  <a:ext uri="{0D108BD9-81ED-4DB2-BD59-A6C34878D82A}">
+                    <a16:rowId xmlns:a16="http://schemas.microsoft.com/office/drawing/2014/main" val="10001"/>
+                  </a:ext>
+                </a:extLst>
               </a:tr>
               <a:tr h="171206">
                 <a:tc>
@@ -10846,18 +10951,13 @@
                     <a:p>
                       <a:pPr algn="l"/>
                       <a:r>
-                        <a:rPr lang="en-US" sz="1400" dirty="0" smtClean="0">
+                        <a:rPr lang="en-US" sz="1400" dirty="0">
                           <a:solidFill>
                             <a:schemeClr val="bg1"/>
                           </a:solidFill>
                         </a:rPr>
                         <a:t>1</a:t>
                       </a:r>
-                      <a:endParaRPr lang="en-US" sz="1400" dirty="0">
-                        <a:solidFill>
-                          <a:schemeClr val="bg1"/>
-                        </a:solidFill>
-                      </a:endParaRPr>
                     </a:p>
                   </a:txBody>
                   <a:tcPr marR="0" marT="0" marB="0">
@@ -10917,10 +11017,9 @@
                     <a:p>
                       <a:pPr algn="ctr"/>
                       <a:r>
-                        <a:rPr lang="en-US" sz="1400" dirty="0" smtClean="0"/>
+                        <a:rPr lang="en-US" sz="1400" dirty="0"/>
                         <a:t>1</a:t>
                       </a:r>
-                      <a:endParaRPr lang="en-US" sz="1400" dirty="0"/>
                     </a:p>
                   </a:txBody>
                   <a:tcPr marL="0" marR="0" marT="0" marB="0">
@@ -10973,6 +11072,11 @@
                     </a:solidFill>
                   </a:tcPr>
                 </a:tc>
+                <a:extLst>
+                  <a:ext uri="{0D108BD9-81ED-4DB2-BD59-A6C34878D82A}">
+                    <a16:rowId xmlns:a16="http://schemas.microsoft.com/office/drawing/2014/main" val="10002"/>
+                  </a:ext>
+                </a:extLst>
               </a:tr>
               <a:tr h="171206">
                 <a:tc>
@@ -10982,18 +11086,13 @@
                     <a:p>
                       <a:pPr algn="l"/>
                       <a:r>
-                        <a:rPr lang="en-US" sz="1400" dirty="0" smtClean="0">
+                        <a:rPr lang="en-US" sz="1400" dirty="0">
                           <a:solidFill>
                             <a:schemeClr val="bg1"/>
                           </a:solidFill>
                         </a:rPr>
                         <a:t>2</a:t>
                       </a:r>
-                      <a:endParaRPr lang="en-US" sz="1400" dirty="0">
-                        <a:solidFill>
-                          <a:schemeClr val="bg1"/>
-                        </a:solidFill>
-                      </a:endParaRPr>
                     </a:p>
                   </a:txBody>
                   <a:tcPr marR="0" marT="0" marB="0">
@@ -11053,10 +11152,9 @@
                     <a:p>
                       <a:pPr algn="ctr"/>
                       <a:r>
-                        <a:rPr lang="en-US" sz="1400" dirty="0" smtClean="0"/>
+                        <a:rPr lang="en-US" sz="1400" dirty="0"/>
                         <a:t>2</a:t>
                       </a:r>
-                      <a:endParaRPr lang="en-US" sz="1400" dirty="0"/>
                     </a:p>
                   </a:txBody>
                   <a:tcPr marL="0" marR="0" marT="0" marB="0">
@@ -11109,6 +11207,11 @@
                     </a:solidFill>
                   </a:tcPr>
                 </a:tc>
+                <a:extLst>
+                  <a:ext uri="{0D108BD9-81ED-4DB2-BD59-A6C34878D82A}">
+                    <a16:rowId xmlns:a16="http://schemas.microsoft.com/office/drawing/2014/main" val="10003"/>
+                  </a:ext>
+                </a:extLst>
               </a:tr>
               <a:tr h="171206">
                 <a:tc>
@@ -11118,18 +11221,13 @@
                     <a:p>
                       <a:pPr algn="l"/>
                       <a:r>
-                        <a:rPr lang="en-US" sz="1400" b="0" dirty="0" smtClean="0">
+                        <a:rPr lang="en-US" sz="1400" b="0" dirty="0">
                           <a:solidFill>
                             <a:schemeClr val="bg1"/>
                           </a:solidFill>
                         </a:rPr>
                         <a:t>..</a:t>
                       </a:r>
-                      <a:endParaRPr lang="en-US" sz="1400" b="0" dirty="0">
-                        <a:solidFill>
-                          <a:schemeClr val="bg1"/>
-                        </a:solidFill>
-                      </a:endParaRPr>
                     </a:p>
                   </a:txBody>
                   <a:tcPr marR="0" marT="0" marB="0">
@@ -11189,7 +11287,7 @@
                     <a:p>
                       <a:pPr algn="ctr"/>
                       <a:r>
-                        <a:rPr lang="mr-IN" sz="1400" dirty="0" smtClean="0"/>
+                        <a:rPr lang="mr-IN" sz="1400" dirty="0"/>
                         <a:t>…</a:t>
                       </a:r>
                       <a:endParaRPr lang="en-US" sz="1400" dirty="0"/>
@@ -11245,6 +11343,11 @@
                     </a:solidFill>
                   </a:tcPr>
                 </a:tc>
+                <a:extLst>
+                  <a:ext uri="{0D108BD9-81ED-4DB2-BD59-A6C34878D82A}">
+                    <a16:rowId xmlns:a16="http://schemas.microsoft.com/office/drawing/2014/main" val="10004"/>
+                  </a:ext>
+                </a:extLst>
               </a:tr>
             </a:tbl>
           </a:graphicData>
@@ -11275,8 +11378,20 @@
                 <a:tableStyleId>{5C22544A-7EE6-4342-B048-85BDC9FD1C3A}</a:tableStyleId>
               </a:tblPr>
               <a:tblGrid>
-                <a:gridCol w="281053"/>
-                <a:gridCol w="1197080"/>
+                <a:gridCol w="281053">
+                  <a:extLst>
+                    <a:ext uri="{9D8B030D-6E8A-4147-A177-3AD203B41FA5}">
+                      <a16:colId xmlns:a16="http://schemas.microsoft.com/office/drawing/2014/main" val="20000"/>
+                    </a:ext>
+                  </a:extLst>
+                </a:gridCol>
+                <a:gridCol w="1197080">
+                  <a:extLst>
+                    <a:ext uri="{9D8B030D-6E8A-4147-A177-3AD203B41FA5}">
+                      <a16:colId xmlns:a16="http://schemas.microsoft.com/office/drawing/2014/main" val="20001"/>
+                    </a:ext>
+                  </a:extLst>
+                </a:gridCol>
               </a:tblGrid>
               <a:tr h="213906">
                 <a:tc>
@@ -11285,7 +11400,7 @@
                     <a:lstStyle/>
                     <a:p>
                       <a:pPr algn="ctr"/>
-                      <a:endParaRPr lang="en-US" sz="1400" b="0" baseline="0" dirty="0" smtClean="0">
+                      <a:endParaRPr lang="en-US" sz="1400" b="0" baseline="0" dirty="0">
                         <a:solidFill>
                           <a:srgbClr val="FFFFFF"/>
                         </a:solidFill>
@@ -11349,7 +11464,7 @@
                     <a:p>
                       <a:pPr algn="ctr"/>
                       <a:r>
-                        <a:rPr lang="en-US" sz="1400" b="0" baseline="0" dirty="0" smtClean="0">
+                        <a:rPr lang="en-US" sz="1400" b="0" baseline="0" dirty="0">
                           <a:solidFill>
                             <a:srgbClr val="FFFFFF"/>
                           </a:solidFill>
@@ -11357,7 +11472,7 @@
                         <a:t>(</a:t>
                       </a:r>
                       <a:r>
-                        <a:rPr lang="en-US" sz="1400" b="0" baseline="0" dirty="0" err="1" smtClean="0">
+                        <a:rPr lang="en-US" sz="1400" b="0" baseline="0" dirty="0" err="1">
                           <a:solidFill>
                             <a:srgbClr val="FFFFFF"/>
                           </a:solidFill>
@@ -11365,7 +11480,7 @@
                         <a:t>x,y,z</a:t>
                       </a:r>
                       <a:r>
-                        <a:rPr lang="en-US" sz="1400" b="0" baseline="0" dirty="0" smtClean="0">
+                        <a:rPr lang="en-US" sz="1400" b="0" baseline="0" dirty="0">
                           <a:solidFill>
                             <a:srgbClr val="FFFFFF"/>
                           </a:solidFill>
@@ -11424,6 +11539,11 @@
                     </a:solidFill>
                   </a:tcPr>
                 </a:tc>
+                <a:extLst>
+                  <a:ext uri="{0D108BD9-81ED-4DB2-BD59-A6C34878D82A}">
+                    <a16:rowId xmlns:a16="http://schemas.microsoft.com/office/drawing/2014/main" val="10000"/>
+                  </a:ext>
+                </a:extLst>
               </a:tr>
               <a:tr h="171206">
                 <a:tc>
@@ -11433,18 +11553,13 @@
                     <a:p>
                       <a:pPr algn="l"/>
                       <a:r>
-                        <a:rPr lang="en-US" sz="1400" b="0" baseline="0" dirty="0" smtClean="0">
+                        <a:rPr lang="en-US" sz="1400" b="0" baseline="0" dirty="0">
                           <a:solidFill>
                             <a:srgbClr val="FFFFFF"/>
                           </a:solidFill>
                         </a:rPr>
                         <a:t>0</a:t>
                       </a:r>
-                      <a:endParaRPr lang="en-US" sz="1400" b="0" baseline="0" dirty="0" smtClean="0">
-                        <a:solidFill>
-                          <a:srgbClr val="FFFFFF"/>
-                        </a:solidFill>
-                      </a:endParaRPr>
                     </a:p>
                   </a:txBody>
                   <a:tcPr marR="0" marT="0" marB="0">
@@ -11504,10 +11619,9 @@
                     <a:p>
                       <a:pPr algn="ctr"/>
                       <a:r>
-                        <a:rPr lang="en-US" sz="1400" dirty="0" smtClean="0"/>
+                        <a:rPr lang="en-US" sz="1400" dirty="0"/>
                         <a:t>(0.1, 0.3, 0.4)</a:t>
                       </a:r>
-                      <a:endParaRPr lang="en-US" sz="1400" dirty="0"/>
                     </a:p>
                   </a:txBody>
                   <a:tcPr marL="0" marR="0" marT="0" marB="0">
@@ -11560,6 +11674,11 @@
                     </a:solidFill>
                   </a:tcPr>
                 </a:tc>
+                <a:extLst>
+                  <a:ext uri="{0D108BD9-81ED-4DB2-BD59-A6C34878D82A}">
+                    <a16:rowId xmlns:a16="http://schemas.microsoft.com/office/drawing/2014/main" val="10001"/>
+                  </a:ext>
+                </a:extLst>
               </a:tr>
               <a:tr h="171206">
                 <a:tc>
@@ -11569,18 +11688,13 @@
                     <a:p>
                       <a:pPr algn="l"/>
                       <a:r>
-                        <a:rPr lang="en-US" sz="1400" dirty="0" smtClean="0">
+                        <a:rPr lang="en-US" sz="1400" dirty="0">
                           <a:solidFill>
                             <a:srgbClr val="FFFFFF"/>
                           </a:solidFill>
                         </a:rPr>
                         <a:t>1</a:t>
                       </a:r>
-                      <a:endParaRPr lang="en-US" sz="1400" dirty="0">
-                        <a:solidFill>
-                          <a:srgbClr val="FFFFFF"/>
-                        </a:solidFill>
-                      </a:endParaRPr>
                     </a:p>
                   </a:txBody>
                   <a:tcPr marR="0" marT="0" marB="0">
@@ -11640,10 +11754,9 @@
                     <a:p>
                       <a:pPr algn="ctr"/>
                       <a:r>
-                        <a:rPr lang="en-US" sz="1400" dirty="0" smtClean="0"/>
+                        <a:rPr lang="en-US" sz="1400" dirty="0"/>
                         <a:t>(0.5, 0.4, 0.2)</a:t>
                       </a:r>
-                      <a:endParaRPr lang="en-US" sz="1400" dirty="0"/>
                     </a:p>
                   </a:txBody>
                   <a:tcPr marL="0" marR="0" marT="0" marB="0">
@@ -11696,6 +11809,11 @@
                     </a:solidFill>
                   </a:tcPr>
                 </a:tc>
+                <a:extLst>
+                  <a:ext uri="{0D108BD9-81ED-4DB2-BD59-A6C34878D82A}">
+                    <a16:rowId xmlns:a16="http://schemas.microsoft.com/office/drawing/2014/main" val="10002"/>
+                  </a:ext>
+                </a:extLst>
               </a:tr>
               <a:tr h="171206">
                 <a:tc>
@@ -11705,18 +11823,13 @@
                     <a:p>
                       <a:pPr algn="l"/>
                       <a:r>
-                        <a:rPr lang="en-US" sz="1400" dirty="0" smtClean="0">
+                        <a:rPr lang="en-US" sz="1400" dirty="0">
                           <a:solidFill>
                             <a:srgbClr val="FFFFFF"/>
                           </a:solidFill>
                         </a:rPr>
                         <a:t>2</a:t>
                       </a:r>
-                      <a:endParaRPr lang="en-US" sz="1400" dirty="0">
-                        <a:solidFill>
-                          <a:srgbClr val="FFFFFF"/>
-                        </a:solidFill>
-                      </a:endParaRPr>
                     </a:p>
                   </a:txBody>
                   <a:tcPr marR="0" marT="0" marB="0">
@@ -11776,10 +11889,9 @@
                     <a:p>
                       <a:pPr algn="ctr"/>
                       <a:r>
-                        <a:rPr lang="en-US" sz="1400" dirty="0" smtClean="0"/>
+                        <a:rPr lang="en-US" sz="1400" dirty="0"/>
                         <a:t>(1.5, 2.6, 1.8)</a:t>
                       </a:r>
-                      <a:endParaRPr lang="en-US" sz="1400" dirty="0"/>
                     </a:p>
                   </a:txBody>
                   <a:tcPr marL="0" marR="0" marT="0" marB="0">
@@ -11832,6 +11944,11 @@
                     </a:solidFill>
                   </a:tcPr>
                 </a:tc>
+                <a:extLst>
+                  <a:ext uri="{0D108BD9-81ED-4DB2-BD59-A6C34878D82A}">
+                    <a16:rowId xmlns:a16="http://schemas.microsoft.com/office/drawing/2014/main" val="10003"/>
+                  </a:ext>
+                </a:extLst>
               </a:tr>
               <a:tr h="171206">
                 <a:tc>
@@ -11841,18 +11958,13 @@
                     <a:p>
                       <a:pPr algn="l"/>
                       <a:r>
-                        <a:rPr lang="en-US" sz="1400" b="0" dirty="0" smtClean="0">
+                        <a:rPr lang="en-US" sz="1400" b="0" dirty="0">
                           <a:solidFill>
                             <a:srgbClr val="FFFFFF"/>
                           </a:solidFill>
                         </a:rPr>
                         <a:t>..</a:t>
                       </a:r>
-                      <a:endParaRPr lang="en-US" sz="1400" b="0" dirty="0">
-                        <a:solidFill>
-                          <a:srgbClr val="FFFFFF"/>
-                        </a:solidFill>
-                      </a:endParaRPr>
                     </a:p>
                   </a:txBody>
                   <a:tcPr marR="0" marT="0" marB="0">
@@ -11912,7 +12024,7 @@
                     <a:p>
                       <a:pPr algn="ctr"/>
                       <a:r>
-                        <a:rPr lang="mr-IN" sz="1400" dirty="0" smtClean="0"/>
+                        <a:rPr lang="mr-IN" sz="1400" dirty="0"/>
                         <a:t>…</a:t>
                       </a:r>
                       <a:endParaRPr lang="en-US" sz="1400" dirty="0"/>
@@ -11968,6 +12080,11 @@
                     </a:solidFill>
                   </a:tcPr>
                 </a:tc>
+                <a:extLst>
+                  <a:ext uri="{0D108BD9-81ED-4DB2-BD59-A6C34878D82A}">
+                    <a16:rowId xmlns:a16="http://schemas.microsoft.com/office/drawing/2014/main" val="10004"/>
+                  </a:ext>
+                </a:extLst>
               </a:tr>
             </a:tbl>
           </a:graphicData>
@@ -11997,7 +12114,7 @@
           <a:p>
             <a:pPr algn="ctr"/>
             <a:r>
-              <a:rPr lang="en-US" sz="1400" b="1" dirty="0" smtClean="0">
+              <a:rPr lang="en-US" sz="1400" b="1" dirty="0">
                 <a:solidFill>
                   <a:srgbClr val="052B48"/>
                 </a:solidFill>
@@ -12006,13 +12123,6 @@
               </a:rPr>
               <a:t>&lt;VectorData&gt;</a:t>
             </a:r>
-            <a:endParaRPr lang="en-US" sz="1400" b="1" dirty="0">
-              <a:solidFill>
-                <a:srgbClr val="052B48"/>
-              </a:solidFill>
-              <a:latin typeface="Calibri"/>
-              <a:cs typeface="Calibri"/>
-            </a:endParaRPr>
           </a:p>
         </p:txBody>
       </p:sp>
@@ -12069,13 +12179,6 @@
               </a:rPr>
               <a:t>&gt;</a:t>
             </a:r>
-            <a:endParaRPr lang="en-US" sz="1400" b="1" dirty="0">
-              <a:solidFill>
-                <a:srgbClr val="052B48"/>
-              </a:solidFill>
-              <a:latin typeface="Calibri"/>
-              <a:cs typeface="Calibri"/>
-            </a:endParaRPr>
           </a:p>
         </p:txBody>
       </p:sp>
@@ -12102,7 +12205,7 @@
           <a:p>
             <a:pPr algn="ctr"/>
             <a:r>
-              <a:rPr lang="en-US" sz="5400" b="1" dirty="0" err="1" smtClean="0">
+              <a:rPr lang="en-US" sz="5400" b="1" dirty="0" err="1">
                 <a:solidFill>
                   <a:srgbClr val="052B48"/>
                 </a:solidFill>
@@ -12223,7 +12326,7 @@
           <a:p>
             <a:pPr algn="ctr"/>
             <a:r>
-              <a:rPr lang="en-US" sz="5400" b="1" dirty="0" err="1" smtClean="0">
+              <a:rPr lang="en-US" sz="5400" b="1" dirty="0" err="1">
                 <a:solidFill>
                   <a:srgbClr val="052B48"/>
                 </a:solidFill>
@@ -12287,26 +12390,6 @@
           <a:lstStyle/>
           <a:p>
             <a:pPr algn="ctr"/>
-            <a:endParaRPr lang="en-US" sz="1200" dirty="0" smtClean="0"/>
-          </a:p>
-          <a:p>
-            <a:pPr algn="ctr"/>
-            <a:r>
-              <a:rPr lang="en-US" sz="1200" dirty="0" smtClean="0"/>
-              <a:t>-------------</a:t>
-            </a:r>
-            <a:endParaRPr lang="en-US" sz="1200" dirty="0"/>
-          </a:p>
-          <a:p>
-            <a:pPr algn="ctr"/>
-            <a:r>
-              <a:rPr lang="en-US" sz="1200" dirty="0"/>
-              <a:t>------------</a:t>
-            </a:r>
-            <a:r>
-              <a:rPr lang="en-US" sz="1200" dirty="0" smtClean="0"/>
-              <a:t>-</a:t>
-            </a:r>
             <a:endParaRPr lang="en-US" sz="1200" dirty="0"/>
           </a:p>
           <a:p>
@@ -12320,17 +12403,26 @@
             <a:pPr algn="ctr"/>
             <a:r>
               <a:rPr lang="en-US" sz="1200" dirty="0"/>
-              <a:t>-----------</a:t>
+              <a:t>-------------</a:t>
             </a:r>
-            <a:r>
-              <a:rPr lang="en-US" sz="1200" dirty="0" smtClean="0"/>
-              <a:t>--</a:t>
-            </a:r>
-            <a:endParaRPr lang="en-US" sz="1200" dirty="0"/>
           </a:p>
           <a:p>
             <a:pPr algn="ctr"/>
-            <a:endParaRPr lang="en-US" sz="1200" dirty="0" smtClean="0"/>
+            <a:r>
+              <a:rPr lang="en-US" sz="1200" dirty="0"/>
+              <a:t>-------------</a:t>
+            </a:r>
+          </a:p>
+          <a:p>
+            <a:pPr algn="ctr"/>
+            <a:r>
+              <a:rPr lang="en-US" sz="1200" dirty="0"/>
+              <a:t>-------------</a:t>
+            </a:r>
+          </a:p>
+          <a:p>
+            <a:pPr algn="ctr"/>
+            <a:endParaRPr lang="en-US" sz="1200" dirty="0"/>
           </a:p>
         </p:txBody>
       </p:sp>
@@ -12379,26 +12471,6 @@
           <a:lstStyle/>
           <a:p>
             <a:pPr algn="ctr"/>
-            <a:endParaRPr lang="en-US" sz="1200" dirty="0" smtClean="0"/>
-          </a:p>
-          <a:p>
-            <a:pPr algn="ctr"/>
-            <a:r>
-              <a:rPr lang="en-US" sz="1200" dirty="0" smtClean="0"/>
-              <a:t>-------------</a:t>
-            </a:r>
-            <a:endParaRPr lang="en-US" sz="1200" dirty="0"/>
-          </a:p>
-          <a:p>
-            <a:pPr algn="ctr"/>
-            <a:r>
-              <a:rPr lang="en-US" sz="1200" dirty="0"/>
-              <a:t>------------</a:t>
-            </a:r>
-            <a:r>
-              <a:rPr lang="en-US" sz="1200" dirty="0" smtClean="0"/>
-              <a:t>-</a:t>
-            </a:r>
             <a:endParaRPr lang="en-US" sz="1200" dirty="0"/>
           </a:p>
           <a:p>
@@ -12412,17 +12484,26 @@
             <a:pPr algn="ctr"/>
             <a:r>
               <a:rPr lang="en-US" sz="1200" dirty="0"/>
-              <a:t>-----------</a:t>
+              <a:t>-------------</a:t>
             </a:r>
-            <a:r>
-              <a:rPr lang="en-US" sz="1200" dirty="0" smtClean="0"/>
-              <a:t>--</a:t>
-            </a:r>
-            <a:endParaRPr lang="en-US" sz="1200" dirty="0"/>
           </a:p>
           <a:p>
             <a:pPr algn="ctr"/>
-            <a:endParaRPr lang="en-US" sz="1200" dirty="0" smtClean="0"/>
+            <a:r>
+              <a:rPr lang="en-US" sz="1200" dirty="0"/>
+              <a:t>-------------</a:t>
+            </a:r>
+          </a:p>
+          <a:p>
+            <a:pPr algn="ctr"/>
+            <a:r>
+              <a:rPr lang="en-US" sz="1200" dirty="0"/>
+              <a:t>-------------</a:t>
+            </a:r>
+          </a:p>
+          <a:p>
+            <a:pPr algn="ctr"/>
+            <a:endParaRPr lang="en-US" sz="1200" dirty="0"/>
           </a:p>
         </p:txBody>
       </p:sp>
@@ -12471,26 +12552,6 @@
           <a:lstStyle/>
           <a:p>
             <a:pPr algn="ctr"/>
-            <a:endParaRPr lang="en-US" sz="1200" dirty="0" smtClean="0"/>
-          </a:p>
-          <a:p>
-            <a:pPr algn="ctr"/>
-            <a:r>
-              <a:rPr lang="en-US" sz="1200" dirty="0" smtClean="0"/>
-              <a:t>-------------</a:t>
-            </a:r>
-            <a:endParaRPr lang="en-US" sz="1200" dirty="0"/>
-          </a:p>
-          <a:p>
-            <a:pPr algn="ctr"/>
-            <a:r>
-              <a:rPr lang="en-US" sz="1200" dirty="0"/>
-              <a:t>------------</a:t>
-            </a:r>
-            <a:r>
-              <a:rPr lang="en-US" sz="1200" dirty="0" smtClean="0"/>
-              <a:t>-</a:t>
-            </a:r>
             <a:endParaRPr lang="en-US" sz="1200" dirty="0"/>
           </a:p>
           <a:p>
@@ -12504,17 +12565,26 @@
             <a:pPr algn="ctr"/>
             <a:r>
               <a:rPr lang="en-US" sz="1200" dirty="0"/>
-              <a:t>-----------</a:t>
+              <a:t>-------------</a:t>
             </a:r>
-            <a:r>
-              <a:rPr lang="en-US" sz="1200" dirty="0" smtClean="0"/>
-              <a:t>--</a:t>
-            </a:r>
-            <a:endParaRPr lang="en-US" sz="1200" dirty="0"/>
           </a:p>
           <a:p>
             <a:pPr algn="ctr"/>
-            <a:endParaRPr lang="en-US" sz="1200" dirty="0" smtClean="0"/>
+            <a:r>
+              <a:rPr lang="en-US" sz="1200" dirty="0"/>
+              <a:t>-------------</a:t>
+            </a:r>
+          </a:p>
+          <a:p>
+            <a:pPr algn="ctr"/>
+            <a:r>
+              <a:rPr lang="en-US" sz="1200" dirty="0"/>
+              <a:t>-------------</a:t>
+            </a:r>
+          </a:p>
+          <a:p>
+            <a:pPr algn="ctr"/>
+            <a:endParaRPr lang="en-US" sz="1200" dirty="0"/>
           </a:p>
         </p:txBody>
       </p:sp>
@@ -12788,7 +12858,7 @@
           <a:p>
             <a:pPr algn="ctr"/>
             <a:r>
-              <a:rPr lang="en-US" sz="5400" b="1" dirty="0" err="1" smtClean="0">
+              <a:rPr lang="en-US" sz="5400" b="1" dirty="0" err="1">
                 <a:solidFill>
                   <a:srgbClr val="052B48"/>
                 </a:solidFill>
@@ -12848,6 +12918,1115 @@
     <p:extLst>
       <p:ext uri="{BB962C8B-B14F-4D97-AF65-F5344CB8AC3E}">
         <p14:creationId xmlns:p14="http://schemas.microsoft.com/office/powerpoint/2010/main" val="2909957797"/>
+      </p:ext>
+    </p:extLst>
+  </p:cSld>
+  <p:clrMapOvr>
+    <a:masterClrMapping/>
+  </p:clrMapOvr>
+</p:sld>
+</file>
+
+<file path=ppt/slides/slide5.xml><?xml version="1.0" encoding="utf-8"?>
+<p:sld xmlns:a="http://schemas.openxmlformats.org/drawingml/2006/main" xmlns:r="http://schemas.openxmlformats.org/officeDocument/2006/relationships" xmlns:p="http://schemas.openxmlformats.org/presentationml/2006/main">
+  <p:cSld>
+    <p:spTree>
+      <p:nvGrpSpPr>
+        <p:cNvPr id="1" name=""/>
+        <p:cNvGrpSpPr/>
+        <p:nvPr/>
+      </p:nvGrpSpPr>
+      <p:grpSpPr>
+        <a:xfrm>
+          <a:off x="0" y="0"/>
+          <a:ext cx="0" cy="0"/>
+          <a:chOff x="0" y="0"/>
+          <a:chExt cx="0" cy="0"/>
+        </a:xfrm>
+      </p:grpSpPr>
+      <p:sp>
+        <p:nvSpPr>
+          <p:cNvPr id="5" name="Rounded Rectangle 4">
+            <a:extLst>
+              <a:ext uri="{FF2B5EF4-FFF2-40B4-BE49-F238E27FC236}">
+                <a16:creationId xmlns:a16="http://schemas.microsoft.com/office/drawing/2014/main" id="{9CD34A0F-9AB2-5841-9E08-8B0C7A830E9B}"/>
+              </a:ext>
+            </a:extLst>
+          </p:cNvPr>
+          <p:cNvSpPr/>
+          <p:nvPr/>
+        </p:nvSpPr>
+        <p:spPr>
+          <a:xfrm>
+            <a:off x="853570" y="853671"/>
+            <a:ext cx="7234527" cy="4851352"/>
+          </a:xfrm>
+          <a:prstGeom prst="roundRect">
+            <a:avLst>
+              <a:gd name="adj" fmla="val 4437"/>
+            </a:avLst>
+          </a:prstGeom>
+          <a:solidFill>
+            <a:srgbClr val="EDEDED"/>
+          </a:solidFill>
+          <a:ln>
+            <a:solidFill>
+              <a:srgbClr val="000000"/>
+            </a:solidFill>
+          </a:ln>
+          <a:effectLst/>
+        </p:spPr>
+        <p:style>
+          <a:lnRef idx="1">
+            <a:schemeClr val="accent1"/>
+          </a:lnRef>
+          <a:fillRef idx="3">
+            <a:schemeClr val="accent1"/>
+          </a:fillRef>
+          <a:effectRef idx="2">
+            <a:schemeClr val="accent1"/>
+          </a:effectRef>
+          <a:fontRef idx="minor">
+            <a:schemeClr val="lt1"/>
+          </a:fontRef>
+        </p:style>
+        <p:txBody>
+          <a:bodyPr rtlCol="0" anchor="ctr"/>
+          <a:lstStyle/>
+          <a:p>
+            <a:pPr algn="ctr"/>
+            <a:endParaRPr lang="en-US"/>
+          </a:p>
+        </p:txBody>
+      </p:sp>
+      <p:sp>
+        <p:nvSpPr>
+          <p:cNvPr id="6" name="Rectangle 5">
+            <a:extLst>
+              <a:ext uri="{FF2B5EF4-FFF2-40B4-BE49-F238E27FC236}">
+                <a16:creationId xmlns:a16="http://schemas.microsoft.com/office/drawing/2014/main" id="{CC770130-5EE4-FD4A-AE93-EB252A3711BD}"/>
+              </a:ext>
+            </a:extLst>
+          </p:cNvPr>
+          <p:cNvSpPr/>
+          <p:nvPr/>
+        </p:nvSpPr>
+        <p:spPr>
+          <a:xfrm>
+            <a:off x="863980" y="855015"/>
+            <a:ext cx="7213708" cy="677108"/>
+          </a:xfrm>
+          <a:prstGeom prst="rect">
+            <a:avLst/>
+          </a:prstGeom>
+        </p:spPr>
+        <p:txBody>
+          <a:bodyPr wrap="square">
+            <a:spAutoFit/>
+          </a:bodyPr>
+          <a:lstStyle/>
+          <a:p>
+            <a:pPr algn="ctr"/>
+            <a:r>
+              <a:rPr lang="en-US" sz="3800" b="1" dirty="0" err="1">
+                <a:solidFill>
+                  <a:srgbClr val="052B48"/>
+                </a:solidFill>
+                <a:latin typeface="Courier" pitchFamily="2" charset="0"/>
+                <a:cs typeface="Courier New" panose="02070309020205020404" pitchFamily="49" charset="0"/>
+              </a:rPr>
+              <a:t>GenericDataChunkIterator</a:t>
+            </a:r>
+            <a:endParaRPr lang="en-US" sz="3800" b="1" dirty="0">
+              <a:solidFill>
+                <a:srgbClr val="052B48"/>
+              </a:solidFill>
+              <a:latin typeface="Courier" pitchFamily="2" charset="0"/>
+              <a:cs typeface="Courier New" panose="02070309020205020404" pitchFamily="49" charset="0"/>
+            </a:endParaRPr>
+          </a:p>
+        </p:txBody>
+      </p:sp>
+      <p:sp>
+        <p:nvSpPr>
+          <p:cNvPr id="8" name="Curved Right Arrow 7">
+            <a:extLst>
+              <a:ext uri="{FF2B5EF4-FFF2-40B4-BE49-F238E27FC236}">
+                <a16:creationId xmlns:a16="http://schemas.microsoft.com/office/drawing/2014/main" id="{0E05D44F-881E-D147-AC3F-718A69FCF7CE}"/>
+              </a:ext>
+            </a:extLst>
+          </p:cNvPr>
+          <p:cNvSpPr/>
+          <p:nvPr/>
+        </p:nvSpPr>
+        <p:spPr>
+          <a:xfrm flipV="1">
+            <a:off x="1458410" y="1770861"/>
+            <a:ext cx="1702606" cy="3316278"/>
+          </a:xfrm>
+          <a:prstGeom prst="curvedRightArrow">
+            <a:avLst/>
+          </a:prstGeom>
+          <a:gradFill rotWithShape="1">
+            <a:gsLst>
+              <a:gs pos="24000">
+                <a:srgbClr val="052A48"/>
+              </a:gs>
+              <a:gs pos="70000">
+                <a:schemeClr val="bg1">
+                  <a:lumMod val="44037"/>
+                  <a:lumOff val="55963"/>
+                </a:schemeClr>
+              </a:gs>
+            </a:gsLst>
+            <a:lin ang="16200000" scaled="0"/>
+          </a:gradFill>
+          <a:ln w="9525" cap="flat" cmpd="sng" algn="ctr">
+            <a:solidFill>
+              <a:sysClr val="windowText" lastClr="000000"/>
+            </a:solidFill>
+            <a:prstDash val="solid"/>
+          </a:ln>
+          <a:effectLst>
+            <a:outerShdw blurRad="40000" dist="23000" dir="5400000" rotWithShape="0">
+              <a:srgbClr val="000000">
+                <a:alpha val="35000"/>
+              </a:srgbClr>
+            </a:outerShdw>
+          </a:effectLst>
+        </p:spPr>
+        <p:txBody>
+          <a:bodyPr rtlCol="0" anchor="ctr"/>
+          <a:lstStyle/>
+          <a:p>
+            <a:pPr marL="0" marR="0" lvl="0" indent="0" algn="ctr" defTabSz="914400" eaLnBrk="1" fontAlgn="auto" latinLnBrk="0" hangingPunct="1">
+              <a:lnSpc>
+                <a:spcPct val="100000"/>
+              </a:lnSpc>
+              <a:spcBef>
+                <a:spcPts val="0"/>
+              </a:spcBef>
+              <a:spcAft>
+                <a:spcPts val="0"/>
+              </a:spcAft>
+              <a:buClrTx/>
+              <a:buSzTx/>
+              <a:buFontTx/>
+              <a:buNone/>
+              <a:tabLst/>
+              <a:defRPr/>
+            </a:pPr>
+            <a:endParaRPr kumimoji="0" lang="en-US" sz="1800" b="0" i="0" u="none" strike="noStrike" kern="0" cap="none" spc="0" normalizeH="0" baseline="0" noProof="0">
+              <a:ln>
+                <a:noFill/>
+              </a:ln>
+              <a:solidFill>
+                <a:sysClr val="windowText" lastClr="000000"/>
+              </a:solidFill>
+              <a:effectLst/>
+              <a:uLnTx/>
+              <a:uFillTx/>
+              <a:latin typeface="Calibri"/>
+              <a:ea typeface="+mn-ea"/>
+              <a:cs typeface="+mn-cs"/>
+            </a:endParaRPr>
+          </a:p>
+        </p:txBody>
+      </p:sp>
+      <p:sp>
+        <p:nvSpPr>
+          <p:cNvPr id="9" name="Curved Right Arrow 8">
+            <a:extLst>
+              <a:ext uri="{FF2B5EF4-FFF2-40B4-BE49-F238E27FC236}">
+                <a16:creationId xmlns:a16="http://schemas.microsoft.com/office/drawing/2014/main" id="{7E41067D-CFF7-8745-B91C-34FF13C878E4}"/>
+              </a:ext>
+            </a:extLst>
+          </p:cNvPr>
+          <p:cNvSpPr/>
+          <p:nvPr/>
+        </p:nvSpPr>
+        <p:spPr>
+          <a:xfrm flipH="1">
+            <a:off x="5757580" y="1796904"/>
+            <a:ext cx="1702605" cy="3316278"/>
+          </a:xfrm>
+          <a:prstGeom prst="curvedRightArrow">
+            <a:avLst/>
+          </a:prstGeom>
+          <a:gradFill rotWithShape="1">
+            <a:gsLst>
+              <a:gs pos="29000">
+                <a:schemeClr val="accent1">
+                  <a:lumMod val="75000"/>
+                </a:schemeClr>
+              </a:gs>
+              <a:gs pos="87000">
+                <a:srgbClr val="C00000"/>
+              </a:gs>
+            </a:gsLst>
+            <a:lin ang="16200000" scaled="0"/>
+          </a:gradFill>
+          <a:ln w="9525" cap="flat" cmpd="sng" algn="ctr">
+            <a:solidFill>
+              <a:sysClr val="windowText" lastClr="000000"/>
+            </a:solidFill>
+            <a:prstDash val="solid"/>
+          </a:ln>
+          <a:effectLst>
+            <a:outerShdw blurRad="40000" dist="23000" dir="5400000" rotWithShape="0">
+              <a:srgbClr val="000000">
+                <a:alpha val="35000"/>
+              </a:srgbClr>
+            </a:outerShdw>
+          </a:effectLst>
+        </p:spPr>
+        <p:txBody>
+          <a:bodyPr rtlCol="0" anchor="ctr"/>
+          <a:lstStyle/>
+          <a:p>
+            <a:pPr marL="0" marR="0" lvl="0" indent="0" algn="ctr" defTabSz="914400" eaLnBrk="1" fontAlgn="auto" latinLnBrk="0" hangingPunct="1">
+              <a:lnSpc>
+                <a:spcPct val="100000"/>
+              </a:lnSpc>
+              <a:spcBef>
+                <a:spcPts val="0"/>
+              </a:spcBef>
+              <a:spcAft>
+                <a:spcPts val="0"/>
+              </a:spcAft>
+              <a:buClrTx/>
+              <a:buSzTx/>
+              <a:buFontTx/>
+              <a:buNone/>
+              <a:tabLst/>
+              <a:defRPr/>
+            </a:pPr>
+            <a:endParaRPr kumimoji="0" lang="en-US" sz="1800" b="0" i="0" u="none" strike="noStrike" kern="0" cap="none" spc="0" normalizeH="0" baseline="0" noProof="0">
+              <a:ln>
+                <a:noFill/>
+              </a:ln>
+              <a:solidFill>
+                <a:sysClr val="windowText" lastClr="000000"/>
+              </a:solidFill>
+              <a:effectLst/>
+              <a:uLnTx/>
+              <a:uFillTx/>
+              <a:latin typeface="Calibri"/>
+              <a:ea typeface="+mn-ea"/>
+              <a:cs typeface="+mn-cs"/>
+            </a:endParaRPr>
+          </a:p>
+        </p:txBody>
+      </p:sp>
+      <p:grpSp>
+        <p:nvGrpSpPr>
+          <p:cNvPr id="18" name="Group 17">
+            <a:extLst>
+              <a:ext uri="{FF2B5EF4-FFF2-40B4-BE49-F238E27FC236}">
+                <a16:creationId xmlns:a16="http://schemas.microsoft.com/office/drawing/2014/main" id="{1B5F8B31-FB1F-974C-9DAC-2E016F17C816}"/>
+              </a:ext>
+            </a:extLst>
+          </p:cNvPr>
+          <p:cNvGrpSpPr>
+            <a:grpSpLocks noChangeAspect="1"/>
+          </p:cNvGrpSpPr>
+          <p:nvPr/>
+        </p:nvGrpSpPr>
+        <p:grpSpPr>
+          <a:xfrm>
+            <a:off x="3416937" y="3854054"/>
+            <a:ext cx="2037088" cy="1767487"/>
+            <a:chOff x="7635099" y="2460210"/>
+            <a:chExt cx="3917748" cy="3399249"/>
+          </a:xfrm>
+        </p:grpSpPr>
+        <p:sp>
+          <p:nvSpPr>
+            <p:cNvPr id="10" name="Cube 9">
+              <a:extLst>
+                <a:ext uri="{FF2B5EF4-FFF2-40B4-BE49-F238E27FC236}">
+                  <a16:creationId xmlns:a16="http://schemas.microsoft.com/office/drawing/2014/main" id="{5782626C-AF0C-DD40-BB16-1C25BCF0B204}"/>
+                </a:ext>
+              </a:extLst>
+            </p:cNvPr>
+            <p:cNvSpPr/>
+            <p:nvPr/>
+          </p:nvSpPr>
+          <p:spPr>
+            <a:xfrm>
+              <a:off x="8065710" y="3751363"/>
+              <a:ext cx="1901188" cy="1633887"/>
+            </a:xfrm>
+            <a:prstGeom prst="cube">
+              <a:avLst/>
+            </a:prstGeom>
+            <a:solidFill>
+              <a:srgbClr val="052A48"/>
+            </a:solidFill>
+            <a:ln w="28575" cap="flat" cmpd="sng" algn="ctr">
+              <a:solidFill>
+                <a:srgbClr val="FFFFFF"/>
+              </a:solidFill>
+              <a:prstDash val="solid"/>
+            </a:ln>
+            <a:effectLst/>
+          </p:spPr>
+          <p:txBody>
+            <a:bodyPr rtlCol="0" anchor="ctr"/>
+            <a:lstStyle/>
+            <a:p>
+              <a:pPr marL="0" marR="0" lvl="0" indent="0" algn="ctr" defTabSz="914400" eaLnBrk="1" fontAlgn="auto" latinLnBrk="0" hangingPunct="1">
+                <a:lnSpc>
+                  <a:spcPct val="100000"/>
+                </a:lnSpc>
+                <a:spcBef>
+                  <a:spcPts val="0"/>
+                </a:spcBef>
+                <a:spcAft>
+                  <a:spcPts val="0"/>
+                </a:spcAft>
+                <a:buClrTx/>
+                <a:buSzTx/>
+                <a:buFontTx/>
+                <a:buNone/>
+                <a:tabLst/>
+                <a:defRPr/>
+              </a:pPr>
+              <a:endParaRPr kumimoji="0" lang="en-US" sz="1800" b="0" i="0" u="none" strike="noStrike" kern="0" cap="none" spc="0" normalizeH="0" baseline="0" noProof="0">
+                <a:ln>
+                  <a:noFill/>
+                </a:ln>
+                <a:solidFill>
+                  <a:sysClr val="window" lastClr="FFFFFF"/>
+                </a:solidFill>
+                <a:effectLst/>
+                <a:uLnTx/>
+                <a:uFillTx/>
+                <a:latin typeface="Calibri"/>
+                <a:ea typeface="+mn-ea"/>
+                <a:cs typeface="+mn-cs"/>
+              </a:endParaRPr>
+            </a:p>
+          </p:txBody>
+        </p:sp>
+        <p:sp>
+          <p:nvSpPr>
+            <p:cNvPr id="11" name="Cube 10">
+              <a:extLst>
+                <a:ext uri="{FF2B5EF4-FFF2-40B4-BE49-F238E27FC236}">
+                  <a16:creationId xmlns:a16="http://schemas.microsoft.com/office/drawing/2014/main" id="{C0587256-9A2B-8C4D-AE67-0AD974A9D29F}"/>
+                </a:ext>
+              </a:extLst>
+            </p:cNvPr>
+            <p:cNvSpPr/>
+            <p:nvPr/>
+          </p:nvSpPr>
+          <p:spPr>
+            <a:xfrm>
+              <a:off x="9651659" y="3751363"/>
+              <a:ext cx="1901188" cy="1633887"/>
+            </a:xfrm>
+            <a:prstGeom prst="cube">
+              <a:avLst/>
+            </a:prstGeom>
+            <a:solidFill>
+              <a:srgbClr val="052A48"/>
+            </a:solidFill>
+            <a:ln w="28575" cap="flat" cmpd="sng" algn="ctr">
+              <a:solidFill>
+                <a:srgbClr val="FFFFFF"/>
+              </a:solidFill>
+              <a:prstDash val="solid"/>
+            </a:ln>
+            <a:effectLst/>
+          </p:spPr>
+          <p:txBody>
+            <a:bodyPr rtlCol="0" anchor="ctr"/>
+            <a:lstStyle/>
+            <a:p>
+              <a:pPr marL="0" marR="0" lvl="0" indent="0" algn="ctr" defTabSz="914400" eaLnBrk="1" fontAlgn="auto" latinLnBrk="0" hangingPunct="1">
+                <a:lnSpc>
+                  <a:spcPct val="100000"/>
+                </a:lnSpc>
+                <a:spcBef>
+                  <a:spcPts val="0"/>
+                </a:spcBef>
+                <a:spcAft>
+                  <a:spcPts val="0"/>
+                </a:spcAft>
+                <a:buClrTx/>
+                <a:buSzTx/>
+                <a:buFontTx/>
+                <a:buNone/>
+                <a:tabLst/>
+                <a:defRPr/>
+              </a:pPr>
+              <a:endParaRPr kumimoji="0" lang="en-US" sz="1800" b="0" i="0" u="none" strike="noStrike" kern="0" cap="none" spc="0" normalizeH="0" baseline="0" noProof="0">
+                <a:ln>
+                  <a:noFill/>
+                </a:ln>
+                <a:solidFill>
+                  <a:sysClr val="window" lastClr="FFFFFF"/>
+                </a:solidFill>
+                <a:effectLst/>
+                <a:uLnTx/>
+                <a:uFillTx/>
+                <a:latin typeface="Calibri"/>
+                <a:ea typeface="+mn-ea"/>
+                <a:cs typeface="+mn-cs"/>
+              </a:endParaRPr>
+            </a:p>
+          </p:txBody>
+        </p:sp>
+        <p:sp>
+          <p:nvSpPr>
+            <p:cNvPr id="12" name="Cube 11">
+              <a:extLst>
+                <a:ext uri="{FF2B5EF4-FFF2-40B4-BE49-F238E27FC236}">
+                  <a16:creationId xmlns:a16="http://schemas.microsoft.com/office/drawing/2014/main" id="{C00A4BF3-BB4C-5641-A2AA-2E58B938CBEE}"/>
+                </a:ext>
+              </a:extLst>
+            </p:cNvPr>
+            <p:cNvSpPr/>
+            <p:nvPr/>
+          </p:nvSpPr>
+          <p:spPr>
+            <a:xfrm>
+              <a:off x="8065710" y="2460210"/>
+              <a:ext cx="1901188" cy="1633887"/>
+            </a:xfrm>
+            <a:prstGeom prst="cube">
+              <a:avLst/>
+            </a:prstGeom>
+            <a:solidFill>
+              <a:srgbClr val="052A48"/>
+            </a:solidFill>
+            <a:ln w="28575" cap="flat" cmpd="sng" algn="ctr">
+              <a:solidFill>
+                <a:schemeClr val="bg1"/>
+              </a:solidFill>
+              <a:prstDash val="solid"/>
+            </a:ln>
+            <a:effectLst/>
+          </p:spPr>
+          <p:txBody>
+            <a:bodyPr rtlCol="0" anchor="ctr"/>
+            <a:lstStyle/>
+            <a:p>
+              <a:pPr marL="0" marR="0" lvl="0" indent="0" algn="ctr" defTabSz="914400" eaLnBrk="1" fontAlgn="auto" latinLnBrk="0" hangingPunct="1">
+                <a:lnSpc>
+                  <a:spcPct val="100000"/>
+                </a:lnSpc>
+                <a:spcBef>
+                  <a:spcPts val="0"/>
+                </a:spcBef>
+                <a:spcAft>
+                  <a:spcPts val="0"/>
+                </a:spcAft>
+                <a:buClrTx/>
+                <a:buSzTx/>
+                <a:buFontTx/>
+                <a:buNone/>
+                <a:tabLst/>
+                <a:defRPr/>
+              </a:pPr>
+              <a:endParaRPr kumimoji="0" lang="en-US" sz="1800" b="0" i="0" u="none" strike="noStrike" kern="0" cap="none" spc="0" normalizeH="0" baseline="0" noProof="0">
+                <a:ln>
+                  <a:noFill/>
+                </a:ln>
+                <a:solidFill>
+                  <a:sysClr val="window" lastClr="FFFFFF"/>
+                </a:solidFill>
+                <a:effectLst/>
+                <a:uLnTx/>
+                <a:uFillTx/>
+                <a:latin typeface="Calibri"/>
+                <a:ea typeface="+mn-ea"/>
+                <a:cs typeface="+mn-cs"/>
+              </a:endParaRPr>
+            </a:p>
+          </p:txBody>
+        </p:sp>
+        <p:sp>
+          <p:nvSpPr>
+            <p:cNvPr id="14" name="Cube 13">
+              <a:extLst>
+                <a:ext uri="{FF2B5EF4-FFF2-40B4-BE49-F238E27FC236}">
+                  <a16:creationId xmlns:a16="http://schemas.microsoft.com/office/drawing/2014/main" id="{FABCCDBB-C8F8-0D45-ACE1-F2982E06CA83}"/>
+                </a:ext>
+              </a:extLst>
+            </p:cNvPr>
+            <p:cNvSpPr/>
+            <p:nvPr/>
+          </p:nvSpPr>
+          <p:spPr>
+            <a:xfrm>
+              <a:off x="7635099" y="4225572"/>
+              <a:ext cx="1901188" cy="1633887"/>
+            </a:xfrm>
+            <a:prstGeom prst="cube">
+              <a:avLst/>
+            </a:prstGeom>
+            <a:solidFill>
+              <a:srgbClr val="052A48"/>
+            </a:solidFill>
+            <a:ln w="28575" cap="flat" cmpd="sng" algn="ctr">
+              <a:solidFill>
+                <a:srgbClr val="FFFFFF"/>
+              </a:solidFill>
+              <a:prstDash val="solid"/>
+            </a:ln>
+            <a:effectLst/>
+          </p:spPr>
+          <p:txBody>
+            <a:bodyPr rtlCol="0" anchor="ctr"/>
+            <a:lstStyle/>
+            <a:p>
+              <a:pPr marL="0" marR="0" lvl="0" indent="0" algn="ctr" defTabSz="914400" eaLnBrk="1" fontAlgn="auto" latinLnBrk="0" hangingPunct="1">
+                <a:lnSpc>
+                  <a:spcPct val="100000"/>
+                </a:lnSpc>
+                <a:spcBef>
+                  <a:spcPts val="0"/>
+                </a:spcBef>
+                <a:spcAft>
+                  <a:spcPts val="0"/>
+                </a:spcAft>
+                <a:buClrTx/>
+                <a:buSzTx/>
+                <a:buFontTx/>
+                <a:buNone/>
+                <a:tabLst/>
+                <a:defRPr/>
+              </a:pPr>
+              <a:endParaRPr kumimoji="0" lang="en-US" sz="1800" b="0" i="0" u="none" strike="noStrike" kern="0" cap="none" spc="0" normalizeH="0" baseline="0" noProof="0">
+                <a:ln>
+                  <a:noFill/>
+                </a:ln>
+                <a:solidFill>
+                  <a:sysClr val="window" lastClr="FFFFFF"/>
+                </a:solidFill>
+                <a:effectLst/>
+                <a:uLnTx/>
+                <a:uFillTx/>
+                <a:latin typeface="Calibri"/>
+                <a:ea typeface="+mn-ea"/>
+                <a:cs typeface="+mn-cs"/>
+              </a:endParaRPr>
+            </a:p>
+          </p:txBody>
+        </p:sp>
+        <p:sp>
+          <p:nvSpPr>
+            <p:cNvPr id="16" name="Cube 15">
+              <a:extLst>
+                <a:ext uri="{FF2B5EF4-FFF2-40B4-BE49-F238E27FC236}">
+                  <a16:creationId xmlns:a16="http://schemas.microsoft.com/office/drawing/2014/main" id="{476DEF7D-B377-2442-B052-620C8D9FE4DA}"/>
+                </a:ext>
+              </a:extLst>
+            </p:cNvPr>
+            <p:cNvSpPr/>
+            <p:nvPr/>
+          </p:nvSpPr>
+          <p:spPr>
+            <a:xfrm>
+              <a:off x="7635099" y="2934419"/>
+              <a:ext cx="1901188" cy="1633887"/>
+            </a:xfrm>
+            <a:prstGeom prst="cube">
+              <a:avLst/>
+            </a:prstGeom>
+            <a:solidFill>
+              <a:srgbClr val="052A48"/>
+            </a:solidFill>
+            <a:ln w="28575" cap="flat" cmpd="sng" algn="ctr">
+              <a:solidFill>
+                <a:schemeClr val="bg1"/>
+              </a:solidFill>
+              <a:prstDash val="solid"/>
+            </a:ln>
+            <a:effectLst/>
+          </p:spPr>
+          <p:txBody>
+            <a:bodyPr rtlCol="0" anchor="ctr"/>
+            <a:lstStyle/>
+            <a:p>
+              <a:pPr marL="0" marR="0" lvl="0" indent="0" algn="ctr" defTabSz="914400" eaLnBrk="1" fontAlgn="auto" latinLnBrk="0" hangingPunct="1">
+                <a:lnSpc>
+                  <a:spcPct val="100000"/>
+                </a:lnSpc>
+                <a:spcBef>
+                  <a:spcPts val="0"/>
+                </a:spcBef>
+                <a:spcAft>
+                  <a:spcPts val="0"/>
+                </a:spcAft>
+                <a:buClrTx/>
+                <a:buSzTx/>
+                <a:buFontTx/>
+                <a:buNone/>
+                <a:tabLst/>
+                <a:defRPr/>
+              </a:pPr>
+              <a:endParaRPr kumimoji="0" lang="en-US" sz="1800" b="0" i="0" u="none" strike="noStrike" kern="0" cap="none" spc="0" normalizeH="0" baseline="0" noProof="0">
+                <a:ln>
+                  <a:noFill/>
+                </a:ln>
+                <a:solidFill>
+                  <a:sysClr val="window" lastClr="FFFFFF"/>
+                </a:solidFill>
+                <a:effectLst/>
+                <a:uLnTx/>
+                <a:uFillTx/>
+                <a:latin typeface="Calibri"/>
+                <a:ea typeface="+mn-ea"/>
+                <a:cs typeface="+mn-cs"/>
+              </a:endParaRPr>
+            </a:p>
+          </p:txBody>
+        </p:sp>
+      </p:grpSp>
+      <p:grpSp>
+        <p:nvGrpSpPr>
+          <p:cNvPr id="24" name="Group 23">
+            <a:extLst>
+              <a:ext uri="{FF2B5EF4-FFF2-40B4-BE49-F238E27FC236}">
+                <a16:creationId xmlns:a16="http://schemas.microsoft.com/office/drawing/2014/main" id="{E9D50164-93F3-9341-BE77-EF668DFDE85A}"/>
+              </a:ext>
+            </a:extLst>
+          </p:cNvPr>
+          <p:cNvGrpSpPr>
+            <a:grpSpLocks noChangeAspect="1"/>
+          </p:cNvGrpSpPr>
+          <p:nvPr/>
+        </p:nvGrpSpPr>
+        <p:grpSpPr>
+          <a:xfrm>
+            <a:off x="3446932" y="1600486"/>
+            <a:ext cx="2037088" cy="1767487"/>
+            <a:chOff x="7635099" y="2460210"/>
+            <a:chExt cx="3917748" cy="3399249"/>
+          </a:xfrm>
+        </p:grpSpPr>
+        <p:sp>
+          <p:nvSpPr>
+            <p:cNvPr id="25" name="Cube 24">
+              <a:extLst>
+                <a:ext uri="{FF2B5EF4-FFF2-40B4-BE49-F238E27FC236}">
+                  <a16:creationId xmlns:a16="http://schemas.microsoft.com/office/drawing/2014/main" id="{98EE61E4-E6D0-D84B-A72C-C47BB6962BC4}"/>
+                </a:ext>
+              </a:extLst>
+            </p:cNvPr>
+            <p:cNvSpPr/>
+            <p:nvPr/>
+          </p:nvSpPr>
+          <p:spPr>
+            <a:xfrm>
+              <a:off x="8065710" y="3751363"/>
+              <a:ext cx="1901188" cy="1633887"/>
+            </a:xfrm>
+            <a:prstGeom prst="cube">
+              <a:avLst/>
+            </a:prstGeom>
+            <a:solidFill>
+              <a:srgbClr val="052A48"/>
+            </a:solidFill>
+            <a:ln w="28575" cap="flat" cmpd="sng" algn="ctr">
+              <a:solidFill>
+                <a:srgbClr val="FFFFFF"/>
+              </a:solidFill>
+              <a:prstDash val="solid"/>
+            </a:ln>
+            <a:effectLst/>
+          </p:spPr>
+          <p:txBody>
+            <a:bodyPr rtlCol="0" anchor="ctr"/>
+            <a:lstStyle/>
+            <a:p>
+              <a:pPr marL="0" marR="0" lvl="0" indent="0" algn="ctr" defTabSz="914400" eaLnBrk="1" fontAlgn="auto" latinLnBrk="0" hangingPunct="1">
+                <a:lnSpc>
+                  <a:spcPct val="100000"/>
+                </a:lnSpc>
+                <a:spcBef>
+                  <a:spcPts val="0"/>
+                </a:spcBef>
+                <a:spcAft>
+                  <a:spcPts val="0"/>
+                </a:spcAft>
+                <a:buClrTx/>
+                <a:buSzTx/>
+                <a:buFontTx/>
+                <a:buNone/>
+                <a:tabLst/>
+                <a:defRPr/>
+              </a:pPr>
+              <a:endParaRPr kumimoji="0" lang="en-US" sz="1800" b="0" i="0" u="none" strike="noStrike" kern="0" cap="none" spc="0" normalizeH="0" baseline="0" noProof="0">
+                <a:ln>
+                  <a:noFill/>
+                </a:ln>
+                <a:solidFill>
+                  <a:sysClr val="window" lastClr="FFFFFF"/>
+                </a:solidFill>
+                <a:effectLst/>
+                <a:uLnTx/>
+                <a:uFillTx/>
+                <a:latin typeface="Calibri"/>
+                <a:ea typeface="+mn-ea"/>
+                <a:cs typeface="+mn-cs"/>
+              </a:endParaRPr>
+            </a:p>
+          </p:txBody>
+        </p:sp>
+        <p:sp>
+          <p:nvSpPr>
+            <p:cNvPr id="26" name="Cube 25">
+              <a:extLst>
+                <a:ext uri="{FF2B5EF4-FFF2-40B4-BE49-F238E27FC236}">
+                  <a16:creationId xmlns:a16="http://schemas.microsoft.com/office/drawing/2014/main" id="{372AFCA4-87AD-6149-8A23-DE2454EF17DA}"/>
+                </a:ext>
+              </a:extLst>
+            </p:cNvPr>
+            <p:cNvSpPr/>
+            <p:nvPr/>
+          </p:nvSpPr>
+          <p:spPr>
+            <a:xfrm>
+              <a:off x="9651659" y="3751363"/>
+              <a:ext cx="1901188" cy="1633887"/>
+            </a:xfrm>
+            <a:prstGeom prst="cube">
+              <a:avLst/>
+            </a:prstGeom>
+            <a:solidFill>
+              <a:srgbClr val="052A48"/>
+            </a:solidFill>
+            <a:ln w="28575" cap="flat" cmpd="sng" algn="ctr">
+              <a:solidFill>
+                <a:srgbClr val="FFFFFF"/>
+              </a:solidFill>
+              <a:prstDash val="solid"/>
+            </a:ln>
+            <a:effectLst/>
+          </p:spPr>
+          <p:txBody>
+            <a:bodyPr rtlCol="0" anchor="ctr"/>
+            <a:lstStyle/>
+            <a:p>
+              <a:pPr marL="0" marR="0" lvl="0" indent="0" algn="ctr" defTabSz="914400" eaLnBrk="1" fontAlgn="auto" latinLnBrk="0" hangingPunct="1">
+                <a:lnSpc>
+                  <a:spcPct val="100000"/>
+                </a:lnSpc>
+                <a:spcBef>
+                  <a:spcPts val="0"/>
+                </a:spcBef>
+                <a:spcAft>
+                  <a:spcPts val="0"/>
+                </a:spcAft>
+                <a:buClrTx/>
+                <a:buSzTx/>
+                <a:buFontTx/>
+                <a:buNone/>
+                <a:tabLst/>
+                <a:defRPr/>
+              </a:pPr>
+              <a:endParaRPr kumimoji="0" lang="en-US" sz="1800" b="0" i="0" u="none" strike="noStrike" kern="0" cap="none" spc="0" normalizeH="0" baseline="0" noProof="0">
+                <a:ln>
+                  <a:noFill/>
+                </a:ln>
+                <a:solidFill>
+                  <a:sysClr val="window" lastClr="FFFFFF"/>
+                </a:solidFill>
+                <a:effectLst/>
+                <a:uLnTx/>
+                <a:uFillTx/>
+                <a:latin typeface="Calibri"/>
+                <a:ea typeface="+mn-ea"/>
+                <a:cs typeface="+mn-cs"/>
+              </a:endParaRPr>
+            </a:p>
+          </p:txBody>
+        </p:sp>
+        <p:sp>
+          <p:nvSpPr>
+            <p:cNvPr id="27" name="Cube 26">
+              <a:extLst>
+                <a:ext uri="{FF2B5EF4-FFF2-40B4-BE49-F238E27FC236}">
+                  <a16:creationId xmlns:a16="http://schemas.microsoft.com/office/drawing/2014/main" id="{F10E446A-3CF2-7F4F-894F-947AE8391EFE}"/>
+                </a:ext>
+              </a:extLst>
+            </p:cNvPr>
+            <p:cNvSpPr/>
+            <p:nvPr/>
+          </p:nvSpPr>
+          <p:spPr>
+            <a:xfrm>
+              <a:off x="8065710" y="2460210"/>
+              <a:ext cx="1901188" cy="1633887"/>
+            </a:xfrm>
+            <a:prstGeom prst="cube">
+              <a:avLst/>
+            </a:prstGeom>
+            <a:solidFill>
+              <a:srgbClr val="052A48"/>
+            </a:solidFill>
+            <a:ln w="28575" cap="flat" cmpd="sng" algn="ctr">
+              <a:solidFill>
+                <a:schemeClr val="bg1"/>
+              </a:solidFill>
+              <a:prstDash val="solid"/>
+            </a:ln>
+            <a:effectLst/>
+          </p:spPr>
+          <p:txBody>
+            <a:bodyPr rtlCol="0" anchor="ctr"/>
+            <a:lstStyle/>
+            <a:p>
+              <a:pPr marL="0" marR="0" lvl="0" indent="0" algn="ctr" defTabSz="914400" eaLnBrk="1" fontAlgn="auto" latinLnBrk="0" hangingPunct="1">
+                <a:lnSpc>
+                  <a:spcPct val="100000"/>
+                </a:lnSpc>
+                <a:spcBef>
+                  <a:spcPts val="0"/>
+                </a:spcBef>
+                <a:spcAft>
+                  <a:spcPts val="0"/>
+                </a:spcAft>
+                <a:buClrTx/>
+                <a:buSzTx/>
+                <a:buFontTx/>
+                <a:buNone/>
+                <a:tabLst/>
+                <a:defRPr/>
+              </a:pPr>
+              <a:endParaRPr kumimoji="0" lang="en-US" sz="1800" b="0" i="0" u="none" strike="noStrike" kern="0" cap="none" spc="0" normalizeH="0" baseline="0" noProof="0">
+                <a:ln>
+                  <a:noFill/>
+                </a:ln>
+                <a:solidFill>
+                  <a:sysClr val="window" lastClr="FFFFFF"/>
+                </a:solidFill>
+                <a:effectLst/>
+                <a:uLnTx/>
+                <a:uFillTx/>
+                <a:latin typeface="Calibri"/>
+                <a:ea typeface="+mn-ea"/>
+                <a:cs typeface="+mn-cs"/>
+              </a:endParaRPr>
+            </a:p>
+          </p:txBody>
+        </p:sp>
+        <p:sp>
+          <p:nvSpPr>
+            <p:cNvPr id="28" name="Cube 27">
+              <a:extLst>
+                <a:ext uri="{FF2B5EF4-FFF2-40B4-BE49-F238E27FC236}">
+                  <a16:creationId xmlns:a16="http://schemas.microsoft.com/office/drawing/2014/main" id="{D0C568F2-65AC-B143-951C-4760DA0F53E6}"/>
+                </a:ext>
+              </a:extLst>
+            </p:cNvPr>
+            <p:cNvSpPr/>
+            <p:nvPr/>
+          </p:nvSpPr>
+          <p:spPr>
+            <a:xfrm>
+              <a:off x="7635099" y="4225572"/>
+              <a:ext cx="1901188" cy="1633887"/>
+            </a:xfrm>
+            <a:prstGeom prst="cube">
+              <a:avLst/>
+            </a:prstGeom>
+            <a:solidFill>
+              <a:srgbClr val="052A48"/>
+            </a:solidFill>
+            <a:ln w="28575" cap="flat" cmpd="sng" algn="ctr">
+              <a:solidFill>
+                <a:srgbClr val="FFFFFF"/>
+              </a:solidFill>
+              <a:prstDash val="solid"/>
+            </a:ln>
+            <a:effectLst/>
+          </p:spPr>
+          <p:txBody>
+            <a:bodyPr rtlCol="0" anchor="ctr"/>
+            <a:lstStyle/>
+            <a:p>
+              <a:pPr marL="0" marR="0" lvl="0" indent="0" algn="ctr" defTabSz="914400" eaLnBrk="1" fontAlgn="auto" latinLnBrk="0" hangingPunct="1">
+                <a:lnSpc>
+                  <a:spcPct val="100000"/>
+                </a:lnSpc>
+                <a:spcBef>
+                  <a:spcPts val="0"/>
+                </a:spcBef>
+                <a:spcAft>
+                  <a:spcPts val="0"/>
+                </a:spcAft>
+                <a:buClrTx/>
+                <a:buSzTx/>
+                <a:buFontTx/>
+                <a:buNone/>
+                <a:tabLst/>
+                <a:defRPr/>
+              </a:pPr>
+              <a:endParaRPr kumimoji="0" lang="en-US" sz="1800" b="0" i="0" u="none" strike="noStrike" kern="0" cap="none" spc="0" normalizeH="0" baseline="0" noProof="0">
+                <a:ln>
+                  <a:noFill/>
+                </a:ln>
+                <a:solidFill>
+                  <a:sysClr val="window" lastClr="FFFFFF"/>
+                </a:solidFill>
+                <a:effectLst/>
+                <a:uLnTx/>
+                <a:uFillTx/>
+                <a:latin typeface="Calibri"/>
+                <a:ea typeface="+mn-ea"/>
+                <a:cs typeface="+mn-cs"/>
+              </a:endParaRPr>
+            </a:p>
+          </p:txBody>
+        </p:sp>
+        <p:sp>
+          <p:nvSpPr>
+            <p:cNvPr id="29" name="Cube 28">
+              <a:extLst>
+                <a:ext uri="{FF2B5EF4-FFF2-40B4-BE49-F238E27FC236}">
+                  <a16:creationId xmlns:a16="http://schemas.microsoft.com/office/drawing/2014/main" id="{6E2CF3BD-5B09-AC45-95DB-E8BB46715AFC}"/>
+                </a:ext>
+              </a:extLst>
+            </p:cNvPr>
+            <p:cNvSpPr/>
+            <p:nvPr/>
+          </p:nvSpPr>
+          <p:spPr>
+            <a:xfrm>
+              <a:off x="7635099" y="2934419"/>
+              <a:ext cx="1901188" cy="1633887"/>
+            </a:xfrm>
+            <a:prstGeom prst="cube">
+              <a:avLst/>
+            </a:prstGeom>
+            <a:solidFill>
+              <a:srgbClr val="052A48"/>
+            </a:solidFill>
+            <a:ln w="28575" cap="flat" cmpd="sng" algn="ctr">
+              <a:solidFill>
+                <a:schemeClr val="bg1"/>
+              </a:solidFill>
+              <a:prstDash val="solid"/>
+            </a:ln>
+            <a:effectLst/>
+          </p:spPr>
+          <p:txBody>
+            <a:bodyPr rtlCol="0" anchor="ctr"/>
+            <a:lstStyle/>
+            <a:p>
+              <a:pPr marL="0" marR="0" lvl="0" indent="0" algn="ctr" defTabSz="914400" eaLnBrk="1" fontAlgn="auto" latinLnBrk="0" hangingPunct="1">
+                <a:lnSpc>
+                  <a:spcPct val="100000"/>
+                </a:lnSpc>
+                <a:spcBef>
+                  <a:spcPts val="0"/>
+                </a:spcBef>
+                <a:spcAft>
+                  <a:spcPts val="0"/>
+                </a:spcAft>
+                <a:buClrTx/>
+                <a:buSzTx/>
+                <a:buFontTx/>
+                <a:buNone/>
+                <a:tabLst/>
+                <a:defRPr/>
+              </a:pPr>
+              <a:endParaRPr kumimoji="0" lang="en-US" sz="1800" b="0" i="0" u="none" strike="noStrike" kern="0" cap="none" spc="0" normalizeH="0" baseline="0" noProof="0">
+                <a:ln>
+                  <a:noFill/>
+                </a:ln>
+                <a:solidFill>
+                  <a:sysClr val="window" lastClr="FFFFFF"/>
+                </a:solidFill>
+                <a:effectLst/>
+                <a:uLnTx/>
+                <a:uFillTx/>
+                <a:latin typeface="Calibri"/>
+                <a:ea typeface="+mn-ea"/>
+                <a:cs typeface="+mn-cs"/>
+              </a:endParaRPr>
+            </a:p>
+          </p:txBody>
+        </p:sp>
+      </p:grpSp>
+      <p:sp>
+        <p:nvSpPr>
+          <p:cNvPr id="30" name="Cube 29">
+            <a:extLst>
+              <a:ext uri="{FF2B5EF4-FFF2-40B4-BE49-F238E27FC236}">
+                <a16:creationId xmlns:a16="http://schemas.microsoft.com/office/drawing/2014/main" id="{E3A5EB04-0E97-CB42-8448-88F44782776D}"/>
+              </a:ext>
+            </a:extLst>
+          </p:cNvPr>
+          <p:cNvSpPr/>
+          <p:nvPr/>
+        </p:nvSpPr>
+        <p:spPr>
+          <a:xfrm>
+            <a:off x="4495471" y="1593423"/>
+            <a:ext cx="988549" cy="849562"/>
+          </a:xfrm>
+          <a:prstGeom prst="cube">
+            <a:avLst/>
+          </a:prstGeom>
+          <a:solidFill>
+            <a:srgbClr val="C00000"/>
+          </a:solidFill>
+          <a:ln w="28575" cap="flat" cmpd="sng" algn="ctr">
+            <a:solidFill>
+              <a:srgbClr val="FFFFFF"/>
+            </a:solidFill>
+            <a:prstDash val="solid"/>
+          </a:ln>
+          <a:effectLst/>
+        </p:spPr>
+        <p:txBody>
+          <a:bodyPr rtlCol="0" anchor="ctr"/>
+          <a:lstStyle/>
+          <a:p>
+            <a:pPr marL="0" marR="0" lvl="0" indent="0" algn="ctr" defTabSz="914400" eaLnBrk="1" fontAlgn="auto" latinLnBrk="0" hangingPunct="1">
+              <a:lnSpc>
+                <a:spcPct val="100000"/>
+              </a:lnSpc>
+              <a:spcBef>
+                <a:spcPts val="0"/>
+              </a:spcBef>
+              <a:spcAft>
+                <a:spcPts val="0"/>
+              </a:spcAft>
+              <a:buClrTx/>
+              <a:buSzTx/>
+              <a:buFontTx/>
+              <a:buNone/>
+              <a:tabLst/>
+              <a:defRPr/>
+            </a:pPr>
+            <a:endParaRPr kumimoji="0" lang="en-US" sz="1800" b="0" i="0" u="none" strike="noStrike" kern="0" cap="none" spc="0" normalizeH="0" baseline="0" noProof="0">
+              <a:ln>
+                <a:noFill/>
+              </a:ln>
+              <a:solidFill>
+                <a:sysClr val="window" lastClr="FFFFFF"/>
+              </a:solidFill>
+              <a:effectLst/>
+              <a:uLnTx/>
+              <a:uFillTx/>
+              <a:latin typeface="Calibri"/>
+              <a:ea typeface="+mn-ea"/>
+              <a:cs typeface="+mn-cs"/>
+            </a:endParaRPr>
+          </a:p>
+        </p:txBody>
+      </p:sp>
+    </p:spTree>
+    <p:extLst>
+      <p:ext uri="{BB962C8B-B14F-4D97-AF65-F5344CB8AC3E}">
+        <p14:creationId xmlns:p14="http://schemas.microsoft.com/office/powerpoint/2010/main" val="1025323820"/>
       </p:ext>
     </p:extLst>
   </p:cSld>
@@ -13427,7 +14606,7 @@
   <a:extraClrSchemeLst/>
   <a:extLst>
     <a:ext uri="{05A4C25C-085E-4340-85A3-A5531E510DB2}">
-      <thm15:themeFamily xmlns="" xmlns:thm15="http://schemas.microsoft.com/office/thememl/2012/main" name="Office Theme" id="{62F939B6-93AF-4DB8-9C6B-D6C7DFDC589F}" vid="{4A3C46E8-61CC-4603-A589-7422A47A8E4A}"/>
+      <thm15:themeFamily xmlns:thm15="http://schemas.microsoft.com/office/thememl/2012/main" name="Office Theme" id="{62F939B6-93AF-4DB8-9C6B-D6C7DFDC589F}" vid="{4A3C46E8-61CC-4603-A589-7422A47A8E4A}"/>
     </a:ext>
   </a:extLst>
 </a:theme>

</xml_diff>